<commit_message>
10/5 progress. Up to deriving avearge intra/inter cluster lengths
</commit_message>
<xml_diff>
--- a/VANET_Felix.pptx
+++ b/VANET_Felix.pptx
@@ -5,9 +5,15 @@
     <p:sldMasterId id="2147483648" r:id="rId1"/>
   </p:sldMasterIdLst>
   <p:sldIdLst>
-    <p:sldId id="256" r:id="rId2"/>
-    <p:sldId id="257" r:id="rId3"/>
-    <p:sldId id="258" r:id="rId4"/>
+    <p:sldId id="263" r:id="rId2"/>
+    <p:sldId id="256" r:id="rId3"/>
+    <p:sldId id="257" r:id="rId4"/>
+    <p:sldId id="258" r:id="rId5"/>
+    <p:sldId id="259" r:id="rId6"/>
+    <p:sldId id="260" r:id="rId7"/>
+    <p:sldId id="261" r:id="rId8"/>
+    <p:sldId id="262" r:id="rId9"/>
+    <p:sldId id="264" r:id="rId10"/>
   </p:sldIdLst>
   <p:sldSz cx="9144000" cy="6858000" type="screen4x3"/>
   <p:notesSz cx="6858000" cy="9144000"/>
@@ -291,7 +297,7 @@
             <a:fld id="{1D8BD707-D9CF-40AE-B4C6-C98DA3205C09}" type="datetimeFigureOut">
               <a:rPr lang="en-US" smtClean="0"/>
               <a:pPr/>
-              <a:t>10/3/2012</a:t>
+              <a:t>10/4/2012</a:t>
             </a:fld>
             <a:endParaRPr lang="en-US"/>
           </a:p>
@@ -458,7 +464,7 @@
             <a:fld id="{1D8BD707-D9CF-40AE-B4C6-C98DA3205C09}" type="datetimeFigureOut">
               <a:rPr lang="en-US" smtClean="0"/>
               <a:pPr/>
-              <a:t>10/3/2012</a:t>
+              <a:t>10/4/2012</a:t>
             </a:fld>
             <a:endParaRPr lang="en-US"/>
           </a:p>
@@ -635,7 +641,7 @@
             <a:fld id="{1D8BD707-D9CF-40AE-B4C6-C98DA3205C09}" type="datetimeFigureOut">
               <a:rPr lang="en-US" smtClean="0"/>
               <a:pPr/>
-              <a:t>10/3/2012</a:t>
+              <a:t>10/4/2012</a:t>
             </a:fld>
             <a:endParaRPr lang="en-US"/>
           </a:p>
@@ -802,7 +808,7 @@
             <a:fld id="{1D8BD707-D9CF-40AE-B4C6-C98DA3205C09}" type="datetimeFigureOut">
               <a:rPr lang="en-US" smtClean="0"/>
               <a:pPr/>
-              <a:t>10/3/2012</a:t>
+              <a:t>10/4/2012</a:t>
             </a:fld>
             <a:endParaRPr lang="en-US"/>
           </a:p>
@@ -1045,7 +1051,7 @@
             <a:fld id="{1D8BD707-D9CF-40AE-B4C6-C98DA3205C09}" type="datetimeFigureOut">
               <a:rPr lang="en-US" smtClean="0"/>
               <a:pPr/>
-              <a:t>10/3/2012</a:t>
+              <a:t>10/4/2012</a:t>
             </a:fld>
             <a:endParaRPr lang="en-US"/>
           </a:p>
@@ -1330,7 +1336,7 @@
             <a:fld id="{1D8BD707-D9CF-40AE-B4C6-C98DA3205C09}" type="datetimeFigureOut">
               <a:rPr lang="en-US" smtClean="0"/>
               <a:pPr/>
-              <a:t>10/3/2012</a:t>
+              <a:t>10/4/2012</a:t>
             </a:fld>
             <a:endParaRPr lang="en-US"/>
           </a:p>
@@ -1749,7 +1755,7 @@
             <a:fld id="{1D8BD707-D9CF-40AE-B4C6-C98DA3205C09}" type="datetimeFigureOut">
               <a:rPr lang="en-US" smtClean="0"/>
               <a:pPr/>
-              <a:t>10/3/2012</a:t>
+              <a:t>10/4/2012</a:t>
             </a:fld>
             <a:endParaRPr lang="en-US"/>
           </a:p>
@@ -1864,7 +1870,7 @@
             <a:fld id="{1D8BD707-D9CF-40AE-B4C6-C98DA3205C09}" type="datetimeFigureOut">
               <a:rPr lang="en-US" smtClean="0"/>
               <a:pPr/>
-              <a:t>10/3/2012</a:t>
+              <a:t>10/4/2012</a:t>
             </a:fld>
             <a:endParaRPr lang="en-US"/>
           </a:p>
@@ -1956,7 +1962,7 @@
             <a:fld id="{1D8BD707-D9CF-40AE-B4C6-C98DA3205C09}" type="datetimeFigureOut">
               <a:rPr lang="en-US" smtClean="0"/>
               <a:pPr/>
-              <a:t>10/3/2012</a:t>
+              <a:t>10/4/2012</a:t>
             </a:fld>
             <a:endParaRPr lang="en-US"/>
           </a:p>
@@ -2230,7 +2236,7 @@
             <a:fld id="{1D8BD707-D9CF-40AE-B4C6-C98DA3205C09}" type="datetimeFigureOut">
               <a:rPr lang="en-US" smtClean="0"/>
               <a:pPr/>
-              <a:t>10/3/2012</a:t>
+              <a:t>10/4/2012</a:t>
             </a:fld>
             <a:endParaRPr lang="en-US"/>
           </a:p>
@@ -2480,7 +2486,7 @@
             <a:fld id="{1D8BD707-D9CF-40AE-B4C6-C98DA3205C09}" type="datetimeFigureOut">
               <a:rPr lang="en-US" smtClean="0"/>
               <a:pPr/>
-              <a:t>10/3/2012</a:t>
+              <a:t>10/4/2012</a:t>
             </a:fld>
             <a:endParaRPr lang="en-US"/>
           </a:p>
@@ -2690,7 +2696,7 @@
             <a:fld id="{1D8BD707-D9CF-40AE-B4C6-C98DA3205C09}" type="datetimeFigureOut">
               <a:rPr lang="en-US" smtClean="0"/>
               <a:pPr/>
-              <a:t>10/3/2012</a:t>
+              <a:t>10/4/2012</a:t>
             </a:fld>
             <a:endParaRPr lang="en-US"/>
           </a:p>
@@ -3061,6 +3067,85 @@
           <a:chExt cx="0" cy="0"/>
         </a:xfrm>
       </p:grpSpPr>
+      <p:sp>
+        <p:nvSpPr>
+          <p:cNvPr id="2" name="Title 1"/>
+          <p:cNvSpPr>
+            <a:spLocks noGrp="1"/>
+          </p:cNvSpPr>
+          <p:nvPr>
+            <p:ph type="title"/>
+          </p:nvPr>
+        </p:nvSpPr>
+        <p:spPr/>
+        <p:txBody>
+          <a:bodyPr>
+            <a:normAutofit fontScale="90000"/>
+          </a:bodyPr>
+          <a:lstStyle/>
+          <a:p>
+            <a:r>
+              <a:rPr lang="en-US" dirty="0" smtClean="0"/>
+              <a:t>Routing in Sparse Vehicular Ad Hoc Wireless Networks</a:t>
+            </a:r>
+            <a:endParaRPr lang="en-US" dirty="0"/>
+          </a:p>
+        </p:txBody>
+      </p:sp>
+      <p:sp>
+        <p:nvSpPr>
+          <p:cNvPr id="3" name="Content Placeholder 2"/>
+          <p:cNvSpPr>
+            <a:spLocks noGrp="1"/>
+          </p:cNvSpPr>
+          <p:nvPr>
+            <p:ph idx="1"/>
+          </p:nvPr>
+        </p:nvSpPr>
+        <p:spPr/>
+        <p:txBody>
+          <a:bodyPr/>
+          <a:lstStyle/>
+          <a:p>
+            <a:r>
+              <a:rPr lang="en-US" dirty="0" smtClean="0"/>
+              <a:t>TODO: Find one of the images to represent this.</a:t>
+            </a:r>
+          </a:p>
+          <a:p>
+            <a:r>
+              <a:rPr lang="en-US" dirty="0" smtClean="0"/>
+              <a:t>TODO: Authors of this paper</a:t>
+            </a:r>
+            <a:endParaRPr lang="en-US" dirty="0"/>
+          </a:p>
+        </p:txBody>
+      </p:sp>
+    </p:spTree>
+  </p:cSld>
+  <p:clrMapOvr>
+    <a:masterClrMapping/>
+  </p:clrMapOvr>
+</p:sld>
+</file>
+
+<file path=ppt/slides/slide2.xml><?xml version="1.0" encoding="utf-8"?>
+<p:sld xmlns:a="http://schemas.openxmlformats.org/drawingml/2006/main" xmlns:r="http://schemas.openxmlformats.org/officeDocument/2006/relationships" xmlns:p="http://schemas.openxmlformats.org/presentationml/2006/main">
+  <p:cSld>
+    <p:spTree>
+      <p:nvGrpSpPr>
+        <p:cNvPr id="1" name=""/>
+        <p:cNvGrpSpPr/>
+        <p:nvPr/>
+      </p:nvGrpSpPr>
+      <p:grpSpPr>
+        <a:xfrm>
+          <a:off x="0" y="0"/>
+          <a:ext cx="0" cy="0"/>
+          <a:chOff x="0" y="0"/>
+          <a:chExt cx="0" cy="0"/>
+        </a:xfrm>
+      </p:grpSpPr>
       <p:pic>
         <p:nvPicPr>
           <p:cNvPr id="1026" name="Picture 2"/>
@@ -3132,7 +3217,7 @@
 </p:sld>
 </file>
 
-<file path=ppt/slides/slide2.xml><?xml version="1.0" encoding="utf-8"?>
+<file path=ppt/slides/slide3.xml><?xml version="1.0" encoding="utf-8"?>
 <p:sld xmlns:a="http://schemas.openxmlformats.org/drawingml/2006/main" xmlns:r="http://schemas.openxmlformats.org/officeDocument/2006/relationships" xmlns:p="http://schemas.openxmlformats.org/presentationml/2006/main">
   <p:cSld>
     <p:spTree>
@@ -3189,7 +3274,7 @@
 </p:sld>
 </file>
 
-<file path=ppt/slides/slide3.xml><?xml version="1.0" encoding="utf-8"?>
+<file path=ppt/slides/slide4.xml><?xml version="1.0" encoding="utf-8"?>
 <p:sld xmlns:a="http://schemas.openxmlformats.org/drawingml/2006/main" xmlns:r="http://schemas.openxmlformats.org/officeDocument/2006/relationships" xmlns:p="http://schemas.openxmlformats.org/presentationml/2006/main">
   <p:cSld>
     <p:spTree>
@@ -3225,6 +3310,291 @@
           <a:xfrm>
             <a:off x="1600200" y="1066800"/>
             <a:ext cx="5295900" cy="4429125"/>
+          </a:xfrm>
+          <a:prstGeom prst="rect">
+            <a:avLst/>
+          </a:prstGeom>
+          <a:noFill/>
+          <a:ln w="9525">
+            <a:noFill/>
+            <a:miter lim="800000"/>
+            <a:headEnd/>
+            <a:tailEnd/>
+          </a:ln>
+        </p:spPr>
+      </p:pic>
+    </p:spTree>
+  </p:cSld>
+  <p:clrMapOvr>
+    <a:masterClrMapping/>
+  </p:clrMapOvr>
+</p:sld>
+</file>
+
+<file path=ppt/slides/slide5.xml><?xml version="1.0" encoding="utf-8"?>
+<p:sld xmlns:a="http://schemas.openxmlformats.org/drawingml/2006/main" xmlns:r="http://schemas.openxmlformats.org/officeDocument/2006/relationships" xmlns:p="http://schemas.openxmlformats.org/presentationml/2006/main">
+  <p:cSld>
+    <p:spTree>
+      <p:nvGrpSpPr>
+        <p:cNvPr id="1" name=""/>
+        <p:cNvGrpSpPr/>
+        <p:nvPr/>
+      </p:nvGrpSpPr>
+      <p:grpSpPr>
+        <a:xfrm>
+          <a:off x="0" y="0"/>
+          <a:ext cx="0" cy="0"/>
+          <a:chOff x="0" y="0"/>
+          <a:chExt cx="0" cy="0"/>
+        </a:xfrm>
+      </p:grpSpPr>
+      <p:pic>
+        <p:nvPicPr>
+          <p:cNvPr id="1026" name="Picture 2"/>
+          <p:cNvPicPr>
+            <a:picLocks noChangeAspect="1" noChangeArrowheads="1"/>
+          </p:cNvPicPr>
+          <p:nvPr/>
+        </p:nvPicPr>
+        <p:blipFill>
+          <a:blip r:embed="rId2" cstate="print"/>
+          <a:srcRect/>
+          <a:stretch>
+            <a:fillRect/>
+          </a:stretch>
+        </p:blipFill>
+        <p:spPr bwMode="auto">
+          <a:xfrm>
+            <a:off x="228600" y="1066800"/>
+            <a:ext cx="8734827" cy="4052888"/>
+          </a:xfrm>
+          <a:prstGeom prst="rect">
+            <a:avLst/>
+          </a:prstGeom>
+          <a:noFill/>
+          <a:ln w="9525">
+            <a:noFill/>
+            <a:miter lim="800000"/>
+            <a:headEnd/>
+            <a:tailEnd/>
+          </a:ln>
+        </p:spPr>
+      </p:pic>
+    </p:spTree>
+  </p:cSld>
+  <p:clrMapOvr>
+    <a:masterClrMapping/>
+  </p:clrMapOvr>
+</p:sld>
+</file>
+
+<file path=ppt/slides/slide6.xml><?xml version="1.0" encoding="utf-8"?>
+<p:sld xmlns:a="http://schemas.openxmlformats.org/drawingml/2006/main" xmlns:r="http://schemas.openxmlformats.org/officeDocument/2006/relationships" xmlns:p="http://schemas.openxmlformats.org/presentationml/2006/main">
+  <p:cSld>
+    <p:spTree>
+      <p:nvGrpSpPr>
+        <p:cNvPr id="1" name=""/>
+        <p:cNvGrpSpPr/>
+        <p:nvPr/>
+      </p:nvGrpSpPr>
+      <p:grpSpPr>
+        <a:xfrm>
+          <a:off x="0" y="0"/>
+          <a:ext cx="0" cy="0"/>
+          <a:chOff x="0" y="0"/>
+          <a:chExt cx="0" cy="0"/>
+        </a:xfrm>
+      </p:grpSpPr>
+      <p:pic>
+        <p:nvPicPr>
+          <p:cNvPr id="2051" name="Picture 3"/>
+          <p:cNvPicPr>
+            <a:picLocks noChangeAspect="1" noChangeArrowheads="1"/>
+          </p:cNvPicPr>
+          <p:nvPr/>
+        </p:nvPicPr>
+        <p:blipFill>
+          <a:blip r:embed="rId2" cstate="print"/>
+          <a:srcRect/>
+          <a:stretch>
+            <a:fillRect/>
+          </a:stretch>
+        </p:blipFill>
+        <p:spPr bwMode="auto">
+          <a:xfrm>
+            <a:off x="152400" y="1752600"/>
+            <a:ext cx="8702843" cy="3833813"/>
+          </a:xfrm>
+          <a:prstGeom prst="rect">
+            <a:avLst/>
+          </a:prstGeom>
+          <a:noFill/>
+          <a:ln w="9525">
+            <a:noFill/>
+            <a:miter lim="800000"/>
+            <a:headEnd/>
+            <a:tailEnd/>
+          </a:ln>
+        </p:spPr>
+      </p:pic>
+    </p:spTree>
+  </p:cSld>
+  <p:clrMapOvr>
+    <a:masterClrMapping/>
+  </p:clrMapOvr>
+</p:sld>
+</file>
+
+<file path=ppt/slides/slide7.xml><?xml version="1.0" encoding="utf-8"?>
+<p:sld xmlns:a="http://schemas.openxmlformats.org/drawingml/2006/main" xmlns:r="http://schemas.openxmlformats.org/officeDocument/2006/relationships" xmlns:p="http://schemas.openxmlformats.org/presentationml/2006/main">
+  <p:cSld>
+    <p:spTree>
+      <p:nvGrpSpPr>
+        <p:cNvPr id="1" name=""/>
+        <p:cNvGrpSpPr/>
+        <p:nvPr/>
+      </p:nvGrpSpPr>
+      <p:grpSpPr>
+        <a:xfrm>
+          <a:off x="0" y="0"/>
+          <a:ext cx="0" cy="0"/>
+          <a:chOff x="0" y="0"/>
+          <a:chExt cx="0" cy="0"/>
+        </a:xfrm>
+      </p:grpSpPr>
+      <p:pic>
+        <p:nvPicPr>
+          <p:cNvPr id="3074" name="Picture 2"/>
+          <p:cNvPicPr>
+            <a:picLocks noChangeAspect="1" noChangeArrowheads="1"/>
+          </p:cNvPicPr>
+          <p:nvPr/>
+        </p:nvPicPr>
+        <p:blipFill>
+          <a:blip r:embed="rId2" cstate="print"/>
+          <a:srcRect/>
+          <a:stretch>
+            <a:fillRect/>
+          </a:stretch>
+        </p:blipFill>
+        <p:spPr bwMode="auto">
+          <a:xfrm>
+            <a:off x="0" y="1524000"/>
+            <a:ext cx="8880203" cy="4138613"/>
+          </a:xfrm>
+          <a:prstGeom prst="rect">
+            <a:avLst/>
+          </a:prstGeom>
+          <a:noFill/>
+          <a:ln w="9525">
+            <a:noFill/>
+            <a:miter lim="800000"/>
+            <a:headEnd/>
+            <a:tailEnd/>
+          </a:ln>
+        </p:spPr>
+      </p:pic>
+    </p:spTree>
+  </p:cSld>
+  <p:clrMapOvr>
+    <a:masterClrMapping/>
+  </p:clrMapOvr>
+</p:sld>
+</file>
+
+<file path=ppt/slides/slide8.xml><?xml version="1.0" encoding="utf-8"?>
+<p:sld xmlns:a="http://schemas.openxmlformats.org/drawingml/2006/main" xmlns:r="http://schemas.openxmlformats.org/officeDocument/2006/relationships" xmlns:p="http://schemas.openxmlformats.org/presentationml/2006/main">
+  <p:cSld>
+    <p:spTree>
+      <p:nvGrpSpPr>
+        <p:cNvPr id="1" name=""/>
+        <p:cNvGrpSpPr/>
+        <p:nvPr/>
+      </p:nvGrpSpPr>
+      <p:grpSpPr>
+        <a:xfrm>
+          <a:off x="0" y="0"/>
+          <a:ext cx="0" cy="0"/>
+          <a:chOff x="0" y="0"/>
+          <a:chExt cx="0" cy="0"/>
+        </a:xfrm>
+      </p:grpSpPr>
+      <p:pic>
+        <p:nvPicPr>
+          <p:cNvPr id="4098" name="Picture 2"/>
+          <p:cNvPicPr>
+            <a:picLocks noChangeAspect="1" noChangeArrowheads="1"/>
+          </p:cNvPicPr>
+          <p:nvPr/>
+        </p:nvPicPr>
+        <p:blipFill>
+          <a:blip r:embed="rId2" cstate="print"/>
+          <a:srcRect/>
+          <a:stretch>
+            <a:fillRect/>
+          </a:stretch>
+        </p:blipFill>
+        <p:spPr bwMode="auto">
+          <a:xfrm>
+            <a:off x="2052638" y="1157288"/>
+            <a:ext cx="5038725" cy="4543425"/>
+          </a:xfrm>
+          <a:prstGeom prst="rect">
+            <a:avLst/>
+          </a:prstGeom>
+          <a:noFill/>
+          <a:ln w="9525">
+            <a:noFill/>
+            <a:miter lim="800000"/>
+            <a:headEnd/>
+            <a:tailEnd/>
+          </a:ln>
+        </p:spPr>
+      </p:pic>
+    </p:spTree>
+  </p:cSld>
+  <p:clrMapOvr>
+    <a:masterClrMapping/>
+  </p:clrMapOvr>
+</p:sld>
+</file>
+
+<file path=ppt/slides/slide9.xml><?xml version="1.0" encoding="utf-8"?>
+<p:sld xmlns:a="http://schemas.openxmlformats.org/drawingml/2006/main" xmlns:r="http://schemas.openxmlformats.org/officeDocument/2006/relationships" xmlns:p="http://schemas.openxmlformats.org/presentationml/2006/main">
+  <p:cSld>
+    <p:spTree>
+      <p:nvGrpSpPr>
+        <p:cNvPr id="1" name=""/>
+        <p:cNvGrpSpPr/>
+        <p:nvPr/>
+      </p:nvGrpSpPr>
+      <p:grpSpPr>
+        <a:xfrm>
+          <a:off x="0" y="0"/>
+          <a:ext cx="0" cy="0"/>
+          <a:chOff x="0" y="0"/>
+          <a:chExt cx="0" cy="0"/>
+        </a:xfrm>
+      </p:grpSpPr>
+      <p:pic>
+        <p:nvPicPr>
+          <p:cNvPr id="5122" name="Picture 2"/>
+          <p:cNvPicPr>
+            <a:picLocks noChangeAspect="1" noChangeArrowheads="1"/>
+          </p:cNvPicPr>
+          <p:nvPr/>
+        </p:nvPicPr>
+        <p:blipFill>
+          <a:blip r:embed="rId2" cstate="print"/>
+          <a:srcRect/>
+          <a:stretch>
+            <a:fillRect/>
+          </a:stretch>
+        </p:blipFill>
+        <p:spPr bwMode="auto">
+          <a:xfrm>
+            <a:off x="0" y="1676400"/>
+            <a:ext cx="9054288" cy="3571875"/>
           </a:xfrm>
           <a:prstGeom prst="rect">
             <a:avLst/>

</xml_diff>

<commit_message>
Finished reading, begin paper on Sparse VANET Created Outline for the Sparse Network Paper
</commit_message>
<xml_diff>
--- a/VANET_Felix.pptx
+++ b/VANET_Felix.pptx
@@ -14,6 +14,16 @@
     <p:sldId id="261" r:id="rId8"/>
     <p:sldId id="262" r:id="rId9"/>
     <p:sldId id="264" r:id="rId10"/>
+    <p:sldId id="265" r:id="rId11"/>
+    <p:sldId id="266" r:id="rId12"/>
+    <p:sldId id="267" r:id="rId13"/>
+    <p:sldId id="268" r:id="rId14"/>
+    <p:sldId id="269" r:id="rId15"/>
+    <p:sldId id="270" r:id="rId16"/>
+    <p:sldId id="271" r:id="rId17"/>
+    <p:sldId id="272" r:id="rId18"/>
+    <p:sldId id="273" r:id="rId19"/>
+    <p:sldId id="274" r:id="rId20"/>
   </p:sldIdLst>
   <p:sldSz cx="9144000" cy="6858000" type="screen4x3"/>
   <p:notesSz cx="6858000" cy="9144000"/>
@@ -297,7 +307,7 @@
             <a:fld id="{1D8BD707-D9CF-40AE-B4C6-C98DA3205C09}" type="datetimeFigureOut">
               <a:rPr lang="en-US" smtClean="0"/>
               <a:pPr/>
-              <a:t>10/4/2012</a:t>
+              <a:t>10/7/2012</a:t>
             </a:fld>
             <a:endParaRPr lang="en-US"/>
           </a:p>
@@ -464,7 +474,7 @@
             <a:fld id="{1D8BD707-D9CF-40AE-B4C6-C98DA3205C09}" type="datetimeFigureOut">
               <a:rPr lang="en-US" smtClean="0"/>
               <a:pPr/>
-              <a:t>10/4/2012</a:t>
+              <a:t>10/7/2012</a:t>
             </a:fld>
             <a:endParaRPr lang="en-US"/>
           </a:p>
@@ -641,7 +651,7 @@
             <a:fld id="{1D8BD707-D9CF-40AE-B4C6-C98DA3205C09}" type="datetimeFigureOut">
               <a:rPr lang="en-US" smtClean="0"/>
               <a:pPr/>
-              <a:t>10/4/2012</a:t>
+              <a:t>10/7/2012</a:t>
             </a:fld>
             <a:endParaRPr lang="en-US"/>
           </a:p>
@@ -808,7 +818,7 @@
             <a:fld id="{1D8BD707-D9CF-40AE-B4C6-C98DA3205C09}" type="datetimeFigureOut">
               <a:rPr lang="en-US" smtClean="0"/>
               <a:pPr/>
-              <a:t>10/4/2012</a:t>
+              <a:t>10/7/2012</a:t>
             </a:fld>
             <a:endParaRPr lang="en-US"/>
           </a:p>
@@ -1051,7 +1061,7 @@
             <a:fld id="{1D8BD707-D9CF-40AE-B4C6-C98DA3205C09}" type="datetimeFigureOut">
               <a:rPr lang="en-US" smtClean="0"/>
               <a:pPr/>
-              <a:t>10/4/2012</a:t>
+              <a:t>10/7/2012</a:t>
             </a:fld>
             <a:endParaRPr lang="en-US"/>
           </a:p>
@@ -1336,7 +1346,7 @@
             <a:fld id="{1D8BD707-D9CF-40AE-B4C6-C98DA3205C09}" type="datetimeFigureOut">
               <a:rPr lang="en-US" smtClean="0"/>
               <a:pPr/>
-              <a:t>10/4/2012</a:t>
+              <a:t>10/7/2012</a:t>
             </a:fld>
             <a:endParaRPr lang="en-US"/>
           </a:p>
@@ -1755,7 +1765,7 @@
             <a:fld id="{1D8BD707-D9CF-40AE-B4C6-C98DA3205C09}" type="datetimeFigureOut">
               <a:rPr lang="en-US" smtClean="0"/>
               <a:pPr/>
-              <a:t>10/4/2012</a:t>
+              <a:t>10/7/2012</a:t>
             </a:fld>
             <a:endParaRPr lang="en-US"/>
           </a:p>
@@ -1870,7 +1880,7 @@
             <a:fld id="{1D8BD707-D9CF-40AE-B4C6-C98DA3205C09}" type="datetimeFigureOut">
               <a:rPr lang="en-US" smtClean="0"/>
               <a:pPr/>
-              <a:t>10/4/2012</a:t>
+              <a:t>10/7/2012</a:t>
             </a:fld>
             <a:endParaRPr lang="en-US"/>
           </a:p>
@@ -1962,7 +1972,7 @@
             <a:fld id="{1D8BD707-D9CF-40AE-B4C6-C98DA3205C09}" type="datetimeFigureOut">
               <a:rPr lang="en-US" smtClean="0"/>
               <a:pPr/>
-              <a:t>10/4/2012</a:t>
+              <a:t>10/7/2012</a:t>
             </a:fld>
             <a:endParaRPr lang="en-US"/>
           </a:p>
@@ -2236,7 +2246,7 @@
             <a:fld id="{1D8BD707-D9CF-40AE-B4C6-C98DA3205C09}" type="datetimeFigureOut">
               <a:rPr lang="en-US" smtClean="0"/>
               <a:pPr/>
-              <a:t>10/4/2012</a:t>
+              <a:t>10/7/2012</a:t>
             </a:fld>
             <a:endParaRPr lang="en-US"/>
           </a:p>
@@ -2486,7 +2496,7 @@
             <a:fld id="{1D8BD707-D9CF-40AE-B4C6-C98DA3205C09}" type="datetimeFigureOut">
               <a:rPr lang="en-US" smtClean="0"/>
               <a:pPr/>
-              <a:t>10/4/2012</a:t>
+              <a:t>10/7/2012</a:t>
             </a:fld>
             <a:endParaRPr lang="en-US"/>
           </a:p>
@@ -2696,7 +2706,7 @@
             <a:fld id="{1D8BD707-D9CF-40AE-B4C6-C98DA3205C09}" type="datetimeFigureOut">
               <a:rPr lang="en-US" smtClean="0"/>
               <a:pPr/>
-              <a:t>10/4/2012</a:t>
+              <a:t>10/7/2012</a:t>
             </a:fld>
             <a:endParaRPr lang="en-US"/>
           </a:p>
@@ -3121,6 +3131,576 @@
           </a:p>
         </p:txBody>
       </p:sp>
+    </p:spTree>
+  </p:cSld>
+  <p:clrMapOvr>
+    <a:masterClrMapping/>
+  </p:clrMapOvr>
+</p:sld>
+</file>
+
+<file path=ppt/slides/slide10.xml><?xml version="1.0" encoding="utf-8"?>
+<p:sld xmlns:a="http://schemas.openxmlformats.org/drawingml/2006/main" xmlns:r="http://schemas.openxmlformats.org/officeDocument/2006/relationships" xmlns:p="http://schemas.openxmlformats.org/presentationml/2006/main">
+  <p:cSld>
+    <p:spTree>
+      <p:nvGrpSpPr>
+        <p:cNvPr id="1" name=""/>
+        <p:cNvGrpSpPr/>
+        <p:nvPr/>
+      </p:nvGrpSpPr>
+      <p:grpSpPr>
+        <a:xfrm>
+          <a:off x="0" y="0"/>
+          <a:ext cx="0" cy="0"/>
+          <a:chOff x="0" y="0"/>
+          <a:chExt cx="0" cy="0"/>
+        </a:xfrm>
+      </p:grpSpPr>
+      <p:pic>
+        <p:nvPicPr>
+          <p:cNvPr id="1026" name="Picture 2"/>
+          <p:cNvPicPr>
+            <a:picLocks noChangeAspect="1" noChangeArrowheads="1"/>
+          </p:cNvPicPr>
+          <p:nvPr/>
+        </p:nvPicPr>
+        <p:blipFill>
+          <a:blip r:embed="rId2" cstate="print"/>
+          <a:srcRect/>
+          <a:stretch>
+            <a:fillRect/>
+          </a:stretch>
+        </p:blipFill>
+        <p:spPr bwMode="auto">
+          <a:xfrm>
+            <a:off x="1876425" y="2547938"/>
+            <a:ext cx="5391150" cy="1762125"/>
+          </a:xfrm>
+          <a:prstGeom prst="rect">
+            <a:avLst/>
+          </a:prstGeom>
+          <a:noFill/>
+          <a:ln w="9525">
+            <a:noFill/>
+            <a:miter lim="800000"/>
+            <a:headEnd/>
+            <a:tailEnd/>
+          </a:ln>
+        </p:spPr>
+      </p:pic>
+    </p:spTree>
+  </p:cSld>
+  <p:clrMapOvr>
+    <a:masterClrMapping/>
+  </p:clrMapOvr>
+</p:sld>
+</file>
+
+<file path=ppt/slides/slide11.xml><?xml version="1.0" encoding="utf-8"?>
+<p:sld xmlns:a="http://schemas.openxmlformats.org/drawingml/2006/main" xmlns:r="http://schemas.openxmlformats.org/officeDocument/2006/relationships" xmlns:p="http://schemas.openxmlformats.org/presentationml/2006/main">
+  <p:cSld>
+    <p:spTree>
+      <p:nvGrpSpPr>
+        <p:cNvPr id="1" name=""/>
+        <p:cNvGrpSpPr/>
+        <p:nvPr/>
+      </p:nvGrpSpPr>
+      <p:grpSpPr>
+        <a:xfrm>
+          <a:off x="0" y="0"/>
+          <a:ext cx="0" cy="0"/>
+          <a:chOff x="0" y="0"/>
+          <a:chExt cx="0" cy="0"/>
+        </a:xfrm>
+      </p:grpSpPr>
+      <p:pic>
+        <p:nvPicPr>
+          <p:cNvPr id="2050" name="Picture 2"/>
+          <p:cNvPicPr>
+            <a:picLocks noChangeAspect="1" noChangeArrowheads="1"/>
+          </p:cNvPicPr>
+          <p:nvPr/>
+        </p:nvPicPr>
+        <p:blipFill>
+          <a:blip r:embed="rId2" cstate="print"/>
+          <a:srcRect/>
+          <a:stretch>
+            <a:fillRect/>
+          </a:stretch>
+        </p:blipFill>
+        <p:spPr bwMode="auto">
+          <a:xfrm>
+            <a:off x="1847850" y="1566863"/>
+            <a:ext cx="5448300" cy="3724275"/>
+          </a:xfrm>
+          <a:prstGeom prst="rect">
+            <a:avLst/>
+          </a:prstGeom>
+          <a:noFill/>
+          <a:ln w="9525">
+            <a:noFill/>
+            <a:miter lim="800000"/>
+            <a:headEnd/>
+            <a:tailEnd/>
+          </a:ln>
+        </p:spPr>
+      </p:pic>
+    </p:spTree>
+  </p:cSld>
+  <p:clrMapOvr>
+    <a:masterClrMapping/>
+  </p:clrMapOvr>
+</p:sld>
+</file>
+
+<file path=ppt/slides/slide12.xml><?xml version="1.0" encoding="utf-8"?>
+<p:sld xmlns:a="http://schemas.openxmlformats.org/drawingml/2006/main" xmlns:r="http://schemas.openxmlformats.org/officeDocument/2006/relationships" xmlns:p="http://schemas.openxmlformats.org/presentationml/2006/main">
+  <p:cSld>
+    <p:spTree>
+      <p:nvGrpSpPr>
+        <p:cNvPr id="1" name=""/>
+        <p:cNvGrpSpPr/>
+        <p:nvPr/>
+      </p:nvGrpSpPr>
+      <p:grpSpPr>
+        <a:xfrm>
+          <a:off x="0" y="0"/>
+          <a:ext cx="0" cy="0"/>
+          <a:chOff x="0" y="0"/>
+          <a:chExt cx="0" cy="0"/>
+        </a:xfrm>
+      </p:grpSpPr>
+      <p:pic>
+        <p:nvPicPr>
+          <p:cNvPr id="3074" name="Picture 2"/>
+          <p:cNvPicPr>
+            <a:picLocks noChangeAspect="1" noChangeArrowheads="1"/>
+          </p:cNvPicPr>
+          <p:nvPr/>
+        </p:nvPicPr>
+        <p:blipFill>
+          <a:blip r:embed="rId2" cstate="print"/>
+          <a:srcRect/>
+          <a:stretch>
+            <a:fillRect/>
+          </a:stretch>
+        </p:blipFill>
+        <p:spPr bwMode="auto">
+          <a:xfrm>
+            <a:off x="1762125" y="2466975"/>
+            <a:ext cx="5619750" cy="1924050"/>
+          </a:xfrm>
+          <a:prstGeom prst="rect">
+            <a:avLst/>
+          </a:prstGeom>
+          <a:noFill/>
+          <a:ln w="9525">
+            <a:noFill/>
+            <a:miter lim="800000"/>
+            <a:headEnd/>
+            <a:tailEnd/>
+          </a:ln>
+        </p:spPr>
+      </p:pic>
+    </p:spTree>
+  </p:cSld>
+  <p:clrMapOvr>
+    <a:masterClrMapping/>
+  </p:clrMapOvr>
+</p:sld>
+</file>
+
+<file path=ppt/slides/slide13.xml><?xml version="1.0" encoding="utf-8"?>
+<p:sld xmlns:a="http://schemas.openxmlformats.org/drawingml/2006/main" xmlns:r="http://schemas.openxmlformats.org/officeDocument/2006/relationships" xmlns:p="http://schemas.openxmlformats.org/presentationml/2006/main">
+  <p:cSld>
+    <p:spTree>
+      <p:nvGrpSpPr>
+        <p:cNvPr id="1" name=""/>
+        <p:cNvGrpSpPr/>
+        <p:nvPr/>
+      </p:nvGrpSpPr>
+      <p:grpSpPr>
+        <a:xfrm>
+          <a:off x="0" y="0"/>
+          <a:ext cx="0" cy="0"/>
+          <a:chOff x="0" y="0"/>
+          <a:chExt cx="0" cy="0"/>
+        </a:xfrm>
+      </p:grpSpPr>
+      <p:pic>
+        <p:nvPicPr>
+          <p:cNvPr id="1026" name="Picture 2"/>
+          <p:cNvPicPr>
+            <a:picLocks noChangeAspect="1" noChangeArrowheads="1"/>
+          </p:cNvPicPr>
+          <p:nvPr/>
+        </p:nvPicPr>
+        <p:blipFill>
+          <a:blip r:embed="rId2" cstate="print"/>
+          <a:srcRect/>
+          <a:stretch>
+            <a:fillRect/>
+          </a:stretch>
+        </p:blipFill>
+        <p:spPr bwMode="auto">
+          <a:xfrm>
+            <a:off x="1714500" y="1209675"/>
+            <a:ext cx="5715000" cy="4438650"/>
+          </a:xfrm>
+          <a:prstGeom prst="rect">
+            <a:avLst/>
+          </a:prstGeom>
+          <a:noFill/>
+          <a:ln w="9525">
+            <a:noFill/>
+            <a:miter lim="800000"/>
+            <a:headEnd/>
+            <a:tailEnd/>
+          </a:ln>
+        </p:spPr>
+      </p:pic>
+    </p:spTree>
+  </p:cSld>
+  <p:clrMapOvr>
+    <a:masterClrMapping/>
+  </p:clrMapOvr>
+</p:sld>
+</file>
+
+<file path=ppt/slides/slide14.xml><?xml version="1.0" encoding="utf-8"?>
+<p:sld xmlns:a="http://schemas.openxmlformats.org/drawingml/2006/main" xmlns:r="http://schemas.openxmlformats.org/officeDocument/2006/relationships" xmlns:p="http://schemas.openxmlformats.org/presentationml/2006/main">
+  <p:cSld>
+    <p:spTree>
+      <p:nvGrpSpPr>
+        <p:cNvPr id="1" name=""/>
+        <p:cNvGrpSpPr/>
+        <p:nvPr/>
+      </p:nvGrpSpPr>
+      <p:grpSpPr>
+        <a:xfrm>
+          <a:off x="0" y="0"/>
+          <a:ext cx="0" cy="0"/>
+          <a:chOff x="0" y="0"/>
+          <a:chExt cx="0" cy="0"/>
+        </a:xfrm>
+      </p:grpSpPr>
+      <p:pic>
+        <p:nvPicPr>
+          <p:cNvPr id="2050" name="Picture 2"/>
+          <p:cNvPicPr>
+            <a:picLocks noChangeAspect="1" noChangeArrowheads="1"/>
+          </p:cNvPicPr>
+          <p:nvPr/>
+        </p:nvPicPr>
+        <p:blipFill>
+          <a:blip r:embed="rId2" cstate="print"/>
+          <a:srcRect/>
+          <a:stretch>
+            <a:fillRect/>
+          </a:stretch>
+        </p:blipFill>
+        <p:spPr bwMode="auto">
+          <a:xfrm>
+            <a:off x="0" y="0"/>
+            <a:ext cx="9149419" cy="7467600"/>
+          </a:xfrm>
+          <a:prstGeom prst="rect">
+            <a:avLst/>
+          </a:prstGeom>
+          <a:noFill/>
+          <a:ln w="9525">
+            <a:noFill/>
+            <a:miter lim="800000"/>
+            <a:headEnd/>
+            <a:tailEnd/>
+          </a:ln>
+        </p:spPr>
+      </p:pic>
+    </p:spTree>
+  </p:cSld>
+  <p:clrMapOvr>
+    <a:masterClrMapping/>
+  </p:clrMapOvr>
+</p:sld>
+</file>
+
+<file path=ppt/slides/slide15.xml><?xml version="1.0" encoding="utf-8"?>
+<p:sld xmlns:a="http://schemas.openxmlformats.org/drawingml/2006/main" xmlns:r="http://schemas.openxmlformats.org/officeDocument/2006/relationships" xmlns:p="http://schemas.openxmlformats.org/presentationml/2006/main">
+  <p:cSld>
+    <p:spTree>
+      <p:nvGrpSpPr>
+        <p:cNvPr id="1" name=""/>
+        <p:cNvGrpSpPr/>
+        <p:nvPr/>
+      </p:nvGrpSpPr>
+      <p:grpSpPr>
+        <a:xfrm>
+          <a:off x="0" y="0"/>
+          <a:ext cx="0" cy="0"/>
+          <a:chOff x="0" y="0"/>
+          <a:chExt cx="0" cy="0"/>
+        </a:xfrm>
+      </p:grpSpPr>
+      <p:pic>
+        <p:nvPicPr>
+          <p:cNvPr id="3074" name="Picture 2"/>
+          <p:cNvPicPr>
+            <a:picLocks noChangeAspect="1" noChangeArrowheads="1"/>
+          </p:cNvPicPr>
+          <p:nvPr/>
+        </p:nvPicPr>
+        <p:blipFill>
+          <a:blip r:embed="rId2" cstate="print"/>
+          <a:srcRect/>
+          <a:stretch>
+            <a:fillRect/>
+          </a:stretch>
+        </p:blipFill>
+        <p:spPr bwMode="auto">
+          <a:xfrm>
+            <a:off x="0" y="1981200"/>
+            <a:ext cx="8880608" cy="4267200"/>
+          </a:xfrm>
+          <a:prstGeom prst="rect">
+            <a:avLst/>
+          </a:prstGeom>
+          <a:noFill/>
+          <a:ln w="9525">
+            <a:noFill/>
+            <a:miter lim="800000"/>
+            <a:headEnd/>
+            <a:tailEnd/>
+          </a:ln>
+        </p:spPr>
+      </p:pic>
+    </p:spTree>
+  </p:cSld>
+  <p:clrMapOvr>
+    <a:masterClrMapping/>
+  </p:clrMapOvr>
+</p:sld>
+</file>
+
+<file path=ppt/slides/slide16.xml><?xml version="1.0" encoding="utf-8"?>
+<p:sld xmlns:a="http://schemas.openxmlformats.org/drawingml/2006/main" xmlns:r="http://schemas.openxmlformats.org/officeDocument/2006/relationships" xmlns:p="http://schemas.openxmlformats.org/presentationml/2006/main">
+  <p:cSld>
+    <p:spTree>
+      <p:nvGrpSpPr>
+        <p:cNvPr id="1" name=""/>
+        <p:cNvGrpSpPr/>
+        <p:nvPr/>
+      </p:nvGrpSpPr>
+      <p:grpSpPr>
+        <a:xfrm>
+          <a:off x="0" y="0"/>
+          <a:ext cx="0" cy="0"/>
+          <a:chOff x="0" y="0"/>
+          <a:chExt cx="0" cy="0"/>
+        </a:xfrm>
+      </p:grpSpPr>
+      <p:pic>
+        <p:nvPicPr>
+          <p:cNvPr id="4098" name="Picture 2"/>
+          <p:cNvPicPr>
+            <a:picLocks noChangeAspect="1" noChangeArrowheads="1"/>
+          </p:cNvPicPr>
+          <p:nvPr/>
+        </p:nvPicPr>
+        <p:blipFill>
+          <a:blip r:embed="rId2" cstate="print"/>
+          <a:srcRect/>
+          <a:stretch>
+            <a:fillRect/>
+          </a:stretch>
+        </p:blipFill>
+        <p:spPr bwMode="auto">
+          <a:xfrm>
+            <a:off x="0" y="1066800"/>
+            <a:ext cx="9141949" cy="4524375"/>
+          </a:xfrm>
+          <a:prstGeom prst="rect">
+            <a:avLst/>
+          </a:prstGeom>
+          <a:noFill/>
+          <a:ln w="9525">
+            <a:noFill/>
+            <a:miter lim="800000"/>
+            <a:headEnd/>
+            <a:tailEnd/>
+          </a:ln>
+        </p:spPr>
+      </p:pic>
+    </p:spTree>
+  </p:cSld>
+  <p:clrMapOvr>
+    <a:masterClrMapping/>
+  </p:clrMapOvr>
+</p:sld>
+</file>
+
+<file path=ppt/slides/slide17.xml><?xml version="1.0" encoding="utf-8"?>
+<p:sld xmlns:a="http://schemas.openxmlformats.org/drawingml/2006/main" xmlns:r="http://schemas.openxmlformats.org/officeDocument/2006/relationships" xmlns:p="http://schemas.openxmlformats.org/presentationml/2006/main">
+  <p:cSld>
+    <p:spTree>
+      <p:nvGrpSpPr>
+        <p:cNvPr id="1" name=""/>
+        <p:cNvGrpSpPr/>
+        <p:nvPr/>
+      </p:nvGrpSpPr>
+      <p:grpSpPr>
+        <a:xfrm>
+          <a:off x="0" y="0"/>
+          <a:ext cx="0" cy="0"/>
+          <a:chOff x="0" y="0"/>
+          <a:chExt cx="0" cy="0"/>
+        </a:xfrm>
+      </p:grpSpPr>
+      <p:pic>
+        <p:nvPicPr>
+          <p:cNvPr id="5122" name="Picture 2"/>
+          <p:cNvPicPr>
+            <a:picLocks noChangeAspect="1" noChangeArrowheads="1"/>
+          </p:cNvPicPr>
+          <p:nvPr/>
+        </p:nvPicPr>
+        <p:blipFill>
+          <a:blip r:embed="rId2" cstate="print"/>
+          <a:srcRect/>
+          <a:stretch>
+            <a:fillRect/>
+          </a:stretch>
+        </p:blipFill>
+        <p:spPr bwMode="auto">
+          <a:xfrm>
+            <a:off x="0" y="1091688"/>
+            <a:ext cx="9144000" cy="4533794"/>
+          </a:xfrm>
+          <a:prstGeom prst="rect">
+            <a:avLst/>
+          </a:prstGeom>
+          <a:noFill/>
+          <a:ln w="9525">
+            <a:noFill/>
+            <a:miter lim="800000"/>
+            <a:headEnd/>
+            <a:tailEnd/>
+          </a:ln>
+        </p:spPr>
+      </p:pic>
+    </p:spTree>
+  </p:cSld>
+  <p:clrMapOvr>
+    <a:masterClrMapping/>
+  </p:clrMapOvr>
+</p:sld>
+</file>
+
+<file path=ppt/slides/slide18.xml><?xml version="1.0" encoding="utf-8"?>
+<p:sld xmlns:a="http://schemas.openxmlformats.org/drawingml/2006/main" xmlns:r="http://schemas.openxmlformats.org/officeDocument/2006/relationships" xmlns:p="http://schemas.openxmlformats.org/presentationml/2006/main">
+  <p:cSld>
+    <p:spTree>
+      <p:nvGrpSpPr>
+        <p:cNvPr id="1" name=""/>
+        <p:cNvGrpSpPr/>
+        <p:nvPr/>
+      </p:nvGrpSpPr>
+      <p:grpSpPr>
+        <a:xfrm>
+          <a:off x="0" y="0"/>
+          <a:ext cx="0" cy="0"/>
+          <a:chOff x="0" y="0"/>
+          <a:chExt cx="0" cy="0"/>
+        </a:xfrm>
+      </p:grpSpPr>
+      <p:pic>
+        <p:nvPicPr>
+          <p:cNvPr id="6146" name="Picture 2"/>
+          <p:cNvPicPr>
+            <a:picLocks noChangeAspect="1" noChangeArrowheads="1"/>
+          </p:cNvPicPr>
+          <p:nvPr/>
+        </p:nvPicPr>
+        <p:blipFill>
+          <a:blip r:embed="rId2" cstate="print"/>
+          <a:srcRect/>
+          <a:stretch>
+            <a:fillRect/>
+          </a:stretch>
+        </p:blipFill>
+        <p:spPr bwMode="auto">
+          <a:xfrm>
+            <a:off x="0" y="1172924"/>
+            <a:ext cx="9144000" cy="4356340"/>
+          </a:xfrm>
+          <a:prstGeom prst="rect">
+            <a:avLst/>
+          </a:prstGeom>
+          <a:noFill/>
+          <a:ln w="9525">
+            <a:noFill/>
+            <a:miter lim="800000"/>
+            <a:headEnd/>
+            <a:tailEnd/>
+          </a:ln>
+        </p:spPr>
+      </p:pic>
+    </p:spTree>
+  </p:cSld>
+  <p:clrMapOvr>
+    <a:masterClrMapping/>
+  </p:clrMapOvr>
+</p:sld>
+</file>
+
+<file path=ppt/slides/slide19.xml><?xml version="1.0" encoding="utf-8"?>
+<p:sld xmlns:a="http://schemas.openxmlformats.org/drawingml/2006/main" xmlns:r="http://schemas.openxmlformats.org/officeDocument/2006/relationships" xmlns:p="http://schemas.openxmlformats.org/presentationml/2006/main">
+  <p:cSld>
+    <p:spTree>
+      <p:nvGrpSpPr>
+        <p:cNvPr id="1" name=""/>
+        <p:cNvGrpSpPr/>
+        <p:nvPr/>
+      </p:nvGrpSpPr>
+      <p:grpSpPr>
+        <a:xfrm>
+          <a:off x="0" y="0"/>
+          <a:ext cx="0" cy="0"/>
+          <a:chOff x="0" y="0"/>
+          <a:chExt cx="0" cy="0"/>
+        </a:xfrm>
+      </p:grpSpPr>
+      <p:pic>
+        <p:nvPicPr>
+          <p:cNvPr id="7170" name="Picture 2"/>
+          <p:cNvPicPr>
+            <a:picLocks noChangeAspect="1" noChangeArrowheads="1"/>
+          </p:cNvPicPr>
+          <p:nvPr/>
+        </p:nvPicPr>
+        <p:blipFill>
+          <a:blip r:embed="rId2" cstate="print"/>
+          <a:srcRect/>
+          <a:stretch>
+            <a:fillRect/>
+          </a:stretch>
+        </p:blipFill>
+        <p:spPr bwMode="auto">
+          <a:xfrm>
+            <a:off x="0" y="1154506"/>
+            <a:ext cx="9144000" cy="4308082"/>
+          </a:xfrm>
+          <a:prstGeom prst="rect">
+            <a:avLst/>
+          </a:prstGeom>
+          <a:noFill/>
+          <a:ln w="9525">
+            <a:noFill/>
+            <a:miter lim="800000"/>
+            <a:headEnd/>
+            <a:tailEnd/>
+          </a:ln>
+        </p:spPr>
+      </p:pic>
     </p:spTree>
   </p:cSld>
   <p:clrMapOvr>

</xml_diff>

<commit_message>
Work up to impact of market penetration Added stuff to power point up to K-S Test
</commit_message>
<xml_diff>
--- a/VANET_Felix.pptx
+++ b/VANET_Felix.pptx
@@ -4,26 +4,33 @@
   <p:sldMasterIdLst>
     <p:sldMasterId id="2147483648" r:id="rId1"/>
   </p:sldMasterIdLst>
+  <p:notesMasterIdLst>
+    <p:notesMasterId r:id="rId25"/>
+  </p:notesMasterIdLst>
   <p:sldIdLst>
     <p:sldId id="263" r:id="rId2"/>
-    <p:sldId id="256" r:id="rId3"/>
-    <p:sldId id="257" r:id="rId4"/>
-    <p:sldId id="258" r:id="rId5"/>
-    <p:sldId id="259" r:id="rId6"/>
-    <p:sldId id="260" r:id="rId7"/>
-    <p:sldId id="261" r:id="rId8"/>
-    <p:sldId id="262" r:id="rId9"/>
-    <p:sldId id="264" r:id="rId10"/>
-    <p:sldId id="265" r:id="rId11"/>
-    <p:sldId id="266" r:id="rId12"/>
-    <p:sldId id="267" r:id="rId13"/>
-    <p:sldId id="268" r:id="rId14"/>
-    <p:sldId id="269" r:id="rId15"/>
-    <p:sldId id="270" r:id="rId16"/>
-    <p:sldId id="271" r:id="rId17"/>
-    <p:sldId id="272" r:id="rId18"/>
-    <p:sldId id="273" r:id="rId19"/>
-    <p:sldId id="274" r:id="rId20"/>
+    <p:sldId id="275" r:id="rId3"/>
+    <p:sldId id="276" r:id="rId4"/>
+    <p:sldId id="256" r:id="rId5"/>
+    <p:sldId id="277" r:id="rId6"/>
+    <p:sldId id="257" r:id="rId7"/>
+    <p:sldId id="259" r:id="rId8"/>
+    <p:sldId id="260" r:id="rId9"/>
+    <p:sldId id="279" r:id="rId10"/>
+    <p:sldId id="278" r:id="rId11"/>
+    <p:sldId id="261" r:id="rId12"/>
+    <p:sldId id="262" r:id="rId13"/>
+    <p:sldId id="264" r:id="rId14"/>
+    <p:sldId id="265" r:id="rId15"/>
+    <p:sldId id="266" r:id="rId16"/>
+    <p:sldId id="267" r:id="rId17"/>
+    <p:sldId id="268" r:id="rId18"/>
+    <p:sldId id="269" r:id="rId19"/>
+    <p:sldId id="270" r:id="rId20"/>
+    <p:sldId id="271" r:id="rId21"/>
+    <p:sldId id="272" r:id="rId22"/>
+    <p:sldId id="273" r:id="rId23"/>
+    <p:sldId id="274" r:id="rId24"/>
   </p:sldIdLst>
   <p:sldSz cx="9144000" cy="6858000" type="screen4x3"/>
   <p:notesSz cx="6858000" cy="9144000"/>
@@ -125,6 +132,353 @@
 </p:presentation>
 </file>
 
+<file path=ppt/notesMasters/notesMaster1.xml><?xml version="1.0" encoding="utf-8"?>
+<p:notesMaster xmlns:a="http://schemas.openxmlformats.org/drawingml/2006/main" xmlns:r="http://schemas.openxmlformats.org/officeDocument/2006/relationships" xmlns:p="http://schemas.openxmlformats.org/presentationml/2006/main">
+  <p:cSld>
+    <p:bg>
+      <p:bgRef idx="1001">
+        <a:schemeClr val="bg1"/>
+      </p:bgRef>
+    </p:bg>
+    <p:spTree>
+      <p:nvGrpSpPr>
+        <p:cNvPr id="1" name=""/>
+        <p:cNvGrpSpPr/>
+        <p:nvPr/>
+      </p:nvGrpSpPr>
+      <p:grpSpPr>
+        <a:xfrm>
+          <a:off x="0" y="0"/>
+          <a:ext cx="0" cy="0"/>
+          <a:chOff x="0" y="0"/>
+          <a:chExt cx="0" cy="0"/>
+        </a:xfrm>
+      </p:grpSpPr>
+      <p:sp>
+        <p:nvSpPr>
+          <p:cNvPr id="2" name="Header Placeholder 1"/>
+          <p:cNvSpPr>
+            <a:spLocks noGrp="1"/>
+          </p:cNvSpPr>
+          <p:nvPr>
+            <p:ph type="hdr" sz="quarter"/>
+          </p:nvPr>
+        </p:nvSpPr>
+        <p:spPr>
+          <a:xfrm>
+            <a:off x="0" y="0"/>
+            <a:ext cx="2971800" cy="457200"/>
+          </a:xfrm>
+          <a:prstGeom prst="rect">
+            <a:avLst/>
+          </a:prstGeom>
+        </p:spPr>
+        <p:txBody>
+          <a:bodyPr vert="horz" lIns="91440" tIns="45720" rIns="91440" bIns="45720" rtlCol="0"/>
+          <a:lstStyle>
+            <a:lvl1pPr algn="l">
+              <a:defRPr sz="1200"/>
+            </a:lvl1pPr>
+          </a:lstStyle>
+          <a:p>
+            <a:endParaRPr lang="en-US"/>
+          </a:p>
+        </p:txBody>
+      </p:sp>
+      <p:sp>
+        <p:nvSpPr>
+          <p:cNvPr id="3" name="Date Placeholder 2"/>
+          <p:cNvSpPr>
+            <a:spLocks noGrp="1"/>
+          </p:cNvSpPr>
+          <p:nvPr>
+            <p:ph type="dt" idx="1"/>
+          </p:nvPr>
+        </p:nvSpPr>
+        <p:spPr>
+          <a:xfrm>
+            <a:off x="3884613" y="0"/>
+            <a:ext cx="2971800" cy="457200"/>
+          </a:xfrm>
+          <a:prstGeom prst="rect">
+            <a:avLst/>
+          </a:prstGeom>
+        </p:spPr>
+        <p:txBody>
+          <a:bodyPr vert="horz" lIns="91440" tIns="45720" rIns="91440" bIns="45720" rtlCol="0"/>
+          <a:lstStyle>
+            <a:lvl1pPr algn="r">
+              <a:defRPr sz="1200"/>
+            </a:lvl1pPr>
+          </a:lstStyle>
+          <a:p>
+            <a:fld id="{AA1794F1-29D0-4E50-8F0F-8A456A29C142}" type="datetimeFigureOut">
+              <a:rPr lang="en-US" smtClean="0"/>
+              <a:t>10/10/2012</a:t>
+            </a:fld>
+            <a:endParaRPr lang="en-US"/>
+          </a:p>
+        </p:txBody>
+      </p:sp>
+      <p:sp>
+        <p:nvSpPr>
+          <p:cNvPr id="4" name="Slide Image Placeholder 3"/>
+          <p:cNvSpPr>
+            <a:spLocks noGrp="1" noRot="1" noChangeAspect="1"/>
+          </p:cNvSpPr>
+          <p:nvPr>
+            <p:ph type="sldImg" idx="2"/>
+          </p:nvPr>
+        </p:nvSpPr>
+        <p:spPr>
+          <a:xfrm>
+            <a:off x="1143000" y="685800"/>
+            <a:ext cx="4572000" cy="3429000"/>
+          </a:xfrm>
+          <a:prstGeom prst="rect">
+            <a:avLst/>
+          </a:prstGeom>
+          <a:noFill/>
+          <a:ln w="12700">
+            <a:solidFill>
+              <a:prstClr val="black"/>
+            </a:solidFill>
+          </a:ln>
+        </p:spPr>
+        <p:txBody>
+          <a:bodyPr vert="horz" lIns="91440" tIns="45720" rIns="91440" bIns="45720" rtlCol="0" anchor="ctr"/>
+          <a:lstStyle/>
+          <a:p>
+            <a:endParaRPr lang="en-US"/>
+          </a:p>
+        </p:txBody>
+      </p:sp>
+      <p:sp>
+        <p:nvSpPr>
+          <p:cNvPr id="5" name="Notes Placeholder 4"/>
+          <p:cNvSpPr>
+            <a:spLocks noGrp="1"/>
+          </p:cNvSpPr>
+          <p:nvPr>
+            <p:ph type="body" sz="quarter" idx="3"/>
+          </p:nvPr>
+        </p:nvSpPr>
+        <p:spPr>
+          <a:xfrm>
+            <a:off x="685800" y="4343400"/>
+            <a:ext cx="5486400" cy="4114800"/>
+          </a:xfrm>
+          <a:prstGeom prst="rect">
+            <a:avLst/>
+          </a:prstGeom>
+        </p:spPr>
+        <p:txBody>
+          <a:bodyPr vert="horz" lIns="91440" tIns="45720" rIns="91440" bIns="45720" rtlCol="0">
+            <a:normAutofit/>
+          </a:bodyPr>
+          <a:lstStyle/>
+          <a:p>
+            <a:pPr lvl="0"/>
+            <a:r>
+              <a:rPr lang="en-US" smtClean="0"/>
+              <a:t>Click to edit Master text styles</a:t>
+            </a:r>
+          </a:p>
+          <a:p>
+            <a:pPr lvl="1"/>
+            <a:r>
+              <a:rPr lang="en-US" smtClean="0"/>
+              <a:t>Second level</a:t>
+            </a:r>
+          </a:p>
+          <a:p>
+            <a:pPr lvl="2"/>
+            <a:r>
+              <a:rPr lang="en-US" smtClean="0"/>
+              <a:t>Third level</a:t>
+            </a:r>
+          </a:p>
+          <a:p>
+            <a:pPr lvl="3"/>
+            <a:r>
+              <a:rPr lang="en-US" smtClean="0"/>
+              <a:t>Fourth level</a:t>
+            </a:r>
+          </a:p>
+          <a:p>
+            <a:pPr lvl="4"/>
+            <a:r>
+              <a:rPr lang="en-US" smtClean="0"/>
+              <a:t>Fifth level</a:t>
+            </a:r>
+            <a:endParaRPr lang="en-US"/>
+          </a:p>
+        </p:txBody>
+      </p:sp>
+      <p:sp>
+        <p:nvSpPr>
+          <p:cNvPr id="6" name="Footer Placeholder 5"/>
+          <p:cNvSpPr>
+            <a:spLocks noGrp="1"/>
+          </p:cNvSpPr>
+          <p:nvPr>
+            <p:ph type="ftr" sz="quarter" idx="4"/>
+          </p:nvPr>
+        </p:nvSpPr>
+        <p:spPr>
+          <a:xfrm>
+            <a:off x="0" y="8685213"/>
+            <a:ext cx="2971800" cy="457200"/>
+          </a:xfrm>
+          <a:prstGeom prst="rect">
+            <a:avLst/>
+          </a:prstGeom>
+        </p:spPr>
+        <p:txBody>
+          <a:bodyPr vert="horz" lIns="91440" tIns="45720" rIns="91440" bIns="45720" rtlCol="0" anchor="b"/>
+          <a:lstStyle>
+            <a:lvl1pPr algn="l">
+              <a:defRPr sz="1200"/>
+            </a:lvl1pPr>
+          </a:lstStyle>
+          <a:p>
+            <a:endParaRPr lang="en-US"/>
+          </a:p>
+        </p:txBody>
+      </p:sp>
+      <p:sp>
+        <p:nvSpPr>
+          <p:cNvPr id="7" name="Slide Number Placeholder 6"/>
+          <p:cNvSpPr>
+            <a:spLocks noGrp="1"/>
+          </p:cNvSpPr>
+          <p:nvPr>
+            <p:ph type="sldNum" sz="quarter" idx="5"/>
+          </p:nvPr>
+        </p:nvSpPr>
+        <p:spPr>
+          <a:xfrm>
+            <a:off x="3884613" y="8685213"/>
+            <a:ext cx="2971800" cy="457200"/>
+          </a:xfrm>
+          <a:prstGeom prst="rect">
+            <a:avLst/>
+          </a:prstGeom>
+        </p:spPr>
+        <p:txBody>
+          <a:bodyPr vert="horz" lIns="91440" tIns="45720" rIns="91440" bIns="45720" rtlCol="0" anchor="b"/>
+          <a:lstStyle>
+            <a:lvl1pPr algn="r">
+              <a:defRPr sz="1200"/>
+            </a:lvl1pPr>
+          </a:lstStyle>
+          <a:p>
+            <a:fld id="{12FF95E7-DEBC-45EA-92BE-3E2682DB1FD4}" type="slidenum">
+              <a:rPr lang="en-US" smtClean="0"/>
+              <a:t>‹#›</a:t>
+            </a:fld>
+            <a:endParaRPr lang="en-US"/>
+          </a:p>
+        </p:txBody>
+      </p:sp>
+    </p:spTree>
+  </p:cSld>
+  <p:clrMap bg1="lt1" tx1="dk1" bg2="lt2" tx2="dk2" accent1="accent1" accent2="accent2" accent3="accent3" accent4="accent4" accent5="accent5" accent6="accent6" hlink="hlink" folHlink="folHlink"/>
+  <p:notesStyle>
+    <a:lvl1pPr marL="0" algn="l" defTabSz="914400" rtl="0" eaLnBrk="1" latinLnBrk="0" hangingPunct="1">
+      <a:defRPr sz="1200" kern="1200">
+        <a:solidFill>
+          <a:schemeClr val="tx1"/>
+        </a:solidFill>
+        <a:latin typeface="+mn-lt"/>
+        <a:ea typeface="+mn-ea"/>
+        <a:cs typeface="+mn-cs"/>
+      </a:defRPr>
+    </a:lvl1pPr>
+    <a:lvl2pPr marL="457200" algn="l" defTabSz="914400" rtl="0" eaLnBrk="1" latinLnBrk="0" hangingPunct="1">
+      <a:defRPr sz="1200" kern="1200">
+        <a:solidFill>
+          <a:schemeClr val="tx1"/>
+        </a:solidFill>
+        <a:latin typeface="+mn-lt"/>
+        <a:ea typeface="+mn-ea"/>
+        <a:cs typeface="+mn-cs"/>
+      </a:defRPr>
+    </a:lvl2pPr>
+    <a:lvl3pPr marL="914400" algn="l" defTabSz="914400" rtl="0" eaLnBrk="1" latinLnBrk="0" hangingPunct="1">
+      <a:defRPr sz="1200" kern="1200">
+        <a:solidFill>
+          <a:schemeClr val="tx1"/>
+        </a:solidFill>
+        <a:latin typeface="+mn-lt"/>
+        <a:ea typeface="+mn-ea"/>
+        <a:cs typeface="+mn-cs"/>
+      </a:defRPr>
+    </a:lvl3pPr>
+    <a:lvl4pPr marL="1371600" algn="l" defTabSz="914400" rtl="0" eaLnBrk="1" latinLnBrk="0" hangingPunct="1">
+      <a:defRPr sz="1200" kern="1200">
+        <a:solidFill>
+          <a:schemeClr val="tx1"/>
+        </a:solidFill>
+        <a:latin typeface="+mn-lt"/>
+        <a:ea typeface="+mn-ea"/>
+        <a:cs typeface="+mn-cs"/>
+      </a:defRPr>
+    </a:lvl4pPr>
+    <a:lvl5pPr marL="1828800" algn="l" defTabSz="914400" rtl="0" eaLnBrk="1" latinLnBrk="0" hangingPunct="1">
+      <a:defRPr sz="1200" kern="1200">
+        <a:solidFill>
+          <a:schemeClr val="tx1"/>
+        </a:solidFill>
+        <a:latin typeface="+mn-lt"/>
+        <a:ea typeface="+mn-ea"/>
+        <a:cs typeface="+mn-cs"/>
+      </a:defRPr>
+    </a:lvl5pPr>
+    <a:lvl6pPr marL="2286000" algn="l" defTabSz="914400" rtl="0" eaLnBrk="1" latinLnBrk="0" hangingPunct="1">
+      <a:defRPr sz="1200" kern="1200">
+        <a:solidFill>
+          <a:schemeClr val="tx1"/>
+        </a:solidFill>
+        <a:latin typeface="+mn-lt"/>
+        <a:ea typeface="+mn-ea"/>
+        <a:cs typeface="+mn-cs"/>
+      </a:defRPr>
+    </a:lvl6pPr>
+    <a:lvl7pPr marL="2743200" algn="l" defTabSz="914400" rtl="0" eaLnBrk="1" latinLnBrk="0" hangingPunct="1">
+      <a:defRPr sz="1200" kern="1200">
+        <a:solidFill>
+          <a:schemeClr val="tx1"/>
+        </a:solidFill>
+        <a:latin typeface="+mn-lt"/>
+        <a:ea typeface="+mn-ea"/>
+        <a:cs typeface="+mn-cs"/>
+      </a:defRPr>
+    </a:lvl7pPr>
+    <a:lvl8pPr marL="3200400" algn="l" defTabSz="914400" rtl="0" eaLnBrk="1" latinLnBrk="0" hangingPunct="1">
+      <a:defRPr sz="1200" kern="1200">
+        <a:solidFill>
+          <a:schemeClr val="tx1"/>
+        </a:solidFill>
+        <a:latin typeface="+mn-lt"/>
+        <a:ea typeface="+mn-ea"/>
+        <a:cs typeface="+mn-cs"/>
+      </a:defRPr>
+    </a:lvl8pPr>
+    <a:lvl9pPr marL="3657600" algn="l" defTabSz="914400" rtl="0" eaLnBrk="1" latinLnBrk="0" hangingPunct="1">
+      <a:defRPr sz="1200" kern="1200">
+        <a:solidFill>
+          <a:schemeClr val="tx1"/>
+        </a:solidFill>
+        <a:latin typeface="+mn-lt"/>
+        <a:ea typeface="+mn-ea"/>
+        <a:cs typeface="+mn-cs"/>
+      </a:defRPr>
+    </a:lvl9pPr>
+  </p:notesStyle>
+</p:notesMaster>
+</file>
+
 <file path=ppt/slideLayouts/slideLayout1.xml><?xml version="1.0" encoding="utf-8"?>
 <p:sldLayout xmlns:a="http://schemas.openxmlformats.org/drawingml/2006/main" xmlns:r="http://schemas.openxmlformats.org/officeDocument/2006/relationships" xmlns:p="http://schemas.openxmlformats.org/presentationml/2006/main" type="title" preserve="1">
   <p:cSld name="Title Slide">
@@ -307,7 +661,7 @@
             <a:fld id="{1D8BD707-D9CF-40AE-B4C6-C98DA3205C09}" type="datetimeFigureOut">
               <a:rPr lang="en-US" smtClean="0"/>
               <a:pPr/>
-              <a:t>10/7/2012</a:t>
+              <a:t>10/10/2012</a:t>
             </a:fld>
             <a:endParaRPr lang="en-US"/>
           </a:p>
@@ -474,7 +828,7 @@
             <a:fld id="{1D8BD707-D9CF-40AE-B4C6-C98DA3205C09}" type="datetimeFigureOut">
               <a:rPr lang="en-US" smtClean="0"/>
               <a:pPr/>
-              <a:t>10/7/2012</a:t>
+              <a:t>10/10/2012</a:t>
             </a:fld>
             <a:endParaRPr lang="en-US"/>
           </a:p>
@@ -651,7 +1005,7 @@
             <a:fld id="{1D8BD707-D9CF-40AE-B4C6-C98DA3205C09}" type="datetimeFigureOut">
               <a:rPr lang="en-US" smtClean="0"/>
               <a:pPr/>
-              <a:t>10/7/2012</a:t>
+              <a:t>10/10/2012</a:t>
             </a:fld>
             <a:endParaRPr lang="en-US"/>
           </a:p>
@@ -818,7 +1172,7 @@
             <a:fld id="{1D8BD707-D9CF-40AE-B4C6-C98DA3205C09}" type="datetimeFigureOut">
               <a:rPr lang="en-US" smtClean="0"/>
               <a:pPr/>
-              <a:t>10/7/2012</a:t>
+              <a:t>10/10/2012</a:t>
             </a:fld>
             <a:endParaRPr lang="en-US"/>
           </a:p>
@@ -1061,7 +1415,7 @@
             <a:fld id="{1D8BD707-D9CF-40AE-B4C6-C98DA3205C09}" type="datetimeFigureOut">
               <a:rPr lang="en-US" smtClean="0"/>
               <a:pPr/>
-              <a:t>10/7/2012</a:t>
+              <a:t>10/10/2012</a:t>
             </a:fld>
             <a:endParaRPr lang="en-US"/>
           </a:p>
@@ -1346,7 +1700,7 @@
             <a:fld id="{1D8BD707-D9CF-40AE-B4C6-C98DA3205C09}" type="datetimeFigureOut">
               <a:rPr lang="en-US" smtClean="0"/>
               <a:pPr/>
-              <a:t>10/7/2012</a:t>
+              <a:t>10/10/2012</a:t>
             </a:fld>
             <a:endParaRPr lang="en-US"/>
           </a:p>
@@ -1765,7 +2119,7 @@
             <a:fld id="{1D8BD707-D9CF-40AE-B4C6-C98DA3205C09}" type="datetimeFigureOut">
               <a:rPr lang="en-US" smtClean="0"/>
               <a:pPr/>
-              <a:t>10/7/2012</a:t>
+              <a:t>10/10/2012</a:t>
             </a:fld>
             <a:endParaRPr lang="en-US"/>
           </a:p>
@@ -1880,7 +2234,7 @@
             <a:fld id="{1D8BD707-D9CF-40AE-B4C6-C98DA3205C09}" type="datetimeFigureOut">
               <a:rPr lang="en-US" smtClean="0"/>
               <a:pPr/>
-              <a:t>10/7/2012</a:t>
+              <a:t>10/10/2012</a:t>
             </a:fld>
             <a:endParaRPr lang="en-US"/>
           </a:p>
@@ -1972,7 +2326,7 @@
             <a:fld id="{1D8BD707-D9CF-40AE-B4C6-C98DA3205C09}" type="datetimeFigureOut">
               <a:rPr lang="en-US" smtClean="0"/>
               <a:pPr/>
-              <a:t>10/7/2012</a:t>
+              <a:t>10/10/2012</a:t>
             </a:fld>
             <a:endParaRPr lang="en-US"/>
           </a:p>
@@ -2246,7 +2600,7 @@
             <a:fld id="{1D8BD707-D9CF-40AE-B4C6-C98DA3205C09}" type="datetimeFigureOut">
               <a:rPr lang="en-US" smtClean="0"/>
               <a:pPr/>
-              <a:t>10/7/2012</a:t>
+              <a:t>10/10/2012</a:t>
             </a:fld>
             <a:endParaRPr lang="en-US"/>
           </a:p>
@@ -2496,7 +2850,7 @@
             <a:fld id="{1D8BD707-D9CF-40AE-B4C6-C98DA3205C09}" type="datetimeFigureOut">
               <a:rPr lang="en-US" smtClean="0"/>
               <a:pPr/>
-              <a:t>10/7/2012</a:t>
+              <a:t>10/10/2012</a:t>
             </a:fld>
             <a:endParaRPr lang="en-US"/>
           </a:p>
@@ -2706,7 +3060,7 @@
             <a:fld id="{1D8BD707-D9CF-40AE-B4C6-C98DA3205C09}" type="datetimeFigureOut">
               <a:rPr lang="en-US" smtClean="0"/>
               <a:pPr/>
-              <a:t>10/7/2012</a:t>
+              <a:t>10/10/2012</a:t>
             </a:fld>
             <a:endParaRPr lang="en-US"/>
           </a:p>
@@ -3136,10 +3490,471 @@
   <p:clrMapOvr>
     <a:masterClrMapping/>
   </p:clrMapOvr>
+  <p:timing>
+    <p:tnLst>
+      <p:par>
+        <p:cTn id="1" dur="indefinite" restart="never" nodeType="tmRoot"/>
+      </p:par>
+    </p:tnLst>
+  </p:timing>
 </p:sld>
 </file>
 
 <file path=ppt/slides/slide10.xml><?xml version="1.0" encoding="utf-8"?>
+<p:sld xmlns:a="http://schemas.openxmlformats.org/drawingml/2006/main" xmlns:r="http://schemas.openxmlformats.org/officeDocument/2006/relationships" xmlns:p="http://schemas.openxmlformats.org/presentationml/2006/main">
+  <p:cSld>
+    <p:spTree>
+      <p:nvGrpSpPr>
+        <p:cNvPr id="1" name=""/>
+        <p:cNvGrpSpPr/>
+        <p:nvPr/>
+      </p:nvGrpSpPr>
+      <p:grpSpPr>
+        <a:xfrm>
+          <a:off x="0" y="0"/>
+          <a:ext cx="0" cy="0"/>
+          <a:chOff x="0" y="0"/>
+          <a:chExt cx="0" cy="0"/>
+        </a:xfrm>
+      </p:grpSpPr>
+      <p:sp>
+        <p:nvSpPr>
+          <p:cNvPr id="2" name="Title 1"/>
+          <p:cNvSpPr>
+            <a:spLocks noGrp="1"/>
+          </p:cNvSpPr>
+          <p:nvPr>
+            <p:ph type="title"/>
+          </p:nvPr>
+        </p:nvSpPr>
+        <p:spPr/>
+        <p:txBody>
+          <a:bodyPr/>
+          <a:lstStyle/>
+          <a:p>
+            <a:r>
+              <a:rPr lang="en-US" dirty="0" err="1" smtClean="0"/>
+              <a:t>Kolmogorov</a:t>
+            </a:r>
+            <a:r>
+              <a:rPr lang="en-US" dirty="0" smtClean="0"/>
+              <a:t>-Smirnov Test (K-S Test)</a:t>
+            </a:r>
+            <a:endParaRPr lang="en-US" dirty="0"/>
+          </a:p>
+        </p:txBody>
+      </p:sp>
+      <p:sp>
+        <p:nvSpPr>
+          <p:cNvPr id="3" name="Content Placeholder 2"/>
+          <p:cNvSpPr>
+            <a:spLocks noGrp="1"/>
+          </p:cNvSpPr>
+          <p:nvPr>
+            <p:ph idx="1"/>
+          </p:nvPr>
+        </p:nvSpPr>
+        <p:spPr/>
+        <p:txBody>
+          <a:bodyPr/>
+          <a:lstStyle/>
+          <a:p>
+            <a:r>
+              <a:rPr lang="en-US" dirty="0" smtClean="0"/>
+              <a:t>Tests the goodness-of-fit of the derived models against the empirical data.</a:t>
+            </a:r>
+          </a:p>
+          <a:p>
+            <a:r>
+              <a:rPr lang="en-US" dirty="0" smtClean="0"/>
+              <a:t>Defined by, </a:t>
+            </a:r>
+          </a:p>
+          <a:p>
+            <a:r>
+              <a:rPr lang="en-US" dirty="0" smtClean="0"/>
+              <a:t>For times 1-3am, the D statistic is accurate up to 3%.</a:t>
+            </a:r>
+          </a:p>
+          <a:p>
+            <a:r>
+              <a:rPr lang="en-US" dirty="0" smtClean="0"/>
+              <a:t>For the other time frames, 10am-12pm and 3pm-5pm, the model breaks down and the D statistic is as high as 10%.</a:t>
+            </a:r>
+            <a:endParaRPr lang="en-US" dirty="0"/>
+          </a:p>
+        </p:txBody>
+      </p:sp>
+      <p:sp>
+        <p:nvSpPr>
+          <p:cNvPr id="37890" name="Rectangle 2"/>
+          <p:cNvSpPr>
+            <a:spLocks noChangeArrowheads="1"/>
+          </p:cNvSpPr>
+          <p:nvPr/>
+        </p:nvSpPr>
+        <p:spPr bwMode="auto">
+          <a:xfrm>
+            <a:off x="0" y="0"/>
+            <a:ext cx="9144000" cy="0"/>
+          </a:xfrm>
+          <a:prstGeom prst="rect">
+            <a:avLst/>
+          </a:prstGeom>
+          <a:noFill/>
+          <a:ln w="9525">
+            <a:noFill/>
+            <a:miter lim="800000"/>
+            <a:headEnd/>
+            <a:tailEnd/>
+          </a:ln>
+          <a:effectLst/>
+        </p:spPr>
+        <p:txBody>
+          <a:bodyPr vert="horz" wrap="none" lIns="91440" tIns="45720" rIns="91440" bIns="45720" numCol="1" anchor="ctr" anchorCtr="0" compatLnSpc="1">
+            <a:prstTxWarp prst="textNoShape">
+              <a:avLst/>
+            </a:prstTxWarp>
+            <a:spAutoFit/>
+          </a:bodyPr>
+          <a:lstStyle/>
+          <a:p>
+            <a:endParaRPr lang="en-US"/>
+          </a:p>
+        </p:txBody>
+      </p:sp>
+      <p:pic>
+        <p:nvPicPr>
+          <p:cNvPr id="37889" name="Picture 1"/>
+          <p:cNvPicPr>
+            <a:picLocks noChangeAspect="1" noChangeArrowheads="1"/>
+          </p:cNvPicPr>
+          <p:nvPr/>
+        </p:nvPicPr>
+        <p:blipFill>
+          <a:blip r:embed="rId2" cstate="print">
+            <a:clrChange>
+              <a:clrFrom>
+                <a:srgbClr val="FFFFFF"/>
+              </a:clrFrom>
+              <a:clrTo>
+                <a:srgbClr val="FFFFFF">
+                  <a:alpha val="0"/>
+                </a:srgbClr>
+              </a:clrTo>
+            </a:clrChange>
+          </a:blip>
+          <a:srcRect/>
+          <a:stretch>
+            <a:fillRect/>
+          </a:stretch>
+        </p:blipFill>
+        <p:spPr bwMode="auto">
+          <a:xfrm>
+            <a:off x="3048000" y="2895600"/>
+            <a:ext cx="3019425" cy="209550"/>
+          </a:xfrm>
+          <a:prstGeom prst="rect">
+            <a:avLst/>
+          </a:prstGeom>
+          <a:noFill/>
+        </p:spPr>
+      </p:pic>
+    </p:spTree>
+  </p:cSld>
+  <p:clrMapOvr>
+    <a:masterClrMapping/>
+  </p:clrMapOvr>
+  <p:timing>
+    <p:tnLst>
+      <p:par>
+        <p:cTn id="1" dur="indefinite" restart="never" nodeType="tmRoot"/>
+      </p:par>
+    </p:tnLst>
+  </p:timing>
+</p:sld>
+</file>
+
+<file path=ppt/slides/slide11.xml><?xml version="1.0" encoding="utf-8"?>
+<p:sld xmlns:a="http://schemas.openxmlformats.org/drawingml/2006/main" xmlns:r="http://schemas.openxmlformats.org/officeDocument/2006/relationships" xmlns:p="http://schemas.openxmlformats.org/presentationml/2006/main">
+  <p:cSld>
+    <p:spTree>
+      <p:nvGrpSpPr>
+        <p:cNvPr id="1" name=""/>
+        <p:cNvGrpSpPr/>
+        <p:nvPr/>
+      </p:nvGrpSpPr>
+      <p:grpSpPr>
+        <a:xfrm>
+          <a:off x="0" y="0"/>
+          <a:ext cx="0" cy="0"/>
+          <a:chOff x="0" y="0"/>
+          <a:chExt cx="0" cy="0"/>
+        </a:xfrm>
+      </p:grpSpPr>
+      <p:pic>
+        <p:nvPicPr>
+          <p:cNvPr id="3074" name="Picture 2"/>
+          <p:cNvPicPr>
+            <a:picLocks noChangeAspect="1" noChangeArrowheads="1"/>
+          </p:cNvPicPr>
+          <p:nvPr/>
+        </p:nvPicPr>
+        <p:blipFill>
+          <a:blip r:embed="rId2" cstate="print"/>
+          <a:srcRect/>
+          <a:stretch>
+            <a:fillRect/>
+          </a:stretch>
+        </p:blipFill>
+        <p:spPr bwMode="auto">
+          <a:xfrm>
+            <a:off x="76200" y="228600"/>
+            <a:ext cx="8553199" cy="3986213"/>
+          </a:xfrm>
+          <a:prstGeom prst="rect">
+            <a:avLst/>
+          </a:prstGeom>
+          <a:noFill/>
+          <a:ln w="9525">
+            <a:noFill/>
+            <a:miter lim="800000"/>
+            <a:headEnd/>
+            <a:tailEnd/>
+          </a:ln>
+        </p:spPr>
+      </p:pic>
+      <p:sp>
+        <p:nvSpPr>
+          <p:cNvPr id="3" name="TextBox 2"/>
+          <p:cNvSpPr txBox="1"/>
+          <p:nvPr/>
+        </p:nvSpPr>
+        <p:spPr>
+          <a:xfrm>
+            <a:off x="228600" y="4419600"/>
+            <a:ext cx="8534400" cy="1200329"/>
+          </a:xfrm>
+          <a:prstGeom prst="rect">
+            <a:avLst/>
+          </a:prstGeom>
+          <a:noFill/>
+        </p:spPr>
+        <p:txBody>
+          <a:bodyPr wrap="square" rtlCol="0">
+            <a:spAutoFit/>
+          </a:bodyPr>
+          <a:lstStyle/>
+          <a:p>
+            <a:pPr>
+              <a:buFont typeface="Arial" pitchFamily="34" charset="0"/>
+              <a:buChar char="•"/>
+            </a:pPr>
+            <a:r>
+              <a:rPr lang="en-US" dirty="0" smtClean="0"/>
+              <a:t>The solid and dashed blue lines represent the time frame 1-3am</a:t>
+            </a:r>
+          </a:p>
+          <a:p>
+            <a:pPr>
+              <a:buFont typeface="Arial" pitchFamily="34" charset="0"/>
+              <a:buChar char="•"/>
+            </a:pPr>
+            <a:r>
+              <a:rPr lang="en-US" dirty="0" smtClean="0"/>
+              <a:t>The derived model is a good fit to the empirical data for this time frame</a:t>
+            </a:r>
+          </a:p>
+          <a:p>
+            <a:pPr>
+              <a:buFont typeface="Arial" pitchFamily="34" charset="0"/>
+              <a:buChar char="•"/>
+            </a:pPr>
+            <a:r>
+              <a:rPr lang="en-US" dirty="0" smtClean="0"/>
+              <a:t>The D statistic is at most 3% for this case</a:t>
+            </a:r>
+          </a:p>
+          <a:p>
+            <a:pPr>
+              <a:buFont typeface="Arial" pitchFamily="34" charset="0"/>
+              <a:buChar char="•"/>
+            </a:pPr>
+            <a:r>
+              <a:rPr lang="en-US" dirty="0" smtClean="0"/>
+              <a:t>The other 2 time frames do not fit as well</a:t>
+            </a:r>
+            <a:endParaRPr lang="en-US" dirty="0"/>
+          </a:p>
+        </p:txBody>
+      </p:sp>
+    </p:spTree>
+  </p:cSld>
+  <p:clrMapOvr>
+    <a:masterClrMapping/>
+  </p:clrMapOvr>
+  <p:timing>
+    <p:tnLst>
+      <p:par>
+        <p:cTn id="1" dur="indefinite" restart="never" nodeType="tmRoot"/>
+      </p:par>
+    </p:tnLst>
+  </p:timing>
+</p:sld>
+</file>
+
+<file path=ppt/slides/slide12.xml><?xml version="1.0" encoding="utf-8"?>
+<p:sld xmlns:a="http://schemas.openxmlformats.org/drawingml/2006/main" xmlns:r="http://schemas.openxmlformats.org/officeDocument/2006/relationships" xmlns:p="http://schemas.openxmlformats.org/presentationml/2006/main">
+  <p:cSld>
+    <p:spTree>
+      <p:nvGrpSpPr>
+        <p:cNvPr id="1" name=""/>
+        <p:cNvGrpSpPr/>
+        <p:nvPr/>
+      </p:nvGrpSpPr>
+      <p:grpSpPr>
+        <a:xfrm>
+          <a:off x="0" y="0"/>
+          <a:ext cx="0" cy="0"/>
+          <a:chOff x="0" y="0"/>
+          <a:chExt cx="0" cy="0"/>
+        </a:xfrm>
+      </p:grpSpPr>
+      <p:pic>
+        <p:nvPicPr>
+          <p:cNvPr id="4098" name="Picture 2"/>
+          <p:cNvPicPr>
+            <a:picLocks noChangeAspect="1" noChangeArrowheads="1"/>
+          </p:cNvPicPr>
+          <p:nvPr/>
+        </p:nvPicPr>
+        <p:blipFill>
+          <a:blip r:embed="rId2" cstate="print"/>
+          <a:srcRect/>
+          <a:stretch>
+            <a:fillRect/>
+          </a:stretch>
+        </p:blipFill>
+        <p:spPr bwMode="auto">
+          <a:xfrm>
+            <a:off x="2057400" y="1676400"/>
+            <a:ext cx="5038725" cy="4543425"/>
+          </a:xfrm>
+          <a:prstGeom prst="rect">
+            <a:avLst/>
+          </a:prstGeom>
+          <a:noFill/>
+          <a:ln w="9525">
+            <a:noFill/>
+            <a:miter lim="800000"/>
+            <a:headEnd/>
+            <a:tailEnd/>
+          </a:ln>
+        </p:spPr>
+      </p:pic>
+      <p:sp>
+        <p:nvSpPr>
+          <p:cNvPr id="3" name="TextBox 2"/>
+          <p:cNvSpPr txBox="1"/>
+          <p:nvPr/>
+        </p:nvSpPr>
+        <p:spPr>
+          <a:xfrm>
+            <a:off x="762000" y="228600"/>
+            <a:ext cx="7543800" cy="369332"/>
+          </a:xfrm>
+          <a:prstGeom prst="rect">
+            <a:avLst/>
+          </a:prstGeom>
+          <a:noFill/>
+        </p:spPr>
+        <p:txBody>
+          <a:bodyPr wrap="square" rtlCol="0">
+            <a:spAutoFit/>
+          </a:bodyPr>
+          <a:lstStyle/>
+          <a:p>
+            <a:r>
+              <a:rPr lang="en-US" dirty="0" smtClean="0"/>
+              <a:t>Analytical data for the D statistics from the K-S Test</a:t>
+            </a:r>
+            <a:endParaRPr lang="en-US" dirty="0"/>
+          </a:p>
+        </p:txBody>
+      </p:sp>
+    </p:spTree>
+  </p:cSld>
+  <p:clrMapOvr>
+    <a:masterClrMapping/>
+  </p:clrMapOvr>
+  <p:timing>
+    <p:tnLst>
+      <p:par>
+        <p:cTn id="1" dur="indefinite" restart="never" nodeType="tmRoot"/>
+      </p:par>
+    </p:tnLst>
+  </p:timing>
+</p:sld>
+</file>
+
+<file path=ppt/slides/slide13.xml><?xml version="1.0" encoding="utf-8"?>
+<p:sld xmlns:a="http://schemas.openxmlformats.org/drawingml/2006/main" xmlns:r="http://schemas.openxmlformats.org/officeDocument/2006/relationships" xmlns:p="http://schemas.openxmlformats.org/presentationml/2006/main">
+  <p:cSld>
+    <p:spTree>
+      <p:nvGrpSpPr>
+        <p:cNvPr id="1" name=""/>
+        <p:cNvGrpSpPr/>
+        <p:nvPr/>
+      </p:nvGrpSpPr>
+      <p:grpSpPr>
+        <a:xfrm>
+          <a:off x="0" y="0"/>
+          <a:ext cx="0" cy="0"/>
+          <a:chOff x="0" y="0"/>
+          <a:chExt cx="0" cy="0"/>
+        </a:xfrm>
+      </p:grpSpPr>
+      <p:pic>
+        <p:nvPicPr>
+          <p:cNvPr id="5122" name="Picture 2"/>
+          <p:cNvPicPr>
+            <a:picLocks noChangeAspect="1" noChangeArrowheads="1"/>
+          </p:cNvPicPr>
+          <p:nvPr/>
+        </p:nvPicPr>
+        <p:blipFill>
+          <a:blip r:embed="rId2" cstate="print"/>
+          <a:srcRect/>
+          <a:stretch>
+            <a:fillRect/>
+          </a:stretch>
+        </p:blipFill>
+        <p:spPr bwMode="auto">
+          <a:xfrm>
+            <a:off x="0" y="1676400"/>
+            <a:ext cx="9054288" cy="3571875"/>
+          </a:xfrm>
+          <a:prstGeom prst="rect">
+            <a:avLst/>
+          </a:prstGeom>
+          <a:noFill/>
+          <a:ln w="9525">
+            <a:noFill/>
+            <a:miter lim="800000"/>
+            <a:headEnd/>
+            <a:tailEnd/>
+          </a:ln>
+        </p:spPr>
+      </p:pic>
+    </p:spTree>
+  </p:cSld>
+  <p:clrMapOvr>
+    <a:masterClrMapping/>
+  </p:clrMapOvr>
+</p:sld>
+</file>
+
+<file path=ppt/slides/slide14.xml><?xml version="1.0" encoding="utf-8"?>
 <p:sld xmlns:a="http://schemas.openxmlformats.org/drawingml/2006/main" xmlns:r="http://schemas.openxmlformats.org/officeDocument/2006/relationships" xmlns:p="http://schemas.openxmlformats.org/presentationml/2006/main">
   <p:cSld>
     <p:spTree>
@@ -3196,7 +4011,7 @@
 </p:sld>
 </file>
 
-<file path=ppt/slides/slide11.xml><?xml version="1.0" encoding="utf-8"?>
+<file path=ppt/slides/slide15.xml><?xml version="1.0" encoding="utf-8"?>
 <p:sld xmlns:a="http://schemas.openxmlformats.org/drawingml/2006/main" xmlns:r="http://schemas.openxmlformats.org/officeDocument/2006/relationships" xmlns:p="http://schemas.openxmlformats.org/presentationml/2006/main">
   <p:cSld>
     <p:spTree>
@@ -3253,7 +4068,7 @@
 </p:sld>
 </file>
 
-<file path=ppt/slides/slide12.xml><?xml version="1.0" encoding="utf-8"?>
+<file path=ppt/slides/slide16.xml><?xml version="1.0" encoding="utf-8"?>
 <p:sld xmlns:a="http://schemas.openxmlformats.org/drawingml/2006/main" xmlns:r="http://schemas.openxmlformats.org/officeDocument/2006/relationships" xmlns:p="http://schemas.openxmlformats.org/presentationml/2006/main">
   <p:cSld>
     <p:spTree>
@@ -3310,7 +4125,7 @@
 </p:sld>
 </file>
 
-<file path=ppt/slides/slide13.xml><?xml version="1.0" encoding="utf-8"?>
+<file path=ppt/slides/slide17.xml><?xml version="1.0" encoding="utf-8"?>
 <p:sld xmlns:a="http://schemas.openxmlformats.org/drawingml/2006/main" xmlns:r="http://schemas.openxmlformats.org/officeDocument/2006/relationships" xmlns:p="http://schemas.openxmlformats.org/presentationml/2006/main">
   <p:cSld>
     <p:spTree>
@@ -3367,7 +4182,7 @@
 </p:sld>
 </file>
 
-<file path=ppt/slides/slide14.xml><?xml version="1.0" encoding="utf-8"?>
+<file path=ppt/slides/slide18.xml><?xml version="1.0" encoding="utf-8"?>
 <p:sld xmlns:a="http://schemas.openxmlformats.org/drawingml/2006/main" xmlns:r="http://schemas.openxmlformats.org/officeDocument/2006/relationships" xmlns:p="http://schemas.openxmlformats.org/presentationml/2006/main">
   <p:cSld>
     <p:spTree>
@@ -3424,7 +4239,7 @@
 </p:sld>
 </file>
 
-<file path=ppt/slides/slide15.xml><?xml version="1.0" encoding="utf-8"?>
+<file path=ppt/slides/slide19.xml><?xml version="1.0" encoding="utf-8"?>
 <p:sld xmlns:a="http://schemas.openxmlformats.org/drawingml/2006/main" xmlns:r="http://schemas.openxmlformats.org/officeDocument/2006/relationships" xmlns:p="http://schemas.openxmlformats.org/presentationml/2006/main">
   <p:cSld>
     <p:spTree>
@@ -3481,7 +4296,101 @@
 </p:sld>
 </file>
 
-<file path=ppt/slides/slide16.xml><?xml version="1.0" encoding="utf-8"?>
+<file path=ppt/slides/slide2.xml><?xml version="1.0" encoding="utf-8"?>
+<p:sld xmlns:a="http://schemas.openxmlformats.org/drawingml/2006/main" xmlns:r="http://schemas.openxmlformats.org/officeDocument/2006/relationships" xmlns:p="http://schemas.openxmlformats.org/presentationml/2006/main">
+  <p:cSld>
+    <p:spTree>
+      <p:nvGrpSpPr>
+        <p:cNvPr id="1" name=""/>
+        <p:cNvGrpSpPr/>
+        <p:nvPr/>
+      </p:nvGrpSpPr>
+      <p:grpSpPr>
+        <a:xfrm>
+          <a:off x="0" y="0"/>
+          <a:ext cx="0" cy="0"/>
+          <a:chOff x="0" y="0"/>
+          <a:chExt cx="0" cy="0"/>
+        </a:xfrm>
+      </p:grpSpPr>
+      <p:sp>
+        <p:nvSpPr>
+          <p:cNvPr id="2" name="Title 1"/>
+          <p:cNvSpPr>
+            <a:spLocks noGrp="1"/>
+          </p:cNvSpPr>
+          <p:nvPr>
+            <p:ph type="title"/>
+          </p:nvPr>
+        </p:nvSpPr>
+        <p:spPr/>
+        <p:txBody>
+          <a:bodyPr/>
+          <a:lstStyle/>
+          <a:p>
+            <a:r>
+              <a:rPr lang="en-US" dirty="0" smtClean="0"/>
+              <a:t>What this research hopes to solve</a:t>
+            </a:r>
+            <a:endParaRPr lang="en-US" dirty="0"/>
+          </a:p>
+        </p:txBody>
+      </p:sp>
+      <p:sp>
+        <p:nvSpPr>
+          <p:cNvPr id="3" name="Content Placeholder 2"/>
+          <p:cNvSpPr>
+            <a:spLocks noGrp="1"/>
+          </p:cNvSpPr>
+          <p:nvPr>
+            <p:ph idx="1"/>
+          </p:nvPr>
+        </p:nvSpPr>
+        <p:spPr/>
+        <p:txBody>
+          <a:bodyPr>
+            <a:normAutofit fontScale="92500" lnSpcReduction="20000"/>
+          </a:bodyPr>
+          <a:lstStyle/>
+          <a:p>
+            <a:r>
+              <a:rPr lang="en-US" dirty="0" smtClean="0"/>
+              <a:t>In a VANET what happens when a message can not be routed to another vehicle because it is out of range?</a:t>
+            </a:r>
+          </a:p>
+          <a:p>
+            <a:r>
+              <a:rPr lang="en-US" dirty="0" smtClean="0"/>
+              <a:t>Can a reliable model be developed to characterize a VANET that assumes a communication network is fragmented and unreliable?</a:t>
+            </a:r>
+          </a:p>
+          <a:p>
+            <a:r>
+              <a:rPr lang="en-US" dirty="0" smtClean="0"/>
+              <a:t>Given a collection of empirical data, how realistic is it to mathematically model for the scenario of expecting disconnections in a communications network?</a:t>
+            </a:r>
+          </a:p>
+          <a:p>
+            <a:endParaRPr lang="en-US" dirty="0"/>
+          </a:p>
+        </p:txBody>
+      </p:sp>
+    </p:spTree>
+  </p:cSld>
+  <p:clrMapOvr>
+    <a:masterClrMapping/>
+  </p:clrMapOvr>
+  <p:timing>
+    <p:tnLst>
+      <p:par>
+        <p:cTn id="1" dur="indefinite" restart="never" nodeType="tmRoot"/>
+      </p:par>
+    </p:tnLst>
+  </p:timing>
+</p:sld>
+</file>
+
+<file path=ppt/slides/slide20.xml><?xml version="1.0" encoding="utf-8"?>
 <p:sld xmlns:a="http://schemas.openxmlformats.org/drawingml/2006/main" xmlns:r="http://schemas.openxmlformats.org/officeDocument/2006/relationships" xmlns:p="http://schemas.openxmlformats.org/presentationml/2006/main">
   <p:cSld>
     <p:spTree>
@@ -3538,7 +4447,7 @@
 </p:sld>
 </file>
 
-<file path=ppt/slides/slide17.xml><?xml version="1.0" encoding="utf-8"?>
+<file path=ppt/slides/slide21.xml><?xml version="1.0" encoding="utf-8"?>
 <p:sld xmlns:a="http://schemas.openxmlformats.org/drawingml/2006/main" xmlns:r="http://schemas.openxmlformats.org/officeDocument/2006/relationships" xmlns:p="http://schemas.openxmlformats.org/presentationml/2006/main">
   <p:cSld>
     <p:spTree>
@@ -3595,7 +4504,7 @@
 </p:sld>
 </file>
 
-<file path=ppt/slides/slide18.xml><?xml version="1.0" encoding="utf-8"?>
+<file path=ppt/slides/slide22.xml><?xml version="1.0" encoding="utf-8"?>
 <p:sld xmlns:a="http://schemas.openxmlformats.org/drawingml/2006/main" xmlns:r="http://schemas.openxmlformats.org/officeDocument/2006/relationships" xmlns:p="http://schemas.openxmlformats.org/presentationml/2006/main">
   <p:cSld>
     <p:spTree>
@@ -3652,7 +4561,7 @@
 </p:sld>
 </file>
 
-<file path=ppt/slides/slide19.xml><?xml version="1.0" encoding="utf-8"?>
+<file path=ppt/slides/slide23.xml><?xml version="1.0" encoding="utf-8"?>
 <p:sld xmlns:a="http://schemas.openxmlformats.org/drawingml/2006/main" xmlns:r="http://schemas.openxmlformats.org/officeDocument/2006/relationships" xmlns:p="http://schemas.openxmlformats.org/presentationml/2006/main">
   <p:cSld>
     <p:spTree>
@@ -3709,7 +4618,104 @@
 </p:sld>
 </file>
 
-<file path=ppt/slides/slide2.xml><?xml version="1.0" encoding="utf-8"?>
+<file path=ppt/slides/slide3.xml><?xml version="1.0" encoding="utf-8"?>
+<p:sld xmlns:a="http://schemas.openxmlformats.org/drawingml/2006/main" xmlns:r="http://schemas.openxmlformats.org/officeDocument/2006/relationships" xmlns:p="http://schemas.openxmlformats.org/presentationml/2006/main">
+  <p:cSld>
+    <p:spTree>
+      <p:nvGrpSpPr>
+        <p:cNvPr id="1" name=""/>
+        <p:cNvGrpSpPr/>
+        <p:nvPr/>
+      </p:nvGrpSpPr>
+      <p:grpSpPr>
+        <a:xfrm>
+          <a:off x="0" y="0"/>
+          <a:ext cx="0" cy="0"/>
+          <a:chOff x="0" y="0"/>
+          <a:chExt cx="0" cy="0"/>
+        </a:xfrm>
+      </p:grpSpPr>
+      <p:sp>
+        <p:nvSpPr>
+          <p:cNvPr id="2" name="Title 1"/>
+          <p:cNvSpPr>
+            <a:spLocks noGrp="1"/>
+          </p:cNvSpPr>
+          <p:nvPr>
+            <p:ph type="title"/>
+          </p:nvPr>
+        </p:nvSpPr>
+        <p:spPr/>
+        <p:txBody>
+          <a:bodyPr/>
+          <a:lstStyle/>
+          <a:p>
+            <a:r>
+              <a:rPr lang="en-US" dirty="0" smtClean="0"/>
+              <a:t>What we hope to answer</a:t>
+            </a:r>
+            <a:endParaRPr lang="en-US" dirty="0"/>
+          </a:p>
+        </p:txBody>
+      </p:sp>
+      <p:sp>
+        <p:nvSpPr>
+          <p:cNvPr id="3" name="Content Placeholder 2"/>
+          <p:cNvSpPr>
+            <a:spLocks noGrp="1"/>
+          </p:cNvSpPr>
+          <p:nvPr>
+            <p:ph idx="1"/>
+          </p:nvPr>
+        </p:nvSpPr>
+        <p:spPr>
+          <a:xfrm>
+            <a:off x="457200" y="1600200"/>
+            <a:ext cx="8229600" cy="4525963"/>
+          </a:xfrm>
+        </p:spPr>
+        <p:txBody>
+          <a:bodyPr>
+            <a:normAutofit fontScale="92500" lnSpcReduction="10000"/>
+          </a:bodyPr>
+          <a:lstStyle/>
+          <a:p>
+            <a:r>
+              <a:rPr lang="en-US" dirty="0" smtClean="0"/>
+              <a:t>What are the consequences when trying to relay safety messages to other vehicles when the network is constantly disconnected?</a:t>
+            </a:r>
+          </a:p>
+          <a:p>
+            <a:r>
+              <a:rPr lang="en-US" dirty="0" smtClean="0"/>
+              <a:t>In a disconnected VANET what are the key characteristics to observe and what are the adverse effects on performance in the network?</a:t>
+            </a:r>
+          </a:p>
+          <a:p>
+            <a:r>
+              <a:rPr lang="en-US" dirty="0" smtClean="0"/>
+              <a:t>What is the solution to a disconnected VANET if any? And if there is not a viable solution to this problem how can the affects of network fragmentation become minimized?</a:t>
+            </a:r>
+            <a:endParaRPr lang="en-US" dirty="0"/>
+          </a:p>
+        </p:txBody>
+      </p:sp>
+    </p:spTree>
+  </p:cSld>
+  <p:clrMapOvr>
+    <a:masterClrMapping/>
+  </p:clrMapOvr>
+  <p:timing>
+    <p:tnLst>
+      <p:par>
+        <p:cTn id="1" dur="indefinite" restart="never" nodeType="tmRoot"/>
+      </p:par>
+    </p:tnLst>
+  </p:timing>
+</p:sld>
+</file>
+
+<file path=ppt/slides/slide4.xml><?xml version="1.0" encoding="utf-8"?>
 <p:sld xmlns:a="http://schemas.openxmlformats.org/drawingml/2006/main" xmlns:r="http://schemas.openxmlformats.org/officeDocument/2006/relationships" xmlns:p="http://schemas.openxmlformats.org/presentationml/2006/main">
   <p:cSld>
     <p:spTree>
@@ -3743,7 +4749,7 @@
         </p:blipFill>
         <p:spPr bwMode="auto">
           <a:xfrm>
-            <a:off x="1981200" y="914400"/>
+            <a:off x="2133600" y="914400"/>
             <a:ext cx="4048125" cy="1152525"/>
           </a:xfrm>
           <a:prstGeom prst="rect">
@@ -3766,8 +4772,8 @@
         </p:nvSpPr>
         <p:spPr>
           <a:xfrm>
-            <a:off x="2819400" y="457200"/>
-            <a:ext cx="2438400" cy="369332"/>
+            <a:off x="1219200" y="457200"/>
+            <a:ext cx="6019800" cy="369332"/>
           </a:xfrm>
           <a:prstGeom prst="rect">
             <a:avLst/>
@@ -3783,8 +4789,94 @@
             <a:pPr algn="ctr"/>
             <a:r>
               <a:rPr lang="en-US" dirty="0" smtClean="0"/>
-              <a:t>Car following model</a:t>
-            </a:r>
+              <a:t>The basis of the model, the Car </a:t>
+            </a:r>
+            <a:r>
+              <a:rPr lang="en-US" dirty="0" smtClean="0"/>
+              <a:t>F</a:t>
+            </a:r>
+            <a:r>
+              <a:rPr lang="en-US" dirty="0" smtClean="0"/>
+              <a:t>ollowing </a:t>
+            </a:r>
+            <a:r>
+              <a:rPr lang="en-US" dirty="0" smtClean="0"/>
+              <a:t>M</a:t>
+            </a:r>
+            <a:r>
+              <a:rPr lang="en-US" dirty="0" smtClean="0"/>
+              <a:t>odel</a:t>
+            </a:r>
+            <a:endParaRPr lang="en-US" dirty="0"/>
+          </a:p>
+        </p:txBody>
+      </p:sp>
+      <p:sp>
+        <p:nvSpPr>
+          <p:cNvPr id="4" name="TextBox 3"/>
+          <p:cNvSpPr txBox="1"/>
+          <p:nvPr/>
+        </p:nvSpPr>
+        <p:spPr>
+          <a:xfrm>
+            <a:off x="609600" y="2209800"/>
+            <a:ext cx="7543800" cy="2862322"/>
+          </a:xfrm>
+          <a:prstGeom prst="rect">
+            <a:avLst/>
+          </a:prstGeom>
+          <a:noFill/>
+        </p:spPr>
+        <p:txBody>
+          <a:bodyPr wrap="square" rtlCol="0">
+            <a:spAutoFit/>
+          </a:bodyPr>
+          <a:lstStyle/>
+          <a:p>
+            <a:pPr>
+              <a:buFont typeface="Arial" pitchFamily="34" charset="0"/>
+              <a:buChar char="•"/>
+            </a:pPr>
+            <a:r>
+              <a:rPr lang="en-US" dirty="0" smtClean="0"/>
+              <a:t>The blue arrows represent a single lane model. Inter-vehicle distances are measured between cars in the same lane.</a:t>
+            </a:r>
+          </a:p>
+          <a:p>
+            <a:pPr>
+              <a:buFont typeface="Arial" pitchFamily="34" charset="0"/>
+              <a:buChar char="•"/>
+            </a:pPr>
+            <a:r>
+              <a:rPr lang="en-US" dirty="0" smtClean="0"/>
+              <a:t>The red arrows represent a multi lane mode. Inter-vehicle distances are measured between the closest adjacent vehicle, which more closely represents the situation of a communications network.</a:t>
+            </a:r>
+          </a:p>
+          <a:p>
+            <a:pPr>
+              <a:buFont typeface="Arial" pitchFamily="34" charset="0"/>
+              <a:buChar char="•"/>
+            </a:pPr>
+            <a:r>
+              <a:rPr lang="en-US" dirty="0" smtClean="0"/>
+              <a:t>It is not relevant whether a car is in the same lane, but whether they are within the range of communication.</a:t>
+            </a:r>
+          </a:p>
+          <a:p>
+            <a:pPr>
+              <a:buFont typeface="Arial" pitchFamily="34" charset="0"/>
+              <a:buChar char="•"/>
+            </a:pPr>
+            <a:r>
+              <a:rPr lang="en-US" dirty="0" smtClean="0"/>
+              <a:t>Using a multi-lane model is one adjustment from the traditional Car Following Model.</a:t>
+            </a:r>
+          </a:p>
+          <a:p>
+            <a:pPr>
+              <a:buFont typeface="Arial" pitchFamily="34" charset="0"/>
+              <a:buChar char="•"/>
+            </a:pPr>
             <a:endParaRPr lang="en-US" dirty="0"/>
           </a:p>
         </p:txBody>
@@ -3794,10 +4886,845 @@
   <p:clrMapOvr>
     <a:masterClrMapping/>
   </p:clrMapOvr>
+  <p:timing>
+    <p:tnLst>
+      <p:par>
+        <p:cTn id="1" dur="indefinite" restart="never" nodeType="tmRoot"/>
+      </p:par>
+    </p:tnLst>
+  </p:timing>
 </p:sld>
 </file>
 
-<file path=ppt/slides/slide3.xml><?xml version="1.0" encoding="utf-8"?>
+<file path=ppt/slides/slide5.xml><?xml version="1.0" encoding="utf-8"?>
+<p:sld xmlns:a="http://schemas.openxmlformats.org/drawingml/2006/main" xmlns:r="http://schemas.openxmlformats.org/officeDocument/2006/relationships" xmlns:p="http://schemas.openxmlformats.org/presentationml/2006/main">
+  <p:cSld>
+    <p:spTree>
+      <p:nvGrpSpPr>
+        <p:cNvPr id="1" name=""/>
+        <p:cNvGrpSpPr/>
+        <p:nvPr/>
+      </p:nvGrpSpPr>
+      <p:grpSpPr>
+        <a:xfrm>
+          <a:off x="0" y="0"/>
+          <a:ext cx="0" cy="0"/>
+          <a:chOff x="0" y="0"/>
+          <a:chExt cx="0" cy="0"/>
+        </a:xfrm>
+      </p:grpSpPr>
+      <p:sp>
+        <p:nvSpPr>
+          <p:cNvPr id="2" name="Title 1"/>
+          <p:cNvSpPr>
+            <a:spLocks noGrp="1"/>
+          </p:cNvSpPr>
+          <p:nvPr>
+            <p:ph type="title"/>
+          </p:nvPr>
+        </p:nvSpPr>
+        <p:spPr/>
+        <p:txBody>
+          <a:bodyPr/>
+          <a:lstStyle/>
+          <a:p>
+            <a:r>
+              <a:rPr lang="en-US" dirty="0" smtClean="0"/>
+              <a:t>The modified Car Following Model</a:t>
+            </a:r>
+            <a:endParaRPr lang="en-US" dirty="0"/>
+          </a:p>
+        </p:txBody>
+      </p:sp>
+      <p:sp>
+        <p:nvSpPr>
+          <p:cNvPr id="14" name="TextBox 13"/>
+          <p:cNvSpPr txBox="1"/>
+          <p:nvPr/>
+        </p:nvSpPr>
+        <p:spPr>
+          <a:xfrm>
+            <a:off x="762000" y="3352800"/>
+            <a:ext cx="8001000" cy="923330"/>
+          </a:xfrm>
+          <a:prstGeom prst="rect">
+            <a:avLst/>
+          </a:prstGeom>
+          <a:noFill/>
+        </p:spPr>
+        <p:txBody>
+          <a:bodyPr wrap="square" rtlCol="0">
+            <a:spAutoFit/>
+          </a:bodyPr>
+          <a:lstStyle/>
+          <a:p>
+            <a:pPr>
+              <a:buFont typeface="Arial" pitchFamily="34" charset="0"/>
+              <a:buChar char="•"/>
+            </a:pPr>
+            <a:r>
+              <a:rPr lang="en-US" dirty="0" smtClean="0"/>
+              <a:t>Basis of model is empirical data gathered by Berkeley Highway Laboratory.  However instead of driver reaction time we replace it with inter-arrival time of vehicles into the network. The modified equation then becomes the following:</a:t>
+            </a:r>
+          </a:p>
+        </p:txBody>
+      </p:sp>
+      <p:graphicFrame>
+        <p:nvGraphicFramePr>
+          <p:cNvPr id="15" name="Table 14"/>
+          <p:cNvGraphicFramePr>
+            <a:graphicFrameLocks noGrp="1"/>
+          </p:cNvGraphicFramePr>
+          <p:nvPr/>
+        </p:nvGraphicFramePr>
+        <p:xfrm>
+          <a:off x="1447800" y="4495800"/>
+          <a:ext cx="6080760" cy="1249553"/>
+        </p:xfrm>
+        <a:graphic>
+          <a:graphicData uri="http://schemas.openxmlformats.org/drawingml/2006/table">
+            <a:tbl>
+              <a:tblPr/>
+              <a:tblGrid>
+                <a:gridCol w="3040380"/>
+                <a:gridCol w="3040380"/>
+              </a:tblGrid>
+              <a:tr h="0">
+                <a:tc>
+                  <a:txBody>
+                    <a:bodyPr/>
+                    <a:lstStyle/>
+                    <a:p>
+                      <a:pPr marL="0" marR="0">
+                        <a:lnSpc>
+                          <a:spcPct val="115000"/>
+                        </a:lnSpc>
+                        <a:spcBef>
+                          <a:spcPts val="0"/>
+                        </a:spcBef>
+                        <a:spcAft>
+                          <a:spcPts val="0"/>
+                        </a:spcAft>
+                      </a:pPr>
+                      <a:endParaRPr lang="en-US" sz="1100" dirty="0">
+                        <a:latin typeface="Calibri"/>
+                        <a:ea typeface="Calibri"/>
+                        <a:cs typeface="Times New Roman"/>
+                      </a:endParaRPr>
+                    </a:p>
+                  </a:txBody>
+                  <a:tcPr marL="68580" marR="68580" marT="0" marB="0">
+                    <a:lnL>
+                      <a:noFill/>
+                    </a:lnL>
+                    <a:lnR>
+                      <a:noFill/>
+                    </a:lnR>
+                    <a:lnT>
+                      <a:noFill/>
+                    </a:lnT>
+                    <a:lnB>
+                      <a:noFill/>
+                    </a:lnB>
+                  </a:tcPr>
+                </a:tc>
+                <a:tc>
+                  <a:txBody>
+                    <a:bodyPr/>
+                    <a:lstStyle/>
+                    <a:p>
+                      <a:pPr marL="342900" marR="0" lvl="0" indent="-342900">
+                        <a:lnSpc>
+                          <a:spcPct val="115000"/>
+                        </a:lnSpc>
+                        <a:spcBef>
+                          <a:spcPts val="0"/>
+                        </a:spcBef>
+                        <a:spcAft>
+                          <a:spcPts val="0"/>
+                        </a:spcAft>
+                        <a:buFont typeface="Symbol"/>
+                        <a:buChar char=""/>
+                      </a:pPr>
+                      <a:r>
+                        <a:rPr lang="en-US" sz="1200" dirty="0">
+                          <a:latin typeface="Calibri"/>
+                          <a:ea typeface="Times New Roman"/>
+                          <a:cs typeface="Times New Roman"/>
+                        </a:rPr>
+                        <a:t> – road level inter-vehicle spacing</a:t>
+                      </a:r>
+                      <a:endParaRPr lang="en-US" sz="1100" dirty="0">
+                        <a:latin typeface="Calibri"/>
+                        <a:ea typeface="Calibri"/>
+                        <a:cs typeface="Times New Roman"/>
+                      </a:endParaRPr>
+                    </a:p>
+                    <a:p>
+                      <a:pPr marL="342900" marR="0" lvl="0" indent="-342900">
+                        <a:lnSpc>
+                          <a:spcPct val="115000"/>
+                        </a:lnSpc>
+                        <a:spcBef>
+                          <a:spcPts val="0"/>
+                        </a:spcBef>
+                        <a:spcAft>
+                          <a:spcPts val="0"/>
+                        </a:spcAft>
+                        <a:buFont typeface="Symbol"/>
+                        <a:buChar char=""/>
+                      </a:pPr>
+                      <a:r>
+                        <a:rPr lang="en-US" sz="1200" dirty="0">
+                          <a:latin typeface="Calibri"/>
+                          <a:ea typeface="Times New Roman"/>
+                          <a:cs typeface="Times New Roman"/>
+                        </a:rPr>
+                        <a:t> - minimum spacing between any two adjacent vehicles</a:t>
+                      </a:r>
+                      <a:endParaRPr lang="en-US" sz="1100" dirty="0">
+                        <a:latin typeface="Calibri"/>
+                        <a:ea typeface="Calibri"/>
+                        <a:cs typeface="Times New Roman"/>
+                      </a:endParaRPr>
+                    </a:p>
+                    <a:p>
+                      <a:pPr marL="342900" marR="0" lvl="0" indent="-342900">
+                        <a:lnSpc>
+                          <a:spcPct val="115000"/>
+                        </a:lnSpc>
+                        <a:spcBef>
+                          <a:spcPts val="0"/>
+                        </a:spcBef>
+                        <a:spcAft>
+                          <a:spcPts val="0"/>
+                        </a:spcAft>
+                        <a:buFont typeface="Symbol"/>
+                        <a:buChar char=""/>
+                      </a:pPr>
+                      <a:r>
+                        <a:rPr lang="en-US" sz="1200" dirty="0">
+                          <a:latin typeface="Calibri"/>
+                          <a:ea typeface="Times New Roman"/>
+                          <a:cs typeface="Times New Roman"/>
+                        </a:rPr>
+                        <a:t> - inter-arrival time of vehicles on any lane from fix observation point</a:t>
+                      </a:r>
+                      <a:endParaRPr lang="en-US" sz="1100" dirty="0">
+                        <a:latin typeface="Calibri"/>
+                        <a:ea typeface="Calibri"/>
+                        <a:cs typeface="Times New Roman"/>
+                      </a:endParaRPr>
+                    </a:p>
+                    <a:p>
+                      <a:pPr marL="342900" marR="0" lvl="0" indent="-342900">
+                        <a:lnSpc>
+                          <a:spcPct val="115000"/>
+                        </a:lnSpc>
+                        <a:spcBef>
+                          <a:spcPts val="0"/>
+                        </a:spcBef>
+                        <a:spcAft>
+                          <a:spcPts val="0"/>
+                        </a:spcAft>
+                        <a:buFont typeface="Symbol"/>
+                        <a:buChar char=""/>
+                      </a:pPr>
+                      <a:r>
+                        <a:rPr lang="en-US" sz="1200" dirty="0">
+                          <a:latin typeface="Calibri"/>
+                          <a:ea typeface="Times New Roman"/>
+                          <a:cs typeface="Times New Roman"/>
+                        </a:rPr>
+                        <a:t>V - vehicle sped in meters/second</a:t>
+                      </a:r>
+                      <a:endParaRPr lang="en-US" sz="1100" dirty="0">
+                        <a:latin typeface="Calibri"/>
+                        <a:ea typeface="Calibri"/>
+                        <a:cs typeface="Times New Roman"/>
+                      </a:endParaRPr>
+                    </a:p>
+                  </a:txBody>
+                  <a:tcPr marL="68580" marR="68580" marT="0" marB="0">
+                    <a:lnL>
+                      <a:noFill/>
+                    </a:lnL>
+                    <a:lnR>
+                      <a:noFill/>
+                    </a:lnR>
+                    <a:lnT>
+                      <a:noFill/>
+                    </a:lnT>
+                    <a:lnB>
+                      <a:noFill/>
+                    </a:lnB>
+                  </a:tcPr>
+                </a:tc>
+              </a:tr>
+            </a:tbl>
+          </a:graphicData>
+        </a:graphic>
+      </p:graphicFrame>
+      <p:pic>
+        <p:nvPicPr>
+          <p:cNvPr id="1036" name="Picture 12"/>
+          <p:cNvPicPr>
+            <a:picLocks noChangeAspect="1" noChangeArrowheads="1"/>
+          </p:cNvPicPr>
+          <p:nvPr/>
+        </p:nvPicPr>
+        <p:blipFill>
+          <a:blip r:embed="rId2" cstate="print">
+            <a:clrChange>
+              <a:clrFrom>
+                <a:srgbClr val="FFFFFF"/>
+              </a:clrFrom>
+              <a:clrTo>
+                <a:srgbClr val="FFFFFF">
+                  <a:alpha val="0"/>
+                </a:srgbClr>
+              </a:clrTo>
+            </a:clrChange>
+          </a:blip>
+          <a:srcRect/>
+          <a:stretch>
+            <a:fillRect/>
+          </a:stretch>
+        </p:blipFill>
+        <p:spPr bwMode="auto">
+          <a:xfrm>
+            <a:off x="2438400" y="4876800"/>
+            <a:ext cx="1104900" cy="257175"/>
+          </a:xfrm>
+          <a:prstGeom prst="rect">
+            <a:avLst/>
+          </a:prstGeom>
+          <a:noFill/>
+        </p:spPr>
+      </p:pic>
+      <p:pic>
+        <p:nvPicPr>
+          <p:cNvPr id="1035" name="Picture 11"/>
+          <p:cNvPicPr>
+            <a:picLocks noChangeAspect="1" noChangeArrowheads="1"/>
+          </p:cNvPicPr>
+          <p:nvPr/>
+        </p:nvPicPr>
+        <p:blipFill>
+          <a:blip r:embed="rId3" cstate="print">
+            <a:clrChange>
+              <a:clrFrom>
+                <a:srgbClr val="FFFFFF"/>
+              </a:clrFrom>
+              <a:clrTo>
+                <a:srgbClr val="FFFFFF">
+                  <a:alpha val="0"/>
+                </a:srgbClr>
+              </a:clrTo>
+            </a:clrChange>
+          </a:blip>
+          <a:srcRect/>
+          <a:stretch>
+            <a:fillRect/>
+          </a:stretch>
+        </p:blipFill>
+        <p:spPr bwMode="auto">
+          <a:xfrm>
+            <a:off x="4724400" y="4495800"/>
+            <a:ext cx="85725" cy="209550"/>
+          </a:xfrm>
+          <a:prstGeom prst="rect">
+            <a:avLst/>
+          </a:prstGeom>
+          <a:noFill/>
+        </p:spPr>
+      </p:pic>
+      <p:pic>
+        <p:nvPicPr>
+          <p:cNvPr id="1034" name="Picture 10"/>
+          <p:cNvPicPr>
+            <a:picLocks noChangeAspect="1" noChangeArrowheads="1"/>
+          </p:cNvPicPr>
+          <p:nvPr/>
+        </p:nvPicPr>
+        <p:blipFill>
+          <a:blip r:embed="rId4" cstate="print">
+            <a:clrChange>
+              <a:clrFrom>
+                <a:srgbClr val="FFFFFF"/>
+              </a:clrFrom>
+              <a:clrTo>
+                <a:srgbClr val="FFFFFF">
+                  <a:alpha val="0"/>
+                </a:srgbClr>
+              </a:clrTo>
+            </a:clrChange>
+          </a:blip>
+          <a:srcRect/>
+          <a:stretch>
+            <a:fillRect/>
+          </a:stretch>
+        </p:blipFill>
+        <p:spPr bwMode="auto">
+          <a:xfrm>
+            <a:off x="4648200" y="4724400"/>
+            <a:ext cx="295275" cy="209550"/>
+          </a:xfrm>
+          <a:prstGeom prst="rect">
+            <a:avLst/>
+          </a:prstGeom>
+          <a:noFill/>
+        </p:spPr>
+      </p:pic>
+      <p:pic>
+        <p:nvPicPr>
+          <p:cNvPr id="1033" name="Picture 9"/>
+          <p:cNvPicPr>
+            <a:picLocks noChangeAspect="1" noChangeArrowheads="1"/>
+          </p:cNvPicPr>
+          <p:nvPr/>
+        </p:nvPicPr>
+        <p:blipFill>
+          <a:blip r:embed="rId5" cstate="print">
+            <a:clrChange>
+              <a:clrFrom>
+                <a:srgbClr val="FFFFFF"/>
+              </a:clrFrom>
+              <a:clrTo>
+                <a:srgbClr val="FFFFFF">
+                  <a:alpha val="0"/>
+                </a:srgbClr>
+              </a:clrTo>
+            </a:clrChange>
+          </a:blip>
+          <a:srcRect/>
+          <a:stretch>
+            <a:fillRect/>
+          </a:stretch>
+        </p:blipFill>
+        <p:spPr bwMode="auto">
+          <a:xfrm>
+            <a:off x="4724400" y="5181600"/>
+            <a:ext cx="95250" cy="209550"/>
+          </a:xfrm>
+          <a:prstGeom prst="rect">
+            <a:avLst/>
+          </a:prstGeom>
+          <a:noFill/>
+        </p:spPr>
+      </p:pic>
+      <p:graphicFrame>
+        <p:nvGraphicFramePr>
+          <p:cNvPr id="20" name="Table 19"/>
+          <p:cNvGraphicFramePr>
+            <a:graphicFrameLocks noGrp="1"/>
+          </p:cNvGraphicFramePr>
+          <p:nvPr/>
+        </p:nvGraphicFramePr>
+        <p:xfrm>
+          <a:off x="1295400" y="1295400"/>
+          <a:ext cx="6080760" cy="1670177"/>
+        </p:xfrm>
+        <a:graphic>
+          <a:graphicData uri="http://schemas.openxmlformats.org/drawingml/2006/table">
+            <a:tbl>
+              <a:tblPr/>
+              <a:tblGrid>
+                <a:gridCol w="3040380"/>
+                <a:gridCol w="3040380"/>
+              </a:tblGrid>
+              <a:tr h="0">
+                <a:tc>
+                  <a:txBody>
+                    <a:bodyPr/>
+                    <a:lstStyle/>
+                    <a:p>
+                      <a:pPr marL="0" marR="0" indent="457200">
+                        <a:lnSpc>
+                          <a:spcPct val="115000"/>
+                        </a:lnSpc>
+                        <a:spcBef>
+                          <a:spcPts val="0"/>
+                        </a:spcBef>
+                        <a:spcAft>
+                          <a:spcPts val="0"/>
+                        </a:spcAft>
+                      </a:pPr>
+                      <a:endParaRPr lang="en-US" sz="1200" dirty="0">
+                        <a:latin typeface="Calibri"/>
+                        <a:ea typeface="Calibri"/>
+                        <a:cs typeface="Times New Roman"/>
+                      </a:endParaRPr>
+                    </a:p>
+                  </a:txBody>
+                  <a:tcPr marL="68580" marR="68580" marT="0" marB="0">
+                    <a:lnL>
+                      <a:noFill/>
+                    </a:lnL>
+                    <a:lnR>
+                      <a:noFill/>
+                    </a:lnR>
+                    <a:lnT>
+                      <a:noFill/>
+                    </a:lnT>
+                    <a:lnB>
+                      <a:noFill/>
+                    </a:lnB>
+                  </a:tcPr>
+                </a:tc>
+                <a:tc>
+                  <a:txBody>
+                    <a:bodyPr/>
+                    <a:lstStyle/>
+                    <a:p>
+                      <a:pPr marL="342900" marR="0" lvl="0" indent="-342900">
+                        <a:lnSpc>
+                          <a:spcPct val="115000"/>
+                        </a:lnSpc>
+                        <a:spcBef>
+                          <a:spcPts val="0"/>
+                        </a:spcBef>
+                        <a:spcAft>
+                          <a:spcPts val="0"/>
+                        </a:spcAft>
+                        <a:buFont typeface="Symbol"/>
+                        <a:buChar char=""/>
+                      </a:pPr>
+                      <a:r>
+                        <a:rPr lang="en-US" sz="1200" dirty="0">
+                          <a:latin typeface="Calibri"/>
+                          <a:ea typeface="Times New Roman"/>
+                          <a:cs typeface="Times New Roman"/>
+                        </a:rPr>
+                        <a:t>S’ - headway spacing between rear bumper to rear bumper</a:t>
+                      </a:r>
+                      <a:endParaRPr lang="en-US" sz="1100" dirty="0">
+                        <a:latin typeface="Calibri"/>
+                        <a:ea typeface="Calibri"/>
+                        <a:cs typeface="Times New Roman"/>
+                      </a:endParaRPr>
+                    </a:p>
+                    <a:p>
+                      <a:pPr marL="342900" marR="0" lvl="0" indent="-342900">
+                        <a:lnSpc>
+                          <a:spcPct val="115000"/>
+                        </a:lnSpc>
+                        <a:spcBef>
+                          <a:spcPts val="0"/>
+                        </a:spcBef>
+                        <a:spcAft>
+                          <a:spcPts val="0"/>
+                        </a:spcAft>
+                        <a:buFont typeface="Symbol"/>
+                        <a:buChar char=""/>
+                      </a:pPr>
+                      <a:r>
+                        <a:rPr lang="en-US" sz="1200" dirty="0">
+                          <a:latin typeface="Calibri"/>
+                          <a:ea typeface="Times New Roman"/>
+                          <a:cs typeface="Times New Roman"/>
+                        </a:rPr>
+                        <a:t>L - effective vehicle length in meters</a:t>
+                      </a:r>
+                      <a:endParaRPr lang="en-US" sz="1100" dirty="0">
+                        <a:latin typeface="Calibri"/>
+                        <a:ea typeface="Calibri"/>
+                        <a:cs typeface="Times New Roman"/>
+                      </a:endParaRPr>
+                    </a:p>
+                    <a:p>
+                      <a:pPr marL="342900" marR="0" lvl="0" indent="-342900">
+                        <a:lnSpc>
+                          <a:spcPct val="115000"/>
+                        </a:lnSpc>
+                        <a:spcBef>
+                          <a:spcPts val="0"/>
+                        </a:spcBef>
+                        <a:spcAft>
+                          <a:spcPts val="0"/>
+                        </a:spcAft>
+                        <a:buFont typeface="Symbol"/>
+                        <a:buChar char=""/>
+                      </a:pPr>
+                      <a:r>
+                        <a:rPr lang="en-US" sz="1200" dirty="0">
+                          <a:latin typeface="Calibri"/>
+                          <a:ea typeface="Times New Roman"/>
+                          <a:cs typeface="Times New Roman"/>
+                        </a:rPr>
+                        <a:t> - driver reaction time in seconds</a:t>
+                      </a:r>
+                      <a:endParaRPr lang="en-US" sz="1100" dirty="0">
+                        <a:latin typeface="Calibri"/>
+                        <a:ea typeface="Calibri"/>
+                        <a:cs typeface="Times New Roman"/>
+                      </a:endParaRPr>
+                    </a:p>
+                    <a:p>
+                      <a:pPr marL="342900" marR="0" lvl="0" indent="-342900">
+                        <a:lnSpc>
+                          <a:spcPct val="115000"/>
+                        </a:lnSpc>
+                        <a:spcBef>
+                          <a:spcPts val="0"/>
+                        </a:spcBef>
+                        <a:spcAft>
+                          <a:spcPts val="0"/>
+                        </a:spcAft>
+                        <a:buFont typeface="Symbol"/>
+                        <a:buChar char=""/>
+                      </a:pPr>
+                      <a:r>
+                        <a:rPr lang="en-US" sz="1200" dirty="0">
+                          <a:latin typeface="Calibri"/>
+                          <a:ea typeface="Times New Roman"/>
+                          <a:cs typeface="Times New Roman"/>
+                        </a:rPr>
+                        <a:t>V - vehicle sped in meters/second</a:t>
+                      </a:r>
+                      <a:endParaRPr lang="en-US" sz="1100" dirty="0">
+                        <a:latin typeface="Calibri"/>
+                        <a:ea typeface="Calibri"/>
+                        <a:cs typeface="Times New Roman"/>
+                      </a:endParaRPr>
+                    </a:p>
+                    <a:p>
+                      <a:pPr marL="342900" marR="0" lvl="0" indent="-342900">
+                        <a:lnSpc>
+                          <a:spcPct val="115000"/>
+                        </a:lnSpc>
+                        <a:spcBef>
+                          <a:spcPts val="0"/>
+                        </a:spcBef>
+                        <a:spcAft>
+                          <a:spcPts val="0"/>
+                        </a:spcAft>
+                        <a:buFont typeface="Symbol"/>
+                        <a:buChar char=""/>
+                      </a:pPr>
+                      <a:r>
+                        <a:rPr lang="en-US" sz="1200" dirty="0">
+                          <a:latin typeface="Calibri"/>
+                          <a:ea typeface="Times New Roman"/>
+                          <a:cs typeface="Times New Roman"/>
+                        </a:rPr>
+                        <a:t> - reciprocal of twice the max average deceleration of a following vehicle (</a:t>
+                      </a:r>
+                      <a:r>
+                        <a:rPr lang="en-US" sz="1200" dirty="0" err="1">
+                          <a:latin typeface="Calibri"/>
+                          <a:ea typeface="Times New Roman"/>
+                          <a:cs typeface="Times New Roman"/>
+                        </a:rPr>
+                        <a:t>ie</a:t>
+                      </a:r>
+                      <a:r>
+                        <a:rPr lang="en-US" sz="1200" dirty="0">
+                          <a:latin typeface="Calibri"/>
+                          <a:ea typeface="Times New Roman"/>
+                          <a:cs typeface="Times New Roman"/>
+                        </a:rPr>
+                        <a:t> approximately 0.075 </a:t>
+                      </a:r>
+                      <a:r>
+                        <a:rPr lang="en-US" sz="1200" dirty="0" smtClean="0">
+                          <a:latin typeface="Calibri"/>
+                          <a:ea typeface="Times New Roman"/>
+                          <a:cs typeface="Times New Roman"/>
+                        </a:rPr>
+                        <a:t>            )</a:t>
+                      </a:r>
+                      <a:endParaRPr lang="en-US" sz="1100" dirty="0">
+                        <a:latin typeface="Calibri"/>
+                        <a:ea typeface="Calibri"/>
+                        <a:cs typeface="Times New Roman"/>
+                      </a:endParaRPr>
+                    </a:p>
+                  </a:txBody>
+                  <a:tcPr marL="68580" marR="68580" marT="0" marB="0">
+                    <a:lnL>
+                      <a:noFill/>
+                    </a:lnL>
+                    <a:lnR>
+                      <a:noFill/>
+                    </a:lnR>
+                    <a:lnT>
+                      <a:noFill/>
+                    </a:lnT>
+                    <a:lnB>
+                      <a:noFill/>
+                    </a:lnB>
+                  </a:tcPr>
+                </a:tc>
+              </a:tr>
+            </a:tbl>
+          </a:graphicData>
+        </a:graphic>
+      </p:graphicFrame>
+      <p:pic>
+        <p:nvPicPr>
+          <p:cNvPr id="1040" name="Picture 16"/>
+          <p:cNvPicPr>
+            <a:picLocks noChangeAspect="1" noChangeArrowheads="1"/>
+          </p:cNvPicPr>
+          <p:nvPr/>
+        </p:nvPicPr>
+        <p:blipFill>
+          <a:blip r:embed="rId6" cstate="print">
+            <a:clrChange>
+              <a:clrFrom>
+                <a:srgbClr val="FFFFFF"/>
+              </a:clrFrom>
+              <a:clrTo>
+                <a:srgbClr val="FFFFFF">
+                  <a:alpha val="0"/>
+                </a:srgbClr>
+              </a:clrTo>
+            </a:clrChange>
+          </a:blip>
+          <a:srcRect/>
+          <a:stretch>
+            <a:fillRect/>
+          </a:stretch>
+        </p:blipFill>
+        <p:spPr bwMode="auto">
+          <a:xfrm>
+            <a:off x="2590800" y="1905000"/>
+            <a:ext cx="1381125" cy="209550"/>
+          </a:xfrm>
+          <a:prstGeom prst="rect">
+            <a:avLst/>
+          </a:prstGeom>
+          <a:noFill/>
+        </p:spPr>
+      </p:pic>
+      <p:pic>
+        <p:nvPicPr>
+          <p:cNvPr id="1039" name="Picture 15"/>
+          <p:cNvPicPr>
+            <a:picLocks noChangeAspect="1" noChangeArrowheads="1"/>
+          </p:cNvPicPr>
+          <p:nvPr/>
+        </p:nvPicPr>
+        <p:blipFill>
+          <a:blip r:embed="rId7" cstate="print">
+            <a:clrChange>
+              <a:clrFrom>
+                <a:srgbClr val="FFFFFF"/>
+              </a:clrFrom>
+              <a:clrTo>
+                <a:srgbClr val="FFFFFF">
+                  <a:alpha val="0"/>
+                </a:srgbClr>
+              </a:clrTo>
+            </a:clrChange>
+          </a:blip>
+          <a:srcRect/>
+          <a:stretch>
+            <a:fillRect/>
+          </a:stretch>
+        </p:blipFill>
+        <p:spPr bwMode="auto">
+          <a:xfrm>
+            <a:off x="4648200" y="1981200"/>
+            <a:ext cx="133350" cy="209550"/>
+          </a:xfrm>
+          <a:prstGeom prst="rect">
+            <a:avLst/>
+          </a:prstGeom>
+          <a:noFill/>
+        </p:spPr>
+      </p:pic>
+      <p:pic>
+        <p:nvPicPr>
+          <p:cNvPr id="1038" name="Picture 14"/>
+          <p:cNvPicPr>
+            <a:picLocks noChangeAspect="1" noChangeArrowheads="1"/>
+          </p:cNvPicPr>
+          <p:nvPr/>
+        </p:nvPicPr>
+        <p:blipFill>
+          <a:blip r:embed="rId8" cstate="print">
+            <a:clrChange>
+              <a:clrFrom>
+                <a:srgbClr val="FFFFFF"/>
+              </a:clrFrom>
+              <a:clrTo>
+                <a:srgbClr val="FFFFFF">
+                  <a:alpha val="0"/>
+                </a:srgbClr>
+              </a:clrTo>
+            </a:clrChange>
+          </a:blip>
+          <a:srcRect/>
+          <a:stretch>
+            <a:fillRect/>
+          </a:stretch>
+        </p:blipFill>
+        <p:spPr bwMode="auto">
+          <a:xfrm>
+            <a:off x="4648200" y="2362200"/>
+            <a:ext cx="85725" cy="209550"/>
+          </a:xfrm>
+          <a:prstGeom prst="rect">
+            <a:avLst/>
+          </a:prstGeom>
+          <a:noFill/>
+        </p:spPr>
+      </p:pic>
+      <p:pic>
+        <p:nvPicPr>
+          <p:cNvPr id="1037" name="Picture 13"/>
+          <p:cNvPicPr>
+            <a:picLocks noChangeAspect="1" noChangeArrowheads="1"/>
+          </p:cNvPicPr>
+          <p:nvPr/>
+        </p:nvPicPr>
+        <p:blipFill>
+          <a:blip r:embed="rId9" cstate="print">
+            <a:clrChange>
+              <a:clrFrom>
+                <a:srgbClr val="FFFFFF"/>
+              </a:clrFrom>
+              <a:clrTo>
+                <a:srgbClr val="FFFFFF">
+                  <a:alpha val="0"/>
+                </a:srgbClr>
+              </a:clrTo>
+            </a:clrChange>
+          </a:blip>
+          <a:srcRect/>
+          <a:stretch>
+            <a:fillRect/>
+          </a:stretch>
+        </p:blipFill>
+        <p:spPr bwMode="auto">
+          <a:xfrm>
+            <a:off x="6096000" y="2819400"/>
+            <a:ext cx="352425" cy="209550"/>
+          </a:xfrm>
+          <a:prstGeom prst="rect">
+            <a:avLst/>
+          </a:prstGeom>
+          <a:noFill/>
+        </p:spPr>
+      </p:pic>
+    </p:spTree>
+  </p:cSld>
+  <p:clrMapOvr>
+    <a:masterClrMapping/>
+  </p:clrMapOvr>
+  <p:timing>
+    <p:tnLst>
+      <p:par>
+        <p:cTn id="1" dur="indefinite" restart="never" nodeType="tmRoot"/>
+      </p:par>
+    </p:tnLst>
+  </p:timing>
+</p:sld>
+</file>
+
+<file path=ppt/slides/slide6.xml><?xml version="1.0" encoding="utf-8"?>
 <p:sld xmlns:a="http://schemas.openxmlformats.org/drawingml/2006/main" xmlns:r="http://schemas.openxmlformats.org/officeDocument/2006/relationships" xmlns:p="http://schemas.openxmlformats.org/presentationml/2006/main">
   <p:cSld>
     <p:spTree>
@@ -3831,8 +5758,8 @@
         </p:blipFill>
         <p:spPr bwMode="auto">
           <a:xfrm>
-            <a:off x="1905000" y="533400"/>
-            <a:ext cx="5153025" cy="4324350"/>
+            <a:off x="228601" y="914400"/>
+            <a:ext cx="3450483" cy="2895600"/>
           </a:xfrm>
           <a:prstGeom prst="rect">
             <a:avLst/>
@@ -3846,41 +5773,54 @@
           </a:ln>
         </p:spPr>
       </p:pic>
-    </p:spTree>
-  </p:cSld>
-  <p:clrMapOvr>
-    <a:masterClrMapping/>
-  </p:clrMapOvr>
-</p:sld>
-</file>
-
-<file path=ppt/slides/slide4.xml><?xml version="1.0" encoding="utf-8"?>
-<p:sld xmlns:a="http://schemas.openxmlformats.org/drawingml/2006/main" xmlns:r="http://schemas.openxmlformats.org/officeDocument/2006/relationships" xmlns:p="http://schemas.openxmlformats.org/presentationml/2006/main">
-  <p:cSld>
-    <p:spTree>
-      <p:nvGrpSpPr>
-        <p:cNvPr id="1" name=""/>
-        <p:cNvGrpSpPr/>
-        <p:nvPr/>
-      </p:nvGrpSpPr>
-      <p:grpSpPr>
-        <a:xfrm>
-          <a:off x="0" y="0"/>
-          <a:ext cx="0" cy="0"/>
-          <a:chOff x="0" y="0"/>
-          <a:chExt cx="0" cy="0"/>
-        </a:xfrm>
-      </p:grpSpPr>
+      <p:sp>
+        <p:nvSpPr>
+          <p:cNvPr id="3" name="TextBox 2"/>
+          <p:cNvSpPr txBox="1"/>
+          <p:nvPr/>
+        </p:nvSpPr>
+        <p:spPr>
+          <a:xfrm>
+            <a:off x="2133600" y="228600"/>
+            <a:ext cx="5105400" cy="646331"/>
+          </a:xfrm>
+          <a:prstGeom prst="rect">
+            <a:avLst/>
+          </a:prstGeom>
+          <a:noFill/>
+        </p:spPr>
+        <p:txBody>
+          <a:bodyPr wrap="square" rtlCol="0">
+            <a:spAutoFit/>
+          </a:bodyPr>
+          <a:lstStyle/>
+          <a:p>
+            <a:r>
+              <a:rPr lang="en-US" dirty="0" smtClean="0"/>
+              <a:t>Empirical data collected by </a:t>
+            </a:r>
+            <a:r>
+              <a:rPr lang="en-US" dirty="0" err="1" smtClean="0"/>
+              <a:t>Berekely</a:t>
+            </a:r>
+            <a:r>
+              <a:rPr lang="en-US" dirty="0" smtClean="0"/>
+              <a:t> Highway Laboratory (BHL)</a:t>
+            </a:r>
+            <a:endParaRPr lang="en-US" dirty="0"/>
+          </a:p>
+        </p:txBody>
+      </p:sp>
       <p:pic>
         <p:nvPicPr>
-          <p:cNvPr id="3074" name="Picture 2"/>
+          <p:cNvPr id="4" name="Picture 2"/>
           <p:cNvPicPr>
             <a:picLocks noChangeAspect="1" noChangeArrowheads="1"/>
           </p:cNvPicPr>
           <p:nvPr/>
         </p:nvPicPr>
         <p:blipFill>
-          <a:blip r:embed="rId2" cstate="print"/>
+          <a:blip r:embed="rId3" cstate="print"/>
           <a:srcRect/>
           <a:stretch>
             <a:fillRect/>
@@ -3888,8 +5828,8 @@
         </p:blipFill>
         <p:spPr bwMode="auto">
           <a:xfrm>
-            <a:off x="1600200" y="1066800"/>
-            <a:ext cx="5295900" cy="4429125"/>
+            <a:off x="5105400" y="3581400"/>
+            <a:ext cx="3644490" cy="3048000"/>
           </a:xfrm>
           <a:prstGeom prst="rect">
             <a:avLst/>
@@ -3903,15 +5843,150 @@
           </a:ln>
         </p:spPr>
       </p:pic>
+      <p:sp>
+        <p:nvSpPr>
+          <p:cNvPr id="5" name="TextBox 4"/>
+          <p:cNvSpPr txBox="1"/>
+          <p:nvPr/>
+        </p:nvSpPr>
+        <p:spPr>
+          <a:xfrm>
+            <a:off x="4038600" y="1066800"/>
+            <a:ext cx="4800600" cy="1754326"/>
+          </a:xfrm>
+          <a:prstGeom prst="rect">
+            <a:avLst/>
+          </a:prstGeom>
+          <a:noFill/>
+        </p:spPr>
+        <p:txBody>
+          <a:bodyPr wrap="square" rtlCol="0">
+            <a:spAutoFit/>
+          </a:bodyPr>
+          <a:lstStyle/>
+          <a:p>
+            <a:pPr>
+              <a:buFont typeface="Arial" pitchFamily="34" charset="0"/>
+              <a:buChar char="•"/>
+            </a:pPr>
+            <a:r>
+              <a:rPr lang="en-US" dirty="0" smtClean="0"/>
+              <a:t>Volume of cars entering network given the time of day.</a:t>
+            </a:r>
+          </a:p>
+          <a:p>
+            <a:pPr>
+              <a:buFont typeface="Arial" pitchFamily="34" charset="0"/>
+              <a:buChar char="•"/>
+            </a:pPr>
+            <a:r>
+              <a:rPr lang="en-US" dirty="0" smtClean="0"/>
+              <a:t>R</a:t>
+            </a:r>
+            <a:r>
+              <a:rPr lang="en-US" dirty="0" smtClean="0"/>
+              <a:t>ecordings taken at 60 readings/second</a:t>
+            </a:r>
+          </a:p>
+          <a:p>
+            <a:pPr>
+              <a:buFont typeface="Arial" pitchFamily="34" charset="0"/>
+              <a:buChar char="•"/>
+            </a:pPr>
+            <a:r>
+              <a:rPr lang="en-US" dirty="0" smtClean="0"/>
+              <a:t>Can be used to extract the inter-arrival times</a:t>
+            </a:r>
+          </a:p>
+          <a:p>
+            <a:pPr>
+              <a:buFont typeface="Arial" pitchFamily="34" charset="0"/>
+              <a:buChar char="•"/>
+            </a:pPr>
+            <a:r>
+              <a:rPr lang="en-US" dirty="0" smtClean="0"/>
+              <a:t>Peak of traffic volume is around 3-5pm</a:t>
+            </a:r>
+          </a:p>
+          <a:p>
+            <a:pPr>
+              <a:buFont typeface="Arial" pitchFamily="34" charset="0"/>
+              <a:buChar char="•"/>
+            </a:pPr>
+            <a:r>
+              <a:rPr lang="en-US" dirty="0" smtClean="0"/>
+              <a:t>Valley of traffic volume around 1-3am</a:t>
+            </a:r>
+            <a:endParaRPr lang="en-US" dirty="0"/>
+          </a:p>
+        </p:txBody>
+      </p:sp>
+      <p:sp>
+        <p:nvSpPr>
+          <p:cNvPr id="6" name="TextBox 5"/>
+          <p:cNvSpPr txBox="1"/>
+          <p:nvPr/>
+        </p:nvSpPr>
+        <p:spPr>
+          <a:xfrm>
+            <a:off x="533400" y="4038600"/>
+            <a:ext cx="4038600" cy="1477328"/>
+          </a:xfrm>
+          <a:prstGeom prst="rect">
+            <a:avLst/>
+          </a:prstGeom>
+          <a:noFill/>
+        </p:spPr>
+        <p:txBody>
+          <a:bodyPr wrap="square" rtlCol="0">
+            <a:spAutoFit/>
+          </a:bodyPr>
+          <a:lstStyle/>
+          <a:p>
+            <a:pPr>
+              <a:buFont typeface="Arial" pitchFamily="34" charset="0"/>
+              <a:buChar char="•"/>
+            </a:pPr>
+            <a:r>
+              <a:rPr lang="en-US" dirty="0" smtClean="0"/>
+              <a:t>Recording of the speed of vehicles given the time of day.</a:t>
+            </a:r>
+          </a:p>
+          <a:p>
+            <a:pPr>
+              <a:buFont typeface="Arial" pitchFamily="34" charset="0"/>
+              <a:buChar char="•"/>
+            </a:pPr>
+            <a:r>
+              <a:rPr lang="en-US" dirty="0" smtClean="0"/>
+              <a:t>Rush hour traffic around 3-5pm causes slower speeds</a:t>
+            </a:r>
+          </a:p>
+          <a:p>
+            <a:pPr>
+              <a:buFont typeface="Arial" pitchFamily="34" charset="0"/>
+              <a:buChar char="•"/>
+            </a:pPr>
+            <a:endParaRPr lang="en-US" dirty="0"/>
+          </a:p>
+        </p:txBody>
+      </p:sp>
     </p:spTree>
   </p:cSld>
   <p:clrMapOvr>
     <a:masterClrMapping/>
   </p:clrMapOvr>
+  <p:timing>
+    <p:tnLst>
+      <p:par>
+        <p:cTn id="1" dur="indefinite" restart="never" nodeType="tmRoot"/>
+      </p:par>
+    </p:tnLst>
+  </p:timing>
 </p:sld>
 </file>
 
-<file path=ppt/slides/slide5.xml><?xml version="1.0" encoding="utf-8"?>
+<file path=ppt/slides/slide7.xml><?xml version="1.0" encoding="utf-8"?>
 <p:sld xmlns:a="http://schemas.openxmlformats.org/drawingml/2006/main" xmlns:r="http://schemas.openxmlformats.org/officeDocument/2006/relationships" xmlns:p="http://schemas.openxmlformats.org/presentationml/2006/main">
   <p:cSld>
     <p:spTree>
@@ -3945,8 +6020,8 @@
         </p:blipFill>
         <p:spPr bwMode="auto">
           <a:xfrm>
-            <a:off x="228600" y="1066800"/>
-            <a:ext cx="8734827" cy="4052888"/>
+            <a:off x="1219200" y="1066800"/>
+            <a:ext cx="6076401" cy="2819400"/>
           </a:xfrm>
           <a:prstGeom prst="rect">
             <a:avLst/>
@@ -3960,15 +6035,122 @@
           </a:ln>
         </p:spPr>
       </p:pic>
+      <p:sp>
+        <p:nvSpPr>
+          <p:cNvPr id="3" name="TextBox 2"/>
+          <p:cNvSpPr txBox="1"/>
+          <p:nvPr/>
+        </p:nvSpPr>
+        <p:spPr>
+          <a:xfrm>
+            <a:off x="685800" y="228600"/>
+            <a:ext cx="8077200" cy="369332"/>
+          </a:xfrm>
+          <a:prstGeom prst="rect">
+            <a:avLst/>
+          </a:prstGeom>
+          <a:noFill/>
+        </p:spPr>
+        <p:txBody>
+          <a:bodyPr wrap="square" rtlCol="0">
+            <a:spAutoFit/>
+          </a:bodyPr>
+          <a:lstStyle/>
+          <a:p>
+            <a:r>
+              <a:rPr lang="en-US" dirty="0" smtClean="0"/>
+              <a:t>Probability Density Function (PDF) of Inter-Arrival Times and Vehicle Speeds</a:t>
+            </a:r>
+            <a:endParaRPr lang="en-US" dirty="0"/>
+          </a:p>
+        </p:txBody>
+      </p:sp>
+      <p:sp>
+        <p:nvSpPr>
+          <p:cNvPr id="4" name="TextBox 3"/>
+          <p:cNvSpPr txBox="1"/>
+          <p:nvPr/>
+        </p:nvSpPr>
+        <p:spPr>
+          <a:xfrm>
+            <a:off x="609600" y="4267200"/>
+            <a:ext cx="8077200" cy="1754326"/>
+          </a:xfrm>
+          <a:prstGeom prst="rect">
+            <a:avLst/>
+          </a:prstGeom>
+          <a:noFill/>
+        </p:spPr>
+        <p:txBody>
+          <a:bodyPr wrap="square" rtlCol="0">
+            <a:spAutoFit/>
+          </a:bodyPr>
+          <a:lstStyle/>
+          <a:p>
+            <a:pPr>
+              <a:buFont typeface="Arial" pitchFamily="34" charset="0"/>
+              <a:buChar char="•"/>
+            </a:pPr>
+            <a:r>
+              <a:rPr lang="en-US" dirty="0" smtClean="0"/>
+              <a:t>Since we are concerned with disconnected networks, will focus on the 1-3am data (The blue colored lines)</a:t>
+            </a:r>
+          </a:p>
+          <a:p>
+            <a:pPr>
+              <a:buFont typeface="Arial" pitchFamily="34" charset="0"/>
+              <a:buChar char="•"/>
+            </a:pPr>
+            <a:r>
+              <a:rPr lang="en-US" dirty="0" smtClean="0"/>
+              <a:t>PDF of Inter-arrival time similar to the general exponential distribution</a:t>
+            </a:r>
+          </a:p>
+          <a:p>
+            <a:pPr>
+              <a:buFont typeface="Arial" pitchFamily="34" charset="0"/>
+              <a:buChar char="•"/>
+            </a:pPr>
+            <a:r>
+              <a:rPr lang="en-US" dirty="0" smtClean="0"/>
+              <a:t>Inter-arrival times range anywhere from 0 to past 30 seconds</a:t>
+            </a:r>
+          </a:p>
+          <a:p>
+            <a:pPr>
+              <a:buFont typeface="Arial" pitchFamily="34" charset="0"/>
+              <a:buChar char="•"/>
+            </a:pPr>
+            <a:r>
+              <a:rPr lang="en-US" dirty="0" smtClean="0"/>
+              <a:t>PDF of vehicle speeds similar to a normal distribution</a:t>
+            </a:r>
+          </a:p>
+          <a:p>
+            <a:pPr>
+              <a:buFont typeface="Arial" pitchFamily="34" charset="0"/>
+              <a:buChar char="•"/>
+            </a:pPr>
+            <a:endParaRPr lang="en-US" dirty="0"/>
+          </a:p>
+        </p:txBody>
+      </p:sp>
     </p:spTree>
   </p:cSld>
   <p:clrMapOvr>
     <a:masterClrMapping/>
   </p:clrMapOvr>
+  <p:timing>
+    <p:tnLst>
+      <p:par>
+        <p:cTn id="1" dur="indefinite" restart="never" nodeType="tmRoot"/>
+      </p:par>
+    </p:tnLst>
+  </p:timing>
 </p:sld>
 </file>
 
-<file path=ppt/slides/slide6.xml><?xml version="1.0" encoding="utf-8"?>
+<file path=ppt/slides/slide8.xml><?xml version="1.0" encoding="utf-8"?>
 <p:sld xmlns:a="http://schemas.openxmlformats.org/drawingml/2006/main" xmlns:r="http://schemas.openxmlformats.org/officeDocument/2006/relationships" xmlns:p="http://schemas.openxmlformats.org/presentationml/2006/main">
   <p:cSld>
     <p:spTree>
@@ -4002,8 +6184,8 @@
         </p:blipFill>
         <p:spPr bwMode="auto">
           <a:xfrm>
-            <a:off x="152400" y="1752600"/>
-            <a:ext cx="8702843" cy="3833813"/>
+            <a:off x="2743898" y="609600"/>
+            <a:ext cx="6400102" cy="2819400"/>
           </a:xfrm>
           <a:prstGeom prst="rect">
             <a:avLst/>
@@ -4017,41 +6199,57 @@
           </a:ln>
         </p:spPr>
       </p:pic>
-    </p:spTree>
-  </p:cSld>
-  <p:clrMapOvr>
-    <a:masterClrMapping/>
-  </p:clrMapOvr>
-</p:sld>
-</file>
-
-<file path=ppt/slides/slide7.xml><?xml version="1.0" encoding="utf-8"?>
-<p:sld xmlns:a="http://schemas.openxmlformats.org/drawingml/2006/main" xmlns:r="http://schemas.openxmlformats.org/officeDocument/2006/relationships" xmlns:p="http://schemas.openxmlformats.org/presentationml/2006/main">
-  <p:cSld>
-    <p:spTree>
-      <p:nvGrpSpPr>
-        <p:cNvPr id="1" name=""/>
-        <p:cNvGrpSpPr/>
-        <p:nvPr/>
-      </p:nvGrpSpPr>
-      <p:grpSpPr>
-        <a:xfrm>
-          <a:off x="0" y="0"/>
-          <a:ext cx="0" cy="0"/>
-          <a:chOff x="0" y="0"/>
-          <a:chExt cx="0" cy="0"/>
-        </a:xfrm>
-      </p:grpSpPr>
+      <p:sp>
+        <p:nvSpPr>
+          <p:cNvPr id="3" name="TextBox 2"/>
+          <p:cNvSpPr txBox="1"/>
+          <p:nvPr/>
+        </p:nvSpPr>
+        <p:spPr>
+          <a:xfrm>
+            <a:off x="838200" y="152400"/>
+            <a:ext cx="7467600" cy="369332"/>
+          </a:xfrm>
+          <a:prstGeom prst="rect">
+            <a:avLst/>
+          </a:prstGeom>
+          <a:noFill/>
+        </p:spPr>
+        <p:txBody>
+          <a:bodyPr wrap="square" rtlCol="0">
+            <a:spAutoFit/>
+          </a:bodyPr>
+          <a:lstStyle/>
+          <a:p>
+            <a:r>
+              <a:rPr lang="en-US" dirty="0" smtClean="0"/>
+              <a:t>Using the inter-arrival times to calculate the inter-vehicle spacing</a:t>
+            </a:r>
+            <a:endParaRPr lang="en-US" dirty="0"/>
+          </a:p>
+        </p:txBody>
+      </p:sp>
       <p:pic>
         <p:nvPicPr>
-          <p:cNvPr id="3074" name="Picture 2"/>
+          <p:cNvPr id="4" name="Picture 12"/>
           <p:cNvPicPr>
             <a:picLocks noChangeAspect="1" noChangeArrowheads="1"/>
           </p:cNvPicPr>
           <p:nvPr/>
         </p:nvPicPr>
         <p:blipFill>
-          <a:blip r:embed="rId2" cstate="print"/>
+          <a:blip r:embed="rId3" cstate="print">
+            <a:clrChange>
+              <a:clrFrom>
+                <a:srgbClr val="FFFFFF"/>
+              </a:clrFrom>
+              <a:clrTo>
+                <a:srgbClr val="FFFFFF">
+                  <a:alpha val="0"/>
+                </a:srgbClr>
+              </a:clrTo>
+            </a:clrChange>
+          </a:blip>
           <a:srcRect/>
           <a:stretch>
             <a:fillRect/>
@@ -4059,8 +6257,188 @@
         </p:blipFill>
         <p:spPr bwMode="auto">
           <a:xfrm>
-            <a:off x="0" y="1524000"/>
-            <a:ext cx="8880203" cy="4138613"/>
+            <a:off x="990600" y="1828800"/>
+            <a:ext cx="1104900" cy="257175"/>
+          </a:xfrm>
+          <a:prstGeom prst="rect">
+            <a:avLst/>
+          </a:prstGeom>
+          <a:noFill/>
+        </p:spPr>
+      </p:pic>
+      <p:sp>
+        <p:nvSpPr>
+          <p:cNvPr id="5" name="TextBox 4"/>
+          <p:cNvSpPr txBox="1"/>
+          <p:nvPr/>
+        </p:nvSpPr>
+        <p:spPr>
+          <a:xfrm>
+            <a:off x="304800" y="1066800"/>
+            <a:ext cx="2743200" cy="646331"/>
+          </a:xfrm>
+          <a:prstGeom prst="rect">
+            <a:avLst/>
+          </a:prstGeom>
+          <a:noFill/>
+        </p:spPr>
+        <p:txBody>
+          <a:bodyPr wrap="square" rtlCol="0">
+            <a:spAutoFit/>
+          </a:bodyPr>
+          <a:lstStyle/>
+          <a:p>
+            <a:r>
+              <a:rPr lang="en-US" dirty="0" smtClean="0"/>
+              <a:t>Modified equation for the inter-vehicle spacing</a:t>
+            </a:r>
+            <a:endParaRPr lang="en-US" dirty="0"/>
+          </a:p>
+        </p:txBody>
+      </p:sp>
+      <p:sp>
+        <p:nvSpPr>
+          <p:cNvPr id="6" name="TextBox 5"/>
+          <p:cNvSpPr txBox="1"/>
+          <p:nvPr/>
+        </p:nvSpPr>
+        <p:spPr>
+          <a:xfrm>
+            <a:off x="457200" y="3581400"/>
+            <a:ext cx="8458200" cy="2308324"/>
+          </a:xfrm>
+          <a:prstGeom prst="rect">
+            <a:avLst/>
+          </a:prstGeom>
+          <a:noFill/>
+        </p:spPr>
+        <p:txBody>
+          <a:bodyPr wrap="square" rtlCol="0">
+            <a:spAutoFit/>
+          </a:bodyPr>
+          <a:lstStyle/>
+          <a:p>
+            <a:pPr>
+              <a:buFont typeface="Arial" pitchFamily="34" charset="0"/>
+              <a:buChar char="•"/>
+            </a:pPr>
+            <a:r>
+              <a:rPr lang="en-US" dirty="0" smtClean="0"/>
+              <a:t>Can approximate S =   V, which results in figure 5(a)</a:t>
+            </a:r>
+          </a:p>
+          <a:p>
+            <a:pPr>
+              <a:buFont typeface="Arial" pitchFamily="34" charset="0"/>
+              <a:buChar char="•"/>
+            </a:pPr>
+            <a:r>
+              <a:rPr lang="en-US" dirty="0" smtClean="0"/>
+              <a:t>Inter-vehicle spacing is anywhere from 0 to 1000km!</a:t>
+            </a:r>
+          </a:p>
+          <a:p>
+            <a:pPr>
+              <a:buFont typeface="Arial" pitchFamily="34" charset="0"/>
+              <a:buChar char="•"/>
+            </a:pPr>
+            <a:r>
+              <a:rPr lang="en-US" dirty="0" smtClean="0"/>
+              <a:t>Can model PDF of inter-vehicle spacing by                          where</a:t>
+            </a:r>
+          </a:p>
+          <a:p>
+            <a:pPr>
+              <a:buFont typeface="Arial" pitchFamily="34" charset="0"/>
+              <a:buChar char="•"/>
+            </a:pPr>
+            <a:r>
+              <a:rPr lang="en-US" dirty="0" smtClean="0"/>
+              <a:t>Integrating                           we can get the Cumulative Density Function of the inter-vehicle spacing.</a:t>
+            </a:r>
+          </a:p>
+          <a:p>
+            <a:pPr>
+              <a:buFont typeface="Arial" pitchFamily="34" charset="0"/>
+              <a:buChar char="•"/>
+            </a:pPr>
+            <a:r>
+              <a:rPr lang="en-US" dirty="0" smtClean="0"/>
+              <a:t>Define range of communication to be 250m or less</a:t>
+            </a:r>
+          </a:p>
+          <a:p>
+            <a:pPr>
+              <a:buFont typeface="Arial" pitchFamily="34" charset="0"/>
+              <a:buChar char="•"/>
+            </a:pPr>
+            <a:r>
+              <a:rPr lang="en-US" dirty="0" smtClean="0"/>
+              <a:t>From figure 5(b) we see there is a 65% chance of being connected to the network.</a:t>
+            </a:r>
+          </a:p>
+          <a:p>
+            <a:pPr>
+              <a:buFont typeface="Arial" pitchFamily="34" charset="0"/>
+              <a:buChar char="•"/>
+            </a:pPr>
+            <a:r>
+              <a:rPr lang="en-US" dirty="0" smtClean="0"/>
+              <a:t>However, this assumes 100% market penetration… Highly unlikely! </a:t>
+            </a:r>
+            <a:endParaRPr lang="en-US" dirty="0"/>
+          </a:p>
+        </p:txBody>
+      </p:sp>
+      <p:pic>
+        <p:nvPicPr>
+          <p:cNvPr id="7" name="Picture 9"/>
+          <p:cNvPicPr>
+            <a:picLocks noChangeAspect="1" noChangeArrowheads="1"/>
+          </p:cNvPicPr>
+          <p:nvPr/>
+        </p:nvPicPr>
+        <p:blipFill>
+          <a:blip r:embed="rId4" cstate="print">
+            <a:clrChange>
+              <a:clrFrom>
+                <a:srgbClr val="FFFFFF"/>
+              </a:clrFrom>
+              <a:clrTo>
+                <a:srgbClr val="FFFFFF">
+                  <a:alpha val="0"/>
+                </a:srgbClr>
+              </a:clrTo>
+            </a:clrChange>
+          </a:blip>
+          <a:srcRect/>
+          <a:stretch>
+            <a:fillRect/>
+          </a:stretch>
+        </p:blipFill>
+        <p:spPr bwMode="auto">
+          <a:xfrm>
+            <a:off x="2590800" y="3657600"/>
+            <a:ext cx="95250" cy="209550"/>
+          </a:xfrm>
+          <a:prstGeom prst="rect">
+            <a:avLst/>
+          </a:prstGeom>
+          <a:noFill/>
+        </p:spPr>
+      </p:pic>
+      <p:sp>
+        <p:nvSpPr>
+          <p:cNvPr id="18434" name="Rectangle 2"/>
+          <p:cNvSpPr>
+            <a:spLocks noChangeArrowheads="1"/>
+          </p:cNvSpPr>
+          <p:nvPr/>
+        </p:nvSpPr>
+        <p:spPr bwMode="auto">
+          <a:xfrm>
+            <a:off x="0" y="0"/>
+            <a:ext cx="9144000" cy="0"/>
           </a:xfrm>
           <a:prstGeom prst="rect">
             <a:avLst/>
@@ -4072,43 +6450,42 @@
             <a:headEnd/>
             <a:tailEnd/>
           </a:ln>
-        </p:spPr>
-      </p:pic>
-    </p:spTree>
-  </p:cSld>
-  <p:clrMapOvr>
-    <a:masterClrMapping/>
-  </p:clrMapOvr>
-</p:sld>
-</file>
-
-<file path=ppt/slides/slide8.xml><?xml version="1.0" encoding="utf-8"?>
-<p:sld xmlns:a="http://schemas.openxmlformats.org/drawingml/2006/main" xmlns:r="http://schemas.openxmlformats.org/officeDocument/2006/relationships" xmlns:p="http://schemas.openxmlformats.org/presentationml/2006/main">
-  <p:cSld>
-    <p:spTree>
-      <p:nvGrpSpPr>
-        <p:cNvPr id="1" name=""/>
-        <p:cNvGrpSpPr/>
-        <p:nvPr/>
-      </p:nvGrpSpPr>
-      <p:grpSpPr>
-        <a:xfrm>
-          <a:off x="0" y="0"/>
-          <a:ext cx="0" cy="0"/>
-          <a:chOff x="0" y="0"/>
-          <a:chExt cx="0" cy="0"/>
-        </a:xfrm>
-      </p:grpSpPr>
+          <a:effectLst/>
+        </p:spPr>
+        <p:txBody>
+          <a:bodyPr vert="horz" wrap="none" lIns="91440" tIns="45720" rIns="91440" bIns="45720" numCol="1" anchor="ctr" anchorCtr="0" compatLnSpc="1">
+            <a:prstTxWarp prst="textNoShape">
+              <a:avLst/>
+            </a:prstTxWarp>
+            <a:spAutoFit/>
+          </a:bodyPr>
+          <a:lstStyle/>
+          <a:p>
+            <a:endParaRPr lang="en-US"/>
+          </a:p>
+        </p:txBody>
+      </p:sp>
       <p:pic>
         <p:nvPicPr>
-          <p:cNvPr id="4098" name="Picture 2"/>
+          <p:cNvPr id="18433" name="Picture 1"/>
           <p:cNvPicPr>
             <a:picLocks noChangeAspect="1" noChangeArrowheads="1"/>
           </p:cNvPicPr>
           <p:nvPr/>
         </p:nvPicPr>
         <p:blipFill>
-          <a:blip r:embed="rId2" cstate="print"/>
+          <a:blip r:embed="rId5" cstate="print">
+            <a:clrChange>
+              <a:clrFrom>
+                <a:srgbClr val="FFFFFF"/>
+              </a:clrFrom>
+              <a:clrTo>
+                <a:srgbClr val="FFFFFF">
+                  <a:alpha val="0"/>
+                </a:srgbClr>
+              </a:clrTo>
+            </a:clrChange>
+          </a:blip>
           <a:srcRect/>
           <a:stretch>
             <a:fillRect/>
@@ -4116,8 +6493,27 @@
         </p:blipFill>
         <p:spPr bwMode="auto">
           <a:xfrm>
-            <a:off x="2052638" y="1157288"/>
-            <a:ext cx="5038725" cy="4543425"/>
+            <a:off x="4572000" y="4191000"/>
+            <a:ext cx="1181100" cy="304800"/>
+          </a:xfrm>
+          <a:prstGeom prst="rect">
+            <a:avLst/>
+          </a:prstGeom>
+          <a:noFill/>
+        </p:spPr>
+      </p:pic>
+      <p:sp>
+        <p:nvSpPr>
+          <p:cNvPr id="18436" name="Rectangle 4"/>
+          <p:cNvSpPr>
+            <a:spLocks noChangeArrowheads="1"/>
+          </p:cNvSpPr>
+          <p:nvPr/>
+        </p:nvSpPr>
+        <p:spPr bwMode="auto">
+          <a:xfrm>
+            <a:off x="0" y="0"/>
+            <a:ext cx="9144000" cy="0"/>
           </a:xfrm>
           <a:prstGeom prst="rect">
             <a:avLst/>
@@ -4129,13 +6525,140 @@
             <a:headEnd/>
             <a:tailEnd/>
           </a:ln>
+          <a:effectLst/>
+        </p:spPr>
+        <p:txBody>
+          <a:bodyPr vert="horz" wrap="none" lIns="91440" tIns="45720" rIns="91440" bIns="45720" numCol="1" anchor="ctr" anchorCtr="0" compatLnSpc="1">
+            <a:prstTxWarp prst="textNoShape">
+              <a:avLst/>
+            </a:prstTxWarp>
+            <a:spAutoFit/>
+          </a:bodyPr>
+          <a:lstStyle/>
+          <a:p>
+            <a:endParaRPr lang="en-US"/>
+          </a:p>
+        </p:txBody>
+      </p:sp>
+      <p:pic>
+        <p:nvPicPr>
+          <p:cNvPr id="18435" name="Picture 3"/>
+          <p:cNvPicPr>
+            <a:picLocks noChangeAspect="1" noChangeArrowheads="1"/>
+          </p:cNvPicPr>
+          <p:nvPr/>
+        </p:nvPicPr>
+        <p:blipFill>
+          <a:blip r:embed="rId6" cstate="print">
+            <a:clrChange>
+              <a:clrFrom>
+                <a:srgbClr val="FFFFFF"/>
+              </a:clrFrom>
+              <a:clrTo>
+                <a:srgbClr val="FFFFFF">
+                  <a:alpha val="0"/>
+                </a:srgbClr>
+              </a:clrTo>
+            </a:clrChange>
+          </a:blip>
+          <a:srcRect/>
+          <a:stretch>
+            <a:fillRect/>
+          </a:stretch>
+        </p:blipFill>
+        <p:spPr bwMode="auto">
+          <a:xfrm>
+            <a:off x="6629400" y="4038600"/>
+            <a:ext cx="695325" cy="371475"/>
+          </a:xfrm>
+          <a:prstGeom prst="rect">
+            <a:avLst/>
+          </a:prstGeom>
+          <a:noFill/>
         </p:spPr>
       </p:pic>
+      <p:pic>
+        <p:nvPicPr>
+          <p:cNvPr id="12" name="Picture 1"/>
+          <p:cNvPicPr>
+            <a:picLocks noChangeAspect="1" noChangeArrowheads="1"/>
+          </p:cNvPicPr>
+          <p:nvPr/>
+        </p:nvPicPr>
+        <p:blipFill>
+          <a:blip r:embed="rId5" cstate="print">
+            <a:clrChange>
+              <a:clrFrom>
+                <a:srgbClr val="FFFFFF"/>
+              </a:clrFrom>
+              <a:clrTo>
+                <a:srgbClr val="FFFFFF">
+                  <a:alpha val="0"/>
+                </a:srgbClr>
+              </a:clrTo>
+            </a:clrChange>
+          </a:blip>
+          <a:srcRect/>
+          <a:stretch>
+            <a:fillRect/>
+          </a:stretch>
+        </p:blipFill>
+        <p:spPr bwMode="auto">
+          <a:xfrm>
+            <a:off x="1752600" y="4419600"/>
+            <a:ext cx="1181100" cy="304800"/>
+          </a:xfrm>
+          <a:prstGeom prst="rect">
+            <a:avLst/>
+          </a:prstGeom>
+          <a:noFill/>
+        </p:spPr>
+      </p:pic>
+      <p:cxnSp>
+        <p:nvCxnSpPr>
+          <p:cNvPr id="14" name="Straight Arrow Connector 13"/>
+          <p:cNvCxnSpPr/>
+          <p:nvPr/>
+        </p:nvCxnSpPr>
+        <p:spPr>
+          <a:xfrm flipH="1">
+            <a:off x="8382000" y="304800"/>
+            <a:ext cx="304800" cy="1143000"/>
+          </a:xfrm>
+          <a:prstGeom prst="straightConnector1">
+            <a:avLst/>
+          </a:prstGeom>
+          <a:ln>
+            <a:tailEnd type="arrow"/>
+          </a:ln>
+        </p:spPr>
+        <p:style>
+          <a:lnRef idx="1">
+            <a:schemeClr val="accent1"/>
+          </a:lnRef>
+          <a:fillRef idx="0">
+            <a:schemeClr val="accent1"/>
+          </a:fillRef>
+          <a:effectRef idx="0">
+            <a:schemeClr val="accent1"/>
+          </a:effectRef>
+          <a:fontRef idx="minor">
+            <a:schemeClr val="tx1"/>
+          </a:fontRef>
+        </p:style>
+      </p:cxnSp>
     </p:spTree>
   </p:cSld>
   <p:clrMapOvr>
     <a:masterClrMapping/>
   </p:clrMapOvr>
+  <p:timing>
+    <p:tnLst>
+      <p:par>
+        <p:cTn id="1" dur="indefinite" restart="never" nodeType="tmRoot"/>
+      </p:par>
+    </p:tnLst>
+  </p:timing>
 </p:sld>
 </file>
 
@@ -4156,25 +6679,76 @@
           <a:chExt cx="0" cy="0"/>
         </a:xfrm>
       </p:grpSpPr>
-      <p:pic>
-        <p:nvPicPr>
-          <p:cNvPr id="5122" name="Picture 2"/>
-          <p:cNvPicPr>
-            <a:picLocks noChangeAspect="1" noChangeArrowheads="1"/>
-          </p:cNvPicPr>
+      <p:sp>
+        <p:nvSpPr>
+          <p:cNvPr id="2" name="Title 1"/>
+          <p:cNvSpPr>
+            <a:spLocks noGrp="1"/>
+          </p:cNvSpPr>
+          <p:nvPr>
+            <p:ph type="title"/>
+          </p:nvPr>
+        </p:nvSpPr>
+        <p:spPr/>
+        <p:txBody>
+          <a:bodyPr/>
+          <a:lstStyle/>
+          <a:p>
+            <a:r>
+              <a:rPr lang="en-US" dirty="0" smtClean="0"/>
+              <a:t>Inter-Vehicle Spacing</a:t>
+            </a:r>
+            <a:endParaRPr lang="en-US" dirty="0"/>
+          </a:p>
+        </p:txBody>
+      </p:sp>
+      <p:sp>
+        <p:nvSpPr>
+          <p:cNvPr id="3" name="Content Placeholder 2"/>
+          <p:cNvSpPr>
+            <a:spLocks noGrp="1"/>
+          </p:cNvSpPr>
+          <p:nvPr>
+            <p:ph idx="1"/>
+          </p:nvPr>
+        </p:nvSpPr>
+        <p:spPr/>
+        <p:txBody>
+          <a:bodyPr/>
+          <a:lstStyle/>
+          <a:p>
+            <a:r>
+              <a:rPr lang="en-US" dirty="0" smtClean="0"/>
+              <a:t>In a similar manner can derive the Inter-vehicle spacing distribution.</a:t>
+            </a:r>
+          </a:p>
+          <a:p>
+            <a:r>
+              <a:rPr lang="en-US" dirty="0" smtClean="0"/>
+              <a:t>                   , </a:t>
+            </a:r>
+          </a:p>
+          <a:p>
+            <a:r>
+              <a:rPr lang="en-US" dirty="0" smtClean="0"/>
+              <a:t>This breaks down when the volume is greater than 1000 vehicles/hour, but we are emphasizing the time frame from 1-3am with a sparse traffic density to model a fragmented network.</a:t>
+            </a:r>
+            <a:endParaRPr lang="en-US" dirty="0"/>
+          </a:p>
+        </p:txBody>
+      </p:sp>
+      <p:sp>
+        <p:nvSpPr>
+          <p:cNvPr id="36866" name="Rectangle 2"/>
+          <p:cNvSpPr>
+            <a:spLocks noChangeArrowheads="1"/>
+          </p:cNvSpPr>
           <p:nvPr/>
-        </p:nvPicPr>
-        <p:blipFill>
-          <a:blip r:embed="rId2" cstate="print"/>
-          <a:srcRect/>
-          <a:stretch>
-            <a:fillRect/>
-          </a:stretch>
-        </p:blipFill>
+        </p:nvSpPr>
         <p:spPr bwMode="auto">
           <a:xfrm>
-            <a:off x="0" y="1676400"/>
-            <a:ext cx="9054288" cy="3571875"/>
+            <a:off x="0" y="0"/>
+            <a:ext cx="9144000" cy="0"/>
           </a:xfrm>
           <a:prstGeom prst="rect">
             <a:avLst/>
@@ -4186,6 +6760,131 @@
             <a:headEnd/>
             <a:tailEnd/>
           </a:ln>
+          <a:effectLst/>
+        </p:spPr>
+        <p:txBody>
+          <a:bodyPr vert="horz" wrap="none" lIns="91440" tIns="45720" rIns="91440" bIns="45720" numCol="1" anchor="ctr" anchorCtr="0" compatLnSpc="1">
+            <a:prstTxWarp prst="textNoShape">
+              <a:avLst/>
+            </a:prstTxWarp>
+            <a:spAutoFit/>
+          </a:bodyPr>
+          <a:lstStyle/>
+          <a:p>
+            <a:endParaRPr lang="en-US"/>
+          </a:p>
+        </p:txBody>
+      </p:sp>
+      <p:pic>
+        <p:nvPicPr>
+          <p:cNvPr id="36865" name="Picture 1"/>
+          <p:cNvPicPr>
+            <a:picLocks noChangeAspect="1" noChangeArrowheads="1"/>
+          </p:cNvPicPr>
+          <p:nvPr/>
+        </p:nvPicPr>
+        <p:blipFill>
+          <a:blip r:embed="rId2" cstate="print">
+            <a:clrChange>
+              <a:clrFrom>
+                <a:srgbClr val="FFFFFF"/>
+              </a:clrFrom>
+              <a:clrTo>
+                <a:srgbClr val="FFFFFF">
+                  <a:alpha val="0"/>
+                </a:srgbClr>
+              </a:clrTo>
+            </a:clrChange>
+          </a:blip>
+          <a:srcRect/>
+          <a:stretch>
+            <a:fillRect/>
+          </a:stretch>
+        </p:blipFill>
+        <p:spPr bwMode="auto">
+          <a:xfrm>
+            <a:off x="1066800" y="2743200"/>
+            <a:ext cx="1381125" cy="381000"/>
+          </a:xfrm>
+          <a:prstGeom prst="rect">
+            <a:avLst/>
+          </a:prstGeom>
+          <a:noFill/>
+        </p:spPr>
+      </p:pic>
+      <p:sp>
+        <p:nvSpPr>
+          <p:cNvPr id="36868" name="Rectangle 4"/>
+          <p:cNvSpPr>
+            <a:spLocks noChangeArrowheads="1"/>
+          </p:cNvSpPr>
+          <p:nvPr/>
+        </p:nvSpPr>
+        <p:spPr bwMode="auto">
+          <a:xfrm>
+            <a:off x="0" y="0"/>
+            <a:ext cx="9144000" cy="0"/>
+          </a:xfrm>
+          <a:prstGeom prst="rect">
+            <a:avLst/>
+          </a:prstGeom>
+          <a:noFill/>
+          <a:ln w="9525">
+            <a:noFill/>
+            <a:miter lim="800000"/>
+            <a:headEnd/>
+            <a:tailEnd/>
+          </a:ln>
+          <a:effectLst/>
+        </p:spPr>
+        <p:txBody>
+          <a:bodyPr vert="horz" wrap="none" lIns="91440" tIns="45720" rIns="91440" bIns="45720" numCol="1" anchor="ctr" anchorCtr="0" compatLnSpc="1">
+            <a:prstTxWarp prst="textNoShape">
+              <a:avLst/>
+            </a:prstTxWarp>
+            <a:spAutoFit/>
+          </a:bodyPr>
+          <a:lstStyle/>
+          <a:p>
+            <a:endParaRPr lang="en-US"/>
+          </a:p>
+        </p:txBody>
+      </p:sp>
+      <p:pic>
+        <p:nvPicPr>
+          <p:cNvPr id="36867" name="Picture 3"/>
+          <p:cNvPicPr>
+            <a:picLocks noChangeAspect="1" noChangeArrowheads="1"/>
+          </p:cNvPicPr>
+          <p:nvPr/>
+        </p:nvPicPr>
+        <p:blipFill>
+          <a:blip r:embed="rId3" cstate="print">
+            <a:clrChange>
+              <a:clrFrom>
+                <a:srgbClr val="FFFFFF"/>
+              </a:clrFrom>
+              <a:clrTo>
+                <a:srgbClr val="FFFFFF">
+                  <a:alpha val="0"/>
+                </a:srgbClr>
+              </a:clrTo>
+            </a:clrChange>
+          </a:blip>
+          <a:srcRect/>
+          <a:stretch>
+            <a:fillRect/>
+          </a:stretch>
+        </p:blipFill>
+        <p:spPr bwMode="auto">
+          <a:xfrm>
+            <a:off x="2971800" y="2819400"/>
+            <a:ext cx="1152525" cy="285750"/>
+          </a:xfrm>
+          <a:prstGeom prst="rect">
+            <a:avLst/>
+          </a:prstGeom>
+          <a:noFill/>
         </p:spPr>
       </p:pic>
     </p:spTree>
@@ -4477,4 +7176,287 @@
   <a:objectDefaults/>
   <a:extraClrSchemeLst/>
 </a:theme>
+</file>
+
+<file path=ppt/theme/theme2.xml><?xml version="1.0" encoding="utf-8"?>
+<a:theme xmlns:a="http://schemas.openxmlformats.org/drawingml/2006/main" name="Office Theme">
+  <a:themeElements>
+    <a:clrScheme name="Office">
+      <a:dk1>
+        <a:sysClr val="windowText" lastClr="000000"/>
+      </a:dk1>
+      <a:lt1>
+        <a:sysClr val="window" lastClr="FFFFFF"/>
+      </a:lt1>
+      <a:dk2>
+        <a:srgbClr val="1F497D"/>
+      </a:dk2>
+      <a:lt2>
+        <a:srgbClr val="EEECE1"/>
+      </a:lt2>
+      <a:accent1>
+        <a:srgbClr val="4F81BD"/>
+      </a:accent1>
+      <a:accent2>
+        <a:srgbClr val="C0504D"/>
+      </a:accent2>
+      <a:accent3>
+        <a:srgbClr val="9BBB59"/>
+      </a:accent3>
+      <a:accent4>
+        <a:srgbClr val="8064A2"/>
+      </a:accent4>
+      <a:accent5>
+        <a:srgbClr val="4BACC6"/>
+      </a:accent5>
+      <a:accent6>
+        <a:srgbClr val="F79646"/>
+      </a:accent6>
+      <a:hlink>
+        <a:srgbClr val="0000FF"/>
+      </a:hlink>
+      <a:folHlink>
+        <a:srgbClr val="800080"/>
+      </a:folHlink>
+    </a:clrScheme>
+    <a:fontScheme name="Office">
+      <a:majorFont>
+        <a:latin typeface="Calibri"/>
+        <a:ea typeface=""/>
+        <a:cs typeface=""/>
+        <a:font script="Jpan" typeface="ＭＳ Ｐゴシック"/>
+        <a:font script="Hang" typeface="맑은 고딕"/>
+        <a:font script="Hans" typeface="宋体"/>
+        <a:font script="Hant" typeface="新細明體"/>
+        <a:font script="Arab" typeface="Times New Roman"/>
+        <a:font script="Hebr" typeface="Times New Roman"/>
+        <a:font script="Thai" typeface="Angsana New"/>
+        <a:font script="Ethi" typeface="Nyala"/>
+        <a:font script="Beng" typeface="Vrinda"/>
+        <a:font script="Gujr" typeface="Shruti"/>
+        <a:font script="Khmr" typeface="MoolBoran"/>
+        <a:font script="Knda" typeface="Tunga"/>
+        <a:font script="Guru" typeface="Raavi"/>
+        <a:font script="Cans" typeface="Euphemia"/>
+        <a:font script="Cher" typeface="Plantagenet Cherokee"/>
+        <a:font script="Yiii" typeface="Microsoft Yi Baiti"/>
+        <a:font script="Tibt" typeface="Microsoft Himalaya"/>
+        <a:font script="Thaa" typeface="MV Boli"/>
+        <a:font script="Deva" typeface="Mangal"/>
+        <a:font script="Telu" typeface="Gautami"/>
+        <a:font script="Taml" typeface="Latha"/>
+        <a:font script="Syrc" typeface="Estrangelo Edessa"/>
+        <a:font script="Orya" typeface="Kalinga"/>
+        <a:font script="Mlym" typeface="Kartika"/>
+        <a:font script="Laoo" typeface="DokChampa"/>
+        <a:font script="Sinh" typeface="Iskoola Pota"/>
+        <a:font script="Mong" typeface="Mongolian Baiti"/>
+        <a:font script="Viet" typeface="Times New Roman"/>
+        <a:font script="Uigh" typeface="Microsoft Uighur"/>
+      </a:majorFont>
+      <a:minorFont>
+        <a:latin typeface="Calibri"/>
+        <a:ea typeface=""/>
+        <a:cs typeface=""/>
+        <a:font script="Jpan" typeface="ＭＳ Ｐゴシック"/>
+        <a:font script="Hang" typeface="맑은 고딕"/>
+        <a:font script="Hans" typeface="宋体"/>
+        <a:font script="Hant" typeface="新細明體"/>
+        <a:font script="Arab" typeface="Arial"/>
+        <a:font script="Hebr" typeface="Arial"/>
+        <a:font script="Thai" typeface="Cordia New"/>
+        <a:font script="Ethi" typeface="Nyala"/>
+        <a:font script="Beng" typeface="Vrinda"/>
+        <a:font script="Gujr" typeface="Shruti"/>
+        <a:font script="Khmr" typeface="DaunPenh"/>
+        <a:font script="Knda" typeface="Tunga"/>
+        <a:font script="Guru" typeface="Raavi"/>
+        <a:font script="Cans" typeface="Euphemia"/>
+        <a:font script="Cher" typeface="Plantagenet Cherokee"/>
+        <a:font script="Yiii" typeface="Microsoft Yi Baiti"/>
+        <a:font script="Tibt" typeface="Microsoft Himalaya"/>
+        <a:font script="Thaa" typeface="MV Boli"/>
+        <a:font script="Deva" typeface="Mangal"/>
+        <a:font script="Telu" typeface="Gautami"/>
+        <a:font script="Taml" typeface="Latha"/>
+        <a:font script="Syrc" typeface="Estrangelo Edessa"/>
+        <a:font script="Orya" typeface="Kalinga"/>
+        <a:font script="Mlym" typeface="Kartika"/>
+        <a:font script="Laoo" typeface="DokChampa"/>
+        <a:font script="Sinh" typeface="Iskoola Pota"/>
+        <a:font script="Mong" typeface="Mongolian Baiti"/>
+        <a:font script="Viet" typeface="Arial"/>
+        <a:font script="Uigh" typeface="Microsoft Uighur"/>
+      </a:minorFont>
+    </a:fontScheme>
+    <a:fmtScheme name="Office">
+      <a:fillStyleLst>
+        <a:solidFill>
+          <a:schemeClr val="phClr"/>
+        </a:solidFill>
+        <a:gradFill rotWithShape="1">
+          <a:gsLst>
+            <a:gs pos="0">
+              <a:schemeClr val="phClr">
+                <a:tint val="50000"/>
+                <a:satMod val="300000"/>
+              </a:schemeClr>
+            </a:gs>
+            <a:gs pos="35000">
+              <a:schemeClr val="phClr">
+                <a:tint val="37000"/>
+                <a:satMod val="300000"/>
+              </a:schemeClr>
+            </a:gs>
+            <a:gs pos="100000">
+              <a:schemeClr val="phClr">
+                <a:tint val="15000"/>
+                <a:satMod val="350000"/>
+              </a:schemeClr>
+            </a:gs>
+          </a:gsLst>
+          <a:lin ang="16200000" scaled="1"/>
+        </a:gradFill>
+        <a:gradFill rotWithShape="1">
+          <a:gsLst>
+            <a:gs pos="0">
+              <a:schemeClr val="phClr">
+                <a:shade val="51000"/>
+                <a:satMod val="130000"/>
+              </a:schemeClr>
+            </a:gs>
+            <a:gs pos="80000">
+              <a:schemeClr val="phClr">
+                <a:shade val="93000"/>
+                <a:satMod val="130000"/>
+              </a:schemeClr>
+            </a:gs>
+            <a:gs pos="100000">
+              <a:schemeClr val="phClr">
+                <a:shade val="94000"/>
+                <a:satMod val="135000"/>
+              </a:schemeClr>
+            </a:gs>
+          </a:gsLst>
+          <a:lin ang="16200000" scaled="0"/>
+        </a:gradFill>
+      </a:fillStyleLst>
+      <a:lnStyleLst>
+        <a:ln w="9525" cap="flat" cmpd="sng" algn="ctr">
+          <a:solidFill>
+            <a:schemeClr val="phClr">
+              <a:shade val="95000"/>
+              <a:satMod val="105000"/>
+            </a:schemeClr>
+          </a:solidFill>
+          <a:prstDash val="solid"/>
+        </a:ln>
+        <a:ln w="25400" cap="flat" cmpd="sng" algn="ctr">
+          <a:solidFill>
+            <a:schemeClr val="phClr"/>
+          </a:solidFill>
+          <a:prstDash val="solid"/>
+        </a:ln>
+        <a:ln w="38100" cap="flat" cmpd="sng" algn="ctr">
+          <a:solidFill>
+            <a:schemeClr val="phClr"/>
+          </a:solidFill>
+          <a:prstDash val="solid"/>
+        </a:ln>
+      </a:lnStyleLst>
+      <a:effectStyleLst>
+        <a:effectStyle>
+          <a:effectLst>
+            <a:outerShdw blurRad="40000" dist="20000" dir="5400000" rotWithShape="0">
+              <a:srgbClr val="000000">
+                <a:alpha val="38000"/>
+              </a:srgbClr>
+            </a:outerShdw>
+          </a:effectLst>
+        </a:effectStyle>
+        <a:effectStyle>
+          <a:effectLst>
+            <a:outerShdw blurRad="40000" dist="23000" dir="5400000" rotWithShape="0">
+              <a:srgbClr val="000000">
+                <a:alpha val="35000"/>
+              </a:srgbClr>
+            </a:outerShdw>
+          </a:effectLst>
+        </a:effectStyle>
+        <a:effectStyle>
+          <a:effectLst>
+            <a:outerShdw blurRad="40000" dist="23000" dir="5400000" rotWithShape="0">
+              <a:srgbClr val="000000">
+                <a:alpha val="35000"/>
+              </a:srgbClr>
+            </a:outerShdw>
+          </a:effectLst>
+          <a:scene3d>
+            <a:camera prst="orthographicFront">
+              <a:rot lat="0" lon="0" rev="0"/>
+            </a:camera>
+            <a:lightRig rig="threePt" dir="t">
+              <a:rot lat="0" lon="0" rev="1200000"/>
+            </a:lightRig>
+          </a:scene3d>
+          <a:sp3d>
+            <a:bevelT w="63500" h="25400"/>
+          </a:sp3d>
+        </a:effectStyle>
+      </a:effectStyleLst>
+      <a:bgFillStyleLst>
+        <a:solidFill>
+          <a:schemeClr val="phClr"/>
+        </a:solidFill>
+        <a:gradFill rotWithShape="1">
+          <a:gsLst>
+            <a:gs pos="0">
+              <a:schemeClr val="phClr">
+                <a:tint val="40000"/>
+                <a:satMod val="350000"/>
+              </a:schemeClr>
+            </a:gs>
+            <a:gs pos="40000">
+              <a:schemeClr val="phClr">
+                <a:tint val="45000"/>
+                <a:shade val="99000"/>
+                <a:satMod val="350000"/>
+              </a:schemeClr>
+            </a:gs>
+            <a:gs pos="100000">
+              <a:schemeClr val="phClr">
+                <a:shade val="20000"/>
+                <a:satMod val="255000"/>
+              </a:schemeClr>
+            </a:gs>
+          </a:gsLst>
+          <a:path path="circle">
+            <a:fillToRect l="50000" t="-80000" r="50000" b="180000"/>
+          </a:path>
+        </a:gradFill>
+        <a:gradFill rotWithShape="1">
+          <a:gsLst>
+            <a:gs pos="0">
+              <a:schemeClr val="phClr">
+                <a:tint val="80000"/>
+                <a:satMod val="300000"/>
+              </a:schemeClr>
+            </a:gs>
+            <a:gs pos="100000">
+              <a:schemeClr val="phClr">
+                <a:shade val="30000"/>
+                <a:satMod val="200000"/>
+              </a:schemeClr>
+            </a:gs>
+          </a:gsLst>
+          <a:path path="circle">
+            <a:fillToRect l="50000" t="50000" r="50000" b="50000"/>
+          </a:path>
+        </a:gradFill>
+      </a:bgFillStyleLst>
+    </a:fmtScheme>
+  </a:themeElements>
+  <a:objectDefaults/>
+  <a:extraClrSchemeLst/>
+</a:theme>
 </file>
</xml_diff>

<commit_message>
Added Key characterisitcs to PPT
</commit_message>
<xml_diff>
--- a/VANET_Felix.pptx
+++ b/VANET_Felix.pptx
@@ -21,7 +21,7 @@
     <p:sldId id="278" r:id="rId12"/>
     <p:sldId id="261" r:id="rId13"/>
     <p:sldId id="262" r:id="rId14"/>
-    <p:sldId id="264" r:id="rId15"/>
+    <p:sldId id="286" r:id="rId15"/>
     <p:sldId id="265" r:id="rId16"/>
     <p:sldId id="266" r:id="rId17"/>
     <p:sldId id="267" r:id="rId18"/>
@@ -2960,7 +2960,7 @@
             <a:fld id="{AA1794F1-29D0-4E50-8F0F-8A456A29C142}" type="datetimeFigureOut">
               <a:rPr lang="en-US" smtClean="0"/>
               <a:pPr/>
-              <a:t>10/11/2012</a:t>
+              <a:t>10/12/2012</a:t>
             </a:fld>
             <a:endParaRPr lang="en-US"/>
           </a:p>
@@ -3752,7 +3752,7 @@
             <a:fld id="{1D8BD707-D9CF-40AE-B4C6-C98DA3205C09}" type="datetimeFigureOut">
               <a:rPr lang="en-US" smtClean="0"/>
               <a:pPr/>
-              <a:t>10/11/2012</a:t>
+              <a:t>10/12/2012</a:t>
             </a:fld>
             <a:endParaRPr lang="en-US"/>
           </a:p>
@@ -4113,7 +4113,7 @@
             <a:fld id="{1D8BD707-D9CF-40AE-B4C6-C98DA3205C09}" type="datetimeFigureOut">
               <a:rPr lang="en-US" smtClean="0"/>
               <a:pPr/>
-              <a:t>10/11/2012</a:t>
+              <a:t>10/12/2012</a:t>
             </a:fld>
             <a:endParaRPr lang="en-US"/>
           </a:p>
@@ -4290,7 +4290,7 @@
             <a:fld id="{1D8BD707-D9CF-40AE-B4C6-C98DA3205C09}" type="datetimeFigureOut">
               <a:rPr lang="en-US" smtClean="0"/>
               <a:pPr/>
-              <a:t>10/11/2012</a:t>
+              <a:t>10/12/2012</a:t>
             </a:fld>
             <a:endParaRPr lang="en-US"/>
           </a:p>
@@ -4527,7 +4527,7 @@
             <a:fld id="{1D8BD707-D9CF-40AE-B4C6-C98DA3205C09}" type="datetimeFigureOut">
               <a:rPr lang="en-US" smtClean="0"/>
               <a:pPr/>
-              <a:t>10/11/2012</a:t>
+              <a:t>10/12/2012</a:t>
             </a:fld>
             <a:endParaRPr lang="en-US"/>
           </a:p>
@@ -4798,7 +4798,7 @@
             <a:fld id="{1D8BD707-D9CF-40AE-B4C6-C98DA3205C09}" type="datetimeFigureOut">
               <a:rPr lang="en-US" smtClean="0"/>
               <a:pPr/>
-              <a:t>10/11/2012</a:t>
+              <a:t>10/12/2012</a:t>
             </a:fld>
             <a:endParaRPr lang="en-US"/>
           </a:p>
@@ -5020,7 +5020,7 @@
             <a:fld id="{1D8BD707-D9CF-40AE-B4C6-C98DA3205C09}" type="datetimeFigureOut">
               <a:rPr lang="en-US" smtClean="0"/>
               <a:pPr/>
-              <a:t>10/11/2012</a:t>
+              <a:t>10/12/2012</a:t>
             </a:fld>
             <a:endParaRPr lang="en-US"/>
           </a:p>
@@ -5374,7 +5374,7 @@
             <a:fld id="{1D8BD707-D9CF-40AE-B4C6-C98DA3205C09}" type="datetimeFigureOut">
               <a:rPr lang="en-US" smtClean="0"/>
               <a:pPr/>
-              <a:t>10/11/2012</a:t>
+              <a:t>10/12/2012</a:t>
             </a:fld>
             <a:endParaRPr lang="en-US"/>
           </a:p>
@@ -5608,7 +5608,7 @@
             <a:fld id="{1D8BD707-D9CF-40AE-B4C6-C98DA3205C09}" type="datetimeFigureOut">
               <a:rPr lang="en-US" smtClean="0"/>
               <a:pPr/>
-              <a:t>10/11/2012</a:t>
+              <a:t>10/12/2012</a:t>
             </a:fld>
             <a:endParaRPr lang="en-US"/>
           </a:p>
@@ -5750,7 +5750,7 @@
             <a:fld id="{1D8BD707-D9CF-40AE-B4C6-C98DA3205C09}" type="datetimeFigureOut">
               <a:rPr lang="en-US" smtClean="0"/>
               <a:pPr/>
-              <a:t>10/11/2012</a:t>
+              <a:t>10/12/2012</a:t>
             </a:fld>
             <a:endParaRPr lang="en-US"/>
           </a:p>
@@ -6029,7 +6029,7 @@
             <a:fld id="{1D8BD707-D9CF-40AE-B4C6-C98DA3205C09}" type="datetimeFigureOut">
               <a:rPr lang="en-US" smtClean="0"/>
               <a:pPr/>
-              <a:t>10/11/2012</a:t>
+              <a:t>10/12/2012</a:t>
             </a:fld>
             <a:endParaRPr lang="en-US"/>
           </a:p>
@@ -6438,7 +6438,7 @@
             <a:fld id="{1D8BD707-D9CF-40AE-B4C6-C98DA3205C09}" type="datetimeFigureOut">
               <a:rPr lang="en-US" smtClean="0"/>
               <a:pPr/>
-              <a:t>10/11/2012</a:t>
+              <a:t>10/12/2012</a:t>
             </a:fld>
             <a:endParaRPr lang="en-US"/>
           </a:p>
@@ -6778,7 +6778,7 @@
             <a:fld id="{1D8BD707-D9CF-40AE-B4C6-C98DA3205C09}" type="datetimeFigureOut">
               <a:rPr lang="en-US" smtClean="0"/>
               <a:pPr/>
-              <a:t>10/11/2012</a:t>
+              <a:t>10/12/2012</a:t>
             </a:fld>
             <a:endParaRPr lang="en-US"/>
           </a:p>
@@ -8241,25 +8241,103 @@
           <a:chExt cx="0" cy="0"/>
         </a:xfrm>
       </p:grpSpPr>
-      <p:pic>
-        <p:nvPicPr>
-          <p:cNvPr id="5122" name="Picture 2"/>
-          <p:cNvPicPr>
-            <a:picLocks noChangeAspect="1" noChangeArrowheads="1"/>
-          </p:cNvPicPr>
+      <p:sp>
+        <p:nvSpPr>
+          <p:cNvPr id="2" name="Title 1"/>
+          <p:cNvSpPr>
+            <a:spLocks noGrp="1"/>
+          </p:cNvSpPr>
+          <p:nvPr>
+            <p:ph type="title"/>
+          </p:nvPr>
+        </p:nvSpPr>
+        <p:spPr/>
+        <p:txBody>
+          <a:bodyPr/>
+          <a:lstStyle/>
+          <a:p>
+            <a:r>
+              <a:rPr lang="en-US" dirty="0" smtClean="0"/>
+              <a:t>Key Characteristics</a:t>
+            </a:r>
+            <a:endParaRPr lang="en-US" dirty="0"/>
+          </a:p>
+        </p:txBody>
+      </p:sp>
+      <p:sp>
+        <p:nvSpPr>
+          <p:cNvPr id="3" name="Content Placeholder 2"/>
+          <p:cNvSpPr>
+            <a:spLocks noGrp="1"/>
+          </p:cNvSpPr>
+          <p:nvPr>
+            <p:ph sz="quarter" idx="1"/>
+          </p:nvPr>
+        </p:nvSpPr>
+        <p:spPr/>
+        <p:txBody>
+          <a:bodyPr/>
+          <a:lstStyle/>
+          <a:p>
+            <a:r>
+              <a:rPr lang="en-US" dirty="0" smtClean="0"/>
+              <a:t>Probability of being the last vehicle in a cluster</a:t>
+            </a:r>
+          </a:p>
+          <a:p>
+            <a:endParaRPr lang="en-US" dirty="0" smtClean="0"/>
+          </a:p>
+          <a:p>
+            <a:r>
+              <a:rPr lang="en-US" dirty="0" smtClean="0"/>
+              <a:t>Average Intra-Cluster Spacing</a:t>
+            </a:r>
+          </a:p>
+          <a:p>
+            <a:endParaRPr lang="en-US" dirty="0" smtClean="0"/>
+          </a:p>
+          <a:p>
+            <a:r>
+              <a:rPr lang="en-US" dirty="0" smtClean="0"/>
+              <a:t>Average Inter-Cluster Spacing</a:t>
+            </a:r>
+            <a:endParaRPr lang="en-US" dirty="0" smtClean="0"/>
+          </a:p>
+          <a:p>
+            <a:endParaRPr lang="en-US" dirty="0" smtClean="0"/>
+          </a:p>
+          <a:p>
+            <a:r>
+              <a:rPr lang="en-US" dirty="0" smtClean="0"/>
+              <a:t>Average Cluster Size</a:t>
+            </a:r>
+          </a:p>
+          <a:p>
+            <a:endParaRPr lang="en-US" dirty="0" smtClean="0"/>
+          </a:p>
+          <a:p>
+            <a:r>
+              <a:rPr lang="en-US" dirty="0" smtClean="0"/>
+              <a:t>Average Cluster Length</a:t>
+            </a:r>
+          </a:p>
+          <a:p>
+            <a:endParaRPr lang="en-US" dirty="0" smtClean="0"/>
+          </a:p>
+        </p:txBody>
+      </p:sp>
+      <p:sp>
+        <p:nvSpPr>
+          <p:cNvPr id="1026" name="Rectangle 2"/>
+          <p:cNvSpPr>
+            <a:spLocks noChangeArrowheads="1"/>
+          </p:cNvSpPr>
           <p:nvPr/>
-        </p:nvPicPr>
-        <p:blipFill>
-          <a:blip r:embed="rId2" cstate="print"/>
-          <a:srcRect/>
-          <a:stretch>
-            <a:fillRect/>
-          </a:stretch>
-        </p:blipFill>
+        </p:nvSpPr>
         <p:spPr bwMode="auto">
           <a:xfrm>
-            <a:off x="0" y="1676400"/>
-            <a:ext cx="9054288" cy="3571875"/>
+            <a:off x="0" y="0"/>
+            <a:ext cx="9144000" cy="0"/>
           </a:xfrm>
           <a:prstGeom prst="rect">
             <a:avLst/>
@@ -8271,6 +8349,394 @@
             <a:headEnd/>
             <a:tailEnd/>
           </a:ln>
+          <a:effectLst/>
+        </p:spPr>
+        <p:txBody>
+          <a:bodyPr vert="horz" wrap="none" lIns="91440" tIns="45720" rIns="91440" bIns="45720" numCol="1" anchor="ctr" anchorCtr="0" compatLnSpc="1">
+            <a:prstTxWarp prst="textNoShape">
+              <a:avLst/>
+            </a:prstTxWarp>
+            <a:spAutoFit/>
+          </a:bodyPr>
+          <a:lstStyle/>
+          <a:p>
+            <a:endParaRPr lang="en-US"/>
+          </a:p>
+        </p:txBody>
+      </p:sp>
+      <p:pic>
+        <p:nvPicPr>
+          <p:cNvPr id="1025" name="Picture 1"/>
+          <p:cNvPicPr>
+            <a:picLocks noChangeAspect="1" noChangeArrowheads="1"/>
+          </p:cNvPicPr>
+          <p:nvPr/>
+        </p:nvPicPr>
+        <p:blipFill>
+          <a:blip r:embed="rId2" cstate="print">
+            <a:clrChange>
+              <a:clrFrom>
+                <a:srgbClr val="FFFFFF"/>
+              </a:clrFrom>
+              <a:clrTo>
+                <a:srgbClr val="FFFFFF">
+                  <a:alpha val="0"/>
+                </a:srgbClr>
+              </a:clrTo>
+            </a:clrChange>
+          </a:blip>
+          <a:srcRect/>
+          <a:stretch>
+            <a:fillRect/>
+          </a:stretch>
+        </p:blipFill>
+        <p:spPr bwMode="auto">
+          <a:xfrm>
+            <a:off x="2362200" y="1676400"/>
+            <a:ext cx="3619500" cy="512495"/>
+          </a:xfrm>
+          <a:prstGeom prst="rect">
+            <a:avLst/>
+          </a:prstGeom>
+          <a:noFill/>
+        </p:spPr>
+      </p:pic>
+      <p:sp>
+        <p:nvSpPr>
+          <p:cNvPr id="1028" name="Rectangle 4"/>
+          <p:cNvSpPr>
+            <a:spLocks noChangeArrowheads="1"/>
+          </p:cNvSpPr>
+          <p:nvPr/>
+        </p:nvSpPr>
+        <p:spPr bwMode="auto">
+          <a:xfrm>
+            <a:off x="0" y="0"/>
+            <a:ext cx="9144000" cy="0"/>
+          </a:xfrm>
+          <a:prstGeom prst="rect">
+            <a:avLst/>
+          </a:prstGeom>
+          <a:noFill/>
+          <a:ln w="9525">
+            <a:noFill/>
+            <a:miter lim="800000"/>
+            <a:headEnd/>
+            <a:tailEnd/>
+          </a:ln>
+          <a:effectLst/>
+        </p:spPr>
+        <p:txBody>
+          <a:bodyPr vert="horz" wrap="none" lIns="91440" tIns="45720" rIns="91440" bIns="45720" numCol="1" anchor="ctr" anchorCtr="0" compatLnSpc="1">
+            <a:prstTxWarp prst="textNoShape">
+              <a:avLst/>
+            </a:prstTxWarp>
+            <a:spAutoFit/>
+          </a:bodyPr>
+          <a:lstStyle/>
+          <a:p>
+            <a:endParaRPr lang="en-US"/>
+          </a:p>
+        </p:txBody>
+      </p:sp>
+      <p:pic>
+        <p:nvPicPr>
+          <p:cNvPr id="1027" name="Picture 3"/>
+          <p:cNvPicPr>
+            <a:picLocks noChangeAspect="1" noChangeArrowheads="1"/>
+          </p:cNvPicPr>
+          <p:nvPr/>
+        </p:nvPicPr>
+        <p:blipFill>
+          <a:blip r:embed="rId3" cstate="print">
+            <a:clrChange>
+              <a:clrFrom>
+                <a:srgbClr val="FFFFFF"/>
+              </a:clrFrom>
+              <a:clrTo>
+                <a:srgbClr val="FFFFFF">
+                  <a:alpha val="0"/>
+                </a:srgbClr>
+              </a:clrTo>
+            </a:clrChange>
+          </a:blip>
+          <a:srcRect/>
+          <a:stretch>
+            <a:fillRect/>
+          </a:stretch>
+        </p:blipFill>
+        <p:spPr bwMode="auto">
+          <a:xfrm>
+            <a:off x="5029200" y="2209800"/>
+            <a:ext cx="2667000" cy="706755"/>
+          </a:xfrm>
+          <a:prstGeom prst="rect">
+            <a:avLst/>
+          </a:prstGeom>
+          <a:noFill/>
+        </p:spPr>
+      </p:pic>
+      <p:sp>
+        <p:nvSpPr>
+          <p:cNvPr id="1030" name="Rectangle 6"/>
+          <p:cNvSpPr>
+            <a:spLocks noChangeArrowheads="1"/>
+          </p:cNvSpPr>
+          <p:nvPr/>
+        </p:nvSpPr>
+        <p:spPr bwMode="auto">
+          <a:xfrm>
+            <a:off x="0" y="0"/>
+            <a:ext cx="9144000" cy="0"/>
+          </a:xfrm>
+          <a:prstGeom prst="rect">
+            <a:avLst/>
+          </a:prstGeom>
+          <a:noFill/>
+          <a:ln w="9525">
+            <a:noFill/>
+            <a:miter lim="800000"/>
+            <a:headEnd/>
+            <a:tailEnd/>
+          </a:ln>
+          <a:effectLst/>
+        </p:spPr>
+        <p:txBody>
+          <a:bodyPr vert="horz" wrap="none" lIns="91440" tIns="45720" rIns="91440" bIns="45720" numCol="1" anchor="ctr" anchorCtr="0" compatLnSpc="1">
+            <a:prstTxWarp prst="textNoShape">
+              <a:avLst/>
+            </a:prstTxWarp>
+            <a:spAutoFit/>
+          </a:bodyPr>
+          <a:lstStyle/>
+          <a:p>
+            <a:endParaRPr lang="en-US"/>
+          </a:p>
+        </p:txBody>
+      </p:sp>
+      <p:pic>
+        <p:nvPicPr>
+          <p:cNvPr id="1029" name="Picture 5"/>
+          <p:cNvPicPr>
+            <a:picLocks noChangeAspect="1" noChangeArrowheads="1"/>
+          </p:cNvPicPr>
+          <p:nvPr/>
+        </p:nvPicPr>
+        <p:blipFill>
+          <a:blip r:embed="rId4" cstate="print">
+            <a:clrChange>
+              <a:clrFrom>
+                <a:srgbClr val="FFFFFF"/>
+              </a:clrFrom>
+              <a:clrTo>
+                <a:srgbClr val="FFFFFF">
+                  <a:alpha val="0"/>
+                </a:srgbClr>
+              </a:clrTo>
+            </a:clrChange>
+          </a:blip>
+          <a:srcRect/>
+          <a:stretch>
+            <a:fillRect/>
+          </a:stretch>
+        </p:blipFill>
+        <p:spPr bwMode="auto">
+          <a:xfrm>
+            <a:off x="5029200" y="3048000"/>
+            <a:ext cx="1752600" cy="639635"/>
+          </a:xfrm>
+          <a:prstGeom prst="rect">
+            <a:avLst/>
+          </a:prstGeom>
+          <a:noFill/>
+        </p:spPr>
+      </p:pic>
+      <p:sp>
+        <p:nvSpPr>
+          <p:cNvPr id="1032" name="Rectangle 8"/>
+          <p:cNvSpPr>
+            <a:spLocks noChangeArrowheads="1"/>
+          </p:cNvSpPr>
+          <p:nvPr/>
+        </p:nvSpPr>
+        <p:spPr bwMode="auto">
+          <a:xfrm>
+            <a:off x="0" y="0"/>
+            <a:ext cx="9144000" cy="0"/>
+          </a:xfrm>
+          <a:prstGeom prst="rect">
+            <a:avLst/>
+          </a:prstGeom>
+          <a:noFill/>
+          <a:ln w="9525">
+            <a:noFill/>
+            <a:miter lim="800000"/>
+            <a:headEnd/>
+            <a:tailEnd/>
+          </a:ln>
+          <a:effectLst/>
+        </p:spPr>
+        <p:txBody>
+          <a:bodyPr vert="horz" wrap="none" lIns="91440" tIns="45720" rIns="91440" bIns="45720" numCol="1" anchor="ctr" anchorCtr="0" compatLnSpc="1">
+            <a:prstTxWarp prst="textNoShape">
+              <a:avLst/>
+            </a:prstTxWarp>
+            <a:spAutoFit/>
+          </a:bodyPr>
+          <a:lstStyle/>
+          <a:p>
+            <a:endParaRPr lang="en-US"/>
+          </a:p>
+        </p:txBody>
+      </p:sp>
+      <p:pic>
+        <p:nvPicPr>
+          <p:cNvPr id="1031" name="Picture 7"/>
+          <p:cNvPicPr>
+            <a:picLocks noChangeAspect="1" noChangeArrowheads="1"/>
+          </p:cNvPicPr>
+          <p:nvPr/>
+        </p:nvPicPr>
+        <p:blipFill>
+          <a:blip r:embed="rId5" cstate="print">
+            <a:clrChange>
+              <a:clrFrom>
+                <a:srgbClr val="FFFFFF"/>
+              </a:clrFrom>
+              <a:clrTo>
+                <a:srgbClr val="FFFFFF">
+                  <a:alpha val="0"/>
+                </a:srgbClr>
+              </a:clrTo>
+            </a:clrChange>
+          </a:blip>
+          <a:srcRect/>
+          <a:stretch>
+            <a:fillRect/>
+          </a:stretch>
+        </p:blipFill>
+        <p:spPr bwMode="auto">
+          <a:xfrm>
+            <a:off x="5029200" y="3886200"/>
+            <a:ext cx="1219200" cy="692727"/>
+          </a:xfrm>
+          <a:prstGeom prst="rect">
+            <a:avLst/>
+          </a:prstGeom>
+          <a:noFill/>
+        </p:spPr>
+      </p:pic>
+      <p:sp>
+        <p:nvSpPr>
+          <p:cNvPr id="1036" name="Rectangle 12"/>
+          <p:cNvSpPr>
+            <a:spLocks noChangeArrowheads="1"/>
+          </p:cNvSpPr>
+          <p:nvPr/>
+        </p:nvSpPr>
+        <p:spPr bwMode="auto">
+          <a:xfrm>
+            <a:off x="0" y="0"/>
+            <a:ext cx="9144000" cy="0"/>
+          </a:xfrm>
+          <a:prstGeom prst="rect">
+            <a:avLst/>
+          </a:prstGeom>
+          <a:noFill/>
+          <a:ln w="9525">
+            <a:noFill/>
+            <a:miter lim="800000"/>
+            <a:headEnd/>
+            <a:tailEnd/>
+          </a:ln>
+          <a:effectLst/>
+        </p:spPr>
+        <p:txBody>
+          <a:bodyPr vert="horz" wrap="none" lIns="91440" tIns="45720" rIns="91440" bIns="45720" numCol="1" anchor="ctr" anchorCtr="0" compatLnSpc="1">
+            <a:prstTxWarp prst="textNoShape">
+              <a:avLst/>
+            </a:prstTxWarp>
+            <a:spAutoFit/>
+          </a:bodyPr>
+          <a:lstStyle/>
+          <a:p>
+            <a:endParaRPr lang="en-US"/>
+          </a:p>
+        </p:txBody>
+      </p:sp>
+      <p:sp>
+        <p:nvSpPr>
+          <p:cNvPr id="1038" name="Rectangle 14"/>
+          <p:cNvSpPr>
+            <a:spLocks noChangeArrowheads="1"/>
+          </p:cNvSpPr>
+          <p:nvPr/>
+        </p:nvSpPr>
+        <p:spPr bwMode="auto">
+          <a:xfrm>
+            <a:off x="0" y="0"/>
+            <a:ext cx="9144000" cy="0"/>
+          </a:xfrm>
+          <a:prstGeom prst="rect">
+            <a:avLst/>
+          </a:prstGeom>
+          <a:noFill/>
+          <a:ln w="9525">
+            <a:noFill/>
+            <a:miter lim="800000"/>
+            <a:headEnd/>
+            <a:tailEnd/>
+          </a:ln>
+          <a:effectLst/>
+        </p:spPr>
+        <p:txBody>
+          <a:bodyPr vert="horz" wrap="none" lIns="91440" tIns="45720" rIns="91440" bIns="45720" numCol="1" anchor="ctr" anchorCtr="0" compatLnSpc="1">
+            <a:prstTxWarp prst="textNoShape">
+              <a:avLst/>
+            </a:prstTxWarp>
+            <a:spAutoFit/>
+          </a:bodyPr>
+          <a:lstStyle/>
+          <a:p>
+            <a:endParaRPr lang="en-US"/>
+          </a:p>
+        </p:txBody>
+      </p:sp>
+      <p:pic>
+        <p:nvPicPr>
+          <p:cNvPr id="1037" name="Picture 13"/>
+          <p:cNvPicPr>
+            <a:picLocks noChangeAspect="1" noChangeArrowheads="1"/>
+          </p:cNvPicPr>
+          <p:nvPr/>
+        </p:nvPicPr>
+        <p:blipFill>
+          <a:blip r:embed="rId6" cstate="print">
+            <a:clrChange>
+              <a:clrFrom>
+                <a:srgbClr val="FFFFFF"/>
+              </a:clrFrom>
+              <a:clrTo>
+                <a:srgbClr val="FFFFFF">
+                  <a:alpha val="0"/>
+                </a:srgbClr>
+              </a:clrTo>
+            </a:clrChange>
+          </a:blip>
+          <a:srcRect/>
+          <a:stretch>
+            <a:fillRect/>
+          </a:stretch>
+        </p:blipFill>
+        <p:spPr bwMode="auto">
+          <a:xfrm>
+            <a:off x="5029200" y="4800600"/>
+            <a:ext cx="3276600" cy="683153"/>
+          </a:xfrm>
+          <a:prstGeom prst="rect">
+            <a:avLst/>
+          </a:prstGeom>
+          <a:noFill/>
         </p:spPr>
       </p:pic>
     </p:spTree>

</xml_diff>

<commit_message>
Finished Paper. Doing power point from Micro Mobility
</commit_message>
<xml_diff>
--- a/VANET_Felix.pptx
+++ b/VANET_Felix.pptx
@@ -5,7 +5,7 @@
     <p:sldMasterId id="2147483696" r:id="rId1"/>
   </p:sldMasterIdLst>
   <p:notesMasterIdLst>
-    <p:notesMasterId r:id="rId30"/>
+    <p:notesMasterId r:id="rId32"/>
   </p:notesMasterIdLst>
   <p:sldIdLst>
     <p:sldId id="280" r:id="rId2"/>
@@ -36,6 +36,8 @@
     <p:sldId id="292" r:id="rId27"/>
     <p:sldId id="293" r:id="rId28"/>
     <p:sldId id="294" r:id="rId29"/>
+    <p:sldId id="295" r:id="rId30"/>
+    <p:sldId id="296" r:id="rId31"/>
   </p:sldIdLst>
   <p:sldSz cx="9144000" cy="6858000" type="screen4x3"/>
   <p:notesSz cx="6858000" cy="9144000"/>
@@ -2964,7 +2966,7 @@
             <a:fld id="{AA1794F1-29D0-4E50-8F0F-8A456A29C142}" type="datetimeFigureOut">
               <a:rPr lang="en-US" smtClean="0"/>
               <a:pPr/>
-              <a:t>10/19/2012</a:t>
+              <a:t>10/23/2012</a:t>
             </a:fld>
             <a:endParaRPr lang="en-US"/>
           </a:p>
@@ -3756,7 +3758,7 @@
             <a:fld id="{1D8BD707-D9CF-40AE-B4C6-C98DA3205C09}" type="datetimeFigureOut">
               <a:rPr lang="en-US" smtClean="0"/>
               <a:pPr/>
-              <a:t>10/19/2012</a:t>
+              <a:t>10/23/2012</a:t>
             </a:fld>
             <a:endParaRPr lang="en-US"/>
           </a:p>
@@ -4117,7 +4119,7 @@
             <a:fld id="{1D8BD707-D9CF-40AE-B4C6-C98DA3205C09}" type="datetimeFigureOut">
               <a:rPr lang="en-US" smtClean="0"/>
               <a:pPr/>
-              <a:t>10/19/2012</a:t>
+              <a:t>10/23/2012</a:t>
             </a:fld>
             <a:endParaRPr lang="en-US"/>
           </a:p>
@@ -4294,7 +4296,7 @@
             <a:fld id="{1D8BD707-D9CF-40AE-B4C6-C98DA3205C09}" type="datetimeFigureOut">
               <a:rPr lang="en-US" smtClean="0"/>
               <a:pPr/>
-              <a:t>10/19/2012</a:t>
+              <a:t>10/23/2012</a:t>
             </a:fld>
             <a:endParaRPr lang="en-US"/>
           </a:p>
@@ -4531,7 +4533,7 @@
             <a:fld id="{1D8BD707-D9CF-40AE-B4C6-C98DA3205C09}" type="datetimeFigureOut">
               <a:rPr lang="en-US" smtClean="0"/>
               <a:pPr/>
-              <a:t>10/19/2012</a:t>
+              <a:t>10/23/2012</a:t>
             </a:fld>
             <a:endParaRPr lang="en-US"/>
           </a:p>
@@ -4802,7 +4804,7 @@
             <a:fld id="{1D8BD707-D9CF-40AE-B4C6-C98DA3205C09}" type="datetimeFigureOut">
               <a:rPr lang="en-US" smtClean="0"/>
               <a:pPr/>
-              <a:t>10/19/2012</a:t>
+              <a:t>10/23/2012</a:t>
             </a:fld>
             <a:endParaRPr lang="en-US"/>
           </a:p>
@@ -5024,7 +5026,7 @@
             <a:fld id="{1D8BD707-D9CF-40AE-B4C6-C98DA3205C09}" type="datetimeFigureOut">
               <a:rPr lang="en-US" smtClean="0"/>
               <a:pPr/>
-              <a:t>10/19/2012</a:t>
+              <a:t>10/23/2012</a:t>
             </a:fld>
             <a:endParaRPr lang="en-US"/>
           </a:p>
@@ -5378,7 +5380,7 @@
             <a:fld id="{1D8BD707-D9CF-40AE-B4C6-C98DA3205C09}" type="datetimeFigureOut">
               <a:rPr lang="en-US" smtClean="0"/>
               <a:pPr/>
-              <a:t>10/19/2012</a:t>
+              <a:t>10/23/2012</a:t>
             </a:fld>
             <a:endParaRPr lang="en-US"/>
           </a:p>
@@ -5612,7 +5614,7 @@
             <a:fld id="{1D8BD707-D9CF-40AE-B4C6-C98DA3205C09}" type="datetimeFigureOut">
               <a:rPr lang="en-US" smtClean="0"/>
               <a:pPr/>
-              <a:t>10/19/2012</a:t>
+              <a:t>10/23/2012</a:t>
             </a:fld>
             <a:endParaRPr lang="en-US"/>
           </a:p>
@@ -5754,7 +5756,7 @@
             <a:fld id="{1D8BD707-D9CF-40AE-B4C6-C98DA3205C09}" type="datetimeFigureOut">
               <a:rPr lang="en-US" smtClean="0"/>
               <a:pPr/>
-              <a:t>10/19/2012</a:t>
+              <a:t>10/23/2012</a:t>
             </a:fld>
             <a:endParaRPr lang="en-US"/>
           </a:p>
@@ -6033,7 +6035,7 @@
             <a:fld id="{1D8BD707-D9CF-40AE-B4C6-C98DA3205C09}" type="datetimeFigureOut">
               <a:rPr lang="en-US" smtClean="0"/>
               <a:pPr/>
-              <a:t>10/19/2012</a:t>
+              <a:t>10/23/2012</a:t>
             </a:fld>
             <a:endParaRPr lang="en-US"/>
           </a:p>
@@ -6442,7 +6444,7 @@
             <a:fld id="{1D8BD707-D9CF-40AE-B4C6-C98DA3205C09}" type="datetimeFigureOut">
               <a:rPr lang="en-US" smtClean="0"/>
               <a:pPr/>
-              <a:t>10/19/2012</a:t>
+              <a:t>10/23/2012</a:t>
             </a:fld>
             <a:endParaRPr lang="en-US"/>
           </a:p>
@@ -6782,7 +6784,7 @@
             <a:fld id="{1D8BD707-D9CF-40AE-B4C6-C98DA3205C09}" type="datetimeFigureOut">
               <a:rPr lang="en-US" smtClean="0"/>
               <a:pPr/>
-              <a:t>10/19/2012</a:t>
+              <a:t>10/23/2012</a:t>
             </a:fld>
             <a:endParaRPr lang="en-US"/>
           </a:p>
@@ -10049,7 +10051,6 @@
               <a:rPr lang="en-US" dirty="0" smtClean="0"/>
               <a:t>There’s no arguing that wireless technology is infiltrating the vehicles we drive everyday. The possibilities are endless, however a common road block in testing prototypes and protocols lies with the resources needed (amount of vehicles) and the large scale of developed roads. </a:t>
             </a:r>
-            <a:endParaRPr lang="en-US" dirty="0" smtClean="0"/>
           </a:p>
           <a:p>
             <a:r>
@@ -10394,11 +10395,7 @@
           <a:p>
             <a:r>
               <a:rPr lang="en-US" dirty="0" smtClean="0"/>
-              <a:t>Macro-Mobility </a:t>
-            </a:r>
-            <a:r>
-              <a:rPr lang="en-US" dirty="0" smtClean="0"/>
-              <a:t>Features: Road Topologies</a:t>
+              <a:t>Macro-Mobility Features: Road Topologies</a:t>
             </a:r>
             <a:endParaRPr lang="en-US" dirty="0"/>
           </a:p>
@@ -10800,11 +10797,7 @@
           <a:p>
             <a:r>
               <a:rPr lang="en-US" dirty="0" smtClean="0"/>
-              <a:t>Macro-Mobility Features: </a:t>
-            </a:r>
-            <a:r>
-              <a:rPr lang="en-US" dirty="0" smtClean="0"/>
-              <a:t>Enhancements</a:t>
+              <a:t>Macro-Mobility Features: Enhancements</a:t>
             </a:r>
             <a:endParaRPr lang="en-US" dirty="0"/>
           </a:p>
@@ -10946,18 +10939,148 @@
           <a:p>
             <a:r>
               <a:rPr lang="en-US" dirty="0" smtClean="0"/>
-              <a:t>Macro-Mobility </a:t>
-            </a:r>
+              <a:t>Macro-Mobility Features: Movement Patterns</a:t>
+            </a:r>
+            <a:endParaRPr lang="en-US" dirty="0"/>
+          </a:p>
+        </p:txBody>
+      </p:sp>
+      <p:sp>
+        <p:nvSpPr>
+          <p:cNvPr id="3" name="Content Placeholder 2"/>
+          <p:cNvSpPr>
+            <a:spLocks noGrp="1"/>
+          </p:cNvSpPr>
+          <p:nvPr>
+            <p:ph sz="quarter" idx="1"/>
+          </p:nvPr>
+        </p:nvSpPr>
+        <p:spPr/>
+        <p:txBody>
+          <a:bodyPr/>
+          <a:lstStyle/>
+          <a:p>
             <a:r>
               <a:rPr lang="en-US" dirty="0" smtClean="0"/>
-              <a:t>Features: Movement Patterns</a:t>
-            </a:r>
+              <a:t>One important aspect of traffic modeling is applying movement patterns to vehicles. In the model, essentially a graph, the movement patterns will dictate how each vehicle moves from vertices to vertices along the edges</a:t>
+            </a:r>
+          </a:p>
+          <a:p>
+            <a:pPr lvl="1"/>
+            <a:r>
+              <a:rPr lang="en-US" dirty="0" smtClean="0"/>
+              <a:t>Trip Generation Module: Allows the user to define a set of points of interest so that vehicles follow the given path across specified edges on the graph. This is ideal if we want to force vehicles on a particular path</a:t>
+            </a:r>
+          </a:p>
+          <a:p>
+            <a:pPr lvl="2"/>
+            <a:r>
+              <a:rPr lang="en-US" dirty="0" smtClean="0"/>
+              <a:t>Two models associated with the Trip Generation Module</a:t>
+            </a:r>
+          </a:p>
+          <a:p>
+            <a:pPr lvl="2"/>
+            <a:r>
+              <a:rPr lang="en-US" dirty="0" smtClean="0"/>
+              <a:t>Random Trip Model: Between a set of points, a random path is decided to reach the destination</a:t>
+            </a:r>
+          </a:p>
+          <a:p>
+            <a:pPr lvl="2"/>
+            <a:r>
+              <a:rPr lang="en-US" dirty="0" smtClean="0"/>
+              <a:t>Activity Sequences:  The user provides the points of interest and the path to reach the destination</a:t>
+            </a:r>
+          </a:p>
+          <a:p>
+            <a:pPr lvl="1"/>
             <a:endParaRPr lang="en-US" dirty="0"/>
           </a:p>
         </p:txBody>
       </p:sp>
       <p:sp>
         <p:nvSpPr>
+          <p:cNvPr id="4" name="TextBox 3"/>
+          <p:cNvSpPr txBox="1"/>
+          <p:nvPr/>
+        </p:nvSpPr>
+        <p:spPr>
+          <a:xfrm>
+            <a:off x="609600" y="6400800"/>
+            <a:ext cx="6172200" cy="276999"/>
+          </a:xfrm>
+          <a:prstGeom prst="rect">
+            <a:avLst/>
+          </a:prstGeom>
+          <a:noFill/>
+        </p:spPr>
+        <p:txBody>
+          <a:bodyPr wrap="square" rtlCol="0">
+            <a:spAutoFit/>
+          </a:bodyPr>
+          <a:lstStyle/>
+          <a:p>
+            <a:r>
+              <a:rPr lang="en-US" sz="1200" b="1" dirty="0" smtClean="0"/>
+              <a:t>Vehicular Mobility Simulation for VANETs</a:t>
+            </a:r>
+            <a:endParaRPr lang="en-US" sz="1200" b="1" dirty="0"/>
+          </a:p>
+        </p:txBody>
+      </p:sp>
+    </p:spTree>
+  </p:cSld>
+  <p:clrMapOvr>
+    <a:masterClrMapping/>
+  </p:clrMapOvr>
+</p:sld>
+</file>
+
+<file path=ppt/slides/slide29.xml><?xml version="1.0" encoding="utf-8"?>
+<p:sld xmlns:a="http://schemas.openxmlformats.org/drawingml/2006/main" xmlns:r="http://schemas.openxmlformats.org/officeDocument/2006/relationships" xmlns:p="http://schemas.openxmlformats.org/presentationml/2006/main">
+  <p:cSld>
+    <p:spTree>
+      <p:nvGrpSpPr>
+        <p:cNvPr id="1" name=""/>
+        <p:cNvGrpSpPr/>
+        <p:nvPr/>
+      </p:nvGrpSpPr>
+      <p:grpSpPr>
+        <a:xfrm>
+          <a:off x="0" y="0"/>
+          <a:ext cx="0" cy="0"/>
+          <a:chOff x="0" y="0"/>
+          <a:chExt cx="0" cy="0"/>
+        </a:xfrm>
+      </p:grpSpPr>
+      <p:sp>
+        <p:nvSpPr>
+          <p:cNvPr id="2" name="Title 1"/>
+          <p:cNvSpPr>
+            <a:spLocks noGrp="1"/>
+          </p:cNvSpPr>
+          <p:nvPr>
+            <p:ph type="title"/>
+          </p:nvPr>
+        </p:nvSpPr>
+        <p:spPr/>
+        <p:txBody>
+          <a:bodyPr>
+            <a:normAutofit fontScale="90000"/>
+          </a:bodyPr>
+          <a:lstStyle/>
+          <a:p>
+            <a:r>
+              <a:rPr lang="en-US" dirty="0" smtClean="0"/>
+              <a:t>Macro-Mobility Features: Movement Patterns</a:t>
+            </a:r>
+            <a:endParaRPr lang="en-US" dirty="0"/>
+          </a:p>
+        </p:txBody>
+      </p:sp>
+      <p:sp>
+        <p:nvSpPr>
           <p:cNvPr id="3" name="Content Placeholder 2"/>
           <p:cNvSpPr>
             <a:spLocks noGrp="1"/>
@@ -10971,6 +11094,50 @@
           <a:bodyPr/>
           <a:lstStyle/>
           <a:p>
+            <a:pPr marL="274320" lvl="1">
+              <a:spcBef>
+                <a:spcPts val="600"/>
+              </a:spcBef>
+              <a:buClr>
+                <a:schemeClr val="accent1"/>
+              </a:buClr>
+            </a:pPr>
+            <a:r>
+              <a:rPr lang="en-US" dirty="0" smtClean="0"/>
+              <a:t>Path Computation Module: Given a set of points to traverse, the module computes the ideal path to each point. This could be used to model more random traffic as the user is not fully in control of the path vehicles will take</a:t>
+            </a:r>
+          </a:p>
+          <a:p>
+            <a:pPr lvl="1"/>
+            <a:r>
+              <a:rPr lang="en-US" dirty="0" smtClean="0"/>
+              <a:t>Three models are included with the Path Computation Module</a:t>
+            </a:r>
+          </a:p>
+          <a:p>
+            <a:pPr lvl="1"/>
+            <a:r>
+              <a:rPr lang="en-US" dirty="0" err="1" smtClean="0"/>
+              <a:t>Dijkstra’s</a:t>
+            </a:r>
+            <a:r>
+              <a:rPr lang="en-US" dirty="0" smtClean="0"/>
+              <a:t> Algorithm is used by applying a weight to each edge on the graph. As the edge decreases the cost increases</a:t>
+            </a:r>
+          </a:p>
+          <a:p>
+            <a:pPr lvl="1"/>
+            <a:r>
+              <a:rPr lang="en-US" dirty="0" smtClean="0"/>
+              <a:t>The weighting can also be determined by the relation between how many vehicles are on the edge. This is used to simulate roads with different densities</a:t>
+            </a:r>
+          </a:p>
+          <a:p>
+            <a:pPr lvl="1"/>
+            <a:r>
+              <a:rPr lang="en-US" dirty="0" smtClean="0"/>
+              <a:t>A combination of the two methods with knowledge of the speed limit. This additional knowledge allows the decisions to be based on clearest and fastest path</a:t>
+            </a:r>
             <a:endParaRPr lang="en-US" dirty="0"/>
           </a:p>
         </p:txBody>
@@ -11074,11 +11241,7 @@
           <a:p>
             <a:r>
               <a:rPr lang="en-US" dirty="0" smtClean="0"/>
-              <a:t>AUTHORS:</a:t>
-            </a:r>
-            <a:r>
-              <a:rPr lang="en-US" dirty="0" smtClean="0"/>
-              <a:t> </a:t>
+              <a:t>AUTHORS: </a:t>
             </a:r>
             <a:r>
               <a:rPr lang="en-US" dirty="0" err="1" smtClean="0"/>
@@ -11179,6 +11342,111 @@
       </p:par>
     </p:tnLst>
   </p:timing>
+</p:sld>
+</file>
+
+<file path=ppt/slides/slide30.xml><?xml version="1.0" encoding="utf-8"?>
+<p:sld xmlns:a="http://schemas.openxmlformats.org/drawingml/2006/main" xmlns:r="http://schemas.openxmlformats.org/officeDocument/2006/relationships" xmlns:p="http://schemas.openxmlformats.org/presentationml/2006/main">
+  <p:cSld>
+    <p:spTree>
+      <p:nvGrpSpPr>
+        <p:cNvPr id="1" name=""/>
+        <p:cNvGrpSpPr/>
+        <p:nvPr/>
+      </p:nvGrpSpPr>
+      <p:grpSpPr>
+        <a:xfrm>
+          <a:off x="0" y="0"/>
+          <a:ext cx="0" cy="0"/>
+          <a:chOff x="0" y="0"/>
+          <a:chExt cx="0" cy="0"/>
+        </a:xfrm>
+      </p:grpSpPr>
+      <p:sp>
+        <p:nvSpPr>
+          <p:cNvPr id="2" name="Title 1"/>
+          <p:cNvSpPr>
+            <a:spLocks noGrp="1"/>
+          </p:cNvSpPr>
+          <p:nvPr>
+            <p:ph type="title"/>
+          </p:nvPr>
+        </p:nvSpPr>
+        <p:spPr/>
+        <p:txBody>
+          <a:bodyPr/>
+          <a:lstStyle/>
+          <a:p>
+            <a:r>
+              <a:rPr lang="en-US" dirty="0" smtClean="0"/>
+              <a:t>Micro-Mobility Features</a:t>
+            </a:r>
+            <a:endParaRPr lang="en-US" dirty="0"/>
+          </a:p>
+        </p:txBody>
+      </p:sp>
+      <p:sp>
+        <p:nvSpPr>
+          <p:cNvPr id="3" name="Content Placeholder 2"/>
+          <p:cNvSpPr>
+            <a:spLocks noGrp="1"/>
+          </p:cNvSpPr>
+          <p:nvPr>
+            <p:ph sz="quarter" idx="1"/>
+          </p:nvPr>
+        </p:nvSpPr>
+        <p:spPr/>
+        <p:txBody>
+          <a:bodyPr/>
+          <a:lstStyle/>
+          <a:p>
+            <a:r>
+              <a:rPr lang="en-US" dirty="0" smtClean="0"/>
+              <a:t>Micro-Mobility Features are related to the behavior of individual cars. I believe this is </a:t>
+            </a:r>
+            <a:r>
+              <a:rPr lang="en-US" smtClean="0"/>
+              <a:t>an important </a:t>
+            </a:r>
+            <a:endParaRPr lang="en-US" dirty="0"/>
+          </a:p>
+        </p:txBody>
+      </p:sp>
+      <p:sp>
+        <p:nvSpPr>
+          <p:cNvPr id="4" name="TextBox 3"/>
+          <p:cNvSpPr txBox="1"/>
+          <p:nvPr/>
+        </p:nvSpPr>
+        <p:spPr>
+          <a:xfrm>
+            <a:off x="609600" y="6400800"/>
+            <a:ext cx="6172200" cy="276999"/>
+          </a:xfrm>
+          <a:prstGeom prst="rect">
+            <a:avLst/>
+          </a:prstGeom>
+          <a:noFill/>
+        </p:spPr>
+        <p:txBody>
+          <a:bodyPr wrap="square" rtlCol="0">
+            <a:spAutoFit/>
+          </a:bodyPr>
+          <a:lstStyle/>
+          <a:p>
+            <a:r>
+              <a:rPr lang="en-US" sz="1200" b="1" dirty="0" smtClean="0"/>
+              <a:t>Vehicular Mobility Simulation for VANETs</a:t>
+            </a:r>
+            <a:endParaRPr lang="en-US" sz="1200" b="1" dirty="0"/>
+          </a:p>
+        </p:txBody>
+      </p:sp>
+    </p:spTree>
+  </p:cSld>
+  <p:clrMapOvr>
+    <a:masterClrMapping/>
+  </p:clrMapOvr>
 </p:sld>
 </file>
 

</xml_diff>

<commit_message>
Simulation PPT, up to the simulation results
</commit_message>
<xml_diff>
--- a/VANET_Felix.pptx
+++ b/VANET_Felix.pptx
@@ -5,7 +5,7 @@
     <p:sldMasterId id="2147483696" r:id="rId1"/>
   </p:sldMasterIdLst>
   <p:notesMasterIdLst>
-    <p:notesMasterId r:id="rId32"/>
+    <p:notesMasterId r:id="rId39"/>
   </p:notesMasterIdLst>
   <p:sldIdLst>
     <p:sldId id="280" r:id="rId2"/>
@@ -38,6 +38,13 @@
     <p:sldId id="294" r:id="rId29"/>
     <p:sldId id="295" r:id="rId30"/>
     <p:sldId id="296" r:id="rId31"/>
+    <p:sldId id="297" r:id="rId32"/>
+    <p:sldId id="298" r:id="rId33"/>
+    <p:sldId id="299" r:id="rId34"/>
+    <p:sldId id="300" r:id="rId35"/>
+    <p:sldId id="301" r:id="rId36"/>
+    <p:sldId id="303" r:id="rId37"/>
+    <p:sldId id="302" r:id="rId38"/>
   </p:sldIdLst>
   <p:sldSz cx="9144000" cy="6858000" type="screen4x3"/>
   <p:notesSz cx="6858000" cy="9144000"/>
@@ -2966,7 +2973,7 @@
             <a:fld id="{AA1794F1-29D0-4E50-8F0F-8A456A29C142}" type="datetimeFigureOut">
               <a:rPr lang="en-US" smtClean="0"/>
               <a:pPr/>
-              <a:t>10/23/2012</a:t>
+              <a:t>10/25/2012</a:t>
             </a:fld>
             <a:endParaRPr lang="en-US"/>
           </a:p>
@@ -3758,7 +3765,7 @@
             <a:fld id="{1D8BD707-D9CF-40AE-B4C6-C98DA3205C09}" type="datetimeFigureOut">
               <a:rPr lang="en-US" smtClean="0"/>
               <a:pPr/>
-              <a:t>10/23/2012</a:t>
+              <a:t>10/25/2012</a:t>
             </a:fld>
             <a:endParaRPr lang="en-US"/>
           </a:p>
@@ -4119,7 +4126,7 @@
             <a:fld id="{1D8BD707-D9CF-40AE-B4C6-C98DA3205C09}" type="datetimeFigureOut">
               <a:rPr lang="en-US" smtClean="0"/>
               <a:pPr/>
-              <a:t>10/23/2012</a:t>
+              <a:t>10/25/2012</a:t>
             </a:fld>
             <a:endParaRPr lang="en-US"/>
           </a:p>
@@ -4296,7 +4303,7 @@
             <a:fld id="{1D8BD707-D9CF-40AE-B4C6-C98DA3205C09}" type="datetimeFigureOut">
               <a:rPr lang="en-US" smtClean="0"/>
               <a:pPr/>
-              <a:t>10/23/2012</a:t>
+              <a:t>10/25/2012</a:t>
             </a:fld>
             <a:endParaRPr lang="en-US"/>
           </a:p>
@@ -4533,7 +4540,7 @@
             <a:fld id="{1D8BD707-D9CF-40AE-B4C6-C98DA3205C09}" type="datetimeFigureOut">
               <a:rPr lang="en-US" smtClean="0"/>
               <a:pPr/>
-              <a:t>10/23/2012</a:t>
+              <a:t>10/25/2012</a:t>
             </a:fld>
             <a:endParaRPr lang="en-US"/>
           </a:p>
@@ -4804,7 +4811,7 @@
             <a:fld id="{1D8BD707-D9CF-40AE-B4C6-C98DA3205C09}" type="datetimeFigureOut">
               <a:rPr lang="en-US" smtClean="0"/>
               <a:pPr/>
-              <a:t>10/23/2012</a:t>
+              <a:t>10/25/2012</a:t>
             </a:fld>
             <a:endParaRPr lang="en-US"/>
           </a:p>
@@ -5026,7 +5033,7 @@
             <a:fld id="{1D8BD707-D9CF-40AE-B4C6-C98DA3205C09}" type="datetimeFigureOut">
               <a:rPr lang="en-US" smtClean="0"/>
               <a:pPr/>
-              <a:t>10/23/2012</a:t>
+              <a:t>10/25/2012</a:t>
             </a:fld>
             <a:endParaRPr lang="en-US"/>
           </a:p>
@@ -5380,7 +5387,7 @@
             <a:fld id="{1D8BD707-D9CF-40AE-B4C6-C98DA3205C09}" type="datetimeFigureOut">
               <a:rPr lang="en-US" smtClean="0"/>
               <a:pPr/>
-              <a:t>10/23/2012</a:t>
+              <a:t>10/25/2012</a:t>
             </a:fld>
             <a:endParaRPr lang="en-US"/>
           </a:p>
@@ -5614,7 +5621,7 @@
             <a:fld id="{1D8BD707-D9CF-40AE-B4C6-C98DA3205C09}" type="datetimeFigureOut">
               <a:rPr lang="en-US" smtClean="0"/>
               <a:pPr/>
-              <a:t>10/23/2012</a:t>
+              <a:t>10/25/2012</a:t>
             </a:fld>
             <a:endParaRPr lang="en-US"/>
           </a:p>
@@ -5756,7 +5763,7 @@
             <a:fld id="{1D8BD707-D9CF-40AE-B4C6-C98DA3205C09}" type="datetimeFigureOut">
               <a:rPr lang="en-US" smtClean="0"/>
               <a:pPr/>
-              <a:t>10/23/2012</a:t>
+              <a:t>10/25/2012</a:t>
             </a:fld>
             <a:endParaRPr lang="en-US"/>
           </a:p>
@@ -6035,7 +6042,7 @@
             <a:fld id="{1D8BD707-D9CF-40AE-B4C6-C98DA3205C09}" type="datetimeFigureOut">
               <a:rPr lang="en-US" smtClean="0"/>
               <a:pPr/>
-              <a:t>10/23/2012</a:t>
+              <a:t>10/25/2012</a:t>
             </a:fld>
             <a:endParaRPr lang="en-US"/>
           </a:p>
@@ -6444,7 +6451,7 @@
             <a:fld id="{1D8BD707-D9CF-40AE-B4C6-C98DA3205C09}" type="datetimeFigureOut">
               <a:rPr lang="en-US" smtClean="0"/>
               <a:pPr/>
-              <a:t>10/23/2012</a:t>
+              <a:t>10/25/2012</a:t>
             </a:fld>
             <a:endParaRPr lang="en-US"/>
           </a:p>
@@ -6784,7 +6791,7 @@
             <a:fld id="{1D8BD707-D9CF-40AE-B4C6-C98DA3205C09}" type="datetimeFigureOut">
               <a:rPr lang="en-US" smtClean="0"/>
               <a:pPr/>
-              <a:t>10/23/2012</a:t>
+              <a:t>10/25/2012</a:t>
             </a:fld>
             <a:endParaRPr lang="en-US"/>
           </a:p>
@@ -11402,12 +11409,43 @@
           <a:p>
             <a:r>
               <a:rPr lang="en-US" dirty="0" smtClean="0"/>
-              <a:t>Micro-Mobility Features are related to the behavior of individual cars. I believe this is </a:t>
-            </a:r>
-            <a:r>
-              <a:rPr lang="en-US" smtClean="0"/>
-              <a:t>an important </a:t>
-            </a:r>
+              <a:t>Micro-Mobility Features are related to the behavior of individual cars. I believe this is an important feature to model because it shapes how traffic is formed just as much as the physical contours of a given road topology.</a:t>
+            </a:r>
+          </a:p>
+          <a:p>
+            <a:pPr lvl="1"/>
+            <a:r>
+              <a:rPr lang="en-US" dirty="0" err="1" smtClean="0"/>
+              <a:t>VanetMobiSim</a:t>
+            </a:r>
+            <a:r>
+              <a:rPr lang="en-US" dirty="0" smtClean="0"/>
+              <a:t> classifies the micro-mobility features into three categories based on how a vehicle accelerates</a:t>
+            </a:r>
+          </a:p>
+          <a:p>
+            <a:pPr lvl="1"/>
+            <a:r>
+              <a:rPr lang="en-US" dirty="0" smtClean="0"/>
+              <a:t>Deterministic, given some set of conditions an expected outcome occurs</a:t>
+            </a:r>
+          </a:p>
+          <a:p>
+            <a:pPr lvl="1"/>
+            <a:r>
+              <a:rPr lang="en-US" dirty="0" smtClean="0"/>
+              <a:t>Function of nearby vehicles in a single lane</a:t>
+            </a:r>
+          </a:p>
+          <a:p>
+            <a:pPr lvl="1"/>
+            <a:r>
+              <a:rPr lang="en-US" dirty="0" smtClean="0"/>
+              <a:t>Function of nearby vehicles for multiple lanes</a:t>
+            </a:r>
+          </a:p>
+          <a:p>
+            <a:pPr lvl="1"/>
             <a:endParaRPr lang="en-US" dirty="0"/>
           </a:p>
         </p:txBody>
@@ -11442,6 +11480,1792 @@
           </a:p>
         </p:txBody>
       </p:sp>
+    </p:spTree>
+  </p:cSld>
+  <p:clrMapOvr>
+    <a:masterClrMapping/>
+  </p:clrMapOvr>
+</p:sld>
+</file>
+
+<file path=ppt/slides/slide31.xml><?xml version="1.0" encoding="utf-8"?>
+<p:sld xmlns:a="http://schemas.openxmlformats.org/drawingml/2006/main" xmlns:r="http://schemas.openxmlformats.org/officeDocument/2006/relationships" xmlns:p="http://schemas.openxmlformats.org/presentationml/2006/main">
+  <p:cSld>
+    <p:spTree>
+      <p:nvGrpSpPr>
+        <p:cNvPr id="1" name=""/>
+        <p:cNvGrpSpPr/>
+        <p:nvPr/>
+      </p:nvGrpSpPr>
+      <p:grpSpPr>
+        <a:xfrm>
+          <a:off x="0" y="0"/>
+          <a:ext cx="0" cy="0"/>
+          <a:chOff x="0" y="0"/>
+          <a:chExt cx="0" cy="0"/>
+        </a:xfrm>
+      </p:grpSpPr>
+      <p:sp>
+        <p:nvSpPr>
+          <p:cNvPr id="9" name="Title 8"/>
+          <p:cNvSpPr>
+            <a:spLocks noGrp="1"/>
+          </p:cNvSpPr>
+          <p:nvPr>
+            <p:ph type="title"/>
+          </p:nvPr>
+        </p:nvSpPr>
+        <p:spPr/>
+        <p:txBody>
+          <a:bodyPr/>
+          <a:lstStyle/>
+          <a:p>
+            <a:r>
+              <a:rPr lang="en-US" dirty="0" smtClean="0"/>
+              <a:t>Models in </a:t>
+            </a:r>
+            <a:r>
+              <a:rPr lang="en-US" dirty="0" err="1" smtClean="0"/>
+              <a:t>VanetMobiSim</a:t>
+            </a:r>
+            <a:endParaRPr lang="en-US" dirty="0"/>
+          </a:p>
+        </p:txBody>
+      </p:sp>
+      <p:sp>
+        <p:nvSpPr>
+          <p:cNvPr id="10" name="Content Placeholder 9"/>
+          <p:cNvSpPr>
+            <a:spLocks noGrp="1"/>
+          </p:cNvSpPr>
+          <p:nvPr>
+            <p:ph sz="quarter" idx="1"/>
+          </p:nvPr>
+        </p:nvSpPr>
+        <p:spPr/>
+        <p:txBody>
+          <a:bodyPr/>
+          <a:lstStyle/>
+          <a:p>
+            <a:r>
+              <a:rPr lang="en-US" dirty="0" smtClean="0"/>
+              <a:t>An improvement form </a:t>
+            </a:r>
+            <a:r>
+              <a:rPr lang="en-US" dirty="0" err="1" smtClean="0"/>
+              <a:t>CanuMobiSim</a:t>
+            </a:r>
+            <a:r>
+              <a:rPr lang="en-US" dirty="0" smtClean="0"/>
+              <a:t> is the modeling of the Fluid Traffic Model (FTM) and Intelligent Driver Model (IDM)</a:t>
+            </a:r>
+          </a:p>
+          <a:p>
+            <a:r>
+              <a:rPr lang="en-US" dirty="0" smtClean="0"/>
+              <a:t>The Fluid Traffic Model is a monotonically decreasing equation with a lower bound as a result of traffic congestion.</a:t>
+            </a:r>
+          </a:p>
+          <a:p>
+            <a:endParaRPr lang="en-US" dirty="0" smtClean="0"/>
+          </a:p>
+          <a:p>
+            <a:r>
+              <a:rPr lang="en-US" dirty="0" smtClean="0"/>
+              <a:t>This equation characterizes the output speed as a function of the min and max speeds , current traffic density </a:t>
+            </a:r>
+            <a:r>
+              <a:rPr lang="en-US" i="1" dirty="0" smtClean="0"/>
+              <a:t>k</a:t>
+            </a:r>
+            <a:r>
+              <a:rPr lang="en-US" dirty="0" smtClean="0"/>
+              <a:t>, and traffic density          when a traffic jam is detected.</a:t>
+            </a:r>
+            <a:endParaRPr lang="en-US" dirty="0"/>
+          </a:p>
+        </p:txBody>
+      </p:sp>
+      <p:graphicFrame>
+        <p:nvGraphicFramePr>
+          <p:cNvPr id="5" name="Table 4"/>
+          <p:cNvGraphicFramePr>
+            <a:graphicFrameLocks noGrp="1"/>
+          </p:cNvGraphicFramePr>
+          <p:nvPr/>
+        </p:nvGraphicFramePr>
+        <p:xfrm>
+          <a:off x="1531620" y="2272284"/>
+          <a:ext cx="6080760" cy="385572"/>
+        </p:xfrm>
+        <a:graphic>
+          <a:graphicData uri="http://schemas.openxmlformats.org/drawingml/2006/table">
+            <a:tbl>
+              <a:tblPr/>
+              <a:tblGrid>
+                <a:gridCol w="3040380"/>
+                <a:gridCol w="3040380"/>
+              </a:tblGrid>
+              <a:tr h="0">
+                <a:tc gridSpan="2">
+                  <a:txBody>
+                    <a:bodyPr/>
+                    <a:lstStyle/>
+                    <a:p>
+                      <a:pPr marL="0" marR="0" algn="ctr">
+                        <a:lnSpc>
+                          <a:spcPct val="115000"/>
+                        </a:lnSpc>
+                        <a:spcBef>
+                          <a:spcPts val="0"/>
+                        </a:spcBef>
+                        <a:spcAft>
+                          <a:spcPts val="0"/>
+                        </a:spcAft>
+                      </a:pPr>
+                      <a:endParaRPr lang="en-US" sz="1100" dirty="0">
+                        <a:latin typeface="Calibri"/>
+                        <a:ea typeface="Calibri"/>
+                        <a:cs typeface="Times New Roman"/>
+                      </a:endParaRPr>
+                    </a:p>
+                  </a:txBody>
+                  <a:tcPr marL="68580" marR="68580" marT="0" marB="0">
+                    <a:lnL>
+                      <a:noFill/>
+                    </a:lnL>
+                    <a:lnR>
+                      <a:noFill/>
+                    </a:lnR>
+                    <a:lnT>
+                      <a:noFill/>
+                    </a:lnT>
+                    <a:lnB>
+                      <a:noFill/>
+                    </a:lnB>
+                  </a:tcPr>
+                </a:tc>
+                <a:tc hMerge="1">
+                  <a:txBody>
+                    <a:bodyPr/>
+                    <a:lstStyle/>
+                    <a:p>
+                      <a:endParaRPr lang="en-US"/>
+                    </a:p>
+                  </a:txBody>
+                  <a:tcPr/>
+                </a:tc>
+              </a:tr>
+              <a:tr h="0">
+                <a:tc>
+                  <a:txBody>
+                    <a:bodyPr/>
+                    <a:lstStyle/>
+                    <a:p>
+                      <a:pPr marL="0" marR="0">
+                        <a:lnSpc>
+                          <a:spcPct val="115000"/>
+                        </a:lnSpc>
+                        <a:spcBef>
+                          <a:spcPts val="0"/>
+                        </a:spcBef>
+                        <a:spcAft>
+                          <a:spcPts val="0"/>
+                        </a:spcAft>
+                      </a:pPr>
+                      <a:endParaRPr lang="en-US" sz="1100">
+                        <a:latin typeface="Calibri"/>
+                        <a:ea typeface="Calibri"/>
+                        <a:cs typeface="Times New Roman"/>
+                      </a:endParaRPr>
+                    </a:p>
+                  </a:txBody>
+                  <a:tcPr marL="68580" marR="68580" marT="0" marB="0">
+                    <a:lnL>
+                      <a:noFill/>
+                    </a:lnL>
+                    <a:lnR>
+                      <a:noFill/>
+                    </a:lnR>
+                    <a:lnT>
+                      <a:noFill/>
+                    </a:lnT>
+                    <a:lnB>
+                      <a:noFill/>
+                    </a:lnB>
+                  </a:tcPr>
+                </a:tc>
+                <a:tc>
+                  <a:txBody>
+                    <a:bodyPr/>
+                    <a:lstStyle/>
+                    <a:p>
+                      <a:pPr marL="0" marR="0">
+                        <a:lnSpc>
+                          <a:spcPct val="115000"/>
+                        </a:lnSpc>
+                        <a:spcBef>
+                          <a:spcPts val="0"/>
+                        </a:spcBef>
+                        <a:spcAft>
+                          <a:spcPts val="0"/>
+                        </a:spcAft>
+                        <a:tabLst>
+                          <a:tab pos="871220" algn="l"/>
+                        </a:tabLst>
+                      </a:pPr>
+                      <a:endParaRPr lang="en-US" sz="1100" dirty="0">
+                        <a:latin typeface="Calibri"/>
+                        <a:ea typeface="Calibri"/>
+                        <a:cs typeface="Times New Roman"/>
+                      </a:endParaRPr>
+                    </a:p>
+                  </a:txBody>
+                  <a:tcPr marL="68580" marR="68580" marT="0" marB="0">
+                    <a:lnL>
+                      <a:noFill/>
+                    </a:lnL>
+                    <a:lnR>
+                      <a:noFill/>
+                    </a:lnR>
+                    <a:lnT>
+                      <a:noFill/>
+                    </a:lnT>
+                    <a:lnB>
+                      <a:noFill/>
+                    </a:lnB>
+                  </a:tcPr>
+                </a:tc>
+              </a:tr>
+            </a:tbl>
+          </a:graphicData>
+        </a:graphic>
+      </p:graphicFrame>
+      <p:sp>
+        <p:nvSpPr>
+          <p:cNvPr id="2" name="Rectangle 2"/>
+          <p:cNvSpPr>
+            <a:spLocks noChangeArrowheads="1"/>
+          </p:cNvSpPr>
+          <p:nvPr/>
+        </p:nvSpPr>
+        <p:spPr bwMode="auto">
+          <a:xfrm>
+            <a:off x="0" y="0"/>
+            <a:ext cx="9144000" cy="0"/>
+          </a:xfrm>
+          <a:prstGeom prst="rect">
+            <a:avLst/>
+          </a:prstGeom>
+          <a:noFill/>
+          <a:ln w="9525">
+            <a:noFill/>
+            <a:miter lim="800000"/>
+            <a:headEnd/>
+            <a:tailEnd/>
+          </a:ln>
+          <a:effectLst/>
+        </p:spPr>
+        <p:txBody>
+          <a:bodyPr vert="horz" wrap="none" lIns="91440" tIns="45720" rIns="91440" bIns="45720" numCol="1" anchor="ctr" anchorCtr="0" compatLnSpc="1">
+            <a:prstTxWarp prst="textNoShape">
+              <a:avLst/>
+            </a:prstTxWarp>
+            <a:spAutoFit/>
+          </a:bodyPr>
+          <a:lstStyle/>
+          <a:p>
+            <a:endParaRPr lang="en-US"/>
+          </a:p>
+        </p:txBody>
+      </p:sp>
+      <p:sp>
+        <p:nvSpPr>
+          <p:cNvPr id="6" name="Rectangle 4"/>
+          <p:cNvSpPr>
+            <a:spLocks noChangeArrowheads="1"/>
+          </p:cNvSpPr>
+          <p:nvPr/>
+        </p:nvSpPr>
+        <p:spPr bwMode="auto">
+          <a:xfrm>
+            <a:off x="0" y="0"/>
+            <a:ext cx="9144000" cy="0"/>
+          </a:xfrm>
+          <a:prstGeom prst="rect">
+            <a:avLst/>
+          </a:prstGeom>
+          <a:noFill/>
+          <a:ln w="9525">
+            <a:noFill/>
+            <a:miter lim="800000"/>
+            <a:headEnd/>
+            <a:tailEnd/>
+          </a:ln>
+          <a:effectLst/>
+        </p:spPr>
+        <p:txBody>
+          <a:bodyPr vert="horz" wrap="none" lIns="91440" tIns="45720" rIns="91440" bIns="45720" numCol="1" anchor="ctr" anchorCtr="0" compatLnSpc="1">
+            <a:prstTxWarp prst="textNoShape">
+              <a:avLst/>
+            </a:prstTxWarp>
+            <a:spAutoFit/>
+          </a:bodyPr>
+          <a:lstStyle/>
+          <a:p>
+            <a:endParaRPr lang="en-US"/>
+          </a:p>
+        </p:txBody>
+      </p:sp>
+      <p:sp>
+        <p:nvSpPr>
+          <p:cNvPr id="1030" name="Rectangle 6"/>
+          <p:cNvSpPr>
+            <a:spLocks noChangeArrowheads="1"/>
+          </p:cNvSpPr>
+          <p:nvPr/>
+        </p:nvSpPr>
+        <p:spPr bwMode="auto">
+          <a:xfrm>
+            <a:off x="0" y="0"/>
+            <a:ext cx="9144000" cy="0"/>
+          </a:xfrm>
+          <a:prstGeom prst="rect">
+            <a:avLst/>
+          </a:prstGeom>
+          <a:noFill/>
+          <a:ln w="9525">
+            <a:noFill/>
+            <a:miter lim="800000"/>
+            <a:headEnd/>
+            <a:tailEnd/>
+          </a:ln>
+          <a:effectLst/>
+        </p:spPr>
+        <p:txBody>
+          <a:bodyPr vert="horz" wrap="none" lIns="91440" tIns="45720" rIns="91440" bIns="45720" numCol="1" anchor="ctr" anchorCtr="0" compatLnSpc="1">
+            <a:prstTxWarp prst="textNoShape">
+              <a:avLst/>
+            </a:prstTxWarp>
+            <a:spAutoFit/>
+          </a:bodyPr>
+          <a:lstStyle/>
+          <a:p>
+            <a:endParaRPr lang="en-US"/>
+          </a:p>
+        </p:txBody>
+      </p:sp>
+      <p:pic>
+        <p:nvPicPr>
+          <p:cNvPr id="8" name="Picture 5"/>
+          <p:cNvPicPr>
+            <a:picLocks noChangeAspect="1" noChangeArrowheads="1"/>
+          </p:cNvPicPr>
+          <p:nvPr/>
+        </p:nvPicPr>
+        <p:blipFill>
+          <a:blip r:embed="rId2" cstate="print">
+            <a:clrChange>
+              <a:clrFrom>
+                <a:srgbClr val="FFFFFF"/>
+              </a:clrFrom>
+              <a:clrTo>
+                <a:srgbClr val="FFFFFF">
+                  <a:alpha val="0"/>
+                </a:srgbClr>
+              </a:clrTo>
+            </a:clrChange>
+          </a:blip>
+          <a:srcRect/>
+          <a:stretch>
+            <a:fillRect/>
+          </a:stretch>
+        </p:blipFill>
+        <p:spPr bwMode="auto">
+          <a:xfrm>
+            <a:off x="2667000" y="3581400"/>
+            <a:ext cx="3419475" cy="781050"/>
+          </a:xfrm>
+          <a:prstGeom prst="rect">
+            <a:avLst/>
+          </a:prstGeom>
+          <a:noFill/>
+        </p:spPr>
+      </p:pic>
+      <p:sp>
+        <p:nvSpPr>
+          <p:cNvPr id="1034" name="Rectangle 10"/>
+          <p:cNvSpPr>
+            <a:spLocks noChangeArrowheads="1"/>
+          </p:cNvSpPr>
+          <p:nvPr/>
+        </p:nvSpPr>
+        <p:spPr bwMode="auto">
+          <a:xfrm>
+            <a:off x="0" y="0"/>
+            <a:ext cx="9144000" cy="0"/>
+          </a:xfrm>
+          <a:prstGeom prst="rect">
+            <a:avLst/>
+          </a:prstGeom>
+          <a:noFill/>
+          <a:ln w="9525">
+            <a:noFill/>
+            <a:miter lim="800000"/>
+            <a:headEnd/>
+            <a:tailEnd/>
+          </a:ln>
+          <a:effectLst/>
+        </p:spPr>
+        <p:txBody>
+          <a:bodyPr vert="horz" wrap="none" lIns="91440" tIns="45720" rIns="91440" bIns="45720" numCol="1" anchor="ctr" anchorCtr="0" compatLnSpc="1">
+            <a:prstTxWarp prst="textNoShape">
+              <a:avLst/>
+            </a:prstTxWarp>
+            <a:spAutoFit/>
+          </a:bodyPr>
+          <a:lstStyle/>
+          <a:p>
+            <a:endParaRPr lang="en-US"/>
+          </a:p>
+        </p:txBody>
+      </p:sp>
+      <p:sp>
+        <p:nvSpPr>
+          <p:cNvPr id="1036" name="Rectangle 12"/>
+          <p:cNvSpPr>
+            <a:spLocks noChangeArrowheads="1"/>
+          </p:cNvSpPr>
+          <p:nvPr/>
+        </p:nvSpPr>
+        <p:spPr bwMode="auto">
+          <a:xfrm>
+            <a:off x="0" y="0"/>
+            <a:ext cx="9144000" cy="0"/>
+          </a:xfrm>
+          <a:prstGeom prst="rect">
+            <a:avLst/>
+          </a:prstGeom>
+          <a:noFill/>
+          <a:ln w="9525">
+            <a:noFill/>
+            <a:miter lim="800000"/>
+            <a:headEnd/>
+            <a:tailEnd/>
+          </a:ln>
+          <a:effectLst/>
+        </p:spPr>
+        <p:txBody>
+          <a:bodyPr vert="horz" wrap="none" lIns="91440" tIns="45720" rIns="91440" bIns="45720" numCol="1" anchor="ctr" anchorCtr="0" compatLnSpc="1">
+            <a:prstTxWarp prst="textNoShape">
+              <a:avLst/>
+            </a:prstTxWarp>
+            <a:spAutoFit/>
+          </a:bodyPr>
+          <a:lstStyle/>
+          <a:p>
+            <a:endParaRPr lang="en-US"/>
+          </a:p>
+        </p:txBody>
+      </p:sp>
+      <p:pic>
+        <p:nvPicPr>
+          <p:cNvPr id="1035" name="Picture 11"/>
+          <p:cNvPicPr>
+            <a:picLocks noChangeAspect="1" noChangeArrowheads="1"/>
+          </p:cNvPicPr>
+          <p:nvPr/>
+        </p:nvPicPr>
+        <p:blipFill>
+          <a:blip r:embed="rId3" cstate="print">
+            <a:clrChange>
+              <a:clrFrom>
+                <a:srgbClr val="FFFFFF"/>
+              </a:clrFrom>
+              <a:clrTo>
+                <a:srgbClr val="FFFFFF">
+                  <a:alpha val="0"/>
+                </a:srgbClr>
+              </a:clrTo>
+            </a:clrChange>
+          </a:blip>
+          <a:srcRect/>
+          <a:stretch>
+            <a:fillRect/>
+          </a:stretch>
+        </p:blipFill>
+        <p:spPr bwMode="auto">
+          <a:xfrm>
+            <a:off x="4648200" y="5105400"/>
+            <a:ext cx="647700" cy="485775"/>
+          </a:xfrm>
+          <a:prstGeom prst="rect">
+            <a:avLst/>
+          </a:prstGeom>
+          <a:noFill/>
+        </p:spPr>
+      </p:pic>
+      <p:sp>
+        <p:nvSpPr>
+          <p:cNvPr id="23" name="TextBox 22"/>
+          <p:cNvSpPr txBox="1"/>
+          <p:nvPr/>
+        </p:nvSpPr>
+        <p:spPr>
+          <a:xfrm>
+            <a:off x="609600" y="6400800"/>
+            <a:ext cx="6172200" cy="276999"/>
+          </a:xfrm>
+          <a:prstGeom prst="rect">
+            <a:avLst/>
+          </a:prstGeom>
+          <a:noFill/>
+        </p:spPr>
+        <p:txBody>
+          <a:bodyPr wrap="square" rtlCol="0">
+            <a:spAutoFit/>
+          </a:bodyPr>
+          <a:lstStyle/>
+          <a:p>
+            <a:r>
+              <a:rPr lang="en-US" sz="1200" b="1" dirty="0" smtClean="0"/>
+              <a:t>Vehicular Mobility Simulation for VANETs</a:t>
+            </a:r>
+            <a:endParaRPr lang="en-US" sz="1200" b="1" dirty="0"/>
+          </a:p>
+        </p:txBody>
+      </p:sp>
+    </p:spTree>
+  </p:cSld>
+  <p:clrMapOvr>
+    <a:masterClrMapping/>
+  </p:clrMapOvr>
+</p:sld>
+</file>
+
+<file path=ppt/slides/slide32.xml><?xml version="1.0" encoding="utf-8"?>
+<p:sld xmlns:a="http://schemas.openxmlformats.org/drawingml/2006/main" xmlns:r="http://schemas.openxmlformats.org/officeDocument/2006/relationships" xmlns:p="http://schemas.openxmlformats.org/presentationml/2006/main">
+  <p:cSld>
+    <p:spTree>
+      <p:nvGrpSpPr>
+        <p:cNvPr id="1" name=""/>
+        <p:cNvGrpSpPr/>
+        <p:nvPr/>
+      </p:nvGrpSpPr>
+      <p:grpSpPr>
+        <a:xfrm>
+          <a:off x="0" y="0"/>
+          <a:ext cx="0" cy="0"/>
+          <a:chOff x="0" y="0"/>
+          <a:chExt cx="0" cy="0"/>
+        </a:xfrm>
+      </p:grpSpPr>
+      <p:sp>
+        <p:nvSpPr>
+          <p:cNvPr id="2" name="Title 1"/>
+          <p:cNvSpPr>
+            <a:spLocks noGrp="1"/>
+          </p:cNvSpPr>
+          <p:nvPr>
+            <p:ph type="title"/>
+          </p:nvPr>
+        </p:nvSpPr>
+        <p:spPr/>
+        <p:txBody>
+          <a:bodyPr/>
+          <a:lstStyle/>
+          <a:p>
+            <a:r>
+              <a:rPr lang="en-US" dirty="0" smtClean="0"/>
+              <a:t>Models in </a:t>
+            </a:r>
+            <a:r>
+              <a:rPr lang="en-US" dirty="0" err="1" smtClean="0"/>
+              <a:t>VanetMobiSim</a:t>
+            </a:r>
+            <a:endParaRPr lang="en-US" dirty="0"/>
+          </a:p>
+        </p:txBody>
+      </p:sp>
+      <p:sp>
+        <p:nvSpPr>
+          <p:cNvPr id="3" name="Content Placeholder 2"/>
+          <p:cNvSpPr>
+            <a:spLocks noGrp="1"/>
+          </p:cNvSpPr>
+          <p:nvPr>
+            <p:ph sz="quarter" idx="1"/>
+          </p:nvPr>
+        </p:nvSpPr>
+        <p:spPr/>
+        <p:txBody>
+          <a:bodyPr/>
+          <a:lstStyle/>
+          <a:p>
+            <a:r>
+              <a:rPr lang="en-US" dirty="0" smtClean="0"/>
+              <a:t>The Intelligent Driver Model is a form of the car following model where results are based on the vehicle directly in front </a:t>
+            </a:r>
+          </a:p>
+          <a:p>
+            <a:endParaRPr lang="en-US" dirty="0" smtClean="0"/>
+          </a:p>
+          <a:p>
+            <a:endParaRPr lang="en-US" dirty="0" smtClean="0"/>
+          </a:p>
+          <a:p>
+            <a:r>
+              <a:rPr lang="en-US" dirty="0" smtClean="0"/>
+              <a:t>This characterizes the instantaneous acceleration as a function of the current vehicle speed, desired velocity, distance from the next vehicle, and desired dynamical distance.</a:t>
+            </a:r>
+          </a:p>
+          <a:p>
+            <a:endParaRPr lang="en-US" dirty="0" smtClean="0"/>
+          </a:p>
+          <a:p>
+            <a:endParaRPr lang="en-US" dirty="0" smtClean="0"/>
+          </a:p>
+          <a:p>
+            <a:endParaRPr lang="en-US" dirty="0"/>
+          </a:p>
+        </p:txBody>
+      </p:sp>
+      <p:sp>
+        <p:nvSpPr>
+          <p:cNvPr id="4" name="TextBox 3"/>
+          <p:cNvSpPr txBox="1"/>
+          <p:nvPr/>
+        </p:nvSpPr>
+        <p:spPr>
+          <a:xfrm>
+            <a:off x="609600" y="6400800"/>
+            <a:ext cx="6172200" cy="276999"/>
+          </a:xfrm>
+          <a:prstGeom prst="rect">
+            <a:avLst/>
+          </a:prstGeom>
+          <a:noFill/>
+        </p:spPr>
+        <p:txBody>
+          <a:bodyPr wrap="square" rtlCol="0">
+            <a:spAutoFit/>
+          </a:bodyPr>
+          <a:lstStyle/>
+          <a:p>
+            <a:r>
+              <a:rPr lang="en-US" sz="1200" b="1" dirty="0" smtClean="0"/>
+              <a:t>Vehicular Mobility Simulation for VANETs</a:t>
+            </a:r>
+            <a:endParaRPr lang="en-US" sz="1200" b="1" dirty="0"/>
+          </a:p>
+        </p:txBody>
+      </p:sp>
+      <p:sp>
+        <p:nvSpPr>
+          <p:cNvPr id="50178" name="Rectangle 2"/>
+          <p:cNvSpPr>
+            <a:spLocks noChangeArrowheads="1"/>
+          </p:cNvSpPr>
+          <p:nvPr/>
+        </p:nvSpPr>
+        <p:spPr bwMode="auto">
+          <a:xfrm>
+            <a:off x="0" y="0"/>
+            <a:ext cx="9144000" cy="457200"/>
+          </a:xfrm>
+          <a:prstGeom prst="rect">
+            <a:avLst/>
+          </a:prstGeom>
+          <a:noFill/>
+          <a:ln w="9525">
+            <a:noFill/>
+            <a:miter lim="800000"/>
+            <a:headEnd/>
+            <a:tailEnd/>
+          </a:ln>
+          <a:effectLst/>
+        </p:spPr>
+        <p:txBody>
+          <a:bodyPr vert="horz" wrap="none" lIns="91440" tIns="45720" rIns="91440" bIns="45720" numCol="1" anchor="ctr" anchorCtr="0" compatLnSpc="1">
+            <a:prstTxWarp prst="textNoShape">
+              <a:avLst/>
+            </a:prstTxWarp>
+            <a:spAutoFit/>
+          </a:bodyPr>
+          <a:lstStyle/>
+          <a:p>
+            <a:endParaRPr lang="en-US"/>
+          </a:p>
+        </p:txBody>
+      </p:sp>
+      <p:pic>
+        <p:nvPicPr>
+          <p:cNvPr id="50177" name="Picture 1"/>
+          <p:cNvPicPr>
+            <a:picLocks noChangeAspect="1" noChangeArrowheads="1"/>
+          </p:cNvPicPr>
+          <p:nvPr/>
+        </p:nvPicPr>
+        <p:blipFill>
+          <a:blip r:embed="rId2" cstate="print">
+            <a:clrChange>
+              <a:clrFrom>
+                <a:srgbClr val="FFFFFF"/>
+              </a:clrFrom>
+              <a:clrTo>
+                <a:srgbClr val="FFFFFF">
+                  <a:alpha val="0"/>
+                </a:srgbClr>
+              </a:clrTo>
+            </a:clrChange>
+          </a:blip>
+          <a:srcRect/>
+          <a:stretch>
+            <a:fillRect/>
+          </a:stretch>
+        </p:blipFill>
+        <p:spPr bwMode="auto">
+          <a:xfrm>
+            <a:off x="1143000" y="2438400"/>
+            <a:ext cx="3190875" cy="981075"/>
+          </a:xfrm>
+          <a:prstGeom prst="rect">
+            <a:avLst/>
+          </a:prstGeom>
+          <a:noFill/>
+        </p:spPr>
+      </p:pic>
+      <p:sp>
+        <p:nvSpPr>
+          <p:cNvPr id="50179" name="Rectangle 3"/>
+          <p:cNvSpPr>
+            <a:spLocks noChangeArrowheads="1"/>
+          </p:cNvSpPr>
+          <p:nvPr/>
+        </p:nvSpPr>
+        <p:spPr bwMode="auto">
+          <a:xfrm>
+            <a:off x="0" y="1438275"/>
+            <a:ext cx="9144000" cy="0"/>
+          </a:xfrm>
+          <a:prstGeom prst="rect">
+            <a:avLst/>
+          </a:prstGeom>
+          <a:noFill/>
+          <a:ln w="9525">
+            <a:noFill/>
+            <a:miter lim="800000"/>
+            <a:headEnd/>
+            <a:tailEnd/>
+          </a:ln>
+          <a:effectLst/>
+        </p:spPr>
+        <p:txBody>
+          <a:bodyPr vert="horz" wrap="none" lIns="91440" tIns="45720" rIns="91440" bIns="45720" numCol="1" anchor="ctr" anchorCtr="0" compatLnSpc="1">
+            <a:prstTxWarp prst="textNoShape">
+              <a:avLst/>
+            </a:prstTxWarp>
+            <a:spAutoFit/>
+          </a:bodyPr>
+          <a:lstStyle/>
+          <a:p>
+            <a:pPr marL="0" marR="0" lvl="0" indent="0" algn="l" defTabSz="914400" rtl="0" eaLnBrk="1" fontAlgn="base" latinLnBrk="0" hangingPunct="1">
+              <a:lnSpc>
+                <a:spcPct val="100000"/>
+              </a:lnSpc>
+              <a:spcBef>
+                <a:spcPct val="0"/>
+              </a:spcBef>
+              <a:spcAft>
+                <a:spcPct val="0"/>
+              </a:spcAft>
+              <a:buClrTx/>
+              <a:buSzTx/>
+              <a:buFontTx/>
+              <a:buNone/>
+              <a:tabLst/>
+            </a:pPr>
+            <a:endParaRPr kumimoji="0" lang="en-US" sz="1800" b="0" i="0" u="none" strike="noStrike" cap="none" normalizeH="0" baseline="0" smtClean="0">
+              <a:ln>
+                <a:noFill/>
+              </a:ln>
+              <a:solidFill>
+                <a:schemeClr val="tx1"/>
+              </a:solidFill>
+              <a:effectLst/>
+              <a:latin typeface="Arial" pitchFamily="34" charset="0"/>
+              <a:cs typeface="Arial" pitchFamily="34" charset="0"/>
+            </a:endParaRPr>
+          </a:p>
+        </p:txBody>
+      </p:sp>
+      <p:sp>
+        <p:nvSpPr>
+          <p:cNvPr id="50181" name="Rectangle 5"/>
+          <p:cNvSpPr>
+            <a:spLocks noChangeArrowheads="1"/>
+          </p:cNvSpPr>
+          <p:nvPr/>
+        </p:nvSpPr>
+        <p:spPr bwMode="auto">
+          <a:xfrm>
+            <a:off x="0" y="0"/>
+            <a:ext cx="9144000" cy="0"/>
+          </a:xfrm>
+          <a:prstGeom prst="rect">
+            <a:avLst/>
+          </a:prstGeom>
+          <a:noFill/>
+          <a:ln w="9525">
+            <a:noFill/>
+            <a:miter lim="800000"/>
+            <a:headEnd/>
+            <a:tailEnd/>
+          </a:ln>
+          <a:effectLst/>
+        </p:spPr>
+        <p:txBody>
+          <a:bodyPr vert="horz" wrap="none" lIns="91440" tIns="45720" rIns="91440" bIns="45720" numCol="1" anchor="ctr" anchorCtr="0" compatLnSpc="1">
+            <a:prstTxWarp prst="textNoShape">
+              <a:avLst/>
+            </a:prstTxWarp>
+            <a:spAutoFit/>
+          </a:bodyPr>
+          <a:lstStyle/>
+          <a:p>
+            <a:endParaRPr lang="en-US"/>
+          </a:p>
+        </p:txBody>
+      </p:sp>
+      <p:pic>
+        <p:nvPicPr>
+          <p:cNvPr id="50180" name="Picture 4"/>
+          <p:cNvPicPr>
+            <a:picLocks noChangeAspect="1" noChangeArrowheads="1"/>
+          </p:cNvPicPr>
+          <p:nvPr/>
+        </p:nvPicPr>
+        <p:blipFill>
+          <a:blip r:embed="rId3" cstate="print">
+            <a:clrChange>
+              <a:clrFrom>
+                <a:srgbClr val="FFFFFF"/>
+              </a:clrFrom>
+              <a:clrTo>
+                <a:srgbClr val="FFFFFF">
+                  <a:alpha val="0"/>
+                </a:srgbClr>
+              </a:clrTo>
+            </a:clrChange>
+          </a:blip>
+          <a:srcRect/>
+          <a:stretch>
+            <a:fillRect/>
+          </a:stretch>
+        </p:blipFill>
+        <p:spPr bwMode="auto">
+          <a:xfrm>
+            <a:off x="4648200" y="2514600"/>
+            <a:ext cx="2962275" cy="876300"/>
+          </a:xfrm>
+          <a:prstGeom prst="rect">
+            <a:avLst/>
+          </a:prstGeom>
+          <a:noFill/>
+        </p:spPr>
+      </p:pic>
+    </p:spTree>
+  </p:cSld>
+  <p:clrMapOvr>
+    <a:masterClrMapping/>
+  </p:clrMapOvr>
+</p:sld>
+</file>
+
+<file path=ppt/slides/slide33.xml><?xml version="1.0" encoding="utf-8"?>
+<p:sld xmlns:a="http://schemas.openxmlformats.org/drawingml/2006/main" xmlns:r="http://schemas.openxmlformats.org/officeDocument/2006/relationships" xmlns:p="http://schemas.openxmlformats.org/presentationml/2006/main">
+  <p:cSld>
+    <p:spTree>
+      <p:nvGrpSpPr>
+        <p:cNvPr id="1" name=""/>
+        <p:cNvGrpSpPr/>
+        <p:nvPr/>
+      </p:nvGrpSpPr>
+      <p:grpSpPr>
+        <a:xfrm>
+          <a:off x="0" y="0"/>
+          <a:ext cx="0" cy="0"/>
+          <a:chOff x="0" y="0"/>
+          <a:chExt cx="0" cy="0"/>
+        </a:xfrm>
+      </p:grpSpPr>
+      <p:sp>
+        <p:nvSpPr>
+          <p:cNvPr id="2" name="Title 1"/>
+          <p:cNvSpPr>
+            <a:spLocks noGrp="1"/>
+          </p:cNvSpPr>
+          <p:nvPr>
+            <p:ph type="title"/>
+          </p:nvPr>
+        </p:nvSpPr>
+        <p:spPr/>
+        <p:txBody>
+          <a:bodyPr/>
+          <a:lstStyle/>
+          <a:p>
+            <a:r>
+              <a:rPr lang="en-US" dirty="0" smtClean="0"/>
+              <a:t>IDM-IM (Intersection Management)</a:t>
+            </a:r>
+            <a:endParaRPr lang="en-US" dirty="0"/>
+          </a:p>
+        </p:txBody>
+      </p:sp>
+      <p:sp>
+        <p:nvSpPr>
+          <p:cNvPr id="3" name="Content Placeholder 2"/>
+          <p:cNvSpPr>
+            <a:spLocks noGrp="1"/>
+          </p:cNvSpPr>
+          <p:nvPr>
+            <p:ph sz="quarter" idx="1"/>
+          </p:nvPr>
+        </p:nvSpPr>
+        <p:spPr/>
+        <p:txBody>
+          <a:bodyPr/>
+          <a:lstStyle/>
+          <a:p>
+            <a:r>
+              <a:rPr lang="en-US" dirty="0" smtClean="0"/>
+              <a:t>With other simulations, the paths of vehicles can cross without any repercussions. </a:t>
+            </a:r>
+            <a:r>
+              <a:rPr lang="en-US" dirty="0" err="1" smtClean="0"/>
+              <a:t>VanetMobiSim</a:t>
+            </a:r>
+            <a:r>
+              <a:rPr lang="en-US" dirty="0" smtClean="0"/>
+              <a:t> offers a solution to this problem with their ability to model intersection traffic.</a:t>
+            </a:r>
+          </a:p>
+          <a:p>
+            <a:r>
+              <a:rPr lang="en-US" dirty="0" smtClean="0"/>
+              <a:t>Stop signs, traffic signals, and drivers changing lanes all contribute to how traffic is formed. Fortunately this can all be modeled with </a:t>
+            </a:r>
+            <a:r>
+              <a:rPr lang="en-US" dirty="0" err="1" smtClean="0"/>
+              <a:t>VanetMobiSim</a:t>
+            </a:r>
+            <a:r>
+              <a:rPr lang="en-US" dirty="0" smtClean="0"/>
+              <a:t>.</a:t>
+            </a:r>
+            <a:endParaRPr lang="en-US" dirty="0"/>
+          </a:p>
+        </p:txBody>
+      </p:sp>
+      <p:sp>
+        <p:nvSpPr>
+          <p:cNvPr id="4" name="TextBox 3"/>
+          <p:cNvSpPr txBox="1"/>
+          <p:nvPr/>
+        </p:nvSpPr>
+        <p:spPr>
+          <a:xfrm>
+            <a:off x="609600" y="6400800"/>
+            <a:ext cx="6172200" cy="276999"/>
+          </a:xfrm>
+          <a:prstGeom prst="rect">
+            <a:avLst/>
+          </a:prstGeom>
+          <a:noFill/>
+        </p:spPr>
+        <p:txBody>
+          <a:bodyPr wrap="square" rtlCol="0">
+            <a:spAutoFit/>
+          </a:bodyPr>
+          <a:lstStyle/>
+          <a:p>
+            <a:r>
+              <a:rPr lang="en-US" sz="1200" b="1" dirty="0" smtClean="0"/>
+              <a:t>Vehicular Mobility Simulation for VANETs</a:t>
+            </a:r>
+            <a:endParaRPr lang="en-US" sz="1200" b="1" dirty="0"/>
+          </a:p>
+        </p:txBody>
+      </p:sp>
+      <p:pic>
+        <p:nvPicPr>
+          <p:cNvPr id="51202" name="Picture 2" descr="http://themoderatevoice.com/wp-content/uploads/2008_july/Stop_Sign.jpg"/>
+          <p:cNvPicPr>
+            <a:picLocks noChangeAspect="1" noChangeArrowheads="1"/>
+          </p:cNvPicPr>
+          <p:nvPr/>
+        </p:nvPicPr>
+        <p:blipFill>
+          <a:blip r:embed="rId2" cstate="print"/>
+          <a:srcRect/>
+          <a:stretch>
+            <a:fillRect/>
+          </a:stretch>
+        </p:blipFill>
+        <p:spPr bwMode="auto">
+          <a:xfrm>
+            <a:off x="1295400" y="4343400"/>
+            <a:ext cx="2362200" cy="1771650"/>
+          </a:xfrm>
+          <a:prstGeom prst="rect">
+            <a:avLst/>
+          </a:prstGeom>
+          <a:noFill/>
+        </p:spPr>
+      </p:pic>
+      <p:pic>
+        <p:nvPicPr>
+          <p:cNvPr id="51204" name="Picture 4" descr="http://mysite.myhostcenter.com/s0096b13/images/traffic_lights_mist.jpg"/>
+          <p:cNvPicPr>
+            <a:picLocks noChangeAspect="1" noChangeArrowheads="1"/>
+          </p:cNvPicPr>
+          <p:nvPr/>
+        </p:nvPicPr>
+        <p:blipFill>
+          <a:blip r:embed="rId3" cstate="print"/>
+          <a:srcRect/>
+          <a:stretch>
+            <a:fillRect/>
+          </a:stretch>
+        </p:blipFill>
+        <p:spPr bwMode="auto">
+          <a:xfrm>
+            <a:off x="4876800" y="4343400"/>
+            <a:ext cx="2438400" cy="1753230"/>
+          </a:xfrm>
+          <a:prstGeom prst="rect">
+            <a:avLst/>
+          </a:prstGeom>
+          <a:noFill/>
+        </p:spPr>
+      </p:pic>
+    </p:spTree>
+  </p:cSld>
+  <p:clrMapOvr>
+    <a:masterClrMapping/>
+  </p:clrMapOvr>
+  <p:timing>
+    <p:tnLst>
+      <p:par>
+        <p:cTn id="1" dur="indefinite" restart="never" nodeType="tmRoot"/>
+      </p:par>
+    </p:tnLst>
+  </p:timing>
+</p:sld>
+</file>
+
+<file path=ppt/slides/slide34.xml><?xml version="1.0" encoding="utf-8"?>
+<p:sld xmlns:a="http://schemas.openxmlformats.org/drawingml/2006/main" xmlns:r="http://schemas.openxmlformats.org/officeDocument/2006/relationships" xmlns:p="http://schemas.openxmlformats.org/presentationml/2006/main">
+  <p:cSld>
+    <p:spTree>
+      <p:nvGrpSpPr>
+        <p:cNvPr id="1" name=""/>
+        <p:cNvGrpSpPr/>
+        <p:nvPr/>
+      </p:nvGrpSpPr>
+      <p:grpSpPr>
+        <a:xfrm>
+          <a:off x="0" y="0"/>
+          <a:ext cx="0" cy="0"/>
+          <a:chOff x="0" y="0"/>
+          <a:chExt cx="0" cy="0"/>
+        </a:xfrm>
+      </p:grpSpPr>
+      <p:sp>
+        <p:nvSpPr>
+          <p:cNvPr id="2" name="Title 1"/>
+          <p:cNvSpPr>
+            <a:spLocks noGrp="1"/>
+          </p:cNvSpPr>
+          <p:nvPr>
+            <p:ph type="title"/>
+          </p:nvPr>
+        </p:nvSpPr>
+        <p:spPr/>
+        <p:txBody>
+          <a:bodyPr/>
+          <a:lstStyle/>
+          <a:p>
+            <a:r>
+              <a:rPr lang="en-US" dirty="0" smtClean="0"/>
+              <a:t>IDM-IM Stop Signs and Traffic Signals</a:t>
+            </a:r>
+            <a:endParaRPr lang="en-US" dirty="0"/>
+          </a:p>
+        </p:txBody>
+      </p:sp>
+      <p:sp>
+        <p:nvSpPr>
+          <p:cNvPr id="3" name="Content Placeholder 2"/>
+          <p:cNvSpPr>
+            <a:spLocks noGrp="1"/>
+          </p:cNvSpPr>
+          <p:nvPr>
+            <p:ph sz="quarter" idx="1"/>
+          </p:nvPr>
+        </p:nvSpPr>
+        <p:spPr/>
+        <p:txBody>
+          <a:bodyPr/>
+          <a:lstStyle/>
+          <a:p>
+            <a:r>
+              <a:rPr lang="en-US" dirty="0" smtClean="0"/>
+              <a:t>When a vehicle reaches a stop sign, the macro-mobility model passes information about the number of cars in front of the vehicle of if any vehicles arrived first at other junctions of the intersection. Following the right-car priority rule, our vehicle waits its turn to move through a given intersection.</a:t>
+            </a:r>
+          </a:p>
+          <a:p>
+            <a:r>
+              <a:rPr lang="en-US" dirty="0" smtClean="0"/>
+              <a:t>The traffic light mechanism decelerates a vehicle as it approaches a RED light and accelerates, to a max speed, if approaching a GREEN light. Another feature is that if a vehicle is slowing down as it approaches a RED light, and the traffic signal turns GREEN, then the vehicle begins to accelerate which models a drivers behavior.</a:t>
+            </a:r>
+            <a:endParaRPr lang="en-US" dirty="0"/>
+          </a:p>
+        </p:txBody>
+      </p:sp>
+      <p:sp>
+        <p:nvSpPr>
+          <p:cNvPr id="4" name="TextBox 3"/>
+          <p:cNvSpPr txBox="1"/>
+          <p:nvPr/>
+        </p:nvSpPr>
+        <p:spPr>
+          <a:xfrm>
+            <a:off x="609600" y="6400800"/>
+            <a:ext cx="6172200" cy="276999"/>
+          </a:xfrm>
+          <a:prstGeom prst="rect">
+            <a:avLst/>
+          </a:prstGeom>
+          <a:noFill/>
+        </p:spPr>
+        <p:txBody>
+          <a:bodyPr wrap="square" rtlCol="0">
+            <a:spAutoFit/>
+          </a:bodyPr>
+          <a:lstStyle/>
+          <a:p>
+            <a:r>
+              <a:rPr lang="en-US" sz="1200" b="1" dirty="0" smtClean="0"/>
+              <a:t>Vehicular Mobility Simulation for VANETs</a:t>
+            </a:r>
+            <a:endParaRPr lang="en-US" sz="1200" b="1" dirty="0"/>
+          </a:p>
+        </p:txBody>
+      </p:sp>
+    </p:spTree>
+  </p:cSld>
+  <p:clrMapOvr>
+    <a:masterClrMapping/>
+  </p:clrMapOvr>
+</p:sld>
+</file>
+
+<file path=ppt/slides/slide35.xml><?xml version="1.0" encoding="utf-8"?>
+<p:sld xmlns:a="http://schemas.openxmlformats.org/drawingml/2006/main" xmlns:r="http://schemas.openxmlformats.org/officeDocument/2006/relationships" xmlns:p="http://schemas.openxmlformats.org/presentationml/2006/main">
+  <p:cSld>
+    <p:spTree>
+      <p:nvGrpSpPr>
+        <p:cNvPr id="1" name=""/>
+        <p:cNvGrpSpPr/>
+        <p:nvPr/>
+      </p:nvGrpSpPr>
+      <p:grpSpPr>
+        <a:xfrm>
+          <a:off x="0" y="0"/>
+          <a:ext cx="0" cy="0"/>
+          <a:chOff x="0" y="0"/>
+          <a:chExt cx="0" cy="0"/>
+        </a:xfrm>
+      </p:grpSpPr>
+      <p:sp>
+        <p:nvSpPr>
+          <p:cNvPr id="2" name="Title 1"/>
+          <p:cNvSpPr>
+            <a:spLocks noGrp="1"/>
+          </p:cNvSpPr>
+          <p:nvPr>
+            <p:ph type="title"/>
+          </p:nvPr>
+        </p:nvSpPr>
+        <p:spPr/>
+        <p:txBody>
+          <a:bodyPr/>
+          <a:lstStyle/>
+          <a:p>
+            <a:r>
+              <a:rPr lang="en-US" dirty="0" smtClean="0"/>
+              <a:t>IDM-LC Lane Change</a:t>
+            </a:r>
+            <a:endParaRPr lang="en-US" dirty="0"/>
+          </a:p>
+        </p:txBody>
+      </p:sp>
+      <p:sp>
+        <p:nvSpPr>
+          <p:cNvPr id="3" name="Content Placeholder 2"/>
+          <p:cNvSpPr>
+            <a:spLocks noGrp="1"/>
+          </p:cNvSpPr>
+          <p:nvPr>
+            <p:ph sz="quarter" idx="1"/>
+          </p:nvPr>
+        </p:nvSpPr>
+        <p:spPr/>
+        <p:txBody>
+          <a:bodyPr/>
+          <a:lstStyle/>
+          <a:p>
+            <a:r>
+              <a:rPr lang="en-US" dirty="0" smtClean="0"/>
+              <a:t>A definite enhancement to this simulation tool is the ability to model a drivers ability to change lanes to pass slower vehicles. It follows a formula that weighs the pros of switching lanes against the cons of other vehicles in the same and new lane. If the calculations show an advantage, and it is determined that a safe lane change is possible, then a driver may switch lanes. </a:t>
+            </a:r>
+          </a:p>
+          <a:p>
+            <a:endParaRPr lang="en-US" dirty="0" smtClean="0"/>
+          </a:p>
+          <a:p>
+            <a:endParaRPr lang="en-US" dirty="0" smtClean="0"/>
+          </a:p>
+          <a:p>
+            <a:pPr>
+              <a:buNone/>
+            </a:pPr>
+            <a:endParaRPr lang="en-US" dirty="0"/>
+          </a:p>
+        </p:txBody>
+      </p:sp>
+      <p:sp>
+        <p:nvSpPr>
+          <p:cNvPr id="4" name="TextBox 3"/>
+          <p:cNvSpPr txBox="1"/>
+          <p:nvPr/>
+        </p:nvSpPr>
+        <p:spPr>
+          <a:xfrm>
+            <a:off x="609600" y="6400800"/>
+            <a:ext cx="6172200" cy="276999"/>
+          </a:xfrm>
+          <a:prstGeom prst="rect">
+            <a:avLst/>
+          </a:prstGeom>
+          <a:noFill/>
+        </p:spPr>
+        <p:txBody>
+          <a:bodyPr wrap="square" rtlCol="0">
+            <a:spAutoFit/>
+          </a:bodyPr>
+          <a:lstStyle/>
+          <a:p>
+            <a:r>
+              <a:rPr lang="en-US" sz="1200" b="1" dirty="0" smtClean="0"/>
+              <a:t>Vehicular Mobility Simulation for VANETs</a:t>
+            </a:r>
+            <a:endParaRPr lang="en-US" sz="1200" b="1" dirty="0"/>
+          </a:p>
+        </p:txBody>
+      </p:sp>
+      <p:sp>
+        <p:nvSpPr>
+          <p:cNvPr id="52226" name="Rectangle 2"/>
+          <p:cNvSpPr>
+            <a:spLocks noChangeArrowheads="1"/>
+          </p:cNvSpPr>
+          <p:nvPr/>
+        </p:nvSpPr>
+        <p:spPr bwMode="auto">
+          <a:xfrm>
+            <a:off x="0" y="0"/>
+            <a:ext cx="9144000" cy="0"/>
+          </a:xfrm>
+          <a:prstGeom prst="rect">
+            <a:avLst/>
+          </a:prstGeom>
+          <a:noFill/>
+          <a:ln w="9525">
+            <a:noFill/>
+            <a:miter lim="800000"/>
+            <a:headEnd/>
+            <a:tailEnd/>
+          </a:ln>
+          <a:effectLst/>
+        </p:spPr>
+        <p:txBody>
+          <a:bodyPr vert="horz" wrap="none" lIns="91440" tIns="45720" rIns="91440" bIns="45720" numCol="1" anchor="ctr" anchorCtr="0" compatLnSpc="1">
+            <a:prstTxWarp prst="textNoShape">
+              <a:avLst/>
+            </a:prstTxWarp>
+            <a:spAutoFit/>
+          </a:bodyPr>
+          <a:lstStyle/>
+          <a:p>
+            <a:endParaRPr lang="en-US"/>
+          </a:p>
+        </p:txBody>
+      </p:sp>
+      <p:sp>
+        <p:nvSpPr>
+          <p:cNvPr id="52232" name="Rectangle 8"/>
+          <p:cNvSpPr>
+            <a:spLocks noChangeArrowheads="1"/>
+          </p:cNvSpPr>
+          <p:nvPr/>
+        </p:nvSpPr>
+        <p:spPr bwMode="auto">
+          <a:xfrm>
+            <a:off x="0" y="0"/>
+            <a:ext cx="9144000" cy="0"/>
+          </a:xfrm>
+          <a:prstGeom prst="rect">
+            <a:avLst/>
+          </a:prstGeom>
+          <a:noFill/>
+          <a:ln w="9525">
+            <a:noFill/>
+            <a:miter lim="800000"/>
+            <a:headEnd/>
+            <a:tailEnd/>
+          </a:ln>
+          <a:effectLst/>
+        </p:spPr>
+        <p:txBody>
+          <a:bodyPr vert="horz" wrap="none" lIns="91440" tIns="45720" rIns="91440" bIns="45720" numCol="1" anchor="ctr" anchorCtr="0" compatLnSpc="1">
+            <a:prstTxWarp prst="textNoShape">
+              <a:avLst/>
+            </a:prstTxWarp>
+            <a:spAutoFit/>
+          </a:bodyPr>
+          <a:lstStyle/>
+          <a:p>
+            <a:endParaRPr lang="en-US"/>
+          </a:p>
+        </p:txBody>
+      </p:sp>
+      <p:pic>
+        <p:nvPicPr>
+          <p:cNvPr id="52231" name="Picture 7"/>
+          <p:cNvPicPr>
+            <a:picLocks noChangeAspect="1" noChangeArrowheads="1"/>
+          </p:cNvPicPr>
+          <p:nvPr/>
+        </p:nvPicPr>
+        <p:blipFill>
+          <a:blip r:embed="rId2" cstate="print">
+            <a:clrChange>
+              <a:clrFrom>
+                <a:srgbClr val="FFFFFF"/>
+              </a:clrFrom>
+              <a:clrTo>
+                <a:srgbClr val="FFFFFF">
+                  <a:alpha val="0"/>
+                </a:srgbClr>
+              </a:clrTo>
+            </a:clrChange>
+          </a:blip>
+          <a:srcRect/>
+          <a:stretch>
+            <a:fillRect/>
+          </a:stretch>
+        </p:blipFill>
+        <p:spPr bwMode="auto">
+          <a:xfrm>
+            <a:off x="1752600" y="4114800"/>
+            <a:ext cx="5867400" cy="381000"/>
+          </a:xfrm>
+          <a:prstGeom prst="rect">
+            <a:avLst/>
+          </a:prstGeom>
+          <a:noFill/>
+        </p:spPr>
+      </p:pic>
+      <p:sp>
+        <p:nvSpPr>
+          <p:cNvPr id="52234" name="Rectangle 10"/>
+          <p:cNvSpPr>
+            <a:spLocks noChangeArrowheads="1"/>
+          </p:cNvSpPr>
+          <p:nvPr/>
+        </p:nvSpPr>
+        <p:spPr bwMode="auto">
+          <a:xfrm>
+            <a:off x="0" y="0"/>
+            <a:ext cx="9144000" cy="0"/>
+          </a:xfrm>
+          <a:prstGeom prst="rect">
+            <a:avLst/>
+          </a:prstGeom>
+          <a:noFill/>
+          <a:ln w="9525">
+            <a:noFill/>
+            <a:miter lim="800000"/>
+            <a:headEnd/>
+            <a:tailEnd/>
+          </a:ln>
+          <a:effectLst/>
+        </p:spPr>
+        <p:txBody>
+          <a:bodyPr vert="horz" wrap="none" lIns="91440" tIns="45720" rIns="91440" bIns="45720" numCol="1" anchor="ctr" anchorCtr="0" compatLnSpc="1">
+            <a:prstTxWarp prst="textNoShape">
+              <a:avLst/>
+            </a:prstTxWarp>
+            <a:spAutoFit/>
+          </a:bodyPr>
+          <a:lstStyle/>
+          <a:p>
+            <a:endParaRPr lang="en-US"/>
+          </a:p>
+        </p:txBody>
+      </p:sp>
+      <p:pic>
+        <p:nvPicPr>
+          <p:cNvPr id="52233" name="Picture 9"/>
+          <p:cNvPicPr>
+            <a:picLocks noChangeAspect="1" noChangeArrowheads="1"/>
+          </p:cNvPicPr>
+          <p:nvPr/>
+        </p:nvPicPr>
+        <p:blipFill>
+          <a:blip r:embed="rId3" cstate="print">
+            <a:clrChange>
+              <a:clrFrom>
+                <a:srgbClr val="FFFFFF"/>
+              </a:clrFrom>
+              <a:clrTo>
+                <a:srgbClr val="FFFFFF">
+                  <a:alpha val="0"/>
+                </a:srgbClr>
+              </a:clrTo>
+            </a:clrChange>
+          </a:blip>
+          <a:srcRect/>
+          <a:stretch>
+            <a:fillRect/>
+          </a:stretch>
+        </p:blipFill>
+        <p:spPr bwMode="auto">
+          <a:xfrm>
+            <a:off x="1752600" y="4572000"/>
+            <a:ext cx="1619250" cy="381000"/>
+          </a:xfrm>
+          <a:prstGeom prst="rect">
+            <a:avLst/>
+          </a:prstGeom>
+          <a:noFill/>
+        </p:spPr>
+      </p:pic>
+    </p:spTree>
+  </p:cSld>
+  <p:clrMapOvr>
+    <a:masterClrMapping/>
+  </p:clrMapOvr>
+</p:sld>
+</file>
+
+<file path=ppt/slides/slide36.xml><?xml version="1.0" encoding="utf-8"?>
+<p:sld xmlns:a="http://schemas.openxmlformats.org/drawingml/2006/main" xmlns:r="http://schemas.openxmlformats.org/officeDocument/2006/relationships" xmlns:p="http://schemas.openxmlformats.org/presentationml/2006/main">
+  <p:cSld>
+    <p:spTree>
+      <p:nvGrpSpPr>
+        <p:cNvPr id="1" name=""/>
+        <p:cNvGrpSpPr/>
+        <p:nvPr/>
+      </p:nvGrpSpPr>
+      <p:grpSpPr>
+        <a:xfrm>
+          <a:off x="0" y="0"/>
+          <a:ext cx="0" cy="0"/>
+          <a:chOff x="0" y="0"/>
+          <a:chExt cx="0" cy="0"/>
+        </a:xfrm>
+      </p:grpSpPr>
+      <p:sp>
+        <p:nvSpPr>
+          <p:cNvPr id="2" name="Title 1"/>
+          <p:cNvSpPr>
+            <a:spLocks noGrp="1"/>
+          </p:cNvSpPr>
+          <p:nvPr>
+            <p:ph type="title"/>
+          </p:nvPr>
+        </p:nvSpPr>
+        <p:spPr/>
+        <p:txBody>
+          <a:bodyPr/>
+          <a:lstStyle/>
+          <a:p>
+            <a:r>
+              <a:rPr lang="en-US" dirty="0" smtClean="0"/>
+              <a:t>Simulation Setup</a:t>
+            </a:r>
+            <a:endParaRPr lang="en-US" dirty="0"/>
+          </a:p>
+        </p:txBody>
+      </p:sp>
+      <p:sp>
+        <p:nvSpPr>
+          <p:cNvPr id="4" name="TextBox 3"/>
+          <p:cNvSpPr txBox="1"/>
+          <p:nvPr/>
+        </p:nvSpPr>
+        <p:spPr>
+          <a:xfrm>
+            <a:off x="609600" y="6400800"/>
+            <a:ext cx="6172200" cy="276999"/>
+          </a:xfrm>
+          <a:prstGeom prst="rect">
+            <a:avLst/>
+          </a:prstGeom>
+          <a:noFill/>
+        </p:spPr>
+        <p:txBody>
+          <a:bodyPr wrap="square" rtlCol="0">
+            <a:spAutoFit/>
+          </a:bodyPr>
+          <a:lstStyle/>
+          <a:p>
+            <a:r>
+              <a:rPr lang="en-US" sz="1200" b="1" dirty="0" smtClean="0"/>
+              <a:t>Vehicular Mobility Simulation for VANETs</a:t>
+            </a:r>
+            <a:endParaRPr lang="en-US" sz="1200" b="1" dirty="0"/>
+          </a:p>
+        </p:txBody>
+      </p:sp>
+      <p:sp>
+        <p:nvSpPr>
+          <p:cNvPr id="6" name="Content Placeholder 5"/>
+          <p:cNvSpPr>
+            <a:spLocks noGrp="1"/>
+          </p:cNvSpPr>
+          <p:nvPr>
+            <p:ph sz="quarter" idx="1"/>
+          </p:nvPr>
+        </p:nvSpPr>
+        <p:spPr/>
+        <p:txBody>
+          <a:bodyPr/>
+          <a:lstStyle/>
+          <a:p>
+            <a:r>
+              <a:rPr lang="en-US" dirty="0" smtClean="0"/>
+              <a:t>A 1500mx1500m road topology where squares represent entry/exit points for vehicles traveling 15 m/s and circles for vehicles traveling 20 m/s</a:t>
+            </a:r>
+          </a:p>
+          <a:p>
+            <a:r>
+              <a:rPr lang="en-US" dirty="0" smtClean="0"/>
+              <a:t>Transition probability matrix</a:t>
+            </a:r>
+            <a:br>
+              <a:rPr lang="en-US" dirty="0" smtClean="0"/>
+            </a:br>
+            <a:r>
+              <a:rPr lang="en-US" dirty="0" smtClean="0"/>
+              <a:t>shows the transitions from </a:t>
+            </a:r>
+            <a:br>
+              <a:rPr lang="en-US" dirty="0" smtClean="0"/>
+            </a:br>
+            <a:r>
+              <a:rPr lang="en-US" dirty="0" smtClean="0"/>
+              <a:t>the slow to faster speeds</a:t>
+            </a:r>
+          </a:p>
+          <a:p>
+            <a:r>
+              <a:rPr lang="en-US" dirty="0" smtClean="0"/>
+              <a:t>Traffic density varies from</a:t>
+            </a:r>
+            <a:br>
+              <a:rPr lang="en-US" dirty="0" smtClean="0"/>
+            </a:br>
+            <a:r>
+              <a:rPr lang="en-US" dirty="0" smtClean="0"/>
+              <a:t>10 to 50 vehicles/km</a:t>
+            </a:r>
+          </a:p>
+          <a:p>
+            <a:r>
+              <a:rPr lang="en-US" dirty="0" smtClean="0"/>
+              <a:t>Simulations were done for</a:t>
+            </a:r>
+            <a:br>
+              <a:rPr lang="en-US" dirty="0" smtClean="0"/>
+            </a:br>
+            <a:r>
+              <a:rPr lang="en-US" dirty="0" smtClean="0"/>
+              <a:t>RWP (Random Way Point), CSM (Constant Speed Motion), FTM, IDM, IDM-IM, IDM-LC</a:t>
+            </a:r>
+          </a:p>
+        </p:txBody>
+      </p:sp>
+      <p:pic>
+        <p:nvPicPr>
+          <p:cNvPr id="7" name="Picture 6"/>
+          <p:cNvPicPr/>
+          <p:nvPr/>
+        </p:nvPicPr>
+        <p:blipFill>
+          <a:blip r:embed="rId2" cstate="print"/>
+          <a:srcRect/>
+          <a:stretch>
+            <a:fillRect/>
+          </a:stretch>
+        </p:blipFill>
+        <p:spPr bwMode="auto">
+          <a:xfrm>
+            <a:off x="4648200" y="2057400"/>
+            <a:ext cx="4138882" cy="3068829"/>
+          </a:xfrm>
+          <a:prstGeom prst="rect">
+            <a:avLst/>
+          </a:prstGeom>
+          <a:noFill/>
+          <a:ln w="9525">
+            <a:noFill/>
+            <a:miter lim="800000"/>
+            <a:headEnd/>
+            <a:tailEnd/>
+          </a:ln>
+        </p:spPr>
+      </p:pic>
+    </p:spTree>
+  </p:cSld>
+  <p:clrMapOvr>
+    <a:masterClrMapping/>
+  </p:clrMapOvr>
+</p:sld>
+</file>
+
+<file path=ppt/slides/slide37.xml><?xml version="1.0" encoding="utf-8"?>
+<p:sld xmlns:a="http://schemas.openxmlformats.org/drawingml/2006/main" xmlns:r="http://schemas.openxmlformats.org/officeDocument/2006/relationships" xmlns:p="http://schemas.openxmlformats.org/presentationml/2006/main">
+  <p:cSld>
+    <p:spTree>
+      <p:nvGrpSpPr>
+        <p:cNvPr id="1" name=""/>
+        <p:cNvGrpSpPr/>
+        <p:nvPr/>
+      </p:nvGrpSpPr>
+      <p:grpSpPr>
+        <a:xfrm>
+          <a:off x="0" y="0"/>
+          <a:ext cx="0" cy="0"/>
+          <a:chOff x="0" y="0"/>
+          <a:chExt cx="0" cy="0"/>
+        </a:xfrm>
+      </p:grpSpPr>
+      <p:sp>
+        <p:nvSpPr>
+          <p:cNvPr id="2" name="Title 1"/>
+          <p:cNvSpPr>
+            <a:spLocks noGrp="1"/>
+          </p:cNvSpPr>
+          <p:nvPr>
+            <p:ph type="title"/>
+          </p:nvPr>
+        </p:nvSpPr>
+        <p:spPr/>
+        <p:txBody>
+          <a:bodyPr/>
+          <a:lstStyle/>
+          <a:p>
+            <a:r>
+              <a:rPr lang="en-US" dirty="0" smtClean="0"/>
+              <a:t>Simulation Results</a:t>
+            </a:r>
+            <a:endParaRPr lang="en-US" dirty="0"/>
+          </a:p>
+        </p:txBody>
+      </p:sp>
+      <p:sp>
+        <p:nvSpPr>
+          <p:cNvPr id="3" name="Content Placeholder 2"/>
+          <p:cNvSpPr>
+            <a:spLocks noGrp="1"/>
+          </p:cNvSpPr>
+          <p:nvPr>
+            <p:ph sz="quarter" idx="1"/>
+          </p:nvPr>
+        </p:nvSpPr>
+        <p:spPr/>
+        <p:txBody>
+          <a:bodyPr/>
+          <a:lstStyle/>
+          <a:p>
+            <a:endParaRPr lang="en-US" dirty="0"/>
+          </a:p>
+        </p:txBody>
+      </p:sp>
+      <p:sp>
+        <p:nvSpPr>
+          <p:cNvPr id="4" name="TextBox 3"/>
+          <p:cNvSpPr txBox="1"/>
+          <p:nvPr/>
+        </p:nvSpPr>
+        <p:spPr>
+          <a:xfrm>
+            <a:off x="609600" y="6400800"/>
+            <a:ext cx="6172200" cy="276999"/>
+          </a:xfrm>
+          <a:prstGeom prst="rect">
+            <a:avLst/>
+          </a:prstGeom>
+          <a:noFill/>
+        </p:spPr>
+        <p:txBody>
+          <a:bodyPr wrap="square" rtlCol="0">
+            <a:spAutoFit/>
+          </a:bodyPr>
+          <a:lstStyle/>
+          <a:p>
+            <a:r>
+              <a:rPr lang="en-US" sz="1200" b="1" dirty="0" smtClean="0"/>
+              <a:t>Vehicular Mobility Simulation for VANETs</a:t>
+            </a:r>
+            <a:endParaRPr lang="en-US" sz="1200" b="1" dirty="0"/>
+          </a:p>
+        </p:txBody>
+      </p:sp>
+      <p:pic>
+        <p:nvPicPr>
+          <p:cNvPr id="17" name="Picture 16"/>
+          <p:cNvPicPr/>
+          <p:nvPr/>
+        </p:nvPicPr>
+        <p:blipFill>
+          <a:blip r:embed="rId2" cstate="print"/>
+          <a:srcRect/>
+          <a:stretch>
+            <a:fillRect/>
+          </a:stretch>
+        </p:blipFill>
+        <p:spPr bwMode="auto">
+          <a:xfrm>
+            <a:off x="4953000" y="1219200"/>
+            <a:ext cx="3742067" cy="3039866"/>
+          </a:xfrm>
+          <a:prstGeom prst="rect">
+            <a:avLst/>
+          </a:prstGeom>
+          <a:noFill/>
+          <a:ln w="9525">
+            <a:noFill/>
+            <a:miter lim="800000"/>
+            <a:headEnd/>
+            <a:tailEnd/>
+          </a:ln>
+        </p:spPr>
+      </p:pic>
     </p:spTree>
   </p:cSld>
   <p:clrMapOvr>

</xml_diff>

<commit_message>
Finished the Simulation on PPT
</commit_message>
<xml_diff>
--- a/VANET_Felix.pptx
+++ b/VANET_Felix.pptx
@@ -5,7 +5,7 @@
     <p:sldMasterId id="2147483696" r:id="rId1"/>
   </p:sldMasterIdLst>
   <p:notesMasterIdLst>
-    <p:notesMasterId r:id="rId40"/>
+    <p:notesMasterId r:id="rId46"/>
   </p:notesMasterIdLst>
   <p:sldIdLst>
     <p:sldId id="280" r:id="rId2"/>
@@ -46,6 +46,12 @@
     <p:sldId id="303" r:id="rId37"/>
     <p:sldId id="302" r:id="rId38"/>
     <p:sldId id="304" r:id="rId39"/>
+    <p:sldId id="305" r:id="rId40"/>
+    <p:sldId id="306" r:id="rId41"/>
+    <p:sldId id="307" r:id="rId42"/>
+    <p:sldId id="308" r:id="rId43"/>
+    <p:sldId id="309" r:id="rId44"/>
+    <p:sldId id="310" r:id="rId45"/>
   </p:sldIdLst>
   <p:sldSz cx="9144000" cy="6858000" type="screen4x3"/>
   <p:notesSz cx="6858000" cy="9144000"/>
@@ -2974,7 +2980,7 @@
             <a:fld id="{AA1794F1-29D0-4E50-8F0F-8A456A29C142}" type="datetimeFigureOut">
               <a:rPr lang="en-US" smtClean="0"/>
               <a:pPr/>
-              <a:t>10/26/2012</a:t>
+              <a:t>10/28/2012</a:t>
             </a:fld>
             <a:endParaRPr lang="en-US"/>
           </a:p>
@@ -3766,7 +3772,7 @@
             <a:fld id="{1D8BD707-D9CF-40AE-B4C6-C98DA3205C09}" type="datetimeFigureOut">
               <a:rPr lang="en-US" smtClean="0"/>
               <a:pPr/>
-              <a:t>10/26/2012</a:t>
+              <a:t>10/28/2012</a:t>
             </a:fld>
             <a:endParaRPr lang="en-US"/>
           </a:p>
@@ -4127,7 +4133,7 @@
             <a:fld id="{1D8BD707-D9CF-40AE-B4C6-C98DA3205C09}" type="datetimeFigureOut">
               <a:rPr lang="en-US" smtClean="0"/>
               <a:pPr/>
-              <a:t>10/26/2012</a:t>
+              <a:t>10/28/2012</a:t>
             </a:fld>
             <a:endParaRPr lang="en-US"/>
           </a:p>
@@ -4304,7 +4310,7 @@
             <a:fld id="{1D8BD707-D9CF-40AE-B4C6-C98DA3205C09}" type="datetimeFigureOut">
               <a:rPr lang="en-US" smtClean="0"/>
               <a:pPr/>
-              <a:t>10/26/2012</a:t>
+              <a:t>10/28/2012</a:t>
             </a:fld>
             <a:endParaRPr lang="en-US"/>
           </a:p>
@@ -4541,7 +4547,7 @@
             <a:fld id="{1D8BD707-D9CF-40AE-B4C6-C98DA3205C09}" type="datetimeFigureOut">
               <a:rPr lang="en-US" smtClean="0"/>
               <a:pPr/>
-              <a:t>10/26/2012</a:t>
+              <a:t>10/28/2012</a:t>
             </a:fld>
             <a:endParaRPr lang="en-US"/>
           </a:p>
@@ -4812,7 +4818,7 @@
             <a:fld id="{1D8BD707-D9CF-40AE-B4C6-C98DA3205C09}" type="datetimeFigureOut">
               <a:rPr lang="en-US" smtClean="0"/>
               <a:pPr/>
-              <a:t>10/26/2012</a:t>
+              <a:t>10/28/2012</a:t>
             </a:fld>
             <a:endParaRPr lang="en-US"/>
           </a:p>
@@ -5034,7 +5040,7 @@
             <a:fld id="{1D8BD707-D9CF-40AE-B4C6-C98DA3205C09}" type="datetimeFigureOut">
               <a:rPr lang="en-US" smtClean="0"/>
               <a:pPr/>
-              <a:t>10/26/2012</a:t>
+              <a:t>10/28/2012</a:t>
             </a:fld>
             <a:endParaRPr lang="en-US"/>
           </a:p>
@@ -5388,7 +5394,7 @@
             <a:fld id="{1D8BD707-D9CF-40AE-B4C6-C98DA3205C09}" type="datetimeFigureOut">
               <a:rPr lang="en-US" smtClean="0"/>
               <a:pPr/>
-              <a:t>10/26/2012</a:t>
+              <a:t>10/28/2012</a:t>
             </a:fld>
             <a:endParaRPr lang="en-US"/>
           </a:p>
@@ -5622,7 +5628,7 @@
             <a:fld id="{1D8BD707-D9CF-40AE-B4C6-C98DA3205C09}" type="datetimeFigureOut">
               <a:rPr lang="en-US" smtClean="0"/>
               <a:pPr/>
-              <a:t>10/26/2012</a:t>
+              <a:t>10/28/2012</a:t>
             </a:fld>
             <a:endParaRPr lang="en-US"/>
           </a:p>
@@ -5764,7 +5770,7 @@
             <a:fld id="{1D8BD707-D9CF-40AE-B4C6-C98DA3205C09}" type="datetimeFigureOut">
               <a:rPr lang="en-US" smtClean="0"/>
               <a:pPr/>
-              <a:t>10/26/2012</a:t>
+              <a:t>10/28/2012</a:t>
             </a:fld>
             <a:endParaRPr lang="en-US"/>
           </a:p>
@@ -6043,7 +6049,7 @@
             <a:fld id="{1D8BD707-D9CF-40AE-B4C6-C98DA3205C09}" type="datetimeFigureOut">
               <a:rPr lang="en-US" smtClean="0"/>
               <a:pPr/>
-              <a:t>10/26/2012</a:t>
+              <a:t>10/28/2012</a:t>
             </a:fld>
             <a:endParaRPr lang="en-US"/>
           </a:p>
@@ -6452,7 +6458,7 @@
             <a:fld id="{1D8BD707-D9CF-40AE-B4C6-C98DA3205C09}" type="datetimeFigureOut">
               <a:rPr lang="en-US" smtClean="0"/>
               <a:pPr/>
-              <a:t>10/26/2012</a:t>
+              <a:t>10/28/2012</a:t>
             </a:fld>
             <a:endParaRPr lang="en-US"/>
           </a:p>
@@ -6792,7 +6798,7 @@
             <a:fld id="{1D8BD707-D9CF-40AE-B4C6-C98DA3205C09}" type="datetimeFigureOut">
               <a:rPr lang="en-US" smtClean="0"/>
               <a:pPr/>
-              <a:t>10/26/2012</a:t>
+              <a:t>10/28/2012</a:t>
             </a:fld>
             <a:endParaRPr lang="en-US"/>
           </a:p>
@@ -13406,7 +13412,69 @@
           <a:bodyPr/>
           <a:lstStyle/>
           <a:p>
-            <a:endParaRPr lang="en-US" dirty="0"/>
+            <a:r>
+              <a:rPr lang="en-US" dirty="0" smtClean="0"/>
+              <a:t>From Figure 4 we see that the</a:t>
+            </a:r>
+            <a:br>
+              <a:rPr lang="en-US" dirty="0" smtClean="0"/>
+            </a:br>
+            <a:r>
+              <a:rPr lang="en-US" dirty="0" smtClean="0"/>
+              <a:t>FTM has the highest average</a:t>
+            </a:r>
+            <a:r>
+              <a:rPr lang="en-US" dirty="0"/>
+              <a:t/>
+            </a:r>
+            <a:br>
+              <a:rPr lang="en-US" dirty="0"/>
+            </a:br>
+            <a:r>
+              <a:rPr lang="en-US" dirty="0" smtClean="0"/>
+              <a:t>velocity. This is due to lack of</a:t>
+            </a:r>
+            <a:r>
+              <a:rPr lang="en-US" dirty="0" smtClean="0"/>
+              <a:t/>
+            </a:r>
+            <a:br>
+              <a:rPr lang="en-US" dirty="0" smtClean="0"/>
+            </a:br>
+            <a:r>
+              <a:rPr lang="en-US" dirty="0" smtClean="0"/>
+              <a:t>intersection modeling and that</a:t>
+            </a:r>
+            <a:br>
+              <a:rPr lang="en-US" dirty="0" smtClean="0"/>
+            </a:br>
+            <a:r>
+              <a:rPr lang="en-US" dirty="0" smtClean="0"/>
+              <a:t>the model does not allow </a:t>
+            </a:r>
+            <a:r>
+              <a:rPr lang="en-US" dirty="0" smtClean="0"/>
+              <a:t/>
+            </a:r>
+            <a:br>
+              <a:rPr lang="en-US" dirty="0" smtClean="0"/>
+            </a:br>
+            <a:r>
+              <a:rPr lang="en-US" dirty="0" smtClean="0"/>
+              <a:t>vehicles to reach 0 m/s</a:t>
+            </a:r>
+          </a:p>
+          <a:p>
+            <a:r>
+              <a:rPr lang="en-US" dirty="0" smtClean="0"/>
+              <a:t>From the road topology, we see the greatest build up of vehicles between points A and B</a:t>
+            </a:r>
+          </a:p>
+          <a:p>
+            <a:r>
+              <a:rPr lang="en-US" dirty="0" smtClean="0"/>
+              <a:t>All other intersections have relatively same density before and after intersections which is unrealistic. This is due to the lack of intersection modeling</a:t>
+            </a:r>
           </a:p>
         </p:txBody>
       </p:sp>
@@ -13482,6 +13550,178 @@
       </p:par>
     </p:tnLst>
   </p:timing>
+</p:sld>
+</file>
+
+<file path=ppt/slides/slide39.xml><?xml version="1.0" encoding="utf-8"?>
+<p:sld xmlns:a="http://schemas.openxmlformats.org/drawingml/2006/main" xmlns:r="http://schemas.openxmlformats.org/officeDocument/2006/relationships" xmlns:p="http://schemas.openxmlformats.org/presentationml/2006/main">
+  <p:cSld>
+    <p:spTree>
+      <p:nvGrpSpPr>
+        <p:cNvPr id="1" name=""/>
+        <p:cNvGrpSpPr/>
+        <p:nvPr/>
+      </p:nvGrpSpPr>
+      <p:grpSpPr>
+        <a:xfrm>
+          <a:off x="0" y="0"/>
+          <a:ext cx="0" cy="0"/>
+          <a:chOff x="0" y="0"/>
+          <a:chExt cx="0" cy="0"/>
+        </a:xfrm>
+      </p:grpSpPr>
+      <p:sp>
+        <p:nvSpPr>
+          <p:cNvPr id="2" name="Title 1"/>
+          <p:cNvSpPr>
+            <a:spLocks noGrp="1"/>
+          </p:cNvSpPr>
+          <p:nvPr>
+            <p:ph type="title"/>
+          </p:nvPr>
+        </p:nvSpPr>
+        <p:spPr/>
+        <p:txBody>
+          <a:bodyPr>
+            <a:normAutofit fontScale="90000"/>
+          </a:bodyPr>
+          <a:lstStyle/>
+          <a:p>
+            <a:r>
+              <a:rPr lang="en-US" dirty="0" smtClean="0"/>
+              <a:t>IDM (Intelligent Driver Model) Simulation</a:t>
+            </a:r>
+            <a:endParaRPr lang="en-US" dirty="0"/>
+          </a:p>
+        </p:txBody>
+      </p:sp>
+      <p:sp>
+        <p:nvSpPr>
+          <p:cNvPr id="3" name="Content Placeholder 2"/>
+          <p:cNvSpPr>
+            <a:spLocks noGrp="1"/>
+          </p:cNvSpPr>
+          <p:nvPr>
+            <p:ph sz="quarter" idx="1"/>
+          </p:nvPr>
+        </p:nvSpPr>
+        <p:spPr/>
+        <p:txBody>
+          <a:bodyPr/>
+          <a:lstStyle/>
+          <a:p>
+            <a:r>
+              <a:rPr lang="en-US" dirty="0" smtClean="0"/>
+              <a:t>IDM follows a car following model</a:t>
+            </a:r>
+            <a:br>
+              <a:rPr lang="en-US" dirty="0" smtClean="0"/>
+            </a:br>
+            <a:r>
+              <a:rPr lang="en-US" dirty="0" smtClean="0"/>
+              <a:t>because it reacts to the vehicle</a:t>
+            </a:r>
+            <a:br>
+              <a:rPr lang="en-US" dirty="0" smtClean="0"/>
+            </a:br>
+            <a:r>
+              <a:rPr lang="en-US" dirty="0" smtClean="0"/>
+              <a:t>directly in front</a:t>
+            </a:r>
+          </a:p>
+          <a:p>
+            <a:r>
+              <a:rPr lang="en-US" dirty="0" smtClean="0"/>
+              <a:t>Attempts to maintain a desired</a:t>
+            </a:r>
+            <a:br>
+              <a:rPr lang="en-US" dirty="0" smtClean="0"/>
+            </a:br>
+            <a:r>
+              <a:rPr lang="en-US" dirty="0" smtClean="0"/>
+              <a:t>dynamical distance from vehicles</a:t>
+            </a:r>
+          </a:p>
+          <a:p>
+            <a:r>
+              <a:rPr lang="en-US" dirty="0" smtClean="0"/>
+              <a:t>Intersections A, B, and C have a significant increase in density as each vehicle attempts to maintain a safe distance from cross traffic as well as the vehicle immediately in front</a:t>
+            </a:r>
+          </a:p>
+          <a:p>
+            <a:r>
+              <a:rPr lang="en-US" dirty="0" smtClean="0"/>
+              <a:t>Again, the lack of intersection modeling there is a disproportionate density at busy intersections</a:t>
+            </a:r>
+            <a:endParaRPr lang="en-US" dirty="0"/>
+          </a:p>
+        </p:txBody>
+      </p:sp>
+      <p:sp>
+        <p:nvSpPr>
+          <p:cNvPr id="4" name="TextBox 3"/>
+          <p:cNvSpPr txBox="1"/>
+          <p:nvPr/>
+        </p:nvSpPr>
+        <p:spPr>
+          <a:xfrm>
+            <a:off x="609600" y="6400800"/>
+            <a:ext cx="6172200" cy="276999"/>
+          </a:xfrm>
+          <a:prstGeom prst="rect">
+            <a:avLst/>
+          </a:prstGeom>
+          <a:noFill/>
+        </p:spPr>
+        <p:txBody>
+          <a:bodyPr wrap="square" rtlCol="0">
+            <a:spAutoFit/>
+          </a:bodyPr>
+          <a:lstStyle/>
+          <a:p>
+            <a:r>
+              <a:rPr lang="en-US" sz="1200" b="1" dirty="0" smtClean="0"/>
+              <a:t>Vehicular Mobility Simulation for VANETs</a:t>
+            </a:r>
+            <a:endParaRPr lang="en-US" sz="1200" b="1" dirty="0"/>
+          </a:p>
+        </p:txBody>
+      </p:sp>
+      <p:pic>
+        <p:nvPicPr>
+          <p:cNvPr id="5" name="Picture 4"/>
+          <p:cNvPicPr/>
+          <p:nvPr/>
+        </p:nvPicPr>
+        <p:blipFill>
+          <a:blip r:embed="rId2" cstate="print"/>
+          <a:srcRect/>
+          <a:stretch>
+            <a:fillRect/>
+          </a:stretch>
+        </p:blipFill>
+        <p:spPr bwMode="auto">
+          <a:xfrm>
+            <a:off x="5410200" y="1219200"/>
+            <a:ext cx="3231671" cy="2057400"/>
+          </a:xfrm>
+          <a:prstGeom prst="rect">
+            <a:avLst/>
+          </a:prstGeom>
+          <a:noFill/>
+          <a:ln w="9525">
+            <a:noFill/>
+            <a:miter lim="800000"/>
+            <a:headEnd/>
+            <a:tailEnd/>
+          </a:ln>
+        </p:spPr>
+      </p:pic>
+    </p:spTree>
+  </p:cSld>
+  <p:clrMapOvr>
+    <a:masterClrMapping/>
+  </p:clrMapOvr>
 </p:sld>
 </file>
 
@@ -13609,6 +13849,929 @@
       </p:par>
     </p:tnLst>
   </p:timing>
+</p:sld>
+</file>
+
+<file path=ppt/slides/slide40.xml><?xml version="1.0" encoding="utf-8"?>
+<p:sld xmlns:a="http://schemas.openxmlformats.org/drawingml/2006/main" xmlns:r="http://schemas.openxmlformats.org/officeDocument/2006/relationships" xmlns:p="http://schemas.openxmlformats.org/presentationml/2006/main">
+  <p:cSld>
+    <p:spTree>
+      <p:nvGrpSpPr>
+        <p:cNvPr id="1" name=""/>
+        <p:cNvGrpSpPr/>
+        <p:nvPr/>
+      </p:nvGrpSpPr>
+      <p:grpSpPr>
+        <a:xfrm>
+          <a:off x="0" y="0"/>
+          <a:ext cx="0" cy="0"/>
+          <a:chOff x="0" y="0"/>
+          <a:chExt cx="0" cy="0"/>
+        </a:xfrm>
+      </p:grpSpPr>
+      <p:sp>
+        <p:nvSpPr>
+          <p:cNvPr id="2" name="Title 1"/>
+          <p:cNvSpPr>
+            <a:spLocks noGrp="1"/>
+          </p:cNvSpPr>
+          <p:nvPr>
+            <p:ph type="title"/>
+          </p:nvPr>
+        </p:nvSpPr>
+        <p:spPr/>
+        <p:txBody>
+          <a:bodyPr/>
+          <a:lstStyle/>
+          <a:p>
+            <a:r>
+              <a:rPr lang="en-US" dirty="0" smtClean="0"/>
+              <a:t>IDM-IM with Stop Lights Simulation</a:t>
+            </a:r>
+            <a:endParaRPr lang="en-US" dirty="0"/>
+          </a:p>
+        </p:txBody>
+      </p:sp>
+      <p:sp>
+        <p:nvSpPr>
+          <p:cNvPr id="3" name="Content Placeholder 2"/>
+          <p:cNvSpPr>
+            <a:spLocks noGrp="1"/>
+          </p:cNvSpPr>
+          <p:nvPr>
+            <p:ph sz="quarter" idx="1"/>
+          </p:nvPr>
+        </p:nvSpPr>
+        <p:spPr/>
+        <p:txBody>
+          <a:bodyPr/>
+          <a:lstStyle/>
+          <a:p>
+            <a:r>
+              <a:rPr lang="en-US" dirty="0" smtClean="0"/>
+              <a:t>The average velocity is slower than </a:t>
+            </a:r>
+            <a:br>
+              <a:rPr lang="en-US" dirty="0" smtClean="0"/>
+            </a:br>
+            <a:r>
+              <a:rPr lang="en-US" dirty="0" smtClean="0"/>
+              <a:t>IDM. This is because of the many</a:t>
+            </a:r>
+            <a:br>
+              <a:rPr lang="en-US" dirty="0" smtClean="0"/>
+            </a:br>
+            <a:r>
+              <a:rPr lang="en-US" dirty="0" smtClean="0"/>
+              <a:t>stops as a result of the stop signs</a:t>
+            </a:r>
+          </a:p>
+          <a:p>
+            <a:r>
+              <a:rPr lang="en-US" dirty="0" smtClean="0"/>
+              <a:t>The busy intersections A, B, and C</a:t>
+            </a:r>
+            <a:br>
+              <a:rPr lang="en-US" dirty="0" smtClean="0"/>
+            </a:br>
+            <a:r>
+              <a:rPr lang="en-US" dirty="0" smtClean="0"/>
+              <a:t>notice the smooth transition from low to high density as a vehicle approaches the intersection. This is the queuing affect due many vehicles waiting their turn to cross</a:t>
+            </a:r>
+          </a:p>
+          <a:p>
+            <a:r>
+              <a:rPr lang="en-US" dirty="0" smtClean="0"/>
+              <a:t>Every other intersection has a slight increase in density also due to the mandatory stop at intersections</a:t>
+            </a:r>
+            <a:endParaRPr lang="en-US" dirty="0"/>
+          </a:p>
+        </p:txBody>
+      </p:sp>
+      <p:pic>
+        <p:nvPicPr>
+          <p:cNvPr id="4" name="Picture 3"/>
+          <p:cNvPicPr/>
+          <p:nvPr/>
+        </p:nvPicPr>
+        <p:blipFill>
+          <a:blip r:embed="rId2" cstate="print"/>
+          <a:srcRect/>
+          <a:stretch>
+            <a:fillRect/>
+          </a:stretch>
+        </p:blipFill>
+        <p:spPr bwMode="auto">
+          <a:xfrm>
+            <a:off x="5791200" y="1219200"/>
+            <a:ext cx="2922558" cy="1674851"/>
+          </a:xfrm>
+          <a:prstGeom prst="rect">
+            <a:avLst/>
+          </a:prstGeom>
+          <a:noFill/>
+          <a:ln w="9525">
+            <a:noFill/>
+            <a:miter lim="800000"/>
+            <a:headEnd/>
+            <a:tailEnd/>
+          </a:ln>
+        </p:spPr>
+      </p:pic>
+      <p:sp>
+        <p:nvSpPr>
+          <p:cNvPr id="5" name="TextBox 4"/>
+          <p:cNvSpPr txBox="1"/>
+          <p:nvPr/>
+        </p:nvSpPr>
+        <p:spPr>
+          <a:xfrm>
+            <a:off x="609600" y="6400800"/>
+            <a:ext cx="6172200" cy="276999"/>
+          </a:xfrm>
+          <a:prstGeom prst="rect">
+            <a:avLst/>
+          </a:prstGeom>
+          <a:noFill/>
+        </p:spPr>
+        <p:txBody>
+          <a:bodyPr wrap="square" rtlCol="0">
+            <a:spAutoFit/>
+          </a:bodyPr>
+          <a:lstStyle/>
+          <a:p>
+            <a:r>
+              <a:rPr lang="en-US" sz="1200" b="1" dirty="0" smtClean="0"/>
+              <a:t>Vehicular Mobility Simulation for VANETs</a:t>
+            </a:r>
+            <a:endParaRPr lang="en-US" sz="1200" b="1" dirty="0"/>
+          </a:p>
+        </p:txBody>
+      </p:sp>
+    </p:spTree>
+  </p:cSld>
+  <p:clrMapOvr>
+    <a:masterClrMapping/>
+  </p:clrMapOvr>
+</p:sld>
+</file>
+
+<file path=ppt/slides/slide41.xml><?xml version="1.0" encoding="utf-8"?>
+<p:sld xmlns:a="http://schemas.openxmlformats.org/drawingml/2006/main" xmlns:r="http://schemas.openxmlformats.org/officeDocument/2006/relationships" xmlns:p="http://schemas.openxmlformats.org/presentationml/2006/main">
+  <p:cSld>
+    <p:spTree>
+      <p:nvGrpSpPr>
+        <p:cNvPr id="1" name=""/>
+        <p:cNvGrpSpPr/>
+        <p:nvPr/>
+      </p:nvGrpSpPr>
+      <p:grpSpPr>
+        <a:xfrm>
+          <a:off x="0" y="0"/>
+          <a:ext cx="0" cy="0"/>
+          <a:chOff x="0" y="0"/>
+          <a:chExt cx="0" cy="0"/>
+        </a:xfrm>
+      </p:grpSpPr>
+      <p:sp>
+        <p:nvSpPr>
+          <p:cNvPr id="2" name="Title 1"/>
+          <p:cNvSpPr>
+            <a:spLocks noGrp="1"/>
+          </p:cNvSpPr>
+          <p:nvPr>
+            <p:ph type="title"/>
+          </p:nvPr>
+        </p:nvSpPr>
+        <p:spPr/>
+        <p:txBody>
+          <a:bodyPr/>
+          <a:lstStyle/>
+          <a:p>
+            <a:r>
+              <a:rPr lang="en-US" dirty="0" smtClean="0"/>
+              <a:t>IDM-IM with Traffic Signals Simulation</a:t>
+            </a:r>
+            <a:endParaRPr lang="en-US" dirty="0"/>
+          </a:p>
+        </p:txBody>
+      </p:sp>
+      <p:sp>
+        <p:nvSpPr>
+          <p:cNvPr id="3" name="Content Placeholder 2"/>
+          <p:cNvSpPr>
+            <a:spLocks noGrp="1"/>
+          </p:cNvSpPr>
+          <p:nvPr>
+            <p:ph sz="quarter" idx="1"/>
+          </p:nvPr>
+        </p:nvSpPr>
+        <p:spPr/>
+        <p:txBody>
+          <a:bodyPr/>
+          <a:lstStyle/>
+          <a:p>
+            <a:r>
+              <a:rPr lang="en-US" dirty="0" smtClean="0"/>
+              <a:t>At the busy intersections A, B, and C</a:t>
+            </a:r>
+            <a:br>
+              <a:rPr lang="en-US" dirty="0" smtClean="0"/>
+            </a:br>
+            <a:r>
+              <a:rPr lang="en-US" dirty="0" smtClean="0"/>
+              <a:t>we notice an increase in density, but</a:t>
+            </a:r>
+            <a:br>
+              <a:rPr lang="en-US" dirty="0" smtClean="0"/>
+            </a:br>
+            <a:r>
+              <a:rPr lang="en-US" dirty="0" smtClean="0"/>
+              <a:t>not as much as with stop signs. This</a:t>
+            </a:r>
+            <a:br>
+              <a:rPr lang="en-US" dirty="0" smtClean="0"/>
+            </a:br>
+            <a:r>
+              <a:rPr lang="en-US" dirty="0" smtClean="0"/>
+              <a:t>is because traffic signals allow for </a:t>
+            </a:r>
+            <a:br>
+              <a:rPr lang="en-US" dirty="0" smtClean="0"/>
+            </a:br>
+            <a:r>
+              <a:rPr lang="en-US" dirty="0" smtClean="0"/>
+              <a:t>bursts of traffic to travel through the intersection</a:t>
+            </a:r>
+          </a:p>
+          <a:p>
+            <a:r>
+              <a:rPr lang="en-US" dirty="0" smtClean="0"/>
+              <a:t>The non busy intersections have a slightly higher density than with stop signs. This is because if vehicles are caught at a red light on non busy intersections, they are mandated to wait until the signal turns green</a:t>
+            </a:r>
+            <a:endParaRPr lang="en-US" dirty="0"/>
+          </a:p>
+        </p:txBody>
+      </p:sp>
+      <p:sp>
+        <p:nvSpPr>
+          <p:cNvPr id="4" name="TextBox 3"/>
+          <p:cNvSpPr txBox="1"/>
+          <p:nvPr/>
+        </p:nvSpPr>
+        <p:spPr>
+          <a:xfrm>
+            <a:off x="609600" y="6400800"/>
+            <a:ext cx="6172200" cy="276999"/>
+          </a:xfrm>
+          <a:prstGeom prst="rect">
+            <a:avLst/>
+          </a:prstGeom>
+          <a:noFill/>
+        </p:spPr>
+        <p:txBody>
+          <a:bodyPr wrap="square" rtlCol="0">
+            <a:spAutoFit/>
+          </a:bodyPr>
+          <a:lstStyle/>
+          <a:p>
+            <a:r>
+              <a:rPr lang="en-US" sz="1200" b="1" dirty="0" smtClean="0"/>
+              <a:t>Vehicular Mobility Simulation for VANETs</a:t>
+            </a:r>
+            <a:endParaRPr lang="en-US" sz="1200" b="1" dirty="0"/>
+          </a:p>
+        </p:txBody>
+      </p:sp>
+      <p:pic>
+        <p:nvPicPr>
+          <p:cNvPr id="6" name="Picture 5"/>
+          <p:cNvPicPr/>
+          <p:nvPr/>
+        </p:nvPicPr>
+        <p:blipFill>
+          <a:blip r:embed="rId2" cstate="print"/>
+          <a:srcRect/>
+          <a:stretch>
+            <a:fillRect/>
+          </a:stretch>
+        </p:blipFill>
+        <p:spPr bwMode="auto">
+          <a:xfrm>
+            <a:off x="5791200" y="1219200"/>
+            <a:ext cx="2849336" cy="1587260"/>
+          </a:xfrm>
+          <a:prstGeom prst="rect">
+            <a:avLst/>
+          </a:prstGeom>
+          <a:noFill/>
+          <a:ln w="9525">
+            <a:noFill/>
+            <a:miter lim="800000"/>
+            <a:headEnd/>
+            <a:tailEnd/>
+          </a:ln>
+        </p:spPr>
+      </p:pic>
+    </p:spTree>
+  </p:cSld>
+  <p:clrMapOvr>
+    <a:masterClrMapping/>
+  </p:clrMapOvr>
+</p:sld>
+</file>
+
+<file path=ppt/slides/slide42.xml><?xml version="1.0" encoding="utf-8"?>
+<p:sld xmlns:a="http://schemas.openxmlformats.org/drawingml/2006/main" xmlns:r="http://schemas.openxmlformats.org/officeDocument/2006/relationships" xmlns:p="http://schemas.openxmlformats.org/presentationml/2006/main">
+  <p:cSld>
+    <p:spTree>
+      <p:nvGrpSpPr>
+        <p:cNvPr id="1" name=""/>
+        <p:cNvGrpSpPr/>
+        <p:nvPr/>
+      </p:nvGrpSpPr>
+      <p:grpSpPr>
+        <a:xfrm>
+          <a:off x="0" y="0"/>
+          <a:ext cx="0" cy="0"/>
+          <a:chOff x="0" y="0"/>
+          <a:chExt cx="0" cy="0"/>
+        </a:xfrm>
+      </p:grpSpPr>
+      <p:sp>
+        <p:nvSpPr>
+          <p:cNvPr id="2" name="Title 1"/>
+          <p:cNvSpPr>
+            <a:spLocks noGrp="1"/>
+          </p:cNvSpPr>
+          <p:nvPr>
+            <p:ph type="title"/>
+          </p:nvPr>
+        </p:nvSpPr>
+        <p:spPr/>
+        <p:txBody>
+          <a:bodyPr/>
+          <a:lstStyle/>
+          <a:p>
+            <a:r>
+              <a:rPr lang="en-US" dirty="0" smtClean="0"/>
+              <a:t>IDM-LC (Lane Change) Simulation</a:t>
+            </a:r>
+            <a:endParaRPr lang="en-US" dirty="0"/>
+          </a:p>
+        </p:txBody>
+      </p:sp>
+      <p:sp>
+        <p:nvSpPr>
+          <p:cNvPr id="3" name="Content Placeholder 2"/>
+          <p:cNvSpPr>
+            <a:spLocks noGrp="1"/>
+          </p:cNvSpPr>
+          <p:nvPr>
+            <p:ph sz="quarter" idx="1"/>
+          </p:nvPr>
+        </p:nvSpPr>
+        <p:spPr/>
+        <p:txBody>
+          <a:bodyPr/>
+          <a:lstStyle/>
+          <a:p>
+            <a:r>
+              <a:rPr lang="en-US" dirty="0" smtClean="0"/>
+              <a:t>Looking at figure 4 we see in the </a:t>
+            </a:r>
+            <a:br>
+              <a:rPr lang="en-US" dirty="0" smtClean="0"/>
+            </a:br>
+            <a:r>
+              <a:rPr lang="en-US" dirty="0" smtClean="0"/>
+              <a:t>simulation that as traffic density</a:t>
+            </a:r>
+            <a:br>
+              <a:rPr lang="en-US" dirty="0" smtClean="0"/>
+            </a:br>
+            <a:r>
+              <a:rPr lang="en-US" dirty="0" smtClean="0"/>
+              <a:t>increases, the average vehicular</a:t>
+            </a:r>
+            <a:br>
+              <a:rPr lang="en-US" dirty="0" smtClean="0"/>
+            </a:br>
+            <a:r>
+              <a:rPr lang="en-US" dirty="0" smtClean="0"/>
+              <a:t>velocity declines only slightly. The </a:t>
+            </a:r>
+            <a:br>
+              <a:rPr lang="en-US" dirty="0" smtClean="0"/>
+            </a:br>
+            <a:r>
+              <a:rPr lang="en-US" dirty="0" smtClean="0"/>
+              <a:t>ability to change lanes and avoid slower drivers attributes to this phenomena</a:t>
+            </a:r>
+          </a:p>
+          <a:p>
+            <a:r>
+              <a:rPr lang="en-US" dirty="0" smtClean="0"/>
+              <a:t>At intersections A, B, and C we can also see that the ability to change lanes also decreased the density at those busy intersections</a:t>
+            </a:r>
+          </a:p>
+          <a:p>
+            <a:r>
+              <a:rPr lang="en-US" dirty="0" smtClean="0"/>
+              <a:t>Having the ability to change lanes decreased the density at busy intersections significantly</a:t>
+            </a:r>
+            <a:endParaRPr lang="en-US" dirty="0"/>
+          </a:p>
+        </p:txBody>
+      </p:sp>
+      <p:pic>
+        <p:nvPicPr>
+          <p:cNvPr id="4" name="Picture 3"/>
+          <p:cNvPicPr/>
+          <p:nvPr/>
+        </p:nvPicPr>
+        <p:blipFill>
+          <a:blip r:embed="rId2" cstate="print"/>
+          <a:srcRect/>
+          <a:stretch>
+            <a:fillRect/>
+          </a:stretch>
+        </p:blipFill>
+        <p:spPr bwMode="auto">
+          <a:xfrm>
+            <a:off x="5638800" y="1219201"/>
+            <a:ext cx="2994444" cy="1676400"/>
+          </a:xfrm>
+          <a:prstGeom prst="rect">
+            <a:avLst/>
+          </a:prstGeom>
+          <a:noFill/>
+          <a:ln w="9525">
+            <a:noFill/>
+            <a:miter lim="800000"/>
+            <a:headEnd/>
+            <a:tailEnd/>
+          </a:ln>
+        </p:spPr>
+      </p:pic>
+      <p:sp>
+        <p:nvSpPr>
+          <p:cNvPr id="5" name="TextBox 4"/>
+          <p:cNvSpPr txBox="1"/>
+          <p:nvPr/>
+        </p:nvSpPr>
+        <p:spPr>
+          <a:xfrm>
+            <a:off x="609600" y="6400800"/>
+            <a:ext cx="6172200" cy="276999"/>
+          </a:xfrm>
+          <a:prstGeom prst="rect">
+            <a:avLst/>
+          </a:prstGeom>
+          <a:noFill/>
+        </p:spPr>
+        <p:txBody>
+          <a:bodyPr wrap="square" rtlCol="0">
+            <a:spAutoFit/>
+          </a:bodyPr>
+          <a:lstStyle/>
+          <a:p>
+            <a:r>
+              <a:rPr lang="en-US" sz="1200" b="1" dirty="0" smtClean="0"/>
+              <a:t>Vehicular Mobility Simulation for VANETs</a:t>
+            </a:r>
+            <a:endParaRPr lang="en-US" sz="1200" b="1" dirty="0"/>
+          </a:p>
+        </p:txBody>
+      </p:sp>
+    </p:spTree>
+  </p:cSld>
+  <p:clrMapOvr>
+    <a:masterClrMapping/>
+  </p:clrMapOvr>
+  <p:timing>
+    <p:tnLst>
+      <p:par>
+        <p:cTn id="1" dur="indefinite" restart="never" nodeType="tmRoot"/>
+      </p:par>
+    </p:tnLst>
+  </p:timing>
+</p:sld>
+</file>
+
+<file path=ppt/slides/slide43.xml><?xml version="1.0" encoding="utf-8"?>
+<p:sld xmlns:a="http://schemas.openxmlformats.org/drawingml/2006/main" xmlns:r="http://schemas.openxmlformats.org/officeDocument/2006/relationships" xmlns:p="http://schemas.openxmlformats.org/presentationml/2006/main">
+  <p:cSld>
+    <p:spTree>
+      <p:nvGrpSpPr>
+        <p:cNvPr id="1" name=""/>
+        <p:cNvGrpSpPr/>
+        <p:nvPr/>
+      </p:nvGrpSpPr>
+      <p:grpSpPr>
+        <a:xfrm>
+          <a:off x="0" y="0"/>
+          <a:ext cx="0" cy="0"/>
+          <a:chOff x="0" y="0"/>
+          <a:chExt cx="0" cy="0"/>
+        </a:xfrm>
+      </p:grpSpPr>
+      <p:sp>
+        <p:nvSpPr>
+          <p:cNvPr id="2" name="Title 1"/>
+          <p:cNvSpPr>
+            <a:spLocks noGrp="1"/>
+          </p:cNvSpPr>
+          <p:nvPr>
+            <p:ph type="title"/>
+          </p:nvPr>
+        </p:nvSpPr>
+        <p:spPr/>
+        <p:txBody>
+          <a:bodyPr/>
+          <a:lstStyle/>
+          <a:p>
+            <a:r>
+              <a:rPr lang="en-US" dirty="0" smtClean="0"/>
+              <a:t>Comparison of three IDM simulations</a:t>
+            </a:r>
+            <a:endParaRPr lang="en-US" dirty="0"/>
+          </a:p>
+        </p:txBody>
+      </p:sp>
+      <p:sp>
+        <p:nvSpPr>
+          <p:cNvPr id="4" name="TextBox 3"/>
+          <p:cNvSpPr txBox="1"/>
+          <p:nvPr/>
+        </p:nvSpPr>
+        <p:spPr>
+          <a:xfrm>
+            <a:off x="609600" y="6400800"/>
+            <a:ext cx="6172200" cy="276999"/>
+          </a:xfrm>
+          <a:prstGeom prst="rect">
+            <a:avLst/>
+          </a:prstGeom>
+          <a:noFill/>
+        </p:spPr>
+        <p:txBody>
+          <a:bodyPr wrap="square" rtlCol="0">
+            <a:spAutoFit/>
+          </a:bodyPr>
+          <a:lstStyle/>
+          <a:p>
+            <a:r>
+              <a:rPr lang="en-US" sz="1200" b="1" dirty="0" smtClean="0"/>
+              <a:t>Vehicular Mobility Simulation for VANETs</a:t>
+            </a:r>
+            <a:endParaRPr lang="en-US" sz="1200" b="1" dirty="0"/>
+          </a:p>
+        </p:txBody>
+      </p:sp>
+      <p:pic>
+        <p:nvPicPr>
+          <p:cNvPr id="5" name="Picture 4"/>
+          <p:cNvPicPr/>
+          <p:nvPr/>
+        </p:nvPicPr>
+        <p:blipFill>
+          <a:blip r:embed="rId2" cstate="print"/>
+          <a:srcRect/>
+          <a:stretch>
+            <a:fillRect/>
+          </a:stretch>
+        </p:blipFill>
+        <p:spPr bwMode="auto">
+          <a:xfrm>
+            <a:off x="533400" y="1371600"/>
+            <a:ext cx="3200400" cy="2057400"/>
+          </a:xfrm>
+          <a:prstGeom prst="rect">
+            <a:avLst/>
+          </a:prstGeom>
+          <a:noFill/>
+          <a:ln w="9525">
+            <a:noFill/>
+            <a:miter lim="800000"/>
+            <a:headEnd/>
+            <a:tailEnd/>
+          </a:ln>
+        </p:spPr>
+      </p:pic>
+      <p:pic>
+        <p:nvPicPr>
+          <p:cNvPr id="6" name="Picture 5"/>
+          <p:cNvPicPr/>
+          <p:nvPr/>
+        </p:nvPicPr>
+        <p:blipFill>
+          <a:blip r:embed="rId3" cstate="print"/>
+          <a:srcRect/>
+          <a:stretch>
+            <a:fillRect/>
+          </a:stretch>
+        </p:blipFill>
+        <p:spPr bwMode="auto">
+          <a:xfrm>
+            <a:off x="4800600" y="1371600"/>
+            <a:ext cx="3535136" cy="2057400"/>
+          </a:xfrm>
+          <a:prstGeom prst="rect">
+            <a:avLst/>
+          </a:prstGeom>
+          <a:noFill/>
+          <a:ln w="9525">
+            <a:noFill/>
+            <a:miter lim="800000"/>
+            <a:headEnd/>
+            <a:tailEnd/>
+          </a:ln>
+        </p:spPr>
+      </p:pic>
+      <p:pic>
+        <p:nvPicPr>
+          <p:cNvPr id="7" name="Picture 6"/>
+          <p:cNvPicPr/>
+          <p:nvPr/>
+        </p:nvPicPr>
+        <p:blipFill>
+          <a:blip r:embed="rId4" cstate="print"/>
+          <a:srcRect/>
+          <a:stretch>
+            <a:fillRect/>
+          </a:stretch>
+        </p:blipFill>
+        <p:spPr bwMode="auto">
+          <a:xfrm>
+            <a:off x="2514600" y="4267200"/>
+            <a:ext cx="3604044" cy="2045511"/>
+          </a:xfrm>
+          <a:prstGeom prst="rect">
+            <a:avLst/>
+          </a:prstGeom>
+          <a:noFill/>
+          <a:ln w="9525">
+            <a:noFill/>
+            <a:miter lim="800000"/>
+            <a:headEnd/>
+            <a:tailEnd/>
+          </a:ln>
+        </p:spPr>
+      </p:pic>
+      <p:sp>
+        <p:nvSpPr>
+          <p:cNvPr id="10" name="Line Callout 1 9"/>
+          <p:cNvSpPr/>
+          <p:nvPr/>
+        </p:nvSpPr>
+        <p:spPr>
+          <a:xfrm>
+            <a:off x="533400" y="3429000"/>
+            <a:ext cx="1828800" cy="762000"/>
+          </a:xfrm>
+          <a:prstGeom prst="borderCallout1">
+            <a:avLst>
+              <a:gd name="adj1" fmla="val -816"/>
+              <a:gd name="adj2" fmla="val 6342"/>
+              <a:gd name="adj3" fmla="val -123286"/>
+              <a:gd name="adj4" fmla="val 39928"/>
+            </a:avLst>
+          </a:prstGeom>
+        </p:spPr>
+        <p:style>
+          <a:lnRef idx="2">
+            <a:schemeClr val="accent1">
+              <a:shade val="50000"/>
+            </a:schemeClr>
+          </a:lnRef>
+          <a:fillRef idx="1">
+            <a:schemeClr val="accent1"/>
+          </a:fillRef>
+          <a:effectRef idx="0">
+            <a:schemeClr val="accent1"/>
+          </a:effectRef>
+          <a:fontRef idx="minor">
+            <a:schemeClr val="lt1"/>
+          </a:fontRef>
+        </p:style>
+        <p:txBody>
+          <a:bodyPr rtlCol="0" anchor="ctr"/>
+          <a:lstStyle/>
+          <a:p>
+            <a:pPr algn="ctr"/>
+            <a:r>
+              <a:rPr lang="en-US" sz="1600" dirty="0" smtClean="0"/>
+              <a:t>Stop signs perform well at low travelled roads</a:t>
+            </a:r>
+            <a:endParaRPr lang="en-US" sz="1600" dirty="0"/>
+          </a:p>
+        </p:txBody>
+      </p:sp>
+      <p:sp>
+        <p:nvSpPr>
+          <p:cNvPr id="11" name="Line Callout 1 10"/>
+          <p:cNvSpPr/>
+          <p:nvPr/>
+        </p:nvSpPr>
+        <p:spPr>
+          <a:xfrm>
+            <a:off x="7543800" y="3505200"/>
+            <a:ext cx="1143000" cy="1752600"/>
+          </a:xfrm>
+          <a:prstGeom prst="borderCallout1">
+            <a:avLst>
+              <a:gd name="adj1" fmla="val 9676"/>
+              <a:gd name="adj2" fmla="val -507"/>
+              <a:gd name="adj3" fmla="val -79182"/>
+              <a:gd name="adj4" fmla="val -67898"/>
+            </a:avLst>
+          </a:prstGeom>
+        </p:spPr>
+        <p:style>
+          <a:lnRef idx="2">
+            <a:schemeClr val="accent1">
+              <a:shade val="50000"/>
+            </a:schemeClr>
+          </a:lnRef>
+          <a:fillRef idx="1">
+            <a:schemeClr val="accent1"/>
+          </a:fillRef>
+          <a:effectRef idx="0">
+            <a:schemeClr val="accent1"/>
+          </a:effectRef>
+          <a:fontRef idx="minor">
+            <a:schemeClr val="lt1"/>
+          </a:fontRef>
+        </p:style>
+        <p:txBody>
+          <a:bodyPr rtlCol="0" anchor="ctr"/>
+          <a:lstStyle/>
+          <a:p>
+            <a:pPr algn="ctr"/>
+            <a:r>
+              <a:rPr lang="en-US" sz="1600" dirty="0" smtClean="0"/>
+              <a:t>Traffic signals temper the queue effect</a:t>
+            </a:r>
+            <a:endParaRPr lang="en-US" sz="1600" dirty="0"/>
+          </a:p>
+        </p:txBody>
+      </p:sp>
+      <p:sp>
+        <p:nvSpPr>
+          <p:cNvPr id="12" name="Line Callout 1 11"/>
+          <p:cNvSpPr/>
+          <p:nvPr/>
+        </p:nvSpPr>
+        <p:spPr>
+          <a:xfrm>
+            <a:off x="457200" y="4953000"/>
+            <a:ext cx="2133600" cy="990600"/>
+          </a:xfrm>
+          <a:prstGeom prst="borderCallout1">
+            <a:avLst>
+              <a:gd name="adj1" fmla="val 9720"/>
+              <a:gd name="adj2" fmla="val 171481"/>
+              <a:gd name="adj3" fmla="val 44273"/>
+              <a:gd name="adj4" fmla="val 100021"/>
+            </a:avLst>
+          </a:prstGeom>
+        </p:spPr>
+        <p:style>
+          <a:lnRef idx="2">
+            <a:schemeClr val="accent1">
+              <a:shade val="50000"/>
+            </a:schemeClr>
+          </a:lnRef>
+          <a:fillRef idx="1">
+            <a:schemeClr val="accent1"/>
+          </a:fillRef>
+          <a:effectRef idx="0">
+            <a:schemeClr val="accent1"/>
+          </a:effectRef>
+          <a:fontRef idx="minor">
+            <a:schemeClr val="lt1"/>
+          </a:fontRef>
+        </p:style>
+        <p:txBody>
+          <a:bodyPr rtlCol="0" anchor="ctr"/>
+          <a:lstStyle/>
+          <a:p>
+            <a:pPr algn="ctr"/>
+            <a:r>
+              <a:rPr lang="en-US" sz="1600" dirty="0" smtClean="0"/>
+              <a:t>Lane changing reduces the density and queuing effect at busy intersections</a:t>
+            </a:r>
+            <a:endParaRPr lang="en-US" sz="1600" dirty="0"/>
+          </a:p>
+        </p:txBody>
+      </p:sp>
+    </p:spTree>
+  </p:cSld>
+  <p:clrMapOvr>
+    <a:masterClrMapping/>
+  </p:clrMapOvr>
+</p:sld>
+</file>
+
+<file path=ppt/slides/slide44.xml><?xml version="1.0" encoding="utf-8"?>
+<p:sld xmlns:a="http://schemas.openxmlformats.org/drawingml/2006/main" xmlns:r="http://schemas.openxmlformats.org/officeDocument/2006/relationships" xmlns:p="http://schemas.openxmlformats.org/presentationml/2006/main">
+  <p:cSld>
+    <p:spTree>
+      <p:nvGrpSpPr>
+        <p:cNvPr id="1" name=""/>
+        <p:cNvGrpSpPr/>
+        <p:nvPr/>
+      </p:nvGrpSpPr>
+      <p:grpSpPr>
+        <a:xfrm>
+          <a:off x="0" y="0"/>
+          <a:ext cx="0" cy="0"/>
+          <a:chOff x="0" y="0"/>
+          <a:chExt cx="0" cy="0"/>
+        </a:xfrm>
+      </p:grpSpPr>
+      <p:sp>
+        <p:nvSpPr>
+          <p:cNvPr id="2" name="Title 1"/>
+          <p:cNvSpPr>
+            <a:spLocks noGrp="1"/>
+          </p:cNvSpPr>
+          <p:nvPr>
+            <p:ph type="title"/>
+          </p:nvPr>
+        </p:nvSpPr>
+        <p:spPr/>
+        <p:txBody>
+          <a:bodyPr/>
+          <a:lstStyle/>
+          <a:p>
+            <a:r>
+              <a:rPr lang="en-US" dirty="0" smtClean="0"/>
+              <a:t>Conclusion on Models</a:t>
+            </a:r>
+            <a:endParaRPr lang="en-US" dirty="0"/>
+          </a:p>
+        </p:txBody>
+      </p:sp>
+      <p:sp>
+        <p:nvSpPr>
+          <p:cNvPr id="3" name="Content Placeholder 2"/>
+          <p:cNvSpPr>
+            <a:spLocks noGrp="1"/>
+          </p:cNvSpPr>
+          <p:nvPr>
+            <p:ph sz="quarter" idx="1"/>
+          </p:nvPr>
+        </p:nvSpPr>
+        <p:spPr/>
+        <p:txBody>
+          <a:bodyPr/>
+          <a:lstStyle/>
+          <a:p>
+            <a:r>
+              <a:rPr lang="en-US" dirty="0" smtClean="0"/>
+              <a:t>The main focus was setting up a model that can realistically simulate real world traffic conditions. The most realistic solutions were IDM with stop signs, traffic signals, and lane changes. As we saw, each model has it’s deficiencies and fortes. Looking at the results the best simulation would be to have a combination of each model depending on whether roads are known to be busy. Having traffic signals with lane changes at busy intersections and stop signs at quiet streets is reasonable and creates a balanced and realistic simulation for vehicular traffic.</a:t>
+            </a:r>
+            <a:endParaRPr lang="en-US" dirty="0"/>
+          </a:p>
+        </p:txBody>
+      </p:sp>
+      <p:sp>
+        <p:nvSpPr>
+          <p:cNvPr id="4" name="TextBox 3"/>
+          <p:cNvSpPr txBox="1"/>
+          <p:nvPr/>
+        </p:nvSpPr>
+        <p:spPr>
+          <a:xfrm>
+            <a:off x="609600" y="6400800"/>
+            <a:ext cx="6172200" cy="276999"/>
+          </a:xfrm>
+          <a:prstGeom prst="rect">
+            <a:avLst/>
+          </a:prstGeom>
+          <a:noFill/>
+        </p:spPr>
+        <p:txBody>
+          <a:bodyPr wrap="square" rtlCol="0">
+            <a:spAutoFit/>
+          </a:bodyPr>
+          <a:lstStyle/>
+          <a:p>
+            <a:r>
+              <a:rPr lang="en-US" sz="1200" b="1" dirty="0" smtClean="0"/>
+              <a:t>Vehicular Mobility Simulation for VANETs</a:t>
+            </a:r>
+            <a:endParaRPr lang="en-US" sz="1200" b="1" dirty="0"/>
+          </a:p>
+        </p:txBody>
+      </p:sp>
+    </p:spTree>
+  </p:cSld>
+  <p:clrMapOvr>
+    <a:masterClrMapping/>
+  </p:clrMapOvr>
 </p:sld>
 </file>
 

</xml_diff>

<commit_message>
Started the last paper's power point
</commit_message>
<xml_diff>
--- a/VANET_Felix.pptx
+++ b/VANET_Felix.pptx
@@ -5,7 +5,7 @@
     <p:sldMasterId id="2147483696" r:id="rId1"/>
   </p:sldMasterIdLst>
   <p:notesMasterIdLst>
-    <p:notesMasterId r:id="rId64"/>
+    <p:notesMasterId r:id="rId73"/>
   </p:notesMasterIdLst>
   <p:sldIdLst>
     <p:sldId id="280" r:id="rId2"/>
@@ -70,6 +70,15 @@
     <p:sldId id="326" r:id="rId61"/>
     <p:sldId id="327" r:id="rId62"/>
     <p:sldId id="328" r:id="rId63"/>
+    <p:sldId id="329" r:id="rId64"/>
+    <p:sldId id="330" r:id="rId65"/>
+    <p:sldId id="331" r:id="rId66"/>
+    <p:sldId id="332" r:id="rId67"/>
+    <p:sldId id="333" r:id="rId68"/>
+    <p:sldId id="334" r:id="rId69"/>
+    <p:sldId id="335" r:id="rId70"/>
+    <p:sldId id="336" r:id="rId71"/>
+    <p:sldId id="337" r:id="rId72"/>
   </p:sldIdLst>
   <p:sldSz cx="9144000" cy="6858000" type="screen4x3"/>
   <p:notesSz cx="6858000" cy="9144000"/>
@@ -2998,7 +3007,7 @@
             <a:fld id="{AA1794F1-29D0-4E50-8F0F-8A456A29C142}" type="datetimeFigureOut">
               <a:rPr lang="en-US" smtClean="0"/>
               <a:pPr/>
-              <a:t>11/9/2012</a:t>
+              <a:t>11/16/2012</a:t>
             </a:fld>
             <a:endParaRPr lang="en-US"/>
           </a:p>
@@ -3790,7 +3799,7 @@
             <a:fld id="{1D8BD707-D9CF-40AE-B4C6-C98DA3205C09}" type="datetimeFigureOut">
               <a:rPr lang="en-US" smtClean="0"/>
               <a:pPr/>
-              <a:t>11/9/2012</a:t>
+              <a:t>11/16/2012</a:t>
             </a:fld>
             <a:endParaRPr lang="en-US"/>
           </a:p>
@@ -4151,7 +4160,7 @@
             <a:fld id="{1D8BD707-D9CF-40AE-B4C6-C98DA3205C09}" type="datetimeFigureOut">
               <a:rPr lang="en-US" smtClean="0"/>
               <a:pPr/>
-              <a:t>11/9/2012</a:t>
+              <a:t>11/16/2012</a:t>
             </a:fld>
             <a:endParaRPr lang="en-US"/>
           </a:p>
@@ -4328,7 +4337,7 @@
             <a:fld id="{1D8BD707-D9CF-40AE-B4C6-C98DA3205C09}" type="datetimeFigureOut">
               <a:rPr lang="en-US" smtClean="0"/>
               <a:pPr/>
-              <a:t>11/9/2012</a:t>
+              <a:t>11/16/2012</a:t>
             </a:fld>
             <a:endParaRPr lang="en-US"/>
           </a:p>
@@ -4565,7 +4574,7 @@
             <a:fld id="{1D8BD707-D9CF-40AE-B4C6-C98DA3205C09}" type="datetimeFigureOut">
               <a:rPr lang="en-US" smtClean="0"/>
               <a:pPr/>
-              <a:t>11/9/2012</a:t>
+              <a:t>11/16/2012</a:t>
             </a:fld>
             <a:endParaRPr lang="en-US"/>
           </a:p>
@@ -4836,7 +4845,7 @@
             <a:fld id="{1D8BD707-D9CF-40AE-B4C6-C98DA3205C09}" type="datetimeFigureOut">
               <a:rPr lang="en-US" smtClean="0"/>
               <a:pPr/>
-              <a:t>11/9/2012</a:t>
+              <a:t>11/16/2012</a:t>
             </a:fld>
             <a:endParaRPr lang="en-US"/>
           </a:p>
@@ -5058,7 +5067,7 @@
             <a:fld id="{1D8BD707-D9CF-40AE-B4C6-C98DA3205C09}" type="datetimeFigureOut">
               <a:rPr lang="en-US" smtClean="0"/>
               <a:pPr/>
-              <a:t>11/9/2012</a:t>
+              <a:t>11/16/2012</a:t>
             </a:fld>
             <a:endParaRPr lang="en-US"/>
           </a:p>
@@ -5412,7 +5421,7 @@
             <a:fld id="{1D8BD707-D9CF-40AE-B4C6-C98DA3205C09}" type="datetimeFigureOut">
               <a:rPr lang="en-US" smtClean="0"/>
               <a:pPr/>
-              <a:t>11/9/2012</a:t>
+              <a:t>11/16/2012</a:t>
             </a:fld>
             <a:endParaRPr lang="en-US"/>
           </a:p>
@@ -5646,7 +5655,7 @@
             <a:fld id="{1D8BD707-D9CF-40AE-B4C6-C98DA3205C09}" type="datetimeFigureOut">
               <a:rPr lang="en-US" smtClean="0"/>
               <a:pPr/>
-              <a:t>11/9/2012</a:t>
+              <a:t>11/16/2012</a:t>
             </a:fld>
             <a:endParaRPr lang="en-US"/>
           </a:p>
@@ -5788,7 +5797,7 @@
             <a:fld id="{1D8BD707-D9CF-40AE-B4C6-C98DA3205C09}" type="datetimeFigureOut">
               <a:rPr lang="en-US" smtClean="0"/>
               <a:pPr/>
-              <a:t>11/9/2012</a:t>
+              <a:t>11/16/2012</a:t>
             </a:fld>
             <a:endParaRPr lang="en-US"/>
           </a:p>
@@ -6067,7 +6076,7 @@
             <a:fld id="{1D8BD707-D9CF-40AE-B4C6-C98DA3205C09}" type="datetimeFigureOut">
               <a:rPr lang="en-US" smtClean="0"/>
               <a:pPr/>
-              <a:t>11/9/2012</a:t>
+              <a:t>11/16/2012</a:t>
             </a:fld>
             <a:endParaRPr lang="en-US"/>
           </a:p>
@@ -6476,7 +6485,7 @@
             <a:fld id="{1D8BD707-D9CF-40AE-B4C6-C98DA3205C09}" type="datetimeFigureOut">
               <a:rPr lang="en-US" smtClean="0"/>
               <a:pPr/>
-              <a:t>11/9/2012</a:t>
+              <a:t>11/16/2012</a:t>
             </a:fld>
             <a:endParaRPr lang="en-US"/>
           </a:p>
@@ -6816,7 +6825,7 @@
             <a:fld id="{1D8BD707-D9CF-40AE-B4C6-C98DA3205C09}" type="datetimeFigureOut">
               <a:rPr lang="en-US" smtClean="0"/>
               <a:pPr/>
-              <a:t>11/9/2012</a:t>
+              <a:t>11/16/2012</a:t>
             </a:fld>
             <a:endParaRPr lang="en-US"/>
           </a:p>
@@ -14984,11 +14993,7 @@
           <a:p>
             <a:r>
               <a:rPr lang="en-US" dirty="0" smtClean="0"/>
-              <a:t>This articl</a:t>
-            </a:r>
-            <a:r>
-              <a:rPr lang="en-US" dirty="0" smtClean="0"/>
-              <a:t>e will outline a developed framework for analyzing the relationship of vehicle speed, traffic flow, and transmission range in a VANET.</a:t>
+              <a:t>This article will outline a developed framework for analyzing the relationship of vehicle speed, traffic flow, and transmission range in a VANET.</a:t>
             </a:r>
             <a:endParaRPr lang="en-US" dirty="0"/>
           </a:p>
@@ -18675,7 +18680,7 @@
           <a:bodyPr/>
           <a:lstStyle/>
           <a:p>
-            <a:endParaRPr lang="en-US"/>
+            <a:endParaRPr lang="en-US" dirty="0"/>
           </a:p>
         </p:txBody>
       </p:sp>
@@ -20304,6 +20309,1221 @@
 </p:sld>
 </file>
 
+<file path=ppt/slides/slide63.xml><?xml version="1.0" encoding="utf-8"?>
+<p:sld xmlns:a="http://schemas.openxmlformats.org/drawingml/2006/main" xmlns:r="http://schemas.openxmlformats.org/officeDocument/2006/relationships" xmlns:p="http://schemas.openxmlformats.org/presentationml/2006/main">
+  <p:cSld>
+    <p:spTree>
+      <p:nvGrpSpPr>
+        <p:cNvPr id="1" name=""/>
+        <p:cNvGrpSpPr/>
+        <p:nvPr/>
+      </p:nvGrpSpPr>
+      <p:grpSpPr>
+        <a:xfrm>
+          <a:off x="0" y="0"/>
+          <a:ext cx="0" cy="0"/>
+          <a:chOff x="0" y="0"/>
+          <a:chExt cx="0" cy="0"/>
+        </a:xfrm>
+      </p:grpSpPr>
+      <p:sp>
+        <p:nvSpPr>
+          <p:cNvPr id="5" name="Title 4"/>
+          <p:cNvSpPr>
+            <a:spLocks noGrp="1"/>
+          </p:cNvSpPr>
+          <p:nvPr>
+            <p:ph type="ctrTitle"/>
+          </p:nvPr>
+        </p:nvSpPr>
+        <p:spPr/>
+        <p:txBody>
+          <a:bodyPr>
+            <a:normAutofit/>
+          </a:bodyPr>
+          <a:lstStyle/>
+          <a:p>
+            <a:r>
+              <a:rPr lang="en-US" sz="2400" b="1" dirty="0" smtClean="0"/>
+              <a:t>An Improved Vehicular Ad Hoc Routing Protocol for City Environments</a:t>
+            </a:r>
+            <a:endParaRPr lang="en-US" sz="2400" b="1" dirty="0"/>
+          </a:p>
+        </p:txBody>
+      </p:sp>
+      <p:sp>
+        <p:nvSpPr>
+          <p:cNvPr id="6" name="Subtitle 5"/>
+          <p:cNvSpPr>
+            <a:spLocks noGrp="1"/>
+          </p:cNvSpPr>
+          <p:nvPr>
+            <p:ph type="subTitle" idx="1"/>
+          </p:nvPr>
+        </p:nvSpPr>
+        <p:spPr/>
+        <p:txBody>
+          <a:bodyPr>
+            <a:normAutofit fontScale="55000" lnSpcReduction="20000"/>
+          </a:bodyPr>
+          <a:lstStyle/>
+          <a:p>
+            <a:r>
+              <a:rPr lang="en-US" dirty="0" err="1" smtClean="0"/>
+              <a:t>Authors:Moes</a:t>
+            </a:r>
+            <a:r>
+              <a:rPr lang="en-US" dirty="0" smtClean="0"/>
+              <a:t> </a:t>
+            </a:r>
+            <a:r>
+              <a:rPr lang="en-US" dirty="0" err="1" smtClean="0"/>
+              <a:t>Jerbi</a:t>
+            </a:r>
+            <a:r>
+              <a:rPr lang="en-US" dirty="0" smtClean="0"/>
+              <a:t>, </a:t>
+            </a:r>
+            <a:r>
+              <a:rPr lang="en-US" dirty="0" err="1" smtClean="0"/>
+              <a:t>Sidi</a:t>
+            </a:r>
+            <a:r>
+              <a:rPr lang="en-US" dirty="0" smtClean="0"/>
+              <a:t>-Mohammed </a:t>
+            </a:r>
+            <a:r>
+              <a:rPr lang="en-US" dirty="0" err="1" smtClean="0"/>
+              <a:t>Senouci</a:t>
+            </a:r>
+            <a:r>
+              <a:rPr lang="en-US" dirty="0" smtClean="0"/>
+              <a:t>, </a:t>
+            </a:r>
+            <a:r>
+              <a:rPr lang="en-US" dirty="0" err="1" smtClean="0"/>
+              <a:t>Rabah</a:t>
+            </a:r>
+            <a:r>
+              <a:rPr lang="en-US" dirty="0" smtClean="0"/>
+              <a:t> </a:t>
+            </a:r>
+            <a:r>
+              <a:rPr lang="en-US" dirty="0" err="1" smtClean="0"/>
+              <a:t>Meraihi</a:t>
+            </a:r>
+            <a:r>
+              <a:rPr lang="en-US" dirty="0" smtClean="0"/>
+              <a:t>, </a:t>
+            </a:r>
+            <a:r>
+              <a:rPr lang="en-US" dirty="0" err="1" smtClean="0"/>
+              <a:t>Yacine</a:t>
+            </a:r>
+            <a:r>
+              <a:rPr lang="en-US" dirty="0" smtClean="0"/>
+              <a:t> </a:t>
+            </a:r>
+            <a:r>
+              <a:rPr lang="en-US" dirty="0" err="1" smtClean="0"/>
+              <a:t>Ghamri-Doudane</a:t>
+            </a:r>
+            <a:endParaRPr lang="en-US" dirty="0" smtClean="0"/>
+          </a:p>
+          <a:p>
+            <a:r>
+              <a:rPr lang="en-US" dirty="0" smtClean="0"/>
+              <a:t> IEEE </a:t>
+            </a:r>
+            <a:r>
+              <a:rPr lang="en-US" dirty="0" smtClean="0"/>
+              <a:t>International Conference on Communications, 2007, ICC’07’ (pgs 3972-3979)</a:t>
+            </a:r>
+            <a:endParaRPr lang="en-US" dirty="0"/>
+          </a:p>
+        </p:txBody>
+      </p:sp>
+    </p:spTree>
+  </p:cSld>
+  <p:clrMapOvr>
+    <a:masterClrMapping/>
+  </p:clrMapOvr>
+</p:sld>
+</file>
+
+<file path=ppt/slides/slide64.xml><?xml version="1.0" encoding="utf-8"?>
+<p:sld xmlns:a="http://schemas.openxmlformats.org/drawingml/2006/main" xmlns:r="http://schemas.openxmlformats.org/officeDocument/2006/relationships" xmlns:p="http://schemas.openxmlformats.org/presentationml/2006/main">
+  <p:cSld>
+    <p:spTree>
+      <p:nvGrpSpPr>
+        <p:cNvPr id="1" name=""/>
+        <p:cNvGrpSpPr/>
+        <p:nvPr/>
+      </p:nvGrpSpPr>
+      <p:grpSpPr>
+        <a:xfrm>
+          <a:off x="0" y="0"/>
+          <a:ext cx="0" cy="0"/>
+          <a:chOff x="0" y="0"/>
+          <a:chExt cx="0" cy="0"/>
+        </a:xfrm>
+      </p:grpSpPr>
+      <p:sp>
+        <p:nvSpPr>
+          <p:cNvPr id="2" name="Title 1"/>
+          <p:cNvSpPr>
+            <a:spLocks noGrp="1"/>
+          </p:cNvSpPr>
+          <p:nvPr>
+            <p:ph type="title"/>
+          </p:nvPr>
+        </p:nvSpPr>
+        <p:spPr/>
+        <p:txBody>
+          <a:bodyPr/>
+          <a:lstStyle/>
+          <a:p>
+            <a:r>
+              <a:rPr lang="en-US" dirty="0" err="1" smtClean="0"/>
+              <a:t>GyTAR</a:t>
+            </a:r>
+            <a:endParaRPr lang="en-US" dirty="0"/>
+          </a:p>
+        </p:txBody>
+      </p:sp>
+      <p:sp>
+        <p:nvSpPr>
+          <p:cNvPr id="3" name="Content Placeholder 2"/>
+          <p:cNvSpPr>
+            <a:spLocks noGrp="1"/>
+          </p:cNvSpPr>
+          <p:nvPr>
+            <p:ph sz="quarter" idx="1"/>
+          </p:nvPr>
+        </p:nvSpPr>
+        <p:spPr/>
+        <p:txBody>
+          <a:bodyPr/>
+          <a:lstStyle/>
+          <a:p>
+            <a:r>
+              <a:rPr lang="en-US" dirty="0" smtClean="0"/>
+              <a:t>VANET communication in the city will probably be a heavily used technology in the near future. The challenges with this technology is unique and requires more in depth research</a:t>
+            </a:r>
+          </a:p>
+          <a:p>
+            <a:r>
+              <a:rPr lang="en-US" dirty="0" smtClean="0"/>
+              <a:t>The proposed </a:t>
+            </a:r>
+            <a:r>
+              <a:rPr lang="en-US" dirty="0" err="1" smtClean="0"/>
+              <a:t>GyTAR</a:t>
+            </a:r>
+            <a:r>
+              <a:rPr lang="en-US" dirty="0" smtClean="0"/>
+              <a:t> (improved Greedy Traffic Aware Routing) protocol offers an improvement to city vehicular communications</a:t>
+            </a:r>
+          </a:p>
+          <a:p>
+            <a:r>
+              <a:rPr lang="en-US" dirty="0" smtClean="0"/>
+              <a:t>Simulations are utilized to verify the contributions that the </a:t>
+            </a:r>
+            <a:r>
+              <a:rPr lang="en-US" dirty="0" err="1" smtClean="0"/>
+              <a:t>GyTAR</a:t>
+            </a:r>
+            <a:r>
+              <a:rPr lang="en-US" dirty="0" smtClean="0"/>
+              <a:t> protocol can offer</a:t>
+            </a:r>
+            <a:endParaRPr lang="en-US" dirty="0"/>
+          </a:p>
+        </p:txBody>
+      </p:sp>
+      <p:sp>
+        <p:nvSpPr>
+          <p:cNvPr id="5" name="TextBox 4"/>
+          <p:cNvSpPr txBox="1"/>
+          <p:nvPr/>
+        </p:nvSpPr>
+        <p:spPr>
+          <a:xfrm>
+            <a:off x="609600" y="6400800"/>
+            <a:ext cx="6172200" cy="276999"/>
+          </a:xfrm>
+          <a:prstGeom prst="rect">
+            <a:avLst/>
+          </a:prstGeom>
+          <a:noFill/>
+        </p:spPr>
+        <p:txBody>
+          <a:bodyPr wrap="square" rtlCol="0">
+            <a:spAutoFit/>
+          </a:bodyPr>
+          <a:lstStyle/>
+          <a:p>
+            <a:r>
+              <a:rPr lang="en-US" sz="1200" b="1" dirty="0" smtClean="0"/>
+              <a:t>An Improved Vehicular Ad Hoc Routing Protocol for City Environments</a:t>
+            </a:r>
+            <a:endParaRPr lang="en-US" sz="1200" b="1" dirty="0"/>
+          </a:p>
+        </p:txBody>
+      </p:sp>
+    </p:spTree>
+  </p:cSld>
+  <p:clrMapOvr>
+    <a:masterClrMapping/>
+  </p:clrMapOvr>
+</p:sld>
+</file>
+
+<file path=ppt/slides/slide65.xml><?xml version="1.0" encoding="utf-8"?>
+<p:sld xmlns:a="http://schemas.openxmlformats.org/drawingml/2006/main" xmlns:r="http://schemas.openxmlformats.org/officeDocument/2006/relationships" xmlns:p="http://schemas.openxmlformats.org/presentationml/2006/main">
+  <p:cSld>
+    <p:spTree>
+      <p:nvGrpSpPr>
+        <p:cNvPr id="1" name=""/>
+        <p:cNvGrpSpPr/>
+        <p:nvPr/>
+      </p:nvGrpSpPr>
+      <p:grpSpPr>
+        <a:xfrm>
+          <a:off x="0" y="0"/>
+          <a:ext cx="0" cy="0"/>
+          <a:chOff x="0" y="0"/>
+          <a:chExt cx="0" cy="0"/>
+        </a:xfrm>
+      </p:grpSpPr>
+      <p:sp>
+        <p:nvSpPr>
+          <p:cNvPr id="2" name="Title 1"/>
+          <p:cNvSpPr>
+            <a:spLocks noGrp="1"/>
+          </p:cNvSpPr>
+          <p:nvPr>
+            <p:ph type="title"/>
+          </p:nvPr>
+        </p:nvSpPr>
+        <p:spPr/>
+        <p:txBody>
+          <a:bodyPr/>
+          <a:lstStyle/>
+          <a:p>
+            <a:r>
+              <a:rPr lang="en-US" dirty="0" smtClean="0"/>
+              <a:t>Uniqueness of a VANET</a:t>
+            </a:r>
+            <a:endParaRPr lang="en-US" dirty="0"/>
+          </a:p>
+        </p:txBody>
+      </p:sp>
+      <p:sp>
+        <p:nvSpPr>
+          <p:cNvPr id="3" name="Content Placeholder 2"/>
+          <p:cNvSpPr>
+            <a:spLocks noGrp="1"/>
+          </p:cNvSpPr>
+          <p:nvPr>
+            <p:ph sz="quarter" idx="1"/>
+          </p:nvPr>
+        </p:nvSpPr>
+        <p:spPr/>
+        <p:txBody>
+          <a:bodyPr/>
+          <a:lstStyle/>
+          <a:p>
+            <a:r>
+              <a:rPr lang="en-US" dirty="0" smtClean="0"/>
+              <a:t>VANET depends on neighboring vehicles to form a connected network, therefore the nature is dynamic system capable of a multi-hop protocol</a:t>
+            </a:r>
+          </a:p>
+          <a:p>
+            <a:r>
+              <a:rPr lang="en-US" dirty="0" smtClean="0"/>
+              <a:t>A VANET system has it’s unique problems and advantages over mobile devices which is why not all protocols are easily adopted with this type of network</a:t>
+            </a:r>
+          </a:p>
+          <a:p>
+            <a:r>
+              <a:rPr lang="en-US" dirty="0" smtClean="0"/>
+              <a:t>Road topologies, traffic density play a big role with connectivity issues</a:t>
+            </a:r>
+          </a:p>
+          <a:p>
+            <a:r>
+              <a:rPr lang="en-US" dirty="0" smtClean="0"/>
+              <a:t>The </a:t>
+            </a:r>
+            <a:r>
+              <a:rPr lang="en-US" dirty="0" err="1" smtClean="0"/>
+              <a:t>GyTAR</a:t>
+            </a:r>
+            <a:r>
+              <a:rPr lang="en-US" dirty="0" smtClean="0"/>
+              <a:t> protocol hopes to improve the packet delivery ratio, end to end delay, and reduce the routing overhead</a:t>
+            </a:r>
+          </a:p>
+          <a:p>
+            <a:endParaRPr lang="en-US" dirty="0"/>
+          </a:p>
+        </p:txBody>
+      </p:sp>
+      <p:sp>
+        <p:nvSpPr>
+          <p:cNvPr id="5" name="TextBox 4"/>
+          <p:cNvSpPr txBox="1"/>
+          <p:nvPr/>
+        </p:nvSpPr>
+        <p:spPr>
+          <a:xfrm>
+            <a:off x="609600" y="6400800"/>
+            <a:ext cx="6172200" cy="276999"/>
+          </a:xfrm>
+          <a:prstGeom prst="rect">
+            <a:avLst/>
+          </a:prstGeom>
+          <a:noFill/>
+        </p:spPr>
+        <p:txBody>
+          <a:bodyPr wrap="square" rtlCol="0">
+            <a:spAutoFit/>
+          </a:bodyPr>
+          <a:lstStyle/>
+          <a:p>
+            <a:r>
+              <a:rPr lang="en-US" sz="1200" b="1" dirty="0" smtClean="0"/>
+              <a:t>An Improved Vehicular Ad Hoc Routing Protocol for City Environments</a:t>
+            </a:r>
+            <a:endParaRPr lang="en-US" sz="1200" b="1" dirty="0"/>
+          </a:p>
+        </p:txBody>
+      </p:sp>
+    </p:spTree>
+  </p:cSld>
+  <p:clrMapOvr>
+    <a:masterClrMapping/>
+  </p:clrMapOvr>
+</p:sld>
+</file>
+
+<file path=ppt/slides/slide66.xml><?xml version="1.0" encoding="utf-8"?>
+<p:sld xmlns:a="http://schemas.openxmlformats.org/drawingml/2006/main" xmlns:r="http://schemas.openxmlformats.org/officeDocument/2006/relationships" xmlns:p="http://schemas.openxmlformats.org/presentationml/2006/main">
+  <p:cSld>
+    <p:spTree>
+      <p:nvGrpSpPr>
+        <p:cNvPr id="1" name=""/>
+        <p:cNvGrpSpPr/>
+        <p:nvPr/>
+      </p:nvGrpSpPr>
+      <p:grpSpPr>
+        <a:xfrm>
+          <a:off x="0" y="0"/>
+          <a:ext cx="0" cy="0"/>
+          <a:chOff x="0" y="0"/>
+          <a:chExt cx="0" cy="0"/>
+        </a:xfrm>
+      </p:grpSpPr>
+      <p:sp>
+        <p:nvSpPr>
+          <p:cNvPr id="2" name="Title 1"/>
+          <p:cNvSpPr>
+            <a:spLocks noGrp="1"/>
+          </p:cNvSpPr>
+          <p:nvPr>
+            <p:ph type="title"/>
+          </p:nvPr>
+        </p:nvSpPr>
+        <p:spPr/>
+        <p:txBody>
+          <a:bodyPr/>
+          <a:lstStyle/>
+          <a:p>
+            <a:r>
+              <a:rPr lang="en-US" dirty="0" smtClean="0"/>
+              <a:t>The </a:t>
+            </a:r>
+            <a:r>
+              <a:rPr lang="en-US" dirty="0" err="1" smtClean="0"/>
+              <a:t>GyTAR</a:t>
+            </a:r>
+            <a:r>
+              <a:rPr lang="en-US" dirty="0" smtClean="0"/>
+              <a:t> Protocol Assumptions</a:t>
+            </a:r>
+            <a:endParaRPr lang="en-US" dirty="0"/>
+          </a:p>
+        </p:txBody>
+      </p:sp>
+      <p:sp>
+        <p:nvSpPr>
+          <p:cNvPr id="3" name="Content Placeholder 2"/>
+          <p:cNvSpPr>
+            <a:spLocks noGrp="1"/>
+          </p:cNvSpPr>
+          <p:nvPr>
+            <p:ph sz="quarter" idx="1"/>
+          </p:nvPr>
+        </p:nvSpPr>
+        <p:spPr/>
+        <p:txBody>
+          <a:bodyPr/>
+          <a:lstStyle/>
+          <a:p>
+            <a:r>
+              <a:rPr lang="en-US" dirty="0" smtClean="0"/>
+              <a:t>Through devices such as GPS a vehicle is expected to know their relative position on a road</a:t>
+            </a:r>
+          </a:p>
+          <a:p>
+            <a:r>
+              <a:rPr lang="en-US" dirty="0" smtClean="0"/>
+              <a:t>Employing any common vehicle location service, the transmitting vehicle knows the eventual destination of the transmitted packets</a:t>
+            </a:r>
+          </a:p>
+          <a:p>
+            <a:r>
+              <a:rPr lang="en-US" dirty="0" smtClean="0"/>
+              <a:t>Each vehicle is aware of the current vehicular density in its surrounding environment</a:t>
+            </a:r>
+            <a:endParaRPr lang="en-US" dirty="0"/>
+          </a:p>
+        </p:txBody>
+      </p:sp>
+      <p:sp>
+        <p:nvSpPr>
+          <p:cNvPr id="4" name="TextBox 3"/>
+          <p:cNvSpPr txBox="1"/>
+          <p:nvPr/>
+        </p:nvSpPr>
+        <p:spPr>
+          <a:xfrm>
+            <a:off x="609600" y="6400800"/>
+            <a:ext cx="6172200" cy="276999"/>
+          </a:xfrm>
+          <a:prstGeom prst="rect">
+            <a:avLst/>
+          </a:prstGeom>
+          <a:noFill/>
+        </p:spPr>
+        <p:txBody>
+          <a:bodyPr wrap="square" rtlCol="0">
+            <a:spAutoFit/>
+          </a:bodyPr>
+          <a:lstStyle/>
+          <a:p>
+            <a:r>
+              <a:rPr lang="en-US" sz="1200" b="1" dirty="0" smtClean="0"/>
+              <a:t>An Improved Vehicular Ad Hoc Routing Protocol for City Environments</a:t>
+            </a:r>
+            <a:endParaRPr lang="en-US" sz="1200" b="1" dirty="0"/>
+          </a:p>
+        </p:txBody>
+      </p:sp>
+    </p:spTree>
+  </p:cSld>
+  <p:clrMapOvr>
+    <a:masterClrMapping/>
+  </p:clrMapOvr>
+</p:sld>
+</file>
+
+<file path=ppt/slides/slide67.xml><?xml version="1.0" encoding="utf-8"?>
+<p:sld xmlns:a="http://schemas.openxmlformats.org/drawingml/2006/main" xmlns:r="http://schemas.openxmlformats.org/officeDocument/2006/relationships" xmlns:p="http://schemas.openxmlformats.org/presentationml/2006/main">
+  <p:cSld>
+    <p:spTree>
+      <p:nvGrpSpPr>
+        <p:cNvPr id="1" name=""/>
+        <p:cNvGrpSpPr/>
+        <p:nvPr/>
+      </p:nvGrpSpPr>
+      <p:grpSpPr>
+        <a:xfrm>
+          <a:off x="0" y="0"/>
+          <a:ext cx="0" cy="0"/>
+          <a:chOff x="0" y="0"/>
+          <a:chExt cx="0" cy="0"/>
+        </a:xfrm>
+      </p:grpSpPr>
+      <p:sp>
+        <p:nvSpPr>
+          <p:cNvPr id="2" name="Title 1"/>
+          <p:cNvSpPr>
+            <a:spLocks noGrp="1"/>
+          </p:cNvSpPr>
+          <p:nvPr>
+            <p:ph type="title"/>
+          </p:nvPr>
+        </p:nvSpPr>
+        <p:spPr/>
+        <p:txBody>
+          <a:bodyPr/>
+          <a:lstStyle/>
+          <a:p>
+            <a:endParaRPr lang="en-US" dirty="0"/>
+          </a:p>
+        </p:txBody>
+      </p:sp>
+      <p:sp>
+        <p:nvSpPr>
+          <p:cNvPr id="3" name="Content Placeholder 2"/>
+          <p:cNvSpPr>
+            <a:spLocks noGrp="1"/>
+          </p:cNvSpPr>
+          <p:nvPr>
+            <p:ph sz="quarter" idx="1"/>
+          </p:nvPr>
+        </p:nvSpPr>
+        <p:spPr/>
+        <p:txBody>
+          <a:bodyPr/>
+          <a:lstStyle/>
+          <a:p>
+            <a:endParaRPr lang="en-US" dirty="0"/>
+          </a:p>
+        </p:txBody>
+      </p:sp>
+      <p:sp>
+        <p:nvSpPr>
+          <p:cNvPr id="4" name="TextBox 3"/>
+          <p:cNvSpPr txBox="1"/>
+          <p:nvPr/>
+        </p:nvSpPr>
+        <p:spPr>
+          <a:xfrm>
+            <a:off x="609600" y="6400800"/>
+            <a:ext cx="6172200" cy="276999"/>
+          </a:xfrm>
+          <a:prstGeom prst="rect">
+            <a:avLst/>
+          </a:prstGeom>
+          <a:noFill/>
+        </p:spPr>
+        <p:txBody>
+          <a:bodyPr wrap="square" rtlCol="0">
+            <a:spAutoFit/>
+          </a:bodyPr>
+          <a:lstStyle/>
+          <a:p>
+            <a:r>
+              <a:rPr lang="en-US" sz="1200" b="1" dirty="0" smtClean="0"/>
+              <a:t>An Improved Vehicular Ad Hoc Routing Protocol for City Environments</a:t>
+            </a:r>
+            <a:endParaRPr lang="en-US" sz="1200" b="1" dirty="0"/>
+          </a:p>
+        </p:txBody>
+      </p:sp>
+    </p:spTree>
+  </p:cSld>
+  <p:clrMapOvr>
+    <a:masterClrMapping/>
+  </p:clrMapOvr>
+</p:sld>
+</file>
+
+<file path=ppt/slides/slide68.xml><?xml version="1.0" encoding="utf-8"?>
+<p:sld xmlns:a="http://schemas.openxmlformats.org/drawingml/2006/main" xmlns:r="http://schemas.openxmlformats.org/officeDocument/2006/relationships" xmlns:p="http://schemas.openxmlformats.org/presentationml/2006/main">
+  <p:cSld>
+    <p:spTree>
+      <p:nvGrpSpPr>
+        <p:cNvPr id="1" name=""/>
+        <p:cNvGrpSpPr/>
+        <p:nvPr/>
+      </p:nvGrpSpPr>
+      <p:grpSpPr>
+        <a:xfrm>
+          <a:off x="0" y="0"/>
+          <a:ext cx="0" cy="0"/>
+          <a:chOff x="0" y="0"/>
+          <a:chExt cx="0" cy="0"/>
+        </a:xfrm>
+      </p:grpSpPr>
+      <p:sp>
+        <p:nvSpPr>
+          <p:cNvPr id="2" name="Title 1"/>
+          <p:cNvSpPr>
+            <a:spLocks noGrp="1"/>
+          </p:cNvSpPr>
+          <p:nvPr>
+            <p:ph type="title"/>
+          </p:nvPr>
+        </p:nvSpPr>
+        <p:spPr/>
+        <p:txBody>
+          <a:bodyPr/>
+          <a:lstStyle/>
+          <a:p>
+            <a:r>
+              <a:rPr lang="en-US" dirty="0" err="1" smtClean="0"/>
+              <a:t>GyTAR</a:t>
+            </a:r>
+            <a:r>
+              <a:rPr lang="en-US" dirty="0" smtClean="0"/>
+              <a:t> Evaluation System</a:t>
+            </a:r>
+            <a:endParaRPr lang="en-US" dirty="0"/>
+          </a:p>
+        </p:txBody>
+      </p:sp>
+      <p:sp>
+        <p:nvSpPr>
+          <p:cNvPr id="3" name="Content Placeholder 2"/>
+          <p:cNvSpPr>
+            <a:spLocks noGrp="1"/>
+          </p:cNvSpPr>
+          <p:nvPr>
+            <p:ph sz="quarter" idx="1"/>
+          </p:nvPr>
+        </p:nvSpPr>
+        <p:spPr/>
+        <p:txBody>
+          <a:bodyPr>
+            <a:normAutofit fontScale="70000" lnSpcReduction="20000"/>
+          </a:bodyPr>
+          <a:lstStyle/>
+          <a:p>
+            <a:r>
+              <a:rPr lang="en-US" dirty="0" smtClean="0"/>
+              <a:t>J: Next candidate junction</a:t>
+            </a:r>
+          </a:p>
+          <a:p>
+            <a:r>
+              <a:rPr lang="en-US" dirty="0" smtClean="0"/>
+              <a:t>I: The current junction</a:t>
+            </a:r>
+          </a:p>
+          <a:p>
+            <a:r>
+              <a:rPr lang="en-US" dirty="0" smtClean="0"/>
+              <a:t>D</a:t>
+            </a:r>
+            <a:r>
+              <a:rPr lang="en-US" baseline="-25000" dirty="0" smtClean="0"/>
+              <a:t>j</a:t>
+            </a:r>
+            <a:r>
+              <a:rPr lang="en-US" dirty="0" smtClean="0"/>
+              <a:t>: The </a:t>
+            </a:r>
+            <a:r>
+              <a:rPr lang="en-US" dirty="0" err="1" smtClean="0"/>
+              <a:t>curvemetric</a:t>
+            </a:r>
+            <a:r>
+              <a:rPr lang="en-US" dirty="0" smtClean="0"/>
+              <a:t> distance from the candidate junction J to the destination</a:t>
+            </a:r>
+          </a:p>
+          <a:p>
+            <a:r>
+              <a:rPr lang="en-US" dirty="0" smtClean="0"/>
+              <a:t>D</a:t>
+            </a:r>
+            <a:r>
+              <a:rPr lang="en-US" baseline="-25000" dirty="0" smtClean="0"/>
+              <a:t>i</a:t>
+            </a:r>
+            <a:r>
+              <a:rPr lang="en-US" dirty="0" smtClean="0"/>
+              <a:t>: The </a:t>
+            </a:r>
+            <a:r>
+              <a:rPr lang="en-US" dirty="0" err="1" smtClean="0"/>
+              <a:t>curvemetric</a:t>
+            </a:r>
+            <a:r>
+              <a:rPr lang="en-US" dirty="0" smtClean="0"/>
+              <a:t> distance from the current junction to the destination</a:t>
+            </a:r>
+          </a:p>
+          <a:p>
+            <a:r>
+              <a:rPr lang="en-US" dirty="0" err="1" smtClean="0"/>
+              <a:t>D</a:t>
+            </a:r>
+            <a:r>
+              <a:rPr lang="en-US" baseline="-25000" dirty="0" err="1" smtClean="0"/>
+              <a:t>p</a:t>
+            </a:r>
+            <a:r>
+              <a:rPr lang="en-US" dirty="0" smtClean="0"/>
+              <a:t>:</a:t>
+            </a:r>
+            <a:r>
+              <a:rPr lang="en-US" dirty="0" smtClean="0"/>
+              <a:t> </a:t>
+            </a:r>
+            <a:r>
+              <a:rPr lang="en-US" dirty="0" smtClean="0"/>
+              <a:t>D</a:t>
+            </a:r>
+            <a:r>
+              <a:rPr lang="en-US" baseline="-25000" dirty="0" smtClean="0"/>
+              <a:t>j</a:t>
+            </a:r>
+            <a:r>
+              <a:rPr lang="en-US" dirty="0" smtClean="0"/>
+              <a:t>/</a:t>
+            </a:r>
+            <a:r>
+              <a:rPr lang="en-US" dirty="0" smtClean="0"/>
+              <a:t> </a:t>
+            </a:r>
+            <a:r>
+              <a:rPr lang="en-US" dirty="0" smtClean="0"/>
+              <a:t>D</a:t>
+            </a:r>
+            <a:r>
+              <a:rPr lang="en-US" baseline="-25000" dirty="0" smtClean="0"/>
+              <a:t>i</a:t>
+            </a:r>
+            <a:r>
+              <a:rPr lang="en-US" dirty="0" smtClean="0"/>
+              <a:t> </a:t>
+            </a:r>
+            <a:r>
+              <a:rPr lang="en-US" dirty="0" smtClean="0"/>
+              <a:t>(</a:t>
+            </a:r>
+            <a:r>
+              <a:rPr lang="en-US" dirty="0" err="1" smtClean="0"/>
+              <a:t>D</a:t>
+            </a:r>
+            <a:r>
+              <a:rPr lang="en-US" baseline="-25000" dirty="0" err="1" smtClean="0"/>
+              <a:t>p</a:t>
+            </a:r>
+            <a:r>
+              <a:rPr lang="en-US" dirty="0" smtClean="0"/>
+              <a:t> </a:t>
+            </a:r>
+            <a:r>
+              <a:rPr lang="en-US" dirty="0" smtClean="0"/>
+              <a:t>determines the closeness of the candidate junction to the destination point)</a:t>
+            </a:r>
+          </a:p>
+          <a:p>
+            <a:r>
+              <a:rPr lang="en-US" dirty="0" smtClean="0"/>
+              <a:t>Between junction I and J</a:t>
+            </a:r>
+          </a:p>
+          <a:p>
+            <a:pPr lvl="1"/>
+            <a:r>
+              <a:rPr lang="en-US" dirty="0" err="1" smtClean="0"/>
+              <a:t>N</a:t>
+            </a:r>
+            <a:r>
+              <a:rPr lang="en-US" baseline="-25000" dirty="0" err="1" smtClean="0"/>
+              <a:t>v</a:t>
+            </a:r>
+            <a:r>
+              <a:rPr lang="en-US" dirty="0" smtClean="0"/>
+              <a:t>: Total number of vehicles between I and J</a:t>
+            </a:r>
+          </a:p>
+          <a:p>
+            <a:pPr lvl="1"/>
+            <a:r>
+              <a:rPr lang="en-US" dirty="0" err="1" smtClean="0"/>
+              <a:t>N</a:t>
+            </a:r>
+            <a:r>
+              <a:rPr lang="en-US" baseline="-25000" dirty="0" err="1" smtClean="0"/>
+              <a:t>c</a:t>
+            </a:r>
+            <a:r>
+              <a:rPr lang="en-US" dirty="0" smtClean="0"/>
+              <a:t>: Number of cells between I and J</a:t>
+            </a:r>
+          </a:p>
+          <a:p>
+            <a:pPr lvl="1"/>
+            <a:r>
+              <a:rPr lang="en-US" dirty="0" err="1" smtClean="0"/>
+              <a:t>N</a:t>
+            </a:r>
+            <a:r>
+              <a:rPr lang="en-US" baseline="-25000" dirty="0" err="1" smtClean="0"/>
+              <a:t>avg</a:t>
+            </a:r>
+            <a:r>
+              <a:rPr lang="en-US" dirty="0" smtClean="0"/>
+              <a:t>: Average number of vehicles per cell (</a:t>
+            </a:r>
+            <a:r>
+              <a:rPr lang="en-US" dirty="0" err="1" smtClean="0"/>
+              <a:t>N</a:t>
+            </a:r>
+            <a:r>
+              <a:rPr lang="en-US" baseline="-25000" dirty="0" err="1" smtClean="0"/>
+              <a:t>avg</a:t>
+            </a:r>
+            <a:r>
+              <a:rPr lang="en-US" dirty="0" smtClean="0"/>
+              <a:t> </a:t>
+            </a:r>
+            <a:r>
+              <a:rPr lang="en-US" dirty="0" smtClean="0"/>
+              <a:t>= </a:t>
+            </a:r>
+            <a:r>
+              <a:rPr lang="en-US" dirty="0" err="1" smtClean="0"/>
+              <a:t>N</a:t>
+            </a:r>
+            <a:r>
+              <a:rPr lang="en-US" baseline="-25000" dirty="0" err="1" smtClean="0"/>
+              <a:t>v</a:t>
+            </a:r>
+            <a:r>
+              <a:rPr lang="en-US" dirty="0" smtClean="0"/>
+              <a:t>/</a:t>
+            </a:r>
+            <a:r>
+              <a:rPr lang="en-US" dirty="0" smtClean="0"/>
+              <a:t> </a:t>
+            </a:r>
+            <a:r>
+              <a:rPr lang="en-US" dirty="0" err="1" smtClean="0"/>
+              <a:t>N</a:t>
+            </a:r>
+            <a:r>
+              <a:rPr lang="en-US" baseline="-25000" dirty="0" err="1" smtClean="0"/>
+              <a:t>c</a:t>
+            </a:r>
+            <a:r>
+              <a:rPr lang="en-US" dirty="0" smtClean="0"/>
+              <a:t>)</a:t>
+            </a:r>
+          </a:p>
+          <a:p>
+            <a:pPr lvl="1"/>
+            <a:r>
+              <a:rPr lang="en-US" dirty="0" err="1" smtClean="0"/>
+              <a:t>N</a:t>
+            </a:r>
+            <a:r>
+              <a:rPr lang="en-US" baseline="-25000" dirty="0" err="1" smtClean="0"/>
+              <a:t>con</a:t>
+            </a:r>
+            <a:r>
+              <a:rPr lang="en-US" dirty="0" smtClean="0"/>
+              <a:t>: Constant which represents the ideal connectivity degree we can have within a cell</a:t>
+            </a:r>
+          </a:p>
+          <a:p>
+            <a:r>
+              <a:rPr lang="en-US" dirty="0" smtClean="0">
+                <a:latin typeface="Calibri"/>
+              </a:rPr>
+              <a:t>α,</a:t>
+            </a:r>
+            <a:r>
+              <a:rPr lang="el-GR" dirty="0" smtClean="0">
+                <a:latin typeface="Cambria Math"/>
+                <a:ea typeface="Cambria Math"/>
+              </a:rPr>
+              <a:t>β</a:t>
+            </a:r>
+            <a:r>
+              <a:rPr lang="en-US" dirty="0" smtClean="0">
+                <a:latin typeface="Cambria Math"/>
+                <a:ea typeface="Cambria Math"/>
+              </a:rPr>
+              <a:t>: Use as weighting factors for the distance and vehicular traffic respectively (with </a:t>
+            </a:r>
+            <a:r>
+              <a:rPr lang="en-US" dirty="0" smtClean="0">
+                <a:latin typeface="Calibri"/>
+              </a:rPr>
+              <a:t>α+</a:t>
+            </a:r>
+            <a:r>
+              <a:rPr lang="el-GR" dirty="0" smtClean="0">
+                <a:latin typeface="Cambria Math"/>
+                <a:ea typeface="Cambria Math"/>
+              </a:rPr>
+              <a:t>β</a:t>
+            </a:r>
+            <a:r>
+              <a:rPr lang="en-US" dirty="0" smtClean="0">
+                <a:latin typeface="Cambria Math"/>
+                <a:ea typeface="Cambria Math"/>
+              </a:rPr>
+              <a:t>=1)</a:t>
+            </a:r>
+          </a:p>
+          <a:p>
+            <a:r>
+              <a:rPr lang="en-US" dirty="0" smtClean="0">
+                <a:latin typeface="Cambria Math"/>
+                <a:ea typeface="Cambria Math"/>
+              </a:rPr>
+              <a:t>The determining equation for the points system:</a:t>
+            </a:r>
+          </a:p>
+          <a:p>
+            <a:pPr lvl="1"/>
+            <a:r>
+              <a:rPr lang="en-US" dirty="0" smtClean="0">
+                <a:latin typeface="Cambria Math"/>
+                <a:ea typeface="Cambria Math"/>
+              </a:rPr>
+              <a:t>(J) =</a:t>
+            </a:r>
+            <a:r>
+              <a:rPr lang="en-US" dirty="0" smtClean="0">
+                <a:latin typeface="Calibri"/>
+              </a:rPr>
+              <a:t>α x [1-</a:t>
+            </a:r>
+            <a:r>
+              <a:rPr lang="en-US" dirty="0" smtClean="0">
+                <a:latin typeface="Cambria Math"/>
+                <a:ea typeface="Cambria Math"/>
+              </a:rPr>
+              <a:t> </a:t>
+            </a:r>
+            <a:r>
+              <a:rPr lang="en-US" dirty="0" err="1" smtClean="0"/>
+              <a:t>D</a:t>
+            </a:r>
+            <a:r>
+              <a:rPr lang="en-US" baseline="-25000" dirty="0" err="1" smtClean="0"/>
+              <a:t>p</a:t>
+            </a:r>
+            <a:r>
+              <a:rPr lang="en-US" dirty="0" smtClean="0"/>
+              <a:t>] + </a:t>
+            </a:r>
+            <a:r>
+              <a:rPr lang="el-GR" dirty="0" smtClean="0">
+                <a:latin typeface="Cambria Math"/>
+                <a:ea typeface="Cambria Math"/>
+              </a:rPr>
+              <a:t>β</a:t>
+            </a:r>
+            <a:r>
+              <a:rPr lang="en-US" dirty="0" smtClean="0">
+                <a:latin typeface="Cambria Math"/>
+                <a:ea typeface="Cambria Math"/>
+              </a:rPr>
+              <a:t>[min((</a:t>
+            </a:r>
+            <a:r>
+              <a:rPr lang="en-US" dirty="0" err="1" smtClean="0"/>
+              <a:t>N</a:t>
+            </a:r>
+            <a:r>
+              <a:rPr lang="en-US" baseline="-25000" dirty="0" err="1" smtClean="0"/>
+              <a:t>avg</a:t>
+            </a:r>
+            <a:r>
+              <a:rPr lang="en-US" dirty="0" smtClean="0"/>
+              <a:t>/</a:t>
+            </a:r>
+            <a:r>
+              <a:rPr lang="en-US" dirty="0" smtClean="0"/>
+              <a:t> </a:t>
+            </a:r>
+            <a:r>
+              <a:rPr lang="en-US" dirty="0" err="1" smtClean="0"/>
+              <a:t>N</a:t>
+            </a:r>
+            <a:r>
+              <a:rPr lang="en-US" baseline="-25000" dirty="0" err="1" smtClean="0"/>
+              <a:t>con</a:t>
+            </a:r>
+            <a:r>
+              <a:rPr lang="en-US" dirty="0" smtClean="0"/>
+              <a:t>),1)]</a:t>
+            </a:r>
+            <a:endParaRPr lang="en-US" dirty="0"/>
+          </a:p>
+        </p:txBody>
+      </p:sp>
+      <p:sp>
+        <p:nvSpPr>
+          <p:cNvPr id="5" name="TextBox 4"/>
+          <p:cNvSpPr txBox="1"/>
+          <p:nvPr/>
+        </p:nvSpPr>
+        <p:spPr>
+          <a:xfrm>
+            <a:off x="609600" y="6400800"/>
+            <a:ext cx="6172200" cy="276999"/>
+          </a:xfrm>
+          <a:prstGeom prst="rect">
+            <a:avLst/>
+          </a:prstGeom>
+          <a:noFill/>
+        </p:spPr>
+        <p:txBody>
+          <a:bodyPr wrap="square" rtlCol="0">
+            <a:spAutoFit/>
+          </a:bodyPr>
+          <a:lstStyle/>
+          <a:p>
+            <a:r>
+              <a:rPr lang="en-US" sz="1200" b="1" dirty="0" smtClean="0"/>
+              <a:t>An Improved Vehicular Ad Hoc Routing Protocol for City Environments</a:t>
+            </a:r>
+            <a:endParaRPr lang="en-US" sz="1200" b="1" dirty="0"/>
+          </a:p>
+        </p:txBody>
+      </p:sp>
+    </p:spTree>
+  </p:cSld>
+  <p:clrMapOvr>
+    <a:masterClrMapping/>
+  </p:clrMapOvr>
+</p:sld>
+</file>
+
+<file path=ppt/slides/slide69.xml><?xml version="1.0" encoding="utf-8"?>
+<p:sld xmlns:a="http://schemas.openxmlformats.org/drawingml/2006/main" xmlns:r="http://schemas.openxmlformats.org/officeDocument/2006/relationships" xmlns:p="http://schemas.openxmlformats.org/presentationml/2006/main">
+  <p:cSld>
+    <p:spTree>
+      <p:nvGrpSpPr>
+        <p:cNvPr id="1" name=""/>
+        <p:cNvGrpSpPr/>
+        <p:nvPr/>
+      </p:nvGrpSpPr>
+      <p:grpSpPr>
+        <a:xfrm>
+          <a:off x="0" y="0"/>
+          <a:ext cx="0" cy="0"/>
+          <a:chOff x="0" y="0"/>
+          <a:chExt cx="0" cy="0"/>
+        </a:xfrm>
+      </p:grpSpPr>
+      <p:sp>
+        <p:nvSpPr>
+          <p:cNvPr id="2" name="Title 1"/>
+          <p:cNvSpPr>
+            <a:spLocks noGrp="1"/>
+          </p:cNvSpPr>
+          <p:nvPr>
+            <p:ph type="title"/>
+          </p:nvPr>
+        </p:nvSpPr>
+        <p:spPr/>
+        <p:txBody>
+          <a:bodyPr/>
+          <a:lstStyle/>
+          <a:p>
+            <a:r>
+              <a:rPr lang="en-US" dirty="0" err="1" smtClean="0"/>
+              <a:t>GyTAR</a:t>
+            </a:r>
+            <a:r>
+              <a:rPr lang="en-US" dirty="0" smtClean="0"/>
+              <a:t> Evaluation System</a:t>
+            </a:r>
+            <a:endParaRPr lang="en-US" dirty="0"/>
+          </a:p>
+        </p:txBody>
+      </p:sp>
+      <p:sp>
+        <p:nvSpPr>
+          <p:cNvPr id="3" name="Content Placeholder 2"/>
+          <p:cNvSpPr>
+            <a:spLocks noGrp="1"/>
+          </p:cNvSpPr>
+          <p:nvPr>
+            <p:ph sz="quarter" idx="1"/>
+          </p:nvPr>
+        </p:nvSpPr>
+        <p:spPr/>
+        <p:txBody>
+          <a:bodyPr/>
+          <a:lstStyle/>
+          <a:p>
+            <a:endParaRPr lang="en-US" dirty="0"/>
+          </a:p>
+        </p:txBody>
+      </p:sp>
+      <p:sp>
+        <p:nvSpPr>
+          <p:cNvPr id="5" name="TextBox 4"/>
+          <p:cNvSpPr txBox="1"/>
+          <p:nvPr/>
+        </p:nvSpPr>
+        <p:spPr>
+          <a:xfrm>
+            <a:off x="609600" y="6400800"/>
+            <a:ext cx="6172200" cy="276999"/>
+          </a:xfrm>
+          <a:prstGeom prst="rect">
+            <a:avLst/>
+          </a:prstGeom>
+          <a:noFill/>
+        </p:spPr>
+        <p:txBody>
+          <a:bodyPr wrap="square" rtlCol="0">
+            <a:spAutoFit/>
+          </a:bodyPr>
+          <a:lstStyle/>
+          <a:p>
+            <a:r>
+              <a:rPr lang="en-US" sz="1200" b="1" dirty="0" smtClean="0"/>
+              <a:t>An Improved Vehicular Ad Hoc Routing Protocol for City Environments</a:t>
+            </a:r>
+            <a:endParaRPr lang="en-US" sz="1200" b="1" dirty="0"/>
+          </a:p>
+        </p:txBody>
+      </p:sp>
+      <p:pic>
+        <p:nvPicPr>
+          <p:cNvPr id="83970" name="Picture 2"/>
+          <p:cNvPicPr>
+            <a:picLocks noChangeAspect="1" noChangeArrowheads="1"/>
+          </p:cNvPicPr>
+          <p:nvPr/>
+        </p:nvPicPr>
+        <p:blipFill>
+          <a:blip r:embed="rId2" cstate="print"/>
+          <a:srcRect/>
+          <a:stretch>
+            <a:fillRect/>
+          </a:stretch>
+        </p:blipFill>
+        <p:spPr bwMode="auto">
+          <a:xfrm>
+            <a:off x="1295400" y="1371600"/>
+            <a:ext cx="6248400" cy="4357068"/>
+          </a:xfrm>
+          <a:prstGeom prst="rect">
+            <a:avLst/>
+          </a:prstGeom>
+          <a:noFill/>
+          <a:ln w="9525">
+            <a:noFill/>
+            <a:miter lim="800000"/>
+            <a:headEnd/>
+            <a:tailEnd/>
+          </a:ln>
+        </p:spPr>
+      </p:pic>
+    </p:spTree>
+  </p:cSld>
+  <p:clrMapOvr>
+    <a:masterClrMapping/>
+  </p:clrMapOvr>
+  <p:timing>
+    <p:tnLst>
+      <p:par>
+        <p:cTn id="1" dur="indefinite" restart="never" nodeType="tmRoot"/>
+      </p:par>
+    </p:tnLst>
+  </p:timing>
+</p:sld>
+</file>
+
 <file path=ppt/slides/slide7.xml><?xml version="1.0" encoding="utf-8"?>
 <p:sld xmlns:a="http://schemas.openxmlformats.org/drawingml/2006/main" xmlns:r="http://schemas.openxmlformats.org/officeDocument/2006/relationships" xmlns:p="http://schemas.openxmlformats.org/presentationml/2006/main">
   <p:cSld>
@@ -20583,6 +21803,238 @@
               <a:t>Routing in Sparse Vehicular Ad Hoc Wireless Networks</a:t>
             </a:r>
             <a:endParaRPr lang="en-US" sz="1200" dirty="0"/>
+          </a:p>
+        </p:txBody>
+      </p:sp>
+    </p:spTree>
+  </p:cSld>
+  <p:clrMapOvr>
+    <a:masterClrMapping/>
+  </p:clrMapOvr>
+</p:sld>
+</file>
+
+<file path=ppt/slides/slide70.xml><?xml version="1.0" encoding="utf-8"?>
+<p:sld xmlns:a="http://schemas.openxmlformats.org/drawingml/2006/main" xmlns:r="http://schemas.openxmlformats.org/officeDocument/2006/relationships" xmlns:p="http://schemas.openxmlformats.org/presentationml/2006/main">
+  <p:cSld>
+    <p:spTree>
+      <p:nvGrpSpPr>
+        <p:cNvPr id="1" name=""/>
+        <p:cNvGrpSpPr/>
+        <p:nvPr/>
+      </p:nvGrpSpPr>
+      <p:grpSpPr>
+        <a:xfrm>
+          <a:off x="0" y="0"/>
+          <a:ext cx="0" cy="0"/>
+          <a:chOff x="0" y="0"/>
+          <a:chExt cx="0" cy="0"/>
+        </a:xfrm>
+      </p:grpSpPr>
+      <p:sp>
+        <p:nvSpPr>
+          <p:cNvPr id="2" name="Title 1"/>
+          <p:cNvSpPr>
+            <a:spLocks noGrp="1"/>
+          </p:cNvSpPr>
+          <p:nvPr>
+            <p:ph type="title"/>
+          </p:nvPr>
+        </p:nvSpPr>
+        <p:spPr/>
+        <p:txBody>
+          <a:bodyPr/>
+          <a:lstStyle/>
+          <a:p>
+            <a:r>
+              <a:rPr lang="en-US" dirty="0" err="1" smtClean="0"/>
+              <a:t>GyTAR</a:t>
+            </a:r>
+            <a:r>
+              <a:rPr lang="en-US" dirty="0" smtClean="0"/>
+              <a:t> Evaluation System</a:t>
+            </a:r>
+            <a:endParaRPr lang="en-US" dirty="0"/>
+          </a:p>
+        </p:txBody>
+      </p:sp>
+      <p:sp>
+        <p:nvSpPr>
+          <p:cNvPr id="3" name="Content Placeholder 2"/>
+          <p:cNvSpPr>
+            <a:spLocks noGrp="1"/>
+          </p:cNvSpPr>
+          <p:nvPr>
+            <p:ph sz="quarter" idx="1"/>
+          </p:nvPr>
+        </p:nvSpPr>
+        <p:spPr/>
+        <p:txBody>
+          <a:bodyPr/>
+          <a:lstStyle/>
+          <a:p>
+            <a:endParaRPr lang="en-US"/>
+          </a:p>
+        </p:txBody>
+      </p:sp>
+      <p:sp>
+        <p:nvSpPr>
+          <p:cNvPr id="4" name="TextBox 3"/>
+          <p:cNvSpPr txBox="1"/>
+          <p:nvPr/>
+        </p:nvSpPr>
+        <p:spPr>
+          <a:xfrm>
+            <a:off x="609600" y="6400800"/>
+            <a:ext cx="6172200" cy="276999"/>
+          </a:xfrm>
+          <a:prstGeom prst="rect">
+            <a:avLst/>
+          </a:prstGeom>
+          <a:noFill/>
+        </p:spPr>
+        <p:txBody>
+          <a:bodyPr wrap="square" rtlCol="0">
+            <a:spAutoFit/>
+          </a:bodyPr>
+          <a:lstStyle/>
+          <a:p>
+            <a:r>
+              <a:rPr lang="en-US" sz="1200" b="1" dirty="0" smtClean="0"/>
+              <a:t>An Improved Vehicular Ad Hoc Routing Protocol for City Environments</a:t>
+            </a:r>
+            <a:endParaRPr lang="en-US" sz="1200" b="1" dirty="0"/>
+          </a:p>
+        </p:txBody>
+      </p:sp>
+    </p:spTree>
+  </p:cSld>
+  <p:clrMapOvr>
+    <a:masterClrMapping/>
+  </p:clrMapOvr>
+</p:sld>
+</file>
+
+<file path=ppt/slides/slide71.xml><?xml version="1.0" encoding="utf-8"?>
+<p:sld xmlns:a="http://schemas.openxmlformats.org/drawingml/2006/main" xmlns:r="http://schemas.openxmlformats.org/officeDocument/2006/relationships" xmlns:p="http://schemas.openxmlformats.org/presentationml/2006/main">
+  <p:cSld>
+    <p:spTree>
+      <p:nvGrpSpPr>
+        <p:cNvPr id="1" name=""/>
+        <p:cNvGrpSpPr/>
+        <p:nvPr/>
+      </p:nvGrpSpPr>
+      <p:grpSpPr>
+        <a:xfrm>
+          <a:off x="0" y="0"/>
+          <a:ext cx="0" cy="0"/>
+          <a:chOff x="0" y="0"/>
+          <a:chExt cx="0" cy="0"/>
+        </a:xfrm>
+      </p:grpSpPr>
+      <p:sp>
+        <p:nvSpPr>
+          <p:cNvPr id="2" name="Title 1"/>
+          <p:cNvSpPr>
+            <a:spLocks noGrp="1"/>
+          </p:cNvSpPr>
+          <p:nvPr>
+            <p:ph type="title"/>
+          </p:nvPr>
+        </p:nvSpPr>
+        <p:spPr/>
+        <p:txBody>
+          <a:bodyPr/>
+          <a:lstStyle/>
+          <a:p>
+            <a:r>
+              <a:rPr lang="en-US" dirty="0" err="1" smtClean="0"/>
+              <a:t>GyTAR</a:t>
+            </a:r>
+            <a:r>
+              <a:rPr lang="en-US" dirty="0" smtClean="0"/>
+              <a:t> Evaluation System</a:t>
+            </a:r>
+            <a:endParaRPr lang="en-US" dirty="0"/>
+          </a:p>
+        </p:txBody>
+      </p:sp>
+      <p:sp>
+        <p:nvSpPr>
+          <p:cNvPr id="3" name="Content Placeholder 2"/>
+          <p:cNvSpPr>
+            <a:spLocks noGrp="1"/>
+          </p:cNvSpPr>
+          <p:nvPr>
+            <p:ph sz="quarter" idx="1"/>
+          </p:nvPr>
+        </p:nvSpPr>
+        <p:spPr/>
+        <p:txBody>
+          <a:bodyPr/>
+          <a:lstStyle/>
+          <a:p>
+            <a:endParaRPr lang="en-US" dirty="0"/>
+          </a:p>
+        </p:txBody>
+      </p:sp>
+      <p:pic>
+        <p:nvPicPr>
+          <p:cNvPr id="4" name="Picture 3"/>
+          <p:cNvPicPr/>
+          <p:nvPr/>
+        </p:nvPicPr>
+        <p:blipFill>
+          <a:blip r:embed="rId2" cstate="print"/>
+          <a:srcRect/>
+          <a:stretch>
+            <a:fillRect/>
+          </a:stretch>
+        </p:blipFill>
+        <p:spPr bwMode="auto">
+          <a:xfrm>
+            <a:off x="1752600" y="1295400"/>
+            <a:ext cx="5562600" cy="4724400"/>
+          </a:xfrm>
+          <a:prstGeom prst="rect">
+            <a:avLst/>
+          </a:prstGeom>
+          <a:noFill/>
+          <a:ln w="9525">
+            <a:noFill/>
+            <a:miter lim="800000"/>
+            <a:headEnd/>
+            <a:tailEnd/>
+          </a:ln>
+        </p:spPr>
+      </p:pic>
+      <p:sp>
+        <p:nvSpPr>
+          <p:cNvPr id="5" name="TextBox 4"/>
+          <p:cNvSpPr txBox="1"/>
+          <p:nvPr/>
+        </p:nvSpPr>
+        <p:spPr>
+          <a:xfrm>
+            <a:off x="609600" y="6400800"/>
+            <a:ext cx="6172200" cy="276999"/>
+          </a:xfrm>
+          <a:prstGeom prst="rect">
+            <a:avLst/>
+          </a:prstGeom>
+          <a:noFill/>
+        </p:spPr>
+        <p:txBody>
+          <a:bodyPr wrap="square" rtlCol="0">
+            <a:spAutoFit/>
+          </a:bodyPr>
+          <a:lstStyle/>
+          <a:p>
+            <a:r>
+              <a:rPr lang="en-US" sz="1200" b="1" dirty="0" smtClean="0"/>
+              <a:t>An Improved Vehicular Ad Hoc Routing Protocol for City Environments</a:t>
+            </a:r>
+            <a:endParaRPr lang="en-US" sz="1200" b="1" dirty="0"/>
           </a:p>
         </p:txBody>
       </p:sp>

</xml_diff>

<commit_message>
Update power point with simulations
</commit_message>
<xml_diff>
--- a/VANET_Felix.pptx
+++ b/VANET_Felix.pptx
@@ -5,7 +5,7 @@
     <p:sldMasterId id="2147483696" r:id="rId1"/>
   </p:sldMasterIdLst>
   <p:notesMasterIdLst>
-    <p:notesMasterId r:id="rId73"/>
+    <p:notesMasterId r:id="rId76"/>
   </p:notesMasterIdLst>
   <p:sldIdLst>
     <p:sldId id="280" r:id="rId2"/>
@@ -77,8 +77,11 @@
     <p:sldId id="333" r:id="rId68"/>
     <p:sldId id="334" r:id="rId69"/>
     <p:sldId id="335" r:id="rId70"/>
-    <p:sldId id="336" r:id="rId71"/>
-    <p:sldId id="337" r:id="rId72"/>
+    <p:sldId id="338" r:id="rId71"/>
+    <p:sldId id="336" r:id="rId72"/>
+    <p:sldId id="337" r:id="rId73"/>
+    <p:sldId id="339" r:id="rId74"/>
+    <p:sldId id="340" r:id="rId75"/>
   </p:sldIdLst>
   <p:sldSz cx="9144000" cy="6858000" type="screen4x3"/>
   <p:notesSz cx="6858000" cy="9144000"/>
@@ -3007,7 +3010,7 @@
             <a:fld id="{AA1794F1-29D0-4E50-8F0F-8A456A29C142}" type="datetimeFigureOut">
               <a:rPr lang="en-US" smtClean="0"/>
               <a:pPr/>
-              <a:t>11/16/2012</a:t>
+              <a:t>11/17/2012</a:t>
             </a:fld>
             <a:endParaRPr lang="en-US"/>
           </a:p>
@@ -3799,7 +3802,7 @@
             <a:fld id="{1D8BD707-D9CF-40AE-B4C6-C98DA3205C09}" type="datetimeFigureOut">
               <a:rPr lang="en-US" smtClean="0"/>
               <a:pPr/>
-              <a:t>11/16/2012</a:t>
+              <a:t>11/17/2012</a:t>
             </a:fld>
             <a:endParaRPr lang="en-US"/>
           </a:p>
@@ -4160,7 +4163,7 @@
             <a:fld id="{1D8BD707-D9CF-40AE-B4C6-C98DA3205C09}" type="datetimeFigureOut">
               <a:rPr lang="en-US" smtClean="0"/>
               <a:pPr/>
-              <a:t>11/16/2012</a:t>
+              <a:t>11/17/2012</a:t>
             </a:fld>
             <a:endParaRPr lang="en-US"/>
           </a:p>
@@ -4337,7 +4340,7 @@
             <a:fld id="{1D8BD707-D9CF-40AE-B4C6-C98DA3205C09}" type="datetimeFigureOut">
               <a:rPr lang="en-US" smtClean="0"/>
               <a:pPr/>
-              <a:t>11/16/2012</a:t>
+              <a:t>11/17/2012</a:t>
             </a:fld>
             <a:endParaRPr lang="en-US"/>
           </a:p>
@@ -4574,7 +4577,7 @@
             <a:fld id="{1D8BD707-D9CF-40AE-B4C6-C98DA3205C09}" type="datetimeFigureOut">
               <a:rPr lang="en-US" smtClean="0"/>
               <a:pPr/>
-              <a:t>11/16/2012</a:t>
+              <a:t>11/17/2012</a:t>
             </a:fld>
             <a:endParaRPr lang="en-US"/>
           </a:p>
@@ -4845,7 +4848,7 @@
             <a:fld id="{1D8BD707-D9CF-40AE-B4C6-C98DA3205C09}" type="datetimeFigureOut">
               <a:rPr lang="en-US" smtClean="0"/>
               <a:pPr/>
-              <a:t>11/16/2012</a:t>
+              <a:t>11/17/2012</a:t>
             </a:fld>
             <a:endParaRPr lang="en-US"/>
           </a:p>
@@ -5067,7 +5070,7 @@
             <a:fld id="{1D8BD707-D9CF-40AE-B4C6-C98DA3205C09}" type="datetimeFigureOut">
               <a:rPr lang="en-US" smtClean="0"/>
               <a:pPr/>
-              <a:t>11/16/2012</a:t>
+              <a:t>11/17/2012</a:t>
             </a:fld>
             <a:endParaRPr lang="en-US"/>
           </a:p>
@@ -5421,7 +5424,7 @@
             <a:fld id="{1D8BD707-D9CF-40AE-B4C6-C98DA3205C09}" type="datetimeFigureOut">
               <a:rPr lang="en-US" smtClean="0"/>
               <a:pPr/>
-              <a:t>11/16/2012</a:t>
+              <a:t>11/17/2012</a:t>
             </a:fld>
             <a:endParaRPr lang="en-US"/>
           </a:p>
@@ -5655,7 +5658,7 @@
             <a:fld id="{1D8BD707-D9CF-40AE-B4C6-C98DA3205C09}" type="datetimeFigureOut">
               <a:rPr lang="en-US" smtClean="0"/>
               <a:pPr/>
-              <a:t>11/16/2012</a:t>
+              <a:t>11/17/2012</a:t>
             </a:fld>
             <a:endParaRPr lang="en-US"/>
           </a:p>
@@ -5797,7 +5800,7 @@
             <a:fld id="{1D8BD707-D9CF-40AE-B4C6-C98DA3205C09}" type="datetimeFigureOut">
               <a:rPr lang="en-US" smtClean="0"/>
               <a:pPr/>
-              <a:t>11/16/2012</a:t>
+              <a:t>11/17/2012</a:t>
             </a:fld>
             <a:endParaRPr lang="en-US"/>
           </a:p>
@@ -6076,7 +6079,7 @@
             <a:fld id="{1D8BD707-D9CF-40AE-B4C6-C98DA3205C09}" type="datetimeFigureOut">
               <a:rPr lang="en-US" smtClean="0"/>
               <a:pPr/>
-              <a:t>11/16/2012</a:t>
+              <a:t>11/17/2012</a:t>
             </a:fld>
             <a:endParaRPr lang="en-US"/>
           </a:p>
@@ -6485,7 +6488,7 @@
             <a:fld id="{1D8BD707-D9CF-40AE-B4C6-C98DA3205C09}" type="datetimeFigureOut">
               <a:rPr lang="en-US" smtClean="0"/>
               <a:pPr/>
-              <a:t>11/16/2012</a:t>
+              <a:t>11/17/2012</a:t>
             </a:fld>
             <a:endParaRPr lang="en-US"/>
           </a:p>
@@ -6825,7 +6828,7 @@
             <a:fld id="{1D8BD707-D9CF-40AE-B4C6-C98DA3205C09}" type="datetimeFigureOut">
               <a:rPr lang="en-US" smtClean="0"/>
               <a:pPr/>
-              <a:t>11/16/2012</a:t>
+              <a:t>11/17/2012</a:t>
             </a:fld>
             <a:endParaRPr lang="en-US"/>
           </a:p>
@@ -20433,11 +20436,7 @@
           <a:p>
             <a:r>
               <a:rPr lang="en-US" dirty="0" smtClean="0"/>
-              <a:t> IEEE </a:t>
-            </a:r>
-            <a:r>
-              <a:rPr lang="en-US" dirty="0" smtClean="0"/>
-              <a:t>International Conference on Communications, 2007, ICC’07’ (pgs 3972-3979)</a:t>
+              <a:t> IEEE International Conference on Communications, 2007, ICC’07’ (pgs 3972-3979)</a:t>
             </a:r>
             <a:endParaRPr lang="en-US" dirty="0"/>
           </a:p>
@@ -20862,6 +20861,14 @@
           <a:bodyPr/>
           <a:lstStyle/>
           <a:p>
+            <a:r>
+              <a:rPr lang="en-US" dirty="0" smtClean="0"/>
+              <a:t>First Premise with </a:t>
+            </a:r>
+            <a:r>
+              <a:rPr lang="en-US" dirty="0" err="1" smtClean="0"/>
+              <a:t>GyTAR</a:t>
+            </a:r>
             <a:endParaRPr lang="en-US" dirty="0"/>
           </a:p>
         </p:txBody>
@@ -20881,6 +20888,30 @@
           <a:bodyPr/>
           <a:lstStyle/>
           <a:p>
+            <a:r>
+              <a:rPr lang="en-US" dirty="0" smtClean="0"/>
+              <a:t>Ability to determine which intersection (junction) to send packets. This determines the path a </a:t>
+            </a:r>
+            <a:r>
+              <a:rPr lang="en-US" dirty="0" smtClean="0"/>
+              <a:t>packet of data traverses</a:t>
+            </a:r>
+          </a:p>
+          <a:p>
+            <a:r>
+              <a:rPr lang="en-US" dirty="0" smtClean="0"/>
+              <a:t>Factors considered are vehicular density at each junction relative to the transmitting vehicles location</a:t>
+            </a:r>
+          </a:p>
+          <a:p>
+            <a:r>
+              <a:rPr lang="en-US" dirty="0" err="1" smtClean="0"/>
+              <a:t>GyTAR</a:t>
+            </a:r>
+            <a:r>
+              <a:rPr lang="en-US" dirty="0" smtClean="0"/>
+              <a:t> then evaluates each possibility with a point system where the highest point total will be the selected data path</a:t>
+            </a:r>
             <a:endParaRPr lang="en-US" dirty="0"/>
           </a:p>
         </p:txBody>
@@ -21050,15 +21081,7 @@
             </a:r>
             <a:r>
               <a:rPr lang="en-US" dirty="0" smtClean="0"/>
-              <a:t>:</a:t>
-            </a:r>
-            <a:r>
-              <a:rPr lang="en-US" dirty="0" smtClean="0"/>
-              <a:t> </a:t>
-            </a:r>
-            <a:r>
-              <a:rPr lang="en-US" dirty="0" smtClean="0"/>
-              <a:t>D</a:t>
+              <a:t>: D</a:t>
             </a:r>
             <a:r>
               <a:rPr lang="en-US" baseline="-25000" dirty="0" smtClean="0"/>
@@ -21066,15 +21089,7 @@
             </a:r>
             <a:r>
               <a:rPr lang="en-US" dirty="0" smtClean="0"/>
-              <a:t>/</a:t>
-            </a:r>
-            <a:r>
-              <a:rPr lang="en-US" dirty="0" smtClean="0"/>
-              <a:t> </a:t>
-            </a:r>
-            <a:r>
-              <a:rPr lang="en-US" dirty="0" smtClean="0"/>
-              <a:t>D</a:t>
+              <a:t>/ D</a:t>
             </a:r>
             <a:r>
               <a:rPr lang="en-US" baseline="-25000" dirty="0" smtClean="0"/>
@@ -21082,11 +21097,7 @@
             </a:r>
             <a:r>
               <a:rPr lang="en-US" dirty="0" smtClean="0"/>
-              <a:t> </a:t>
-            </a:r>
-            <a:r>
-              <a:rPr lang="en-US" dirty="0" smtClean="0"/>
-              <a:t>(</a:t>
+              <a:t> (</a:t>
             </a:r>
             <a:r>
               <a:rPr lang="en-US" dirty="0" err="1" smtClean="0"/>
@@ -21098,11 +21109,7 @@
             </a:r>
             <a:r>
               <a:rPr lang="en-US" dirty="0" smtClean="0"/>
-              <a:t> </a:t>
-            </a:r>
-            <a:r>
-              <a:rPr lang="en-US" dirty="0" smtClean="0"/>
-              <a:t>determines the closeness of the candidate junction to the destination point)</a:t>
+              <a:t> determines the closeness of the candidate junction to the destination point)</a:t>
             </a:r>
           </a:p>
           <a:p>
@@ -21165,11 +21172,7 @@
             </a:r>
             <a:r>
               <a:rPr lang="en-US" dirty="0" smtClean="0"/>
-              <a:t> </a:t>
-            </a:r>
-            <a:r>
-              <a:rPr lang="en-US" dirty="0" smtClean="0"/>
-              <a:t>= </a:t>
+              <a:t> = </a:t>
             </a:r>
             <a:r>
               <a:rPr lang="en-US" dirty="0" err="1" smtClean="0"/>
@@ -21181,11 +21184,7 @@
             </a:r>
             <a:r>
               <a:rPr lang="en-US" dirty="0" smtClean="0"/>
-              <a:t>/</a:t>
-            </a:r>
-            <a:r>
-              <a:rPr lang="en-US" dirty="0" smtClean="0"/>
-              <a:t> </a:t>
+              <a:t>/ </a:t>
             </a:r>
             <a:r>
               <a:rPr lang="en-US" dirty="0" err="1" smtClean="0"/>
@@ -21324,11 +21323,7 @@
             </a:r>
             <a:r>
               <a:rPr lang="en-US" dirty="0" smtClean="0"/>
-              <a:t>/</a:t>
-            </a:r>
-            <a:r>
-              <a:rPr lang="en-US" dirty="0" smtClean="0"/>
-              <a:t> </a:t>
+              <a:t>/ </a:t>
             </a:r>
             <a:r>
               <a:rPr lang="en-US" dirty="0" err="1" smtClean="0"/>
@@ -21847,12 +21842,16 @@
           <a:lstStyle/>
           <a:p>
             <a:r>
+              <a:rPr lang="en-US" dirty="0" smtClean="0"/>
+              <a:t>Second Premise with </a:t>
+            </a:r>
+            <a:r>
               <a:rPr lang="en-US" dirty="0" err="1" smtClean="0"/>
               <a:t>GyTAR</a:t>
             </a:r>
             <a:r>
               <a:rPr lang="en-US" dirty="0" smtClean="0"/>
-              <a:t> Evaluation System</a:t>
+              <a:t> </a:t>
             </a:r>
             <a:endParaRPr lang="en-US" dirty="0"/>
           </a:p>
@@ -21873,37 +21872,23 @@
           <a:bodyPr/>
           <a:lstStyle/>
           <a:p>
-            <a:endParaRPr lang="en-US"/>
-          </a:p>
-        </p:txBody>
-      </p:sp>
-      <p:sp>
-        <p:nvSpPr>
-          <p:cNvPr id="4" name="TextBox 3"/>
-          <p:cNvSpPr txBox="1"/>
-          <p:nvPr/>
-        </p:nvSpPr>
-        <p:spPr>
-          <a:xfrm>
-            <a:off x="609600" y="6400800"/>
-            <a:ext cx="6172200" cy="276999"/>
-          </a:xfrm>
-          <a:prstGeom prst="rect">
-            <a:avLst/>
-          </a:prstGeom>
-          <a:noFill/>
-        </p:spPr>
-        <p:txBody>
-          <a:bodyPr wrap="square" rtlCol="0">
-            <a:spAutoFit/>
-          </a:bodyPr>
-          <a:lstStyle/>
-          <a:p>
-            <a:r>
-              <a:rPr lang="en-US" sz="1200" b="1" dirty="0" smtClean="0"/>
-              <a:t>An Improved Vehicular Ad Hoc Routing Protocol for City Environments</a:t>
-            </a:r>
-            <a:endParaRPr lang="en-US" sz="1200" b="1" dirty="0"/>
+            <a:r>
+              <a:rPr lang="en-US" dirty="0" smtClean="0"/>
+              <a:t>The ability to forward packets between two selected junctions</a:t>
+            </a:r>
+          </a:p>
+          <a:p>
+            <a:r>
+              <a:rPr lang="en-US" dirty="0" smtClean="0"/>
+              <a:t>The sending vehicle manages knowledge of the speed, direction, and position of neighboring vehicles to aid in the decision</a:t>
+            </a:r>
+          </a:p>
+          <a:p>
+            <a:r>
+              <a:rPr lang="en-US" dirty="0" smtClean="0"/>
+              <a:t>Figure 2 illustrates how the two premises are used together to decide which vehicles to send packets</a:t>
+            </a:r>
+            <a:endParaRPr lang="en-US" dirty="0"/>
           </a:p>
         </p:txBody>
       </p:sp>
@@ -21974,6 +21959,139 @@
           <a:bodyPr/>
           <a:lstStyle/>
           <a:p>
+            <a:r>
+              <a:rPr lang="en-US" dirty="0" smtClean="0"/>
+              <a:t>The forwarding vehicles has 4 vehicles in it’s transmission range and knows the destination junction for the packets</a:t>
+            </a:r>
+          </a:p>
+          <a:p>
+            <a:r>
+              <a:rPr lang="en-US" dirty="0" smtClean="0"/>
+              <a:t>At time t1 vehicle 4 is the closest vehicle to the desired junction </a:t>
+            </a:r>
+          </a:p>
+          <a:p>
+            <a:r>
+              <a:rPr lang="en-US" dirty="0" err="1" smtClean="0"/>
+              <a:t>GyTAR</a:t>
+            </a:r>
+            <a:r>
+              <a:rPr lang="en-US" dirty="0" smtClean="0"/>
+              <a:t> accounts for the speed and direction of candidate vehicles. Vehicle 3 and 4 are travelling in the opposite direction of the desired destination</a:t>
+            </a:r>
+          </a:p>
+          <a:p>
+            <a:r>
+              <a:rPr lang="en-US" dirty="0" smtClean="0"/>
+              <a:t>At time t2 vehicle 1 passes vehicle 2 because it is travelling faster</a:t>
+            </a:r>
+          </a:p>
+          <a:p>
+            <a:r>
+              <a:rPr lang="en-US" dirty="0" smtClean="0"/>
+              <a:t>Based on the point system vehicle 1 is chosen to forward the packet to the desired junction</a:t>
+            </a:r>
+            <a:endParaRPr lang="en-US" dirty="0"/>
+          </a:p>
+        </p:txBody>
+      </p:sp>
+      <p:sp>
+        <p:nvSpPr>
+          <p:cNvPr id="4" name="TextBox 3"/>
+          <p:cNvSpPr txBox="1"/>
+          <p:nvPr/>
+        </p:nvSpPr>
+        <p:spPr>
+          <a:xfrm>
+            <a:off x="609600" y="6400800"/>
+            <a:ext cx="6172200" cy="276999"/>
+          </a:xfrm>
+          <a:prstGeom prst="rect">
+            <a:avLst/>
+          </a:prstGeom>
+          <a:noFill/>
+        </p:spPr>
+        <p:txBody>
+          <a:bodyPr wrap="square" rtlCol="0">
+            <a:spAutoFit/>
+          </a:bodyPr>
+          <a:lstStyle/>
+          <a:p>
+            <a:r>
+              <a:rPr lang="en-US" sz="1200" b="1" dirty="0" smtClean="0"/>
+              <a:t>An Improved Vehicular Ad Hoc Routing Protocol for City Environments</a:t>
+            </a:r>
+            <a:endParaRPr lang="en-US" sz="1200" b="1" dirty="0"/>
+          </a:p>
+        </p:txBody>
+      </p:sp>
+    </p:spTree>
+  </p:cSld>
+  <p:clrMapOvr>
+    <a:masterClrMapping/>
+  </p:clrMapOvr>
+</p:sld>
+</file>
+
+<file path=ppt/slides/slide72.xml><?xml version="1.0" encoding="utf-8"?>
+<p:sld xmlns:a="http://schemas.openxmlformats.org/drawingml/2006/main" xmlns:r="http://schemas.openxmlformats.org/officeDocument/2006/relationships" xmlns:p="http://schemas.openxmlformats.org/presentationml/2006/main">
+  <p:cSld>
+    <p:spTree>
+      <p:nvGrpSpPr>
+        <p:cNvPr id="1" name=""/>
+        <p:cNvGrpSpPr/>
+        <p:nvPr/>
+      </p:nvGrpSpPr>
+      <p:grpSpPr>
+        <a:xfrm>
+          <a:off x="0" y="0"/>
+          <a:ext cx="0" cy="0"/>
+          <a:chOff x="0" y="0"/>
+          <a:chExt cx="0" cy="0"/>
+        </a:xfrm>
+      </p:grpSpPr>
+      <p:sp>
+        <p:nvSpPr>
+          <p:cNvPr id="2" name="Title 1"/>
+          <p:cNvSpPr>
+            <a:spLocks noGrp="1"/>
+          </p:cNvSpPr>
+          <p:nvPr>
+            <p:ph type="title"/>
+          </p:nvPr>
+        </p:nvSpPr>
+        <p:spPr/>
+        <p:txBody>
+          <a:bodyPr/>
+          <a:lstStyle/>
+          <a:p>
+            <a:r>
+              <a:rPr lang="en-US" dirty="0" err="1" smtClean="0"/>
+              <a:t>GyTAR</a:t>
+            </a:r>
+            <a:r>
+              <a:rPr lang="en-US" dirty="0" smtClean="0"/>
+              <a:t> Evaluation System</a:t>
+            </a:r>
+            <a:endParaRPr lang="en-US" dirty="0"/>
+          </a:p>
+        </p:txBody>
+      </p:sp>
+      <p:sp>
+        <p:nvSpPr>
+          <p:cNvPr id="3" name="Content Placeholder 2"/>
+          <p:cNvSpPr>
+            <a:spLocks noGrp="1"/>
+          </p:cNvSpPr>
+          <p:nvPr>
+            <p:ph sz="quarter" idx="1"/>
+          </p:nvPr>
+        </p:nvSpPr>
+        <p:spPr/>
+        <p:txBody>
+          <a:bodyPr/>
+          <a:lstStyle/>
+          <a:p>
             <a:endParaRPr lang="en-US" dirty="0"/>
           </a:p>
         </p:txBody>
@@ -22043,6 +22161,314 @@
   <p:clrMapOvr>
     <a:masterClrMapping/>
   </p:clrMapOvr>
+</p:sld>
+</file>
+
+<file path=ppt/slides/slide73.xml><?xml version="1.0" encoding="utf-8"?>
+<p:sld xmlns:a="http://schemas.openxmlformats.org/drawingml/2006/main" xmlns:r="http://schemas.openxmlformats.org/officeDocument/2006/relationships" xmlns:p="http://schemas.openxmlformats.org/presentationml/2006/main">
+  <p:cSld>
+    <p:spTree>
+      <p:nvGrpSpPr>
+        <p:cNvPr id="1" name=""/>
+        <p:cNvGrpSpPr/>
+        <p:nvPr/>
+      </p:nvGrpSpPr>
+      <p:grpSpPr>
+        <a:xfrm>
+          <a:off x="0" y="0"/>
+          <a:ext cx="0" cy="0"/>
+          <a:chOff x="0" y="0"/>
+          <a:chExt cx="0" cy="0"/>
+        </a:xfrm>
+      </p:grpSpPr>
+      <p:sp>
+        <p:nvSpPr>
+          <p:cNvPr id="2" name="Title 1"/>
+          <p:cNvSpPr>
+            <a:spLocks noGrp="1"/>
+          </p:cNvSpPr>
+          <p:nvPr>
+            <p:ph type="title"/>
+          </p:nvPr>
+        </p:nvSpPr>
+        <p:spPr/>
+        <p:txBody>
+          <a:bodyPr/>
+          <a:lstStyle/>
+          <a:p>
+            <a:r>
+              <a:rPr lang="en-US" dirty="0" smtClean="0"/>
+              <a:t>Simulation Setup</a:t>
+            </a:r>
+            <a:endParaRPr lang="en-US" dirty="0"/>
+          </a:p>
+        </p:txBody>
+      </p:sp>
+      <p:sp>
+        <p:nvSpPr>
+          <p:cNvPr id="3" name="Content Placeholder 2"/>
+          <p:cNvSpPr>
+            <a:spLocks noGrp="1"/>
+          </p:cNvSpPr>
+          <p:nvPr>
+            <p:ph sz="quarter" idx="1"/>
+          </p:nvPr>
+        </p:nvSpPr>
+        <p:spPr/>
+        <p:txBody>
+          <a:bodyPr/>
+          <a:lstStyle/>
+          <a:p>
+            <a:r>
+              <a:rPr lang="en-US" dirty="0" smtClean="0"/>
+              <a:t>Simulation includes </a:t>
+            </a:r>
+            <a:r>
+              <a:rPr lang="en-US" dirty="0" err="1" smtClean="0"/>
+              <a:t>GyTAR</a:t>
+            </a:r>
+            <a:r>
+              <a:rPr lang="en-US" dirty="0" smtClean="0"/>
+              <a:t>, B-</a:t>
+            </a:r>
+            <a:r>
+              <a:rPr lang="en-US" dirty="0" err="1" smtClean="0"/>
+              <a:t>GyTAR</a:t>
+            </a:r>
+            <a:r>
+              <a:rPr lang="en-US" dirty="0" smtClean="0"/>
+              <a:t> (Basic </a:t>
+            </a:r>
+            <a:r>
+              <a:rPr lang="en-US" dirty="0" err="1" smtClean="0"/>
+              <a:t>GyTAR</a:t>
+            </a:r>
+            <a:r>
+              <a:rPr lang="en-US" dirty="0" smtClean="0"/>
+              <a:t> without recovery mechanisms), GSR (Geographic Source Routing), and LAR (Location Aided Routing)</a:t>
+            </a:r>
+          </a:p>
+          <a:p>
+            <a:r>
+              <a:rPr lang="en-US" dirty="0" smtClean="0"/>
+              <a:t>Figure 1 is the layout of a 2500x2500 m</a:t>
+            </a:r>
+            <a:r>
+              <a:rPr lang="en-US" baseline="30000" dirty="0" smtClean="0"/>
+              <a:t>2</a:t>
+            </a:r>
+            <a:r>
+              <a:rPr lang="en-US" dirty="0" smtClean="0"/>
+              <a:t> city with 16 intersections and 26 two-way roads</a:t>
+            </a:r>
+          </a:p>
+          <a:p>
+            <a:r>
+              <a:rPr lang="en-US" dirty="0" smtClean="0"/>
+              <a:t>Vehicles travel at speeds of 30-50 km/h</a:t>
+            </a:r>
+          </a:p>
+          <a:p>
+            <a:r>
+              <a:rPr lang="en-US" dirty="0" smtClean="0"/>
+              <a:t>The number of vehicles in the VANET system at anytime is between 100-300 vehicles</a:t>
+            </a:r>
+          </a:p>
+          <a:p>
+            <a:r>
+              <a:rPr lang="en-US" dirty="0" smtClean="0"/>
+              <a:t>The transmission range of the communication devices is 266 meters</a:t>
+            </a:r>
+          </a:p>
+        </p:txBody>
+      </p:sp>
+      <p:sp>
+        <p:nvSpPr>
+          <p:cNvPr id="4" name="TextBox 3"/>
+          <p:cNvSpPr txBox="1"/>
+          <p:nvPr/>
+        </p:nvSpPr>
+        <p:spPr>
+          <a:xfrm>
+            <a:off x="609600" y="6400800"/>
+            <a:ext cx="6172200" cy="276999"/>
+          </a:xfrm>
+          <a:prstGeom prst="rect">
+            <a:avLst/>
+          </a:prstGeom>
+          <a:noFill/>
+        </p:spPr>
+        <p:txBody>
+          <a:bodyPr wrap="square" rtlCol="0">
+            <a:spAutoFit/>
+          </a:bodyPr>
+          <a:lstStyle/>
+          <a:p>
+            <a:r>
+              <a:rPr lang="en-US" sz="1200" b="1" dirty="0" smtClean="0"/>
+              <a:t>An Improved Vehicular Ad Hoc Routing Protocol for City Environments</a:t>
+            </a:r>
+            <a:endParaRPr lang="en-US" sz="1200" b="1" dirty="0"/>
+          </a:p>
+        </p:txBody>
+      </p:sp>
+    </p:spTree>
+  </p:cSld>
+  <p:clrMapOvr>
+    <a:masterClrMapping/>
+  </p:clrMapOvr>
+</p:sld>
+</file>
+
+<file path=ppt/slides/slide74.xml><?xml version="1.0" encoding="utf-8"?>
+<p:sld xmlns:a="http://schemas.openxmlformats.org/drawingml/2006/main" xmlns:r="http://schemas.openxmlformats.org/officeDocument/2006/relationships" xmlns:p="http://schemas.openxmlformats.org/presentationml/2006/main">
+  <p:cSld>
+    <p:spTree>
+      <p:nvGrpSpPr>
+        <p:cNvPr id="1" name=""/>
+        <p:cNvGrpSpPr/>
+        <p:nvPr/>
+      </p:nvGrpSpPr>
+      <p:grpSpPr>
+        <a:xfrm>
+          <a:off x="0" y="0"/>
+          <a:ext cx="0" cy="0"/>
+          <a:chOff x="0" y="0"/>
+          <a:chExt cx="0" cy="0"/>
+        </a:xfrm>
+      </p:grpSpPr>
+      <p:sp>
+        <p:nvSpPr>
+          <p:cNvPr id="2" name="Title 1"/>
+          <p:cNvSpPr>
+            <a:spLocks noGrp="1"/>
+          </p:cNvSpPr>
+          <p:nvPr>
+            <p:ph type="title"/>
+          </p:nvPr>
+        </p:nvSpPr>
+        <p:spPr/>
+        <p:txBody>
+          <a:bodyPr/>
+          <a:lstStyle/>
+          <a:p>
+            <a:r>
+              <a:rPr lang="en-US" dirty="0" smtClean="0"/>
+              <a:t>Packet Delivery Ratio</a:t>
+            </a:r>
+            <a:endParaRPr lang="en-US" dirty="0"/>
+          </a:p>
+        </p:txBody>
+      </p:sp>
+      <p:sp>
+        <p:nvSpPr>
+          <p:cNvPr id="3" name="Content Placeholder 2"/>
+          <p:cNvSpPr>
+            <a:spLocks noGrp="1"/>
+          </p:cNvSpPr>
+          <p:nvPr>
+            <p:ph sz="quarter" idx="1"/>
+          </p:nvPr>
+        </p:nvSpPr>
+        <p:spPr/>
+        <p:txBody>
+          <a:bodyPr/>
+          <a:lstStyle/>
+          <a:p>
+            <a:endParaRPr lang="en-US" dirty="0" smtClean="0"/>
+          </a:p>
+          <a:p>
+            <a:endParaRPr lang="en-US" dirty="0" smtClean="0"/>
+          </a:p>
+          <a:p>
+            <a:endParaRPr lang="en-US" dirty="0" smtClean="0"/>
+          </a:p>
+          <a:p>
+            <a:endParaRPr lang="en-US" dirty="0" smtClean="0"/>
+          </a:p>
+          <a:p>
+            <a:endParaRPr lang="en-US" dirty="0" smtClean="0"/>
+          </a:p>
+          <a:p>
+            <a:endParaRPr lang="en-US" dirty="0" smtClean="0"/>
+          </a:p>
+          <a:p>
+            <a:endParaRPr lang="en-US" dirty="0" smtClean="0"/>
+          </a:p>
+        </p:txBody>
+      </p:sp>
+      <p:sp>
+        <p:nvSpPr>
+          <p:cNvPr id="4" name="TextBox 3"/>
+          <p:cNvSpPr txBox="1"/>
+          <p:nvPr/>
+        </p:nvSpPr>
+        <p:spPr>
+          <a:xfrm>
+            <a:off x="609600" y="6400800"/>
+            <a:ext cx="6172200" cy="276999"/>
+          </a:xfrm>
+          <a:prstGeom prst="rect">
+            <a:avLst/>
+          </a:prstGeom>
+          <a:noFill/>
+        </p:spPr>
+        <p:txBody>
+          <a:bodyPr wrap="square" rtlCol="0">
+            <a:spAutoFit/>
+          </a:bodyPr>
+          <a:lstStyle/>
+          <a:p>
+            <a:r>
+              <a:rPr lang="en-US" sz="1200" b="1" dirty="0" smtClean="0"/>
+              <a:t>An Improved Vehicular Ad Hoc Routing Protocol for City Environments</a:t>
+            </a:r>
+            <a:endParaRPr lang="en-US" sz="1200" b="1" dirty="0"/>
+          </a:p>
+        </p:txBody>
+      </p:sp>
+      <p:pic>
+        <p:nvPicPr>
+          <p:cNvPr id="5" name="Picture 4"/>
+          <p:cNvPicPr/>
+          <p:nvPr/>
+        </p:nvPicPr>
+        <p:blipFill>
+          <a:blip r:embed="rId2" cstate="print"/>
+          <a:srcRect/>
+          <a:stretch>
+            <a:fillRect/>
+          </a:stretch>
+        </p:blipFill>
+        <p:spPr bwMode="auto">
+          <a:xfrm>
+            <a:off x="609600" y="1219200"/>
+            <a:ext cx="8001000" cy="2971800"/>
+          </a:xfrm>
+          <a:prstGeom prst="rect">
+            <a:avLst/>
+          </a:prstGeom>
+          <a:noFill/>
+          <a:ln w="9525">
+            <a:noFill/>
+            <a:miter lim="800000"/>
+            <a:headEnd/>
+            <a:tailEnd/>
+          </a:ln>
+        </p:spPr>
+      </p:pic>
+    </p:spTree>
+  </p:cSld>
+  <p:clrMapOvr>
+    <a:masterClrMapping/>
+  </p:clrMapOvr>
+  <p:timing>
+    <p:tnLst>
+      <p:par>
+        <p:cTn id="1" dur="indefinite" restart="never" nodeType="tmRoot"/>
+      </p:par>
+    </p:tnLst>
+  </p:timing>
 </p:sld>
 </file>
 

</xml_diff>

<commit_message>
Finished most of Paper and Power Point
</commit_message>
<xml_diff>
--- a/VANET_Felix.pptx
+++ b/VANET_Felix.pptx
@@ -5,7 +5,7 @@
     <p:sldMasterId id="2147483696" r:id="rId1"/>
   </p:sldMasterIdLst>
   <p:notesMasterIdLst>
-    <p:notesMasterId r:id="rId76"/>
+    <p:notesMasterId r:id="rId79"/>
   </p:notesMasterIdLst>
   <p:sldIdLst>
     <p:sldId id="280" r:id="rId2"/>
@@ -82,6 +82,9 @@
     <p:sldId id="337" r:id="rId73"/>
     <p:sldId id="339" r:id="rId74"/>
     <p:sldId id="340" r:id="rId75"/>
+    <p:sldId id="341" r:id="rId76"/>
+    <p:sldId id="342" r:id="rId77"/>
+    <p:sldId id="343" r:id="rId78"/>
   </p:sldIdLst>
   <p:sldSz cx="9144000" cy="6858000" type="screen4x3"/>
   <p:notesSz cx="6858000" cy="9144000"/>
@@ -3010,7 +3013,7 @@
             <a:fld id="{AA1794F1-29D0-4E50-8F0F-8A456A29C142}" type="datetimeFigureOut">
               <a:rPr lang="en-US" smtClean="0"/>
               <a:pPr/>
-              <a:t>11/17/2012</a:t>
+              <a:t>11/18/2012</a:t>
             </a:fld>
             <a:endParaRPr lang="en-US"/>
           </a:p>
@@ -3802,7 +3805,7 @@
             <a:fld id="{1D8BD707-D9CF-40AE-B4C6-C98DA3205C09}" type="datetimeFigureOut">
               <a:rPr lang="en-US" smtClean="0"/>
               <a:pPr/>
-              <a:t>11/17/2012</a:t>
+              <a:t>11/18/2012</a:t>
             </a:fld>
             <a:endParaRPr lang="en-US"/>
           </a:p>
@@ -4163,7 +4166,7 @@
             <a:fld id="{1D8BD707-D9CF-40AE-B4C6-C98DA3205C09}" type="datetimeFigureOut">
               <a:rPr lang="en-US" smtClean="0"/>
               <a:pPr/>
-              <a:t>11/17/2012</a:t>
+              <a:t>11/18/2012</a:t>
             </a:fld>
             <a:endParaRPr lang="en-US"/>
           </a:p>
@@ -4340,7 +4343,7 @@
             <a:fld id="{1D8BD707-D9CF-40AE-B4C6-C98DA3205C09}" type="datetimeFigureOut">
               <a:rPr lang="en-US" smtClean="0"/>
               <a:pPr/>
-              <a:t>11/17/2012</a:t>
+              <a:t>11/18/2012</a:t>
             </a:fld>
             <a:endParaRPr lang="en-US"/>
           </a:p>
@@ -4577,7 +4580,7 @@
             <a:fld id="{1D8BD707-D9CF-40AE-B4C6-C98DA3205C09}" type="datetimeFigureOut">
               <a:rPr lang="en-US" smtClean="0"/>
               <a:pPr/>
-              <a:t>11/17/2012</a:t>
+              <a:t>11/18/2012</a:t>
             </a:fld>
             <a:endParaRPr lang="en-US"/>
           </a:p>
@@ -4848,7 +4851,7 @@
             <a:fld id="{1D8BD707-D9CF-40AE-B4C6-C98DA3205C09}" type="datetimeFigureOut">
               <a:rPr lang="en-US" smtClean="0"/>
               <a:pPr/>
-              <a:t>11/17/2012</a:t>
+              <a:t>11/18/2012</a:t>
             </a:fld>
             <a:endParaRPr lang="en-US"/>
           </a:p>
@@ -5070,7 +5073,7 @@
             <a:fld id="{1D8BD707-D9CF-40AE-B4C6-C98DA3205C09}" type="datetimeFigureOut">
               <a:rPr lang="en-US" smtClean="0"/>
               <a:pPr/>
-              <a:t>11/17/2012</a:t>
+              <a:t>11/18/2012</a:t>
             </a:fld>
             <a:endParaRPr lang="en-US"/>
           </a:p>
@@ -5424,7 +5427,7 @@
             <a:fld id="{1D8BD707-D9CF-40AE-B4C6-C98DA3205C09}" type="datetimeFigureOut">
               <a:rPr lang="en-US" smtClean="0"/>
               <a:pPr/>
-              <a:t>11/17/2012</a:t>
+              <a:t>11/18/2012</a:t>
             </a:fld>
             <a:endParaRPr lang="en-US"/>
           </a:p>
@@ -5658,7 +5661,7 @@
             <a:fld id="{1D8BD707-D9CF-40AE-B4C6-C98DA3205C09}" type="datetimeFigureOut">
               <a:rPr lang="en-US" smtClean="0"/>
               <a:pPr/>
-              <a:t>11/17/2012</a:t>
+              <a:t>11/18/2012</a:t>
             </a:fld>
             <a:endParaRPr lang="en-US"/>
           </a:p>
@@ -5800,7 +5803,7 @@
             <a:fld id="{1D8BD707-D9CF-40AE-B4C6-C98DA3205C09}" type="datetimeFigureOut">
               <a:rPr lang="en-US" smtClean="0"/>
               <a:pPr/>
-              <a:t>11/17/2012</a:t>
+              <a:t>11/18/2012</a:t>
             </a:fld>
             <a:endParaRPr lang="en-US"/>
           </a:p>
@@ -6079,7 +6082,7 @@
             <a:fld id="{1D8BD707-D9CF-40AE-B4C6-C98DA3205C09}" type="datetimeFigureOut">
               <a:rPr lang="en-US" smtClean="0"/>
               <a:pPr/>
-              <a:t>11/17/2012</a:t>
+              <a:t>11/18/2012</a:t>
             </a:fld>
             <a:endParaRPr lang="en-US"/>
           </a:p>
@@ -6488,7 +6491,7 @@
             <a:fld id="{1D8BD707-D9CF-40AE-B4C6-C98DA3205C09}" type="datetimeFigureOut">
               <a:rPr lang="en-US" smtClean="0"/>
               <a:pPr/>
-              <a:t>11/17/2012</a:t>
+              <a:t>11/18/2012</a:t>
             </a:fld>
             <a:endParaRPr lang="en-US"/>
           </a:p>
@@ -6828,7 +6831,7 @@
             <a:fld id="{1D8BD707-D9CF-40AE-B4C6-C98DA3205C09}" type="datetimeFigureOut">
               <a:rPr lang="en-US" smtClean="0"/>
               <a:pPr/>
-              <a:t>11/17/2012</a:t>
+              <a:t>11/18/2012</a:t>
             </a:fld>
             <a:endParaRPr lang="en-US"/>
           </a:p>
@@ -10033,6 +10036,13 @@
   <p:clrMapOvr>
     <a:masterClrMapping/>
   </p:clrMapOvr>
+  <p:timing>
+    <p:tnLst>
+      <p:par>
+        <p:cTn id="1" dur="indefinite" restart="never" nodeType="tmRoot"/>
+      </p:par>
+    </p:tnLst>
+  </p:timing>
 </p:sld>
 </file>
 
@@ -20890,11 +20900,7 @@
           <a:p>
             <a:r>
               <a:rPr lang="en-US" dirty="0" smtClean="0"/>
-              <a:t>Ability to determine which intersection (junction) to send packets. This determines the path a </a:t>
-            </a:r>
-            <a:r>
-              <a:rPr lang="en-US" dirty="0" smtClean="0"/>
-              <a:t>packet of data traverses</a:t>
+              <a:t>Ability to determine which intersection (junction) to send packets. This determines the path a packet of data traverses</a:t>
             </a:r>
           </a:p>
           <a:p>
@@ -22372,7 +22378,9 @@
         </p:nvSpPr>
         <p:spPr/>
         <p:txBody>
-          <a:bodyPr/>
+          <a:bodyPr>
+            <a:normAutofit fontScale="77500" lnSpcReduction="20000"/>
+          </a:bodyPr>
           <a:lstStyle/>
           <a:p>
             <a:endParaRPr lang="en-US" dirty="0" smtClean="0"/>
@@ -22390,7 +22398,50 @@
             <a:endParaRPr lang="en-US" dirty="0" smtClean="0"/>
           </a:p>
           <a:p>
-            <a:endParaRPr lang="en-US" dirty="0" smtClean="0"/>
+            <a:endParaRPr lang="en-US" sz="2000" dirty="0" smtClean="0"/>
+          </a:p>
+          <a:p>
+            <a:endParaRPr lang="en-US" sz="2000" dirty="0" smtClean="0"/>
+          </a:p>
+          <a:p>
+            <a:endParaRPr lang="en-US" sz="2000" dirty="0" smtClean="0"/>
+          </a:p>
+          <a:p>
+            <a:endParaRPr lang="en-US" sz="2000" dirty="0" smtClean="0"/>
+          </a:p>
+          <a:p>
+            <a:r>
+              <a:rPr lang="en-US" sz="2000" dirty="0" err="1" smtClean="0"/>
+              <a:t>GyTAR</a:t>
+            </a:r>
+            <a:r>
+              <a:rPr lang="en-US" sz="2000" dirty="0" smtClean="0"/>
+              <a:t> has the best packet delivery ratio regardless of the packet send rate or the number of nodes in a system</a:t>
+            </a:r>
+          </a:p>
+          <a:p>
+            <a:r>
+              <a:rPr lang="en-US" sz="2000" dirty="0" smtClean="0"/>
+              <a:t>This is attributed to the awareness of vehicle density and the protocol choosing the path best suited to transmit a message</a:t>
+            </a:r>
+          </a:p>
+          <a:p>
+            <a:r>
+              <a:rPr lang="en-US" sz="2000" dirty="0" smtClean="0"/>
+              <a:t>The recovery protocol, store-carry-forward,  bolsters the stability of the protocol</a:t>
+            </a:r>
+          </a:p>
+          <a:p>
+            <a:r>
+              <a:rPr lang="en-US" sz="2000" dirty="0" smtClean="0"/>
+              <a:t>In general as the node number increases so does the delivery packet ratio because there are less chances of having a disconnected network with more vehicles within transmission range</a:t>
+            </a:r>
+          </a:p>
+          <a:p>
+            <a:r>
+              <a:rPr lang="en-US" sz="2000" dirty="0" smtClean="0"/>
+              <a:t>Also, as the number of nodes increases past a threshold the quality decreases as interference between and over abundance of messages interfere with the network</a:t>
+            </a:r>
           </a:p>
           <a:p>
             <a:endParaRPr lang="en-US" dirty="0" smtClean="0"/>
@@ -22442,8 +22493,8 @@
         </p:blipFill>
         <p:spPr bwMode="auto">
           <a:xfrm>
-            <a:off x="609600" y="1219200"/>
-            <a:ext cx="8001000" cy="2971800"/>
+            <a:off x="762000" y="1219200"/>
+            <a:ext cx="7620000" cy="2667000"/>
           </a:xfrm>
           <a:prstGeom prst="rect">
             <a:avLst/>
@@ -22469,6 +22520,499 @@
       </p:par>
     </p:tnLst>
   </p:timing>
+</p:sld>
+</file>
+
+<file path=ppt/slides/slide75.xml><?xml version="1.0" encoding="utf-8"?>
+<p:sld xmlns:a="http://schemas.openxmlformats.org/drawingml/2006/main" xmlns:r="http://schemas.openxmlformats.org/officeDocument/2006/relationships" xmlns:p="http://schemas.openxmlformats.org/presentationml/2006/main">
+  <p:cSld>
+    <p:spTree>
+      <p:nvGrpSpPr>
+        <p:cNvPr id="1" name=""/>
+        <p:cNvGrpSpPr/>
+        <p:nvPr/>
+      </p:nvGrpSpPr>
+      <p:grpSpPr>
+        <a:xfrm>
+          <a:off x="0" y="0"/>
+          <a:ext cx="0" cy="0"/>
+          <a:chOff x="0" y="0"/>
+          <a:chExt cx="0" cy="0"/>
+        </a:xfrm>
+      </p:grpSpPr>
+      <p:sp>
+        <p:nvSpPr>
+          <p:cNvPr id="2" name="Title 1"/>
+          <p:cNvSpPr>
+            <a:spLocks noGrp="1"/>
+          </p:cNvSpPr>
+          <p:nvPr>
+            <p:ph type="title"/>
+          </p:nvPr>
+        </p:nvSpPr>
+        <p:spPr/>
+        <p:txBody>
+          <a:bodyPr/>
+          <a:lstStyle/>
+          <a:p>
+            <a:r>
+              <a:rPr lang="en-US" dirty="0" smtClean="0"/>
+              <a:t>End to End Packet Delay</a:t>
+            </a:r>
+            <a:endParaRPr lang="en-US" dirty="0"/>
+          </a:p>
+        </p:txBody>
+      </p:sp>
+      <p:sp>
+        <p:nvSpPr>
+          <p:cNvPr id="3" name="Content Placeholder 2"/>
+          <p:cNvSpPr>
+            <a:spLocks noGrp="1"/>
+          </p:cNvSpPr>
+          <p:nvPr>
+            <p:ph sz="quarter" idx="1"/>
+          </p:nvPr>
+        </p:nvSpPr>
+        <p:spPr/>
+        <p:txBody>
+          <a:bodyPr>
+            <a:normAutofit fontScale="77500" lnSpcReduction="20000"/>
+          </a:bodyPr>
+          <a:lstStyle/>
+          <a:p>
+            <a:endParaRPr lang="en-US" dirty="0" smtClean="0"/>
+          </a:p>
+          <a:p>
+            <a:endParaRPr lang="en-US" dirty="0" smtClean="0"/>
+          </a:p>
+          <a:p>
+            <a:endParaRPr lang="en-US" dirty="0" smtClean="0"/>
+          </a:p>
+          <a:p>
+            <a:endParaRPr lang="en-US" dirty="0" smtClean="0"/>
+          </a:p>
+          <a:p>
+            <a:endParaRPr lang="en-US" dirty="0" smtClean="0"/>
+          </a:p>
+          <a:p>
+            <a:endParaRPr lang="en-US" dirty="0" smtClean="0"/>
+          </a:p>
+          <a:p>
+            <a:endParaRPr lang="en-US" dirty="0" smtClean="0"/>
+          </a:p>
+          <a:p>
+            <a:endParaRPr lang="en-US" dirty="0" smtClean="0"/>
+          </a:p>
+          <a:p>
+            <a:r>
+              <a:rPr lang="en-US" dirty="0" smtClean="0"/>
+              <a:t>The </a:t>
+            </a:r>
+            <a:r>
+              <a:rPr lang="en-US" dirty="0" err="1" smtClean="0"/>
+              <a:t>GyTAR</a:t>
+            </a:r>
+            <a:r>
+              <a:rPr lang="en-US" dirty="0" smtClean="0"/>
+              <a:t> protocols clearly have a better end to end packet delay than both GSR and LAR</a:t>
+            </a:r>
+          </a:p>
+          <a:p>
+            <a:r>
+              <a:rPr lang="en-US" dirty="0" err="1" smtClean="0"/>
+              <a:t>GyTAR</a:t>
+            </a:r>
+            <a:r>
+              <a:rPr lang="en-US" dirty="0" smtClean="0"/>
+              <a:t> is a dynamic protocol and saves time by not updating static routing tables to improve decision time</a:t>
+            </a:r>
+          </a:p>
+          <a:p>
+            <a:r>
+              <a:rPr lang="en-US" dirty="0" smtClean="0"/>
+              <a:t>The greedy nature allows for </a:t>
+            </a:r>
+            <a:r>
+              <a:rPr lang="en-US" dirty="0" err="1" smtClean="0"/>
+              <a:t>GyTAR</a:t>
+            </a:r>
+            <a:r>
+              <a:rPr lang="en-US" dirty="0" smtClean="0"/>
+              <a:t> to choose the routes most likely to stay connected, reducing delay times</a:t>
+            </a:r>
+          </a:p>
+          <a:p>
+            <a:r>
+              <a:rPr lang="en-US" dirty="0" smtClean="0"/>
+              <a:t>This is clear in figure b at low vehicular density as </a:t>
+            </a:r>
+            <a:r>
+              <a:rPr lang="en-US" dirty="0" err="1" smtClean="0"/>
+              <a:t>GyTAR</a:t>
+            </a:r>
+            <a:r>
+              <a:rPr lang="en-US" dirty="0" smtClean="0"/>
+              <a:t> is able to choose connected paths with a higher probability thus decreasing the delay</a:t>
+            </a:r>
+          </a:p>
+        </p:txBody>
+      </p:sp>
+      <p:sp>
+        <p:nvSpPr>
+          <p:cNvPr id="4" name="TextBox 3"/>
+          <p:cNvSpPr txBox="1"/>
+          <p:nvPr/>
+        </p:nvSpPr>
+        <p:spPr>
+          <a:xfrm>
+            <a:off x="609600" y="6400800"/>
+            <a:ext cx="6172200" cy="276999"/>
+          </a:xfrm>
+          <a:prstGeom prst="rect">
+            <a:avLst/>
+          </a:prstGeom>
+          <a:noFill/>
+        </p:spPr>
+        <p:txBody>
+          <a:bodyPr wrap="square" rtlCol="0">
+            <a:spAutoFit/>
+          </a:bodyPr>
+          <a:lstStyle/>
+          <a:p>
+            <a:r>
+              <a:rPr lang="en-US" sz="1200" b="1" dirty="0" smtClean="0"/>
+              <a:t>An Improved Vehicular Ad Hoc Routing Protocol for City Environments</a:t>
+            </a:r>
+            <a:endParaRPr lang="en-US" sz="1200" b="1" dirty="0"/>
+          </a:p>
+        </p:txBody>
+      </p:sp>
+      <p:pic>
+        <p:nvPicPr>
+          <p:cNvPr id="5" name="Picture 4"/>
+          <p:cNvPicPr/>
+          <p:nvPr/>
+        </p:nvPicPr>
+        <p:blipFill>
+          <a:blip r:embed="rId2" cstate="print"/>
+          <a:srcRect/>
+          <a:stretch>
+            <a:fillRect/>
+          </a:stretch>
+        </p:blipFill>
+        <p:spPr bwMode="auto">
+          <a:xfrm>
+            <a:off x="685800" y="1295400"/>
+            <a:ext cx="7696200" cy="2438400"/>
+          </a:xfrm>
+          <a:prstGeom prst="rect">
+            <a:avLst/>
+          </a:prstGeom>
+          <a:noFill/>
+          <a:ln w="9525">
+            <a:noFill/>
+            <a:miter lim="800000"/>
+            <a:headEnd/>
+            <a:tailEnd/>
+          </a:ln>
+        </p:spPr>
+      </p:pic>
+    </p:spTree>
+  </p:cSld>
+  <p:clrMapOvr>
+    <a:masterClrMapping/>
+  </p:clrMapOvr>
+  <p:timing>
+    <p:tnLst>
+      <p:par>
+        <p:cTn id="1" dur="indefinite" restart="never" nodeType="tmRoot"/>
+      </p:par>
+    </p:tnLst>
+  </p:timing>
+</p:sld>
+</file>
+
+<file path=ppt/slides/slide76.xml><?xml version="1.0" encoding="utf-8"?>
+<p:sld xmlns:a="http://schemas.openxmlformats.org/drawingml/2006/main" xmlns:r="http://schemas.openxmlformats.org/officeDocument/2006/relationships" xmlns:p="http://schemas.openxmlformats.org/presentationml/2006/main">
+  <p:cSld>
+    <p:spTree>
+      <p:nvGrpSpPr>
+        <p:cNvPr id="1" name=""/>
+        <p:cNvGrpSpPr/>
+        <p:nvPr/>
+      </p:nvGrpSpPr>
+      <p:grpSpPr>
+        <a:xfrm>
+          <a:off x="0" y="0"/>
+          <a:ext cx="0" cy="0"/>
+          <a:chOff x="0" y="0"/>
+          <a:chExt cx="0" cy="0"/>
+        </a:xfrm>
+      </p:grpSpPr>
+      <p:sp>
+        <p:nvSpPr>
+          <p:cNvPr id="2" name="Title 1"/>
+          <p:cNvSpPr>
+            <a:spLocks noGrp="1"/>
+          </p:cNvSpPr>
+          <p:nvPr>
+            <p:ph type="title"/>
+          </p:nvPr>
+        </p:nvSpPr>
+        <p:spPr/>
+        <p:txBody>
+          <a:bodyPr/>
+          <a:lstStyle/>
+          <a:p>
+            <a:r>
+              <a:rPr lang="en-US" dirty="0" smtClean="0"/>
+              <a:t>Packet Overhead</a:t>
+            </a:r>
+            <a:endParaRPr lang="en-US" dirty="0"/>
+          </a:p>
+        </p:txBody>
+      </p:sp>
+      <p:sp>
+        <p:nvSpPr>
+          <p:cNvPr id="3" name="Content Placeholder 2"/>
+          <p:cNvSpPr>
+            <a:spLocks noGrp="1"/>
+          </p:cNvSpPr>
+          <p:nvPr>
+            <p:ph sz="quarter" idx="1"/>
+          </p:nvPr>
+        </p:nvSpPr>
+        <p:spPr/>
+        <p:txBody>
+          <a:bodyPr>
+            <a:normAutofit fontScale="85000" lnSpcReduction="20000"/>
+          </a:bodyPr>
+          <a:lstStyle/>
+          <a:p>
+            <a:endParaRPr lang="en-US" dirty="0" smtClean="0"/>
+          </a:p>
+          <a:p>
+            <a:endParaRPr lang="en-US" dirty="0" smtClean="0"/>
+          </a:p>
+          <a:p>
+            <a:endParaRPr lang="en-US" dirty="0" smtClean="0"/>
+          </a:p>
+          <a:p>
+            <a:endParaRPr lang="en-US" dirty="0" smtClean="0"/>
+          </a:p>
+          <a:p>
+            <a:endParaRPr lang="en-US" dirty="0" smtClean="0"/>
+          </a:p>
+          <a:p>
+            <a:endParaRPr lang="en-US" dirty="0" smtClean="0"/>
+          </a:p>
+          <a:p>
+            <a:endParaRPr lang="en-US" dirty="0" smtClean="0"/>
+          </a:p>
+          <a:p>
+            <a:endParaRPr lang="en-US" dirty="0" smtClean="0"/>
+          </a:p>
+          <a:p>
+            <a:r>
+              <a:rPr lang="en-US" dirty="0" smtClean="0"/>
+              <a:t>For every protocol packet overhead increases as the packet rate or number of nodes increase, however the </a:t>
+            </a:r>
+            <a:r>
+              <a:rPr lang="en-US" dirty="0" err="1" smtClean="0"/>
+              <a:t>GyTAR</a:t>
+            </a:r>
+            <a:r>
+              <a:rPr lang="en-US" dirty="0" smtClean="0"/>
+              <a:t> protocol outperforms GSR and LAR</a:t>
+            </a:r>
+          </a:p>
+          <a:p>
+            <a:r>
+              <a:rPr lang="en-US" dirty="0" smtClean="0"/>
+              <a:t>By choosing paths with the highest connectivity, less packets are produced, as a result reducing packet overhead</a:t>
+            </a:r>
+          </a:p>
+          <a:p>
+            <a:r>
+              <a:rPr lang="en-US" dirty="0" smtClean="0"/>
+              <a:t>This is apparent when vehicular density is high as GSR and LAR do not account for vehicular density</a:t>
+            </a:r>
+            <a:endParaRPr lang="en-US" dirty="0"/>
+          </a:p>
+        </p:txBody>
+      </p:sp>
+      <p:pic>
+        <p:nvPicPr>
+          <p:cNvPr id="4" name="Picture 3"/>
+          <p:cNvPicPr/>
+          <p:nvPr/>
+        </p:nvPicPr>
+        <p:blipFill>
+          <a:blip r:embed="rId2" cstate="print"/>
+          <a:srcRect/>
+          <a:stretch>
+            <a:fillRect/>
+          </a:stretch>
+        </p:blipFill>
+        <p:spPr bwMode="auto">
+          <a:xfrm>
+            <a:off x="609600" y="1295400"/>
+            <a:ext cx="8077200" cy="2743200"/>
+          </a:xfrm>
+          <a:prstGeom prst="rect">
+            <a:avLst/>
+          </a:prstGeom>
+          <a:noFill/>
+          <a:ln w="9525">
+            <a:noFill/>
+            <a:miter lim="800000"/>
+            <a:headEnd/>
+            <a:tailEnd/>
+          </a:ln>
+        </p:spPr>
+      </p:pic>
+      <p:sp>
+        <p:nvSpPr>
+          <p:cNvPr id="5" name="TextBox 4"/>
+          <p:cNvSpPr txBox="1"/>
+          <p:nvPr/>
+        </p:nvSpPr>
+        <p:spPr>
+          <a:xfrm>
+            <a:off x="609600" y="6400800"/>
+            <a:ext cx="6172200" cy="276999"/>
+          </a:xfrm>
+          <a:prstGeom prst="rect">
+            <a:avLst/>
+          </a:prstGeom>
+          <a:noFill/>
+        </p:spPr>
+        <p:txBody>
+          <a:bodyPr wrap="square" rtlCol="0">
+            <a:spAutoFit/>
+          </a:bodyPr>
+          <a:lstStyle/>
+          <a:p>
+            <a:r>
+              <a:rPr lang="en-US" sz="1200" b="1" dirty="0" smtClean="0"/>
+              <a:t>An Improved Vehicular Ad Hoc Routing Protocol for City Environments</a:t>
+            </a:r>
+            <a:endParaRPr lang="en-US" sz="1200" b="1" dirty="0"/>
+          </a:p>
+        </p:txBody>
+      </p:sp>
+    </p:spTree>
+  </p:cSld>
+  <p:clrMapOvr>
+    <a:masterClrMapping/>
+  </p:clrMapOvr>
+</p:sld>
+</file>
+
+<file path=ppt/slides/slide77.xml><?xml version="1.0" encoding="utf-8"?>
+<p:sld xmlns:a="http://schemas.openxmlformats.org/drawingml/2006/main" xmlns:r="http://schemas.openxmlformats.org/officeDocument/2006/relationships" xmlns:p="http://schemas.openxmlformats.org/presentationml/2006/main">
+  <p:cSld>
+    <p:spTree>
+      <p:nvGrpSpPr>
+        <p:cNvPr id="1" name=""/>
+        <p:cNvGrpSpPr/>
+        <p:nvPr/>
+      </p:nvGrpSpPr>
+      <p:grpSpPr>
+        <a:xfrm>
+          <a:off x="0" y="0"/>
+          <a:ext cx="0" cy="0"/>
+          <a:chOff x="0" y="0"/>
+          <a:chExt cx="0" cy="0"/>
+        </a:xfrm>
+      </p:grpSpPr>
+      <p:sp>
+        <p:nvSpPr>
+          <p:cNvPr id="2" name="Title 1"/>
+          <p:cNvSpPr>
+            <a:spLocks noGrp="1"/>
+          </p:cNvSpPr>
+          <p:nvPr>
+            <p:ph type="title"/>
+          </p:nvPr>
+        </p:nvSpPr>
+        <p:spPr/>
+        <p:txBody>
+          <a:bodyPr/>
+          <a:lstStyle/>
+          <a:p>
+            <a:r>
+              <a:rPr lang="en-US" dirty="0" smtClean="0"/>
+              <a:t>Conclusion</a:t>
+            </a:r>
+            <a:endParaRPr lang="en-US" dirty="0"/>
+          </a:p>
+        </p:txBody>
+      </p:sp>
+      <p:sp>
+        <p:nvSpPr>
+          <p:cNvPr id="3" name="Content Placeholder 2"/>
+          <p:cNvSpPr>
+            <a:spLocks noGrp="1"/>
+          </p:cNvSpPr>
+          <p:nvPr>
+            <p:ph sz="quarter" idx="1"/>
+          </p:nvPr>
+        </p:nvSpPr>
+        <p:spPr/>
+        <p:txBody>
+          <a:bodyPr/>
+          <a:lstStyle/>
+          <a:p>
+            <a:r>
+              <a:rPr lang="en-US" dirty="0" smtClean="0"/>
+              <a:t>We saw how the transmitting protocol can vastly improve the speed and quality of service in which data is transmitted</a:t>
+            </a:r>
+          </a:p>
+          <a:p>
+            <a:r>
+              <a:rPr lang="en-US" dirty="0" smtClean="0"/>
+              <a:t>Having a dynamic protocol also improved the end to end delay which is the most notable result. As technology improves people expect devices to work faster so reducing any delays definitely improves the user experience</a:t>
+            </a:r>
+            <a:endParaRPr lang="en-US" dirty="0"/>
+          </a:p>
+        </p:txBody>
+      </p:sp>
+      <p:sp>
+        <p:nvSpPr>
+          <p:cNvPr id="4" name="TextBox 3"/>
+          <p:cNvSpPr txBox="1"/>
+          <p:nvPr/>
+        </p:nvSpPr>
+        <p:spPr>
+          <a:xfrm>
+            <a:off x="609600" y="6400800"/>
+            <a:ext cx="6172200" cy="276999"/>
+          </a:xfrm>
+          <a:prstGeom prst="rect">
+            <a:avLst/>
+          </a:prstGeom>
+          <a:noFill/>
+        </p:spPr>
+        <p:txBody>
+          <a:bodyPr wrap="square" rtlCol="0">
+            <a:spAutoFit/>
+          </a:bodyPr>
+          <a:lstStyle/>
+          <a:p>
+            <a:r>
+              <a:rPr lang="en-US" sz="1200" b="1" dirty="0" smtClean="0"/>
+              <a:t>An Improved Vehicular Ad Hoc Routing Protocol for City Environments</a:t>
+            </a:r>
+            <a:endParaRPr lang="en-US" sz="1200" b="1" dirty="0"/>
+          </a:p>
+        </p:txBody>
+      </p:sp>
+    </p:spTree>
+  </p:cSld>
+  <p:clrMapOvr>
+    <a:masterClrMapping/>
+  </p:clrMapOvr>
 </p:sld>
 </file>
 

</xml_diff>